<commit_message>
change presentation to match proposal
</commit_message>
<xml_diff>
--- a/Final-Project-Team-2.pptx
+++ b/Final-Project-Team-2.pptx
@@ -5,21 +5,28 @@
     <p:sldMasterId id="2147483763" r:id="rId1"/>
   </p:sldMasterIdLst>
   <p:notesMasterIdLst>
-    <p:notesMasterId r:id="rId11"/>
+    <p:notesMasterId r:id="rId18"/>
   </p:notesMasterIdLst>
   <p:handoutMasterIdLst>
-    <p:handoutMasterId r:id="rId12"/>
+    <p:handoutMasterId r:id="rId19"/>
   </p:handoutMasterIdLst>
   <p:sldIdLst>
     <p:sldId id="256" r:id="rId2"/>
-    <p:sldId id="257" r:id="rId3"/>
-    <p:sldId id="259" r:id="rId4"/>
+    <p:sldId id="273" r:id="rId3"/>
+    <p:sldId id="257" r:id="rId4"/>
     <p:sldId id="260" r:id="rId5"/>
-    <p:sldId id="261" r:id="rId6"/>
-    <p:sldId id="262" r:id="rId7"/>
-    <p:sldId id="263" r:id="rId8"/>
-    <p:sldId id="264" r:id="rId9"/>
-    <p:sldId id="265" r:id="rId10"/>
+    <p:sldId id="269" r:id="rId6"/>
+    <p:sldId id="266" r:id="rId7"/>
+    <p:sldId id="261" r:id="rId8"/>
+    <p:sldId id="262" r:id="rId9"/>
+    <p:sldId id="270" r:id="rId10"/>
+    <p:sldId id="271" r:id="rId11"/>
+    <p:sldId id="272" r:id="rId12"/>
+    <p:sldId id="263" r:id="rId13"/>
+    <p:sldId id="267" r:id="rId14"/>
+    <p:sldId id="268" r:id="rId15"/>
+    <p:sldId id="264" r:id="rId16"/>
+    <p:sldId id="265" r:id="rId17"/>
   </p:sldIdLst>
   <p:sldSz cx="12192000" cy="6858000"/>
   <p:notesSz cx="6858000" cy="9144000"/>
@@ -170,7 +177,7 @@
 <file path=ppt/revisionInfo.xml><?xml version="1.0" encoding="utf-8"?>
 <p1510:revInfo xmlns:a="http://schemas.openxmlformats.org/drawingml/2006/main" xmlns:r="http://schemas.openxmlformats.org/officeDocument/2006/relationships" xmlns:p1510="http://schemas.microsoft.com/office/powerpoint/2015/10/main">
   <p1510:revLst>
-    <p1510:client id="{9DC81C8E-254C-4083-9BF4-030793D3F1B6}" v="2" dt="2023-07-10T00:58:02.074"/>
+    <p1510:client id="{9DC81C8E-254C-4083-9BF4-030793D3F1B6}" v="22" dt="2023-07-15T02:48:51.470"/>
   </p1510:revLst>
 </p1510:revInfo>
 </file>
@@ -268,7 +275,7 @@
             <a:fld id="{3CB42547-1216-8745-B61E-1644CC83EEDE}" type="datetimeFigureOut">
               <a:rPr lang="en-US" altLang="en-US"/>
               <a:pPr/>
-              <a:t>7/9/2023</a:t>
+              <a:t>7/14/2023</a:t>
             </a:fld>
             <a:endParaRPr lang="en-US" altLang="en-US"/>
           </a:p>
@@ -963,8 +970,21 @@
           <a:p>
             <a:r>
               <a:rPr lang="en-US" dirty="0"/>
-              <a:t>Welcome to our presentation titled “Attention Is All You Need”. This project was carried out by Jonathan Agustin, Fernando Calderon, and Juliet Lawton.</a:t>
-            </a:r>
+              <a:t>A </a:t>
+            </a:r>
+            <a:r>
+              <a:rPr lang="en-US"/>
+              <a:t>cool introductory videoclip </a:t>
+            </a:r>
+            <a:r>
+              <a:rPr lang="en-US" dirty="0"/>
+              <a:t>will be inserted here to WOW the audience and show that we </a:t>
+            </a:r>
+            <a:r>
+              <a:rPr lang="en-US"/>
+              <a:t>mean business.</a:t>
+            </a:r>
+            <a:endParaRPr lang="en-US" dirty="0"/>
           </a:p>
         </p:txBody>
       </p:sp>
@@ -996,6 +1016,622 @@
     <p:extLst>
       <p:ext uri="{BB962C8B-B14F-4D97-AF65-F5344CB8AC3E}">
         <p14:creationId xmlns:p14="http://schemas.microsoft.com/office/powerpoint/2010/main" val="4054898556"/>
+      </p:ext>
+    </p:extLst>
+  </p:cSld>
+  <p:clrMapOvr>
+    <a:masterClrMapping/>
+  </p:clrMapOvr>
+</p:notes>
+</file>
+
+<file path=ppt/notesSlides/notesSlide10.xml><?xml version="1.0" encoding="utf-8"?>
+<p:notes xmlns:a="http://schemas.openxmlformats.org/drawingml/2006/main" xmlns:r="http://schemas.openxmlformats.org/officeDocument/2006/relationships" xmlns:p="http://schemas.openxmlformats.org/presentationml/2006/main">
+  <p:cSld>
+    <p:spTree>
+      <p:nvGrpSpPr>
+        <p:cNvPr id="1" name=""/>
+        <p:cNvGrpSpPr/>
+        <p:nvPr/>
+      </p:nvGrpSpPr>
+      <p:grpSpPr>
+        <a:xfrm>
+          <a:off x="0" y="0"/>
+          <a:ext cx="0" cy="0"/>
+          <a:chOff x="0" y="0"/>
+          <a:chExt cx="0" cy="0"/>
+        </a:xfrm>
+      </p:grpSpPr>
+      <p:sp>
+        <p:nvSpPr>
+          <p:cNvPr id="2" name="Slide Image Placeholder 1"/>
+          <p:cNvSpPr>
+            <a:spLocks noGrp="1" noRot="1" noChangeAspect="1"/>
+          </p:cNvSpPr>
+          <p:nvPr>
+            <p:ph type="sldImg"/>
+          </p:nvPr>
+        </p:nvSpPr>
+        <p:spPr/>
+      </p:sp>
+      <p:sp>
+        <p:nvSpPr>
+          <p:cNvPr id="3" name="Notes Placeholder 2"/>
+          <p:cNvSpPr>
+            <a:spLocks noGrp="1"/>
+          </p:cNvSpPr>
+          <p:nvPr>
+            <p:ph type="body" idx="1"/>
+          </p:nvPr>
+        </p:nvSpPr>
+        <p:spPr/>
+        <p:txBody>
+          <a:bodyPr/>
+          <a:lstStyle/>
+          <a:p>
+            <a:r>
+              <a:rPr lang="en-US" dirty="0"/>
+              <a:t>In the development stage, we handled invalid values and discarded non-textual content. We trained our models to identify a brand and align with the sentiment expressed in a tweet, and then tuned them to improve performance.</a:t>
+            </a:r>
+          </a:p>
+        </p:txBody>
+      </p:sp>
+      <p:sp>
+        <p:nvSpPr>
+          <p:cNvPr id="4" name="Slide Number Placeholder 3"/>
+          <p:cNvSpPr>
+            <a:spLocks noGrp="1"/>
+          </p:cNvSpPr>
+          <p:nvPr>
+            <p:ph type="sldNum" sz="quarter" idx="5"/>
+          </p:nvPr>
+        </p:nvSpPr>
+        <p:spPr/>
+        <p:txBody>
+          <a:bodyPr/>
+          <a:lstStyle/>
+          <a:p>
+            <a:fld id="{AA4D7F38-9E4B-194A-AA5A-81BF138D29E9}" type="slidenum">
+              <a:rPr lang="en-US" altLang="en-US" smtClean="0"/>
+              <a:pPr/>
+              <a:t>10</a:t>
+            </a:fld>
+            <a:endParaRPr lang="en-US" altLang="en-US"/>
+          </a:p>
+        </p:txBody>
+      </p:sp>
+    </p:spTree>
+    <p:extLst>
+      <p:ext uri="{BB962C8B-B14F-4D97-AF65-F5344CB8AC3E}">
+        <p14:creationId xmlns:p14="http://schemas.microsoft.com/office/powerpoint/2010/main" val="2161610621"/>
+      </p:ext>
+    </p:extLst>
+  </p:cSld>
+  <p:clrMapOvr>
+    <a:masterClrMapping/>
+  </p:clrMapOvr>
+</p:notes>
+</file>
+
+<file path=ppt/notesSlides/notesSlide11.xml><?xml version="1.0" encoding="utf-8"?>
+<p:notes xmlns:a="http://schemas.openxmlformats.org/drawingml/2006/main" xmlns:r="http://schemas.openxmlformats.org/officeDocument/2006/relationships" xmlns:p="http://schemas.openxmlformats.org/presentationml/2006/main">
+  <p:cSld>
+    <p:spTree>
+      <p:nvGrpSpPr>
+        <p:cNvPr id="1" name=""/>
+        <p:cNvGrpSpPr/>
+        <p:nvPr/>
+      </p:nvGrpSpPr>
+      <p:grpSpPr>
+        <a:xfrm>
+          <a:off x="0" y="0"/>
+          <a:ext cx="0" cy="0"/>
+          <a:chOff x="0" y="0"/>
+          <a:chExt cx="0" cy="0"/>
+        </a:xfrm>
+      </p:grpSpPr>
+      <p:sp>
+        <p:nvSpPr>
+          <p:cNvPr id="2" name="Slide Image Placeholder 1"/>
+          <p:cNvSpPr>
+            <a:spLocks noGrp="1" noRot="1" noChangeAspect="1"/>
+          </p:cNvSpPr>
+          <p:nvPr>
+            <p:ph type="sldImg"/>
+          </p:nvPr>
+        </p:nvSpPr>
+        <p:spPr/>
+      </p:sp>
+      <p:sp>
+        <p:nvSpPr>
+          <p:cNvPr id="3" name="Notes Placeholder 2"/>
+          <p:cNvSpPr>
+            <a:spLocks noGrp="1"/>
+          </p:cNvSpPr>
+          <p:nvPr>
+            <p:ph type="body" idx="1"/>
+          </p:nvPr>
+        </p:nvSpPr>
+        <p:spPr/>
+        <p:txBody>
+          <a:bodyPr/>
+          <a:lstStyle/>
+          <a:p>
+            <a:r>
+              <a:rPr lang="en-US" dirty="0"/>
+              <a:t>In the development stage, we handled invalid values and discarded non-textual content. We trained our models to identify a brand and align with the sentiment expressed in a tweet, and then tuned them to improve performance.</a:t>
+            </a:r>
+          </a:p>
+        </p:txBody>
+      </p:sp>
+      <p:sp>
+        <p:nvSpPr>
+          <p:cNvPr id="4" name="Slide Number Placeholder 3"/>
+          <p:cNvSpPr>
+            <a:spLocks noGrp="1"/>
+          </p:cNvSpPr>
+          <p:nvPr>
+            <p:ph type="sldNum" sz="quarter" idx="5"/>
+          </p:nvPr>
+        </p:nvSpPr>
+        <p:spPr/>
+        <p:txBody>
+          <a:bodyPr/>
+          <a:lstStyle/>
+          <a:p>
+            <a:fld id="{AA4D7F38-9E4B-194A-AA5A-81BF138D29E9}" type="slidenum">
+              <a:rPr lang="en-US" altLang="en-US" smtClean="0"/>
+              <a:pPr/>
+              <a:t>11</a:t>
+            </a:fld>
+            <a:endParaRPr lang="en-US" altLang="en-US"/>
+          </a:p>
+        </p:txBody>
+      </p:sp>
+    </p:spTree>
+    <p:extLst>
+      <p:ext uri="{BB962C8B-B14F-4D97-AF65-F5344CB8AC3E}">
+        <p14:creationId xmlns:p14="http://schemas.microsoft.com/office/powerpoint/2010/main" val="1812335125"/>
+      </p:ext>
+    </p:extLst>
+  </p:cSld>
+  <p:clrMapOvr>
+    <a:masterClrMapping/>
+  </p:clrMapOvr>
+</p:notes>
+</file>
+
+<file path=ppt/notesSlides/notesSlide12.xml><?xml version="1.0" encoding="utf-8"?>
+<p:notes xmlns:a="http://schemas.openxmlformats.org/drawingml/2006/main" xmlns:r="http://schemas.openxmlformats.org/officeDocument/2006/relationships" xmlns:p="http://schemas.openxmlformats.org/presentationml/2006/main">
+  <p:cSld>
+    <p:spTree>
+      <p:nvGrpSpPr>
+        <p:cNvPr id="1" name=""/>
+        <p:cNvGrpSpPr/>
+        <p:nvPr/>
+      </p:nvGrpSpPr>
+      <p:grpSpPr>
+        <a:xfrm>
+          <a:off x="0" y="0"/>
+          <a:ext cx="0" cy="0"/>
+          <a:chOff x="0" y="0"/>
+          <a:chExt cx="0" cy="0"/>
+        </a:xfrm>
+      </p:grpSpPr>
+      <p:sp>
+        <p:nvSpPr>
+          <p:cNvPr id="2" name="Slide Image Placeholder 1"/>
+          <p:cNvSpPr>
+            <a:spLocks noGrp="1" noRot="1" noChangeAspect="1"/>
+          </p:cNvSpPr>
+          <p:nvPr>
+            <p:ph type="sldImg"/>
+          </p:nvPr>
+        </p:nvSpPr>
+        <p:spPr/>
+      </p:sp>
+      <p:sp>
+        <p:nvSpPr>
+          <p:cNvPr id="3" name="Notes Placeholder 2"/>
+          <p:cNvSpPr>
+            <a:spLocks noGrp="1"/>
+          </p:cNvSpPr>
+          <p:nvPr>
+            <p:ph type="body" idx="1"/>
+          </p:nvPr>
+        </p:nvSpPr>
+        <p:spPr/>
+        <p:txBody>
+          <a:bodyPr/>
+          <a:lstStyle/>
+          <a:p>
+            <a:r>
+              <a:rPr lang="en-US" dirty="0"/>
+              <a:t>In the evaluation stage, we measured the models' ability to identify brands and predict sentiment in Twitter posts. We used standard classification metrics such as Accuracy, Precision, Recall, and F1 Score to evaluate the models.</a:t>
+            </a:r>
+          </a:p>
+        </p:txBody>
+      </p:sp>
+      <p:sp>
+        <p:nvSpPr>
+          <p:cNvPr id="4" name="Slide Number Placeholder 3"/>
+          <p:cNvSpPr>
+            <a:spLocks noGrp="1"/>
+          </p:cNvSpPr>
+          <p:nvPr>
+            <p:ph type="sldNum" sz="quarter" idx="5"/>
+          </p:nvPr>
+        </p:nvSpPr>
+        <p:spPr/>
+        <p:txBody>
+          <a:bodyPr/>
+          <a:lstStyle/>
+          <a:p>
+            <a:fld id="{AA4D7F38-9E4B-194A-AA5A-81BF138D29E9}" type="slidenum">
+              <a:rPr lang="en-US" altLang="en-US" smtClean="0"/>
+              <a:pPr/>
+              <a:t>12</a:t>
+            </a:fld>
+            <a:endParaRPr lang="en-US" altLang="en-US"/>
+          </a:p>
+        </p:txBody>
+      </p:sp>
+    </p:spTree>
+    <p:extLst>
+      <p:ext uri="{BB962C8B-B14F-4D97-AF65-F5344CB8AC3E}">
+        <p14:creationId xmlns:p14="http://schemas.microsoft.com/office/powerpoint/2010/main" val="3632726758"/>
+      </p:ext>
+    </p:extLst>
+  </p:cSld>
+  <p:clrMapOvr>
+    <a:masterClrMapping/>
+  </p:clrMapOvr>
+</p:notes>
+</file>
+
+<file path=ppt/notesSlides/notesSlide13.xml><?xml version="1.0" encoding="utf-8"?>
+<p:notes xmlns:a="http://schemas.openxmlformats.org/drawingml/2006/main" xmlns:r="http://schemas.openxmlformats.org/officeDocument/2006/relationships" xmlns:p="http://schemas.openxmlformats.org/presentationml/2006/main">
+  <p:cSld>
+    <p:spTree>
+      <p:nvGrpSpPr>
+        <p:cNvPr id="1" name=""/>
+        <p:cNvGrpSpPr/>
+        <p:nvPr/>
+      </p:nvGrpSpPr>
+      <p:grpSpPr>
+        <a:xfrm>
+          <a:off x="0" y="0"/>
+          <a:ext cx="0" cy="0"/>
+          <a:chOff x="0" y="0"/>
+          <a:chExt cx="0" cy="0"/>
+        </a:xfrm>
+      </p:grpSpPr>
+      <p:sp>
+        <p:nvSpPr>
+          <p:cNvPr id="2" name="Slide Image Placeholder 1"/>
+          <p:cNvSpPr>
+            <a:spLocks noGrp="1" noRot="1" noChangeAspect="1"/>
+          </p:cNvSpPr>
+          <p:nvPr>
+            <p:ph type="sldImg"/>
+          </p:nvPr>
+        </p:nvSpPr>
+        <p:spPr/>
+      </p:sp>
+      <p:sp>
+        <p:nvSpPr>
+          <p:cNvPr id="3" name="Notes Placeholder 2"/>
+          <p:cNvSpPr>
+            <a:spLocks noGrp="1"/>
+          </p:cNvSpPr>
+          <p:nvPr>
+            <p:ph type="body" idx="1"/>
+          </p:nvPr>
+        </p:nvSpPr>
+        <p:spPr/>
+        <p:txBody>
+          <a:bodyPr/>
+          <a:lstStyle/>
+          <a:p>
+            <a:r>
+              <a:rPr lang="en-US" dirty="0"/>
+              <a:t>We present the results of our experiments, including any relevant figures or tables, discuss the implications of our results, and explain whether our results support our initial hypothesis. We present the results of our models. We achieved an accuracy rate over 50%, demonstrating the potential of machine learning in understanding public sentiment towards brands based on social media content.</a:t>
+            </a:r>
+          </a:p>
+        </p:txBody>
+      </p:sp>
+      <p:sp>
+        <p:nvSpPr>
+          <p:cNvPr id="4" name="Slide Number Placeholder 3"/>
+          <p:cNvSpPr>
+            <a:spLocks noGrp="1"/>
+          </p:cNvSpPr>
+          <p:nvPr>
+            <p:ph type="sldNum" sz="quarter" idx="5"/>
+          </p:nvPr>
+        </p:nvSpPr>
+        <p:spPr/>
+        <p:txBody>
+          <a:bodyPr/>
+          <a:lstStyle/>
+          <a:p>
+            <a:fld id="{AA4D7F38-9E4B-194A-AA5A-81BF138D29E9}" type="slidenum">
+              <a:rPr lang="en-US" altLang="en-US" smtClean="0"/>
+              <a:pPr/>
+              <a:t>13</a:t>
+            </a:fld>
+            <a:endParaRPr lang="en-US" altLang="en-US"/>
+          </a:p>
+        </p:txBody>
+      </p:sp>
+    </p:spTree>
+    <p:extLst>
+      <p:ext uri="{BB962C8B-B14F-4D97-AF65-F5344CB8AC3E}">
+        <p14:creationId xmlns:p14="http://schemas.microsoft.com/office/powerpoint/2010/main" val="4074490549"/>
+      </p:ext>
+    </p:extLst>
+  </p:cSld>
+  <p:clrMapOvr>
+    <a:masterClrMapping/>
+  </p:clrMapOvr>
+</p:notes>
+</file>
+
+<file path=ppt/notesSlides/notesSlide14.xml><?xml version="1.0" encoding="utf-8"?>
+<p:notes xmlns:a="http://schemas.openxmlformats.org/drawingml/2006/main" xmlns:r="http://schemas.openxmlformats.org/officeDocument/2006/relationships" xmlns:p="http://schemas.openxmlformats.org/presentationml/2006/main">
+  <p:cSld>
+    <p:spTree>
+      <p:nvGrpSpPr>
+        <p:cNvPr id="1" name=""/>
+        <p:cNvGrpSpPr/>
+        <p:nvPr/>
+      </p:nvGrpSpPr>
+      <p:grpSpPr>
+        <a:xfrm>
+          <a:off x="0" y="0"/>
+          <a:ext cx="0" cy="0"/>
+          <a:chOff x="0" y="0"/>
+          <a:chExt cx="0" cy="0"/>
+        </a:xfrm>
+      </p:grpSpPr>
+      <p:sp>
+        <p:nvSpPr>
+          <p:cNvPr id="2" name="Slide Image Placeholder 1"/>
+          <p:cNvSpPr>
+            <a:spLocks noGrp="1" noRot="1" noChangeAspect="1"/>
+          </p:cNvSpPr>
+          <p:nvPr>
+            <p:ph type="sldImg"/>
+          </p:nvPr>
+        </p:nvSpPr>
+        <p:spPr/>
+      </p:sp>
+      <p:sp>
+        <p:nvSpPr>
+          <p:cNvPr id="3" name="Notes Placeholder 2"/>
+          <p:cNvSpPr>
+            <a:spLocks noGrp="1"/>
+          </p:cNvSpPr>
+          <p:nvPr>
+            <p:ph type="body" idx="1"/>
+          </p:nvPr>
+        </p:nvSpPr>
+        <p:spPr/>
+        <p:txBody>
+          <a:bodyPr/>
+          <a:lstStyle/>
+          <a:p>
+            <a:r>
+              <a:rPr lang="en-US" dirty="0"/>
+              <a:t>We faced challenges such as the 'aboutness' problem, which refers to the challenge of determining the subject of the sentiment expressed in a sentence. We also encountered issues with complex sentences and ambiguous subjects.</a:t>
+            </a:r>
+          </a:p>
+        </p:txBody>
+      </p:sp>
+      <p:sp>
+        <p:nvSpPr>
+          <p:cNvPr id="4" name="Slide Number Placeholder 3"/>
+          <p:cNvSpPr>
+            <a:spLocks noGrp="1"/>
+          </p:cNvSpPr>
+          <p:nvPr>
+            <p:ph type="sldNum" sz="quarter" idx="5"/>
+          </p:nvPr>
+        </p:nvSpPr>
+        <p:spPr/>
+        <p:txBody>
+          <a:bodyPr/>
+          <a:lstStyle/>
+          <a:p>
+            <a:fld id="{AA4D7F38-9E4B-194A-AA5A-81BF138D29E9}" type="slidenum">
+              <a:rPr lang="en-US" altLang="en-US" smtClean="0"/>
+              <a:pPr/>
+              <a:t>14</a:t>
+            </a:fld>
+            <a:endParaRPr lang="en-US" altLang="en-US"/>
+          </a:p>
+        </p:txBody>
+      </p:sp>
+    </p:spTree>
+    <p:extLst>
+      <p:ext uri="{BB962C8B-B14F-4D97-AF65-F5344CB8AC3E}">
+        <p14:creationId xmlns:p14="http://schemas.microsoft.com/office/powerpoint/2010/main" val="2371925110"/>
+      </p:ext>
+    </p:extLst>
+  </p:cSld>
+  <p:clrMapOvr>
+    <a:masterClrMapping/>
+  </p:clrMapOvr>
+</p:notes>
+</file>
+
+<file path=ppt/notesSlides/notesSlide15.xml><?xml version="1.0" encoding="utf-8"?>
+<p:notes xmlns:a="http://schemas.openxmlformats.org/drawingml/2006/main" xmlns:r="http://schemas.openxmlformats.org/officeDocument/2006/relationships" xmlns:p="http://schemas.openxmlformats.org/presentationml/2006/main">
+  <p:cSld>
+    <p:spTree>
+      <p:nvGrpSpPr>
+        <p:cNvPr id="1" name=""/>
+        <p:cNvGrpSpPr/>
+        <p:nvPr/>
+      </p:nvGrpSpPr>
+      <p:grpSpPr>
+        <a:xfrm>
+          <a:off x="0" y="0"/>
+          <a:ext cx="0" cy="0"/>
+          <a:chOff x="0" y="0"/>
+          <a:chExt cx="0" cy="0"/>
+        </a:xfrm>
+      </p:grpSpPr>
+      <p:sp>
+        <p:nvSpPr>
+          <p:cNvPr id="2" name="Slide Image Placeholder 1"/>
+          <p:cNvSpPr>
+            <a:spLocks noGrp="1" noRot="1" noChangeAspect="1"/>
+          </p:cNvSpPr>
+          <p:nvPr>
+            <p:ph type="sldImg"/>
+          </p:nvPr>
+        </p:nvSpPr>
+        <p:spPr/>
+      </p:sp>
+      <p:sp>
+        <p:nvSpPr>
+          <p:cNvPr id="3" name="Notes Placeholder 2"/>
+          <p:cNvSpPr>
+            <a:spLocks noGrp="1"/>
+          </p:cNvSpPr>
+          <p:nvPr>
+            <p:ph type="body" idx="1"/>
+          </p:nvPr>
+        </p:nvSpPr>
+        <p:spPr/>
+        <p:txBody>
+          <a:bodyPr/>
+          <a:lstStyle/>
+          <a:p>
+            <a:r>
+              <a:rPr lang="en-US" dirty="0"/>
+              <a:t>In the conclusion and future work section, we will summarize the main findings of our project, conclude the report by discussing the significance of our findings, and discuss potential future work, such as how our project could be extended or improved.</a:t>
+            </a:r>
+          </a:p>
+        </p:txBody>
+      </p:sp>
+      <p:sp>
+        <p:nvSpPr>
+          <p:cNvPr id="4" name="Slide Number Placeholder 3"/>
+          <p:cNvSpPr>
+            <a:spLocks noGrp="1"/>
+          </p:cNvSpPr>
+          <p:nvPr>
+            <p:ph type="sldNum" sz="quarter" idx="5"/>
+          </p:nvPr>
+        </p:nvSpPr>
+        <p:spPr/>
+        <p:txBody>
+          <a:bodyPr/>
+          <a:lstStyle/>
+          <a:p>
+            <a:fld id="{AA4D7F38-9E4B-194A-AA5A-81BF138D29E9}" type="slidenum">
+              <a:rPr lang="en-US" altLang="en-US" smtClean="0"/>
+              <a:pPr/>
+              <a:t>15</a:t>
+            </a:fld>
+            <a:endParaRPr lang="en-US" altLang="en-US"/>
+          </a:p>
+        </p:txBody>
+      </p:sp>
+    </p:spTree>
+    <p:extLst>
+      <p:ext uri="{BB962C8B-B14F-4D97-AF65-F5344CB8AC3E}">
+        <p14:creationId xmlns:p14="http://schemas.microsoft.com/office/powerpoint/2010/main" val="1196247736"/>
+      </p:ext>
+    </p:extLst>
+  </p:cSld>
+  <p:clrMapOvr>
+    <a:masterClrMapping/>
+  </p:clrMapOvr>
+</p:notes>
+</file>
+
+<file path=ppt/notesSlides/notesSlide16.xml><?xml version="1.0" encoding="utf-8"?>
+<p:notes xmlns:a="http://schemas.openxmlformats.org/drawingml/2006/main" xmlns:r="http://schemas.openxmlformats.org/officeDocument/2006/relationships" xmlns:p="http://schemas.openxmlformats.org/presentationml/2006/main">
+  <p:cSld>
+    <p:spTree>
+      <p:nvGrpSpPr>
+        <p:cNvPr id="1" name=""/>
+        <p:cNvGrpSpPr/>
+        <p:nvPr/>
+      </p:nvGrpSpPr>
+      <p:grpSpPr>
+        <a:xfrm>
+          <a:off x="0" y="0"/>
+          <a:ext cx="0" cy="0"/>
+          <a:chOff x="0" y="0"/>
+          <a:chExt cx="0" cy="0"/>
+        </a:xfrm>
+      </p:grpSpPr>
+      <p:sp>
+        <p:nvSpPr>
+          <p:cNvPr id="2" name="Slide Image Placeholder 1"/>
+          <p:cNvSpPr>
+            <a:spLocks noGrp="1" noRot="1" noChangeAspect="1"/>
+          </p:cNvSpPr>
+          <p:nvPr>
+            <p:ph type="sldImg"/>
+          </p:nvPr>
+        </p:nvSpPr>
+        <p:spPr/>
+      </p:sp>
+      <p:sp>
+        <p:nvSpPr>
+          <p:cNvPr id="3" name="Notes Placeholder 2"/>
+          <p:cNvSpPr>
+            <a:spLocks noGrp="1"/>
+          </p:cNvSpPr>
+          <p:nvPr>
+            <p:ph type="body" idx="1"/>
+          </p:nvPr>
+        </p:nvSpPr>
+        <p:spPr/>
+        <p:txBody>
+          <a:bodyPr/>
+          <a:lstStyle/>
+          <a:p>
+            <a:r>
+              <a:rPr lang="en-US" dirty="0"/>
+              <a:t>We would like to take a moment to express our deepest gratitude to those who have made this project possible. First and foremost, we would like to thank our professor, whose guidance and expertise have been invaluable throughout this process. Your patience and dedication have not gone unnoticed, and we are truly grateful for your support.</a:t>
+            </a:r>
+          </a:p>
+        </p:txBody>
+      </p:sp>
+      <p:sp>
+        <p:nvSpPr>
+          <p:cNvPr id="4" name="Slide Number Placeholder 3"/>
+          <p:cNvSpPr>
+            <a:spLocks noGrp="1"/>
+          </p:cNvSpPr>
+          <p:nvPr>
+            <p:ph type="sldNum" sz="quarter" idx="5"/>
+          </p:nvPr>
+        </p:nvSpPr>
+        <p:spPr/>
+        <p:txBody>
+          <a:bodyPr/>
+          <a:lstStyle/>
+          <a:p>
+            <a:fld id="{AA4D7F38-9E4B-194A-AA5A-81BF138D29E9}" type="slidenum">
+              <a:rPr lang="en-US" altLang="en-US" smtClean="0"/>
+              <a:pPr/>
+              <a:t>16</a:t>
+            </a:fld>
+            <a:endParaRPr lang="en-US" altLang="en-US"/>
+          </a:p>
+        </p:txBody>
+      </p:sp>
+    </p:spTree>
+    <p:extLst>
+      <p:ext uri="{BB962C8B-B14F-4D97-AF65-F5344CB8AC3E}">
+        <p14:creationId xmlns:p14="http://schemas.microsoft.com/office/powerpoint/2010/main" val="684833767"/>
       </p:ext>
     </p:extLst>
   </p:cSld>
@@ -1051,7 +1687,17 @@
           <a:p>
             <a:r>
               <a:rPr lang="en-US" dirty="0"/>
-              <a:t>In the introduction, we will briefly introduce the problem we are addressing in our project, provide some context about why this problem is important, state the purpose of our project, outline the goals we hope to achieve, and define the scope of our project, including any limitations.</a:t>
+              <a:t>Let’s get started. Welcome to our project titled “</a:t>
+            </a:r>
+            <a:r>
+              <a:rPr lang="en-US" altLang="en-US" sz="1200" dirty="0">
+                <a:ea typeface="ＭＳ Ｐゴシック" charset="-128"/>
+              </a:rPr>
+              <a:t>Brand Sentiment Analysis of Twitter Posts</a:t>
+            </a:r>
+            <a:r>
+              <a:rPr lang="en-US" dirty="0"/>
+              <a:t>”. </a:t>
             </a:r>
           </a:p>
         </p:txBody>
@@ -1083,7 +1729,7 @@
     </p:spTree>
     <p:extLst>
       <p:ext uri="{BB962C8B-B14F-4D97-AF65-F5344CB8AC3E}">
-        <p14:creationId xmlns:p14="http://schemas.microsoft.com/office/powerpoint/2010/main" val="228650707"/>
+        <p14:creationId xmlns:p14="http://schemas.microsoft.com/office/powerpoint/2010/main" val="850201174"/>
       </p:ext>
     </p:extLst>
   </p:cSld>
@@ -1139,7 +1785,7 @@
           <a:p>
             <a:r>
               <a:rPr lang="en-US" dirty="0"/>
-              <a:t>In the section on related work, we will discuss previous work that has been done on this problem, compare and contrast our approach with these previous methods, and explain why our approach is different or better.</a:t>
+              <a:t>Our team has worked diligently to develop a system that leverages AI to understand public sentiment towards brands based on social media content.</a:t>
             </a:r>
           </a:p>
         </p:txBody>
@@ -1171,7 +1817,7 @@
     </p:spTree>
     <p:extLst>
       <p:ext uri="{BB962C8B-B14F-4D97-AF65-F5344CB8AC3E}">
-        <p14:creationId xmlns:p14="http://schemas.microsoft.com/office/powerpoint/2010/main" val="1831412315"/>
+        <p14:creationId xmlns:p14="http://schemas.microsoft.com/office/powerpoint/2010/main" val="228650707"/>
       </p:ext>
     </p:extLst>
   </p:cSld>
@@ -1227,7 +1873,7 @@
           <a:p>
             <a:r>
               <a:rPr lang="en-US" dirty="0"/>
-              <a:t>In the section on problem definition and AI techniques, we will clearly define the problem we are addressing, describe the AI techniques we used in our project, and explain why these techniques are appropriate for our problem.</a:t>
+              <a:t>We build two models: a Brand Classifier that predicts whether a Twitter post expresses a brand, and a Brand Sentiment Analyzer that predicts the sentiment of a Twitter post towards a brand.</a:t>
             </a:r>
           </a:p>
         </p:txBody>
@@ -1315,7 +1961,7 @@
           <a:p>
             <a:r>
               <a:rPr lang="en-US" dirty="0"/>
-              <a:t>In the section on dataset description, we will describe the dataset we used in our project, discuss any relevant characteristics of the data, and explain how the data was collected and any preprocessing steps we took.</a:t>
+              <a:t>They are trained on Twitter posts, so they cannot classify posts from other social media sites. They also process only text data, ignoring non-textual elements like images, videos, and audio clips.</a:t>
             </a:r>
           </a:p>
         </p:txBody>
@@ -1347,7 +1993,7 @@
     </p:spTree>
     <p:extLst>
       <p:ext uri="{BB962C8B-B14F-4D97-AF65-F5344CB8AC3E}">
-        <p14:creationId xmlns:p14="http://schemas.microsoft.com/office/powerpoint/2010/main" val="1805981893"/>
+        <p14:creationId xmlns:p14="http://schemas.microsoft.com/office/powerpoint/2010/main" val="3757772613"/>
       </p:ext>
     </p:extLst>
   </p:cSld>
@@ -1403,7 +2049,7 @@
           <a:p>
             <a:r>
               <a:rPr lang="en-US" dirty="0"/>
-              <a:t>In the section on experimental design, we will describe the design of our experiment, discuss any preprocessing steps we took, such as cleaning the data or dealing with missing values, explain any feature engineering we did, such as creating new variables or transforming existing ones, and detail the specific AI techniques we used and why we chose them.</a:t>
+              <a:t>We experimented with various machine learning algorithms like Naïve Bayes, Logistic Regression, Support Vector Machines, Recurrent Neural Networks, and Transformers.</a:t>
             </a:r>
           </a:p>
         </p:txBody>
@@ -1435,7 +2081,7 @@
     </p:spTree>
     <p:extLst>
       <p:ext uri="{BB962C8B-B14F-4D97-AF65-F5344CB8AC3E}">
-        <p14:creationId xmlns:p14="http://schemas.microsoft.com/office/powerpoint/2010/main" val="3333620174"/>
+        <p14:creationId xmlns:p14="http://schemas.microsoft.com/office/powerpoint/2010/main" val="1137822234"/>
       </p:ext>
     </p:extLst>
   </p:cSld>
@@ -1491,7 +2137,7 @@
           <a:p>
             <a:r>
               <a:rPr lang="en-US" dirty="0"/>
-              <a:t>In the section on results and discussion, we will present the results of our experiments, including any relevant figures or tables, discuss the implications of our results, and explain whether our results support our initial hypothesis.</a:t>
+              <a:t>We used the Sentiment140 dataset, which contains 1.6 million tweets, to train our models.</a:t>
             </a:r>
           </a:p>
         </p:txBody>
@@ -1523,7 +2169,7 @@
     </p:spTree>
     <p:extLst>
       <p:ext uri="{BB962C8B-B14F-4D97-AF65-F5344CB8AC3E}">
-        <p14:creationId xmlns:p14="http://schemas.microsoft.com/office/powerpoint/2010/main" val="3632726758"/>
+        <p14:creationId xmlns:p14="http://schemas.microsoft.com/office/powerpoint/2010/main" val="1805981893"/>
       </p:ext>
     </p:extLst>
   </p:cSld>
@@ -1579,7 +2225,7 @@
           <a:p>
             <a:r>
               <a:rPr lang="en-US" dirty="0"/>
-              <a:t>In the conclusion and future work section, we will summarize the main findings of our project, conclude the report by discussing the significance of our findings, and discuss potential future work, such as how our project could be extended or improved.</a:t>
+              <a:t>Our methods were designed to ensure a thorough and systematic approach to the problem. It involved using at least two different types of AI and machine learning algorithms. We conducted an investigation of the analytics solution to the problem, which included aspects of experimental comparison. We also explored variable importance to understand which features were most important in making good predictions.</a:t>
             </a:r>
           </a:p>
         </p:txBody>
@@ -1611,7 +2257,7 @@
     </p:spTree>
     <p:extLst>
       <p:ext uri="{BB962C8B-B14F-4D97-AF65-F5344CB8AC3E}">
-        <p14:creationId xmlns:p14="http://schemas.microsoft.com/office/powerpoint/2010/main" val="1196247736"/>
+        <p14:creationId xmlns:p14="http://schemas.microsoft.com/office/powerpoint/2010/main" val="3333620174"/>
       </p:ext>
     </p:extLst>
   </p:cSld>
@@ -1667,7 +2313,7 @@
           <a:p>
             <a:r>
               <a:rPr lang="en-US" dirty="0"/>
-              <a:t>We would like to take a moment to express our deepest gratitude to those who have made this project possible. First and foremost, we would like to thank our professor, whose guidance and expertise have been invaluable throughout this process. Your patience and dedication have not gone unnoticed, and we are truly grateful for your support.</a:t>
+              <a:t>In the assess stage, we analyzed the dataset and selected appropriate models based on the specific requirements of the sentiment analysis task, the characteristics of the available data, and the nature of the problem.</a:t>
             </a:r>
           </a:p>
         </p:txBody>
@@ -1699,7 +2345,7 @@
     </p:spTree>
     <p:extLst>
       <p:ext uri="{BB962C8B-B14F-4D97-AF65-F5344CB8AC3E}">
-        <p14:creationId xmlns:p14="http://schemas.microsoft.com/office/powerpoint/2010/main" val="684833767"/>
+        <p14:creationId xmlns:p14="http://schemas.microsoft.com/office/powerpoint/2010/main" val="1875703993"/>
       </p:ext>
     </p:extLst>
   </p:cSld>
@@ -1780,7 +2426,7 @@
             <a:fld id="{60E4B0F9-A7FB-5046-8EA1-145E13C1BB14}" type="datetimeFigureOut">
               <a:rPr lang="en-US" altLang="en-US"/>
               <a:pPr/>
-              <a:t>7/9/2023</a:t>
+              <a:t>7/14/2023</a:t>
             </a:fld>
             <a:endParaRPr lang="en-US" altLang="en-US"/>
           </a:p>
@@ -1972,7 +2618,7 @@
             <a:fld id="{9461B8EA-79DB-F845-97F0-24C5A509848C}" type="datetimeFigureOut">
               <a:rPr lang="en-US" altLang="en-US"/>
               <a:pPr/>
-              <a:t>7/9/2023</a:t>
+              <a:t>7/14/2023</a:t>
             </a:fld>
             <a:endParaRPr lang="en-US" altLang="en-US"/>
           </a:p>
@@ -2513,7 +3159,7 @@
             <a:fld id="{51040245-401E-DC4F-B046-F0C79A3107CA}" type="datetimeFigureOut">
               <a:rPr lang="en-US" altLang="en-US"/>
               <a:pPr/>
-              <a:t>7/9/2023</a:t>
+              <a:t>7/14/2023</a:t>
             </a:fld>
             <a:endParaRPr lang="en-US" altLang="en-US"/>
           </a:p>
@@ -2625,7 +3271,7 @@
             <a:fld id="{B8E3EDF6-D7E0-BF42-B0B6-A092B242026B}" type="datetimeFigureOut">
               <a:rPr lang="en-US" altLang="en-US"/>
               <a:pPr/>
-              <a:t>7/9/2023</a:t>
+              <a:t>7/14/2023</a:t>
             </a:fld>
             <a:endParaRPr lang="en-US" altLang="en-US"/>
           </a:p>
@@ -3020,7 +3666,7 @@
             <a:fld id="{482C3D94-7C5D-0846-984C-DFD8ACC0A135}" type="datetimeFigureOut">
               <a:rPr lang="en-US" altLang="en-US"/>
               <a:pPr/>
-              <a:t>7/9/2023</a:t>
+              <a:t>7/14/2023</a:t>
             </a:fld>
             <a:endParaRPr lang="en-US" altLang="en-US"/>
           </a:p>
@@ -3579,7 +4225,60 @@
       </p:grpSpPr>
       <p:sp>
         <p:nvSpPr>
-          <p:cNvPr id="8193" name="Title 1"/>
+          <p:cNvPr id="5" name="Title 4">
+            <a:extLst>
+              <a:ext uri="{FF2B5EF4-FFF2-40B4-BE49-F238E27FC236}">
+                <a16:creationId xmlns:a16="http://schemas.microsoft.com/office/drawing/2014/main" id="{E3720A7F-5BAF-4380-F170-E30B74F67C24}"/>
+              </a:ext>
+            </a:extLst>
+          </p:cNvPr>
+          <p:cNvSpPr>
+            <a:spLocks noGrp="1"/>
+          </p:cNvSpPr>
+          <p:nvPr>
+            <p:ph type="title"/>
+          </p:nvPr>
+        </p:nvSpPr>
+        <p:spPr/>
+        <p:txBody>
+          <a:bodyPr/>
+          <a:lstStyle/>
+          <a:p>
+            <a:r>
+              <a:rPr lang="en-US" dirty="0"/>
+              <a:t>Intro Videoclip &amp; Segue to Presentation</a:t>
+            </a:r>
+          </a:p>
+        </p:txBody>
+      </p:sp>
+    </p:spTree>
+  </p:cSld>
+  <p:clrMapOvr>
+    <a:masterClrMapping/>
+  </p:clrMapOvr>
+</p:sld>
+</file>
+
+<file path=ppt/slides/slide10.xml><?xml version="1.0" encoding="utf-8"?>
+<p:sld xmlns:a="http://schemas.openxmlformats.org/drawingml/2006/main" xmlns:r="http://schemas.openxmlformats.org/officeDocument/2006/relationships" xmlns:p="http://schemas.openxmlformats.org/presentationml/2006/main">
+  <p:cSld>
+    <p:spTree>
+      <p:nvGrpSpPr>
+        <p:cNvPr id="1" name=""/>
+        <p:cNvGrpSpPr/>
+        <p:nvPr/>
+      </p:nvGrpSpPr>
+      <p:grpSpPr>
+        <a:xfrm>
+          <a:off x="0" y="0"/>
+          <a:ext cx="0" cy="0"/>
+          <a:chOff x="0" y="0"/>
+          <a:chExt cx="0" cy="0"/>
+        </a:xfrm>
+      </p:grpSpPr>
+      <p:sp>
+        <p:nvSpPr>
+          <p:cNvPr id="9217" name="Title 1"/>
           <p:cNvSpPr>
             <a:spLocks noGrp="1"/>
           </p:cNvSpPr>
@@ -3596,117 +4295,341 @@
               <a:rPr lang="en-US" altLang="en-US" dirty="0">
                 <a:ea typeface="ＭＳ Ｐゴシック" charset="-128"/>
               </a:rPr>
-              <a:t>Attention Is All You Need</a:t>
-            </a:r>
-          </a:p>
-        </p:txBody>
-      </p:sp>
-      <p:sp>
-        <p:nvSpPr>
-          <p:cNvPr id="2" name="TextBox 1">
-            <a:extLst>
-              <a:ext uri="{FF2B5EF4-FFF2-40B4-BE49-F238E27FC236}">
-                <a16:creationId xmlns:a16="http://schemas.microsoft.com/office/drawing/2014/main" id="{7D0BDA10-284A-7B41-8670-B6B5D19AF0F7}"/>
-              </a:ext>
-            </a:extLst>
-          </p:cNvPr>
-          <p:cNvSpPr txBox="1"/>
-          <p:nvPr/>
-        </p:nvSpPr>
-        <p:spPr>
-          <a:xfrm>
-            <a:off x="1204948" y="3733800"/>
-            <a:ext cx="2548133" cy="461665"/>
-          </a:xfrm>
-          <a:prstGeom prst="rect">
-            <a:avLst/>
-          </a:prstGeom>
-          <a:noFill/>
-        </p:spPr>
-        <p:txBody>
-          <a:bodyPr wrap="none" rtlCol="0">
-            <a:spAutoFit/>
-          </a:bodyPr>
+              <a:t>Second Stage: Develop</a:t>
+            </a:r>
+          </a:p>
+        </p:txBody>
+      </p:sp>
+    </p:spTree>
+    <p:extLst>
+      <p:ext uri="{BB962C8B-B14F-4D97-AF65-F5344CB8AC3E}">
+        <p14:creationId xmlns:p14="http://schemas.microsoft.com/office/powerpoint/2010/main" val="4127828933"/>
+      </p:ext>
+    </p:extLst>
+  </p:cSld>
+  <p:clrMapOvr>
+    <a:masterClrMapping/>
+  </p:clrMapOvr>
+</p:sld>
+</file>
+
+<file path=ppt/slides/slide11.xml><?xml version="1.0" encoding="utf-8"?>
+<p:sld xmlns:a="http://schemas.openxmlformats.org/drawingml/2006/main" xmlns:r="http://schemas.openxmlformats.org/officeDocument/2006/relationships" xmlns:p="http://schemas.openxmlformats.org/presentationml/2006/main">
+  <p:cSld>
+    <p:spTree>
+      <p:nvGrpSpPr>
+        <p:cNvPr id="1" name=""/>
+        <p:cNvGrpSpPr/>
+        <p:nvPr/>
+      </p:nvGrpSpPr>
+      <p:grpSpPr>
+        <a:xfrm>
+          <a:off x="0" y="0"/>
+          <a:ext cx="0" cy="0"/>
+          <a:chOff x="0" y="0"/>
+          <a:chExt cx="0" cy="0"/>
+        </a:xfrm>
+      </p:grpSpPr>
+      <p:sp>
+        <p:nvSpPr>
+          <p:cNvPr id="9217" name="Title 1"/>
+          <p:cNvSpPr>
+            <a:spLocks noGrp="1"/>
+          </p:cNvSpPr>
+          <p:nvPr>
+            <p:ph type="title"/>
+          </p:nvPr>
+        </p:nvSpPr>
+        <p:spPr/>
+        <p:txBody>
+          <a:bodyPr/>
           <a:lstStyle/>
           <a:p>
             <a:r>
-              <a:rPr lang="en-US" dirty="0"/>
-              <a:t>Jonathan Agustin</a:t>
-            </a:r>
-          </a:p>
-        </p:txBody>
-      </p:sp>
-      <p:sp>
-        <p:nvSpPr>
-          <p:cNvPr id="3" name="TextBox 2">
-            <a:extLst>
-              <a:ext uri="{FF2B5EF4-FFF2-40B4-BE49-F238E27FC236}">
-                <a16:creationId xmlns:a16="http://schemas.microsoft.com/office/drawing/2014/main" id="{F501E45A-DF55-5B93-C877-50B2C4B47180}"/>
-              </a:ext>
-            </a:extLst>
-          </p:cNvPr>
-          <p:cNvSpPr txBox="1"/>
-          <p:nvPr/>
-        </p:nvSpPr>
-        <p:spPr>
-          <a:xfrm>
-            <a:off x="4958029" y="3784600"/>
-            <a:ext cx="2840842" cy="461665"/>
-          </a:xfrm>
-          <a:prstGeom prst="rect">
-            <a:avLst/>
-          </a:prstGeom>
-          <a:noFill/>
-        </p:spPr>
-        <p:txBody>
-          <a:bodyPr wrap="none" rtlCol="0">
-            <a:spAutoFit/>
-          </a:bodyPr>
+              <a:rPr lang="en-US" altLang="en-US" dirty="0">
+                <a:ea typeface="ＭＳ Ｐゴシック" charset="-128"/>
+              </a:rPr>
+              <a:t>Second Stage: Develop</a:t>
+            </a:r>
+          </a:p>
+        </p:txBody>
+      </p:sp>
+    </p:spTree>
+    <p:extLst>
+      <p:ext uri="{BB962C8B-B14F-4D97-AF65-F5344CB8AC3E}">
+        <p14:creationId xmlns:p14="http://schemas.microsoft.com/office/powerpoint/2010/main" val="2811755235"/>
+      </p:ext>
+    </p:extLst>
+  </p:cSld>
+  <p:clrMapOvr>
+    <a:masterClrMapping/>
+  </p:clrMapOvr>
+</p:sld>
+</file>
+
+<file path=ppt/slides/slide12.xml><?xml version="1.0" encoding="utf-8"?>
+<p:sld xmlns:a="http://schemas.openxmlformats.org/drawingml/2006/main" xmlns:r="http://schemas.openxmlformats.org/officeDocument/2006/relationships" xmlns:p="http://schemas.openxmlformats.org/presentationml/2006/main">
+  <p:cSld>
+    <p:spTree>
+      <p:nvGrpSpPr>
+        <p:cNvPr id="1" name=""/>
+        <p:cNvGrpSpPr/>
+        <p:nvPr/>
+      </p:nvGrpSpPr>
+      <p:grpSpPr>
+        <a:xfrm>
+          <a:off x="0" y="0"/>
+          <a:ext cx="0" cy="0"/>
+          <a:chOff x="0" y="0"/>
+          <a:chExt cx="0" cy="0"/>
+        </a:xfrm>
+      </p:grpSpPr>
+      <p:sp>
+        <p:nvSpPr>
+          <p:cNvPr id="9217" name="Title 1"/>
+          <p:cNvSpPr>
+            <a:spLocks noGrp="1"/>
+          </p:cNvSpPr>
+          <p:nvPr>
+            <p:ph type="title"/>
+          </p:nvPr>
+        </p:nvSpPr>
+        <p:spPr/>
+        <p:txBody>
+          <a:bodyPr/>
           <a:lstStyle/>
           <a:p>
             <a:r>
-              <a:rPr lang="en-US" dirty="0"/>
-              <a:t>Fernando Calderon</a:t>
-            </a:r>
-          </a:p>
-        </p:txBody>
-      </p:sp>
-      <p:sp>
-        <p:nvSpPr>
-          <p:cNvPr id="4" name="TextBox 3">
-            <a:extLst>
-              <a:ext uri="{FF2B5EF4-FFF2-40B4-BE49-F238E27FC236}">
-                <a16:creationId xmlns:a16="http://schemas.microsoft.com/office/drawing/2014/main" id="{99028ACB-FE7B-0E6D-EF5A-0ECC023F0069}"/>
-              </a:ext>
-            </a:extLst>
-          </p:cNvPr>
-          <p:cNvSpPr txBox="1"/>
-          <p:nvPr/>
-        </p:nvSpPr>
-        <p:spPr>
-          <a:xfrm>
-            <a:off x="9003819" y="3835400"/>
-            <a:ext cx="1983235" cy="461665"/>
-          </a:xfrm>
-          <a:prstGeom prst="rect">
-            <a:avLst/>
-          </a:prstGeom>
-          <a:noFill/>
-        </p:spPr>
-        <p:txBody>
-          <a:bodyPr wrap="none" rtlCol="0">
-            <a:spAutoFit/>
-          </a:bodyPr>
+              <a:rPr lang="en-US" altLang="en-US" dirty="0">
+                <a:ea typeface="ＭＳ Ｐゴシック" charset="-128"/>
+              </a:rPr>
+              <a:t>Third Stage: Evaluate</a:t>
+            </a:r>
+          </a:p>
+        </p:txBody>
+      </p:sp>
+    </p:spTree>
+    <p:extLst>
+      <p:ext uri="{BB962C8B-B14F-4D97-AF65-F5344CB8AC3E}">
+        <p14:creationId xmlns:p14="http://schemas.microsoft.com/office/powerpoint/2010/main" val="901105427"/>
+      </p:ext>
+    </p:extLst>
+  </p:cSld>
+  <p:clrMapOvr>
+    <a:masterClrMapping/>
+  </p:clrMapOvr>
+</p:sld>
+</file>
+
+<file path=ppt/slides/slide13.xml><?xml version="1.0" encoding="utf-8"?>
+<p:sld xmlns:a="http://schemas.openxmlformats.org/drawingml/2006/main" xmlns:r="http://schemas.openxmlformats.org/officeDocument/2006/relationships" xmlns:p="http://schemas.openxmlformats.org/presentationml/2006/main">
+  <p:cSld>
+    <p:spTree>
+      <p:nvGrpSpPr>
+        <p:cNvPr id="1" name=""/>
+        <p:cNvGrpSpPr/>
+        <p:nvPr/>
+      </p:nvGrpSpPr>
+      <p:grpSpPr>
+        <a:xfrm>
+          <a:off x="0" y="0"/>
+          <a:ext cx="0" cy="0"/>
+          <a:chOff x="0" y="0"/>
+          <a:chExt cx="0" cy="0"/>
+        </a:xfrm>
+      </p:grpSpPr>
+      <p:sp>
+        <p:nvSpPr>
+          <p:cNvPr id="9217" name="Title 1"/>
+          <p:cNvSpPr>
+            <a:spLocks noGrp="1"/>
+          </p:cNvSpPr>
+          <p:nvPr>
+            <p:ph type="title"/>
+          </p:nvPr>
+        </p:nvSpPr>
+        <p:spPr/>
+        <p:txBody>
+          <a:bodyPr/>
           <a:lstStyle/>
           <a:p>
             <a:r>
-              <a:rPr lang="en-US" dirty="0"/>
-              <a:t>Juliet Lawton</a:t>
+              <a:rPr lang="en-US" altLang="en-US" dirty="0">
+                <a:ea typeface="ＭＳ Ｐゴシック" charset="-128"/>
+              </a:rPr>
+              <a:t>Results</a:t>
             </a:r>
           </a:p>
         </p:txBody>
       </p:sp>
     </p:spTree>
+    <p:extLst>
+      <p:ext uri="{BB962C8B-B14F-4D97-AF65-F5344CB8AC3E}">
+        <p14:creationId xmlns:p14="http://schemas.microsoft.com/office/powerpoint/2010/main" val="2681042120"/>
+      </p:ext>
+    </p:extLst>
+  </p:cSld>
+  <p:clrMapOvr>
+    <a:masterClrMapping/>
+  </p:clrMapOvr>
+</p:sld>
+</file>
+
+<file path=ppt/slides/slide14.xml><?xml version="1.0" encoding="utf-8"?>
+<p:sld xmlns:a="http://schemas.openxmlformats.org/drawingml/2006/main" xmlns:r="http://schemas.openxmlformats.org/officeDocument/2006/relationships" xmlns:p="http://schemas.openxmlformats.org/presentationml/2006/main">
+  <p:cSld>
+    <p:spTree>
+      <p:nvGrpSpPr>
+        <p:cNvPr id="1" name=""/>
+        <p:cNvGrpSpPr/>
+        <p:nvPr/>
+      </p:nvGrpSpPr>
+      <p:grpSpPr>
+        <a:xfrm>
+          <a:off x="0" y="0"/>
+          <a:ext cx="0" cy="0"/>
+          <a:chOff x="0" y="0"/>
+          <a:chExt cx="0" cy="0"/>
+        </a:xfrm>
+      </p:grpSpPr>
+      <p:sp>
+        <p:nvSpPr>
+          <p:cNvPr id="9217" name="Title 1"/>
+          <p:cNvSpPr>
+            <a:spLocks noGrp="1"/>
+          </p:cNvSpPr>
+          <p:nvPr>
+            <p:ph type="title"/>
+          </p:nvPr>
+        </p:nvSpPr>
+        <p:spPr/>
+        <p:txBody>
+          <a:bodyPr/>
+          <a:lstStyle/>
+          <a:p>
+            <a:r>
+              <a:rPr lang="en-US" altLang="en-US" dirty="0">
+                <a:ea typeface="ＭＳ Ｐゴシック" charset="-128"/>
+              </a:rPr>
+              <a:t>Challenges</a:t>
+            </a:r>
+          </a:p>
+        </p:txBody>
+      </p:sp>
+    </p:spTree>
+    <p:extLst>
+      <p:ext uri="{BB962C8B-B14F-4D97-AF65-F5344CB8AC3E}">
+        <p14:creationId xmlns:p14="http://schemas.microsoft.com/office/powerpoint/2010/main" val="603158914"/>
+      </p:ext>
+    </p:extLst>
+  </p:cSld>
+  <p:clrMapOvr>
+    <a:masterClrMapping/>
+  </p:clrMapOvr>
+</p:sld>
+</file>
+
+<file path=ppt/slides/slide15.xml><?xml version="1.0" encoding="utf-8"?>
+<p:sld xmlns:a="http://schemas.openxmlformats.org/drawingml/2006/main" xmlns:r="http://schemas.openxmlformats.org/officeDocument/2006/relationships" xmlns:p="http://schemas.openxmlformats.org/presentationml/2006/main">
+  <p:cSld>
+    <p:spTree>
+      <p:nvGrpSpPr>
+        <p:cNvPr id="1" name=""/>
+        <p:cNvGrpSpPr/>
+        <p:nvPr/>
+      </p:nvGrpSpPr>
+      <p:grpSpPr>
+        <a:xfrm>
+          <a:off x="0" y="0"/>
+          <a:ext cx="0" cy="0"/>
+          <a:chOff x="0" y="0"/>
+          <a:chExt cx="0" cy="0"/>
+        </a:xfrm>
+      </p:grpSpPr>
+      <p:sp>
+        <p:nvSpPr>
+          <p:cNvPr id="9217" name="Title 1"/>
+          <p:cNvSpPr>
+            <a:spLocks noGrp="1"/>
+          </p:cNvSpPr>
+          <p:nvPr>
+            <p:ph type="title"/>
+          </p:nvPr>
+        </p:nvSpPr>
+        <p:spPr/>
+        <p:txBody>
+          <a:bodyPr/>
+          <a:lstStyle/>
+          <a:p>
+            <a:r>
+              <a:rPr lang="en-US" altLang="en-US" dirty="0">
+                <a:ea typeface="ＭＳ Ｐゴシック" charset="-128"/>
+              </a:rPr>
+              <a:t>Conclusion &amp; Future Work</a:t>
+            </a:r>
+          </a:p>
+        </p:txBody>
+      </p:sp>
+    </p:spTree>
+    <p:extLst>
+      <p:ext uri="{BB962C8B-B14F-4D97-AF65-F5344CB8AC3E}">
+        <p14:creationId xmlns:p14="http://schemas.microsoft.com/office/powerpoint/2010/main" val="2875911112"/>
+      </p:ext>
+    </p:extLst>
+  </p:cSld>
+  <p:clrMapOvr>
+    <a:masterClrMapping/>
+  </p:clrMapOvr>
+</p:sld>
+</file>
+
+<file path=ppt/slides/slide16.xml><?xml version="1.0" encoding="utf-8"?>
+<p:sld xmlns:a="http://schemas.openxmlformats.org/drawingml/2006/main" xmlns:r="http://schemas.openxmlformats.org/officeDocument/2006/relationships" xmlns:p="http://schemas.openxmlformats.org/presentationml/2006/main">
+  <p:cSld>
+    <p:spTree>
+      <p:nvGrpSpPr>
+        <p:cNvPr id="1" name=""/>
+        <p:cNvGrpSpPr/>
+        <p:nvPr/>
+      </p:nvGrpSpPr>
+      <p:grpSpPr>
+        <a:xfrm>
+          <a:off x="0" y="0"/>
+          <a:ext cx="0" cy="0"/>
+          <a:chOff x="0" y="0"/>
+          <a:chExt cx="0" cy="0"/>
+        </a:xfrm>
+      </p:grpSpPr>
+      <p:sp>
+        <p:nvSpPr>
+          <p:cNvPr id="9217" name="Title 1"/>
+          <p:cNvSpPr>
+            <a:spLocks noGrp="1"/>
+          </p:cNvSpPr>
+          <p:nvPr>
+            <p:ph type="title"/>
+          </p:nvPr>
+        </p:nvSpPr>
+        <p:spPr/>
+        <p:txBody>
+          <a:bodyPr/>
+          <a:lstStyle/>
+          <a:p>
+            <a:r>
+              <a:rPr lang="en-US" altLang="en-US" dirty="0">
+                <a:ea typeface="ＭＳ Ｐゴシック" charset="-128"/>
+              </a:rPr>
+              <a:t>Acknowledgements</a:t>
+            </a:r>
+          </a:p>
+        </p:txBody>
+      </p:sp>
+    </p:spTree>
+    <p:extLst>
+      <p:ext uri="{BB962C8B-B14F-4D97-AF65-F5344CB8AC3E}">
+        <p14:creationId xmlns:p14="http://schemas.microsoft.com/office/powerpoint/2010/main" val="1671929546"/>
+      </p:ext>
+    </p:extLst>
   </p:cSld>
   <p:clrMapOvr>
     <a:masterClrMapping/>
@@ -3733,7 +4656,7 @@
       </p:grpSpPr>
       <p:sp>
         <p:nvSpPr>
-          <p:cNvPr id="9217" name="Title 1"/>
+          <p:cNvPr id="8193" name="Title 1"/>
           <p:cNvSpPr>
             <a:spLocks noGrp="1"/>
           </p:cNvSpPr>
@@ -3741,21 +4664,136 @@
             <p:ph type="title"/>
           </p:nvPr>
         </p:nvSpPr>
-        <p:spPr/>
+        <p:spPr>
+          <a:xfrm>
+            <a:off x="914400" y="2057400"/>
+            <a:ext cx="10363200" cy="2743200"/>
+          </a:xfrm>
+        </p:spPr>
         <p:txBody>
           <a:bodyPr/>
           <a:lstStyle/>
           <a:p>
             <a:r>
-              <a:rPr lang="en-US" altLang="en-US" dirty="0">
+              <a:rPr lang="en-US" altLang="en-US" sz="3600" dirty="0">
                 <a:ea typeface="ＭＳ Ｐゴシック" charset="-128"/>
               </a:rPr>
-              <a:t>Introduction</a:t>
+              <a:t>Brand Sentiment Analysis of Twitter Posts</a:t>
+            </a:r>
+          </a:p>
+        </p:txBody>
+      </p:sp>
+      <p:sp>
+        <p:nvSpPr>
+          <p:cNvPr id="2" name="TextBox 1">
+            <a:extLst>
+              <a:ext uri="{FF2B5EF4-FFF2-40B4-BE49-F238E27FC236}">
+                <a16:creationId xmlns:a16="http://schemas.microsoft.com/office/drawing/2014/main" id="{7D0BDA10-284A-7B41-8670-B6B5D19AF0F7}"/>
+              </a:ext>
+            </a:extLst>
+          </p:cNvPr>
+          <p:cNvSpPr txBox="1"/>
+          <p:nvPr/>
+        </p:nvSpPr>
+        <p:spPr>
+          <a:xfrm>
+            <a:off x="1204948" y="4114800"/>
+            <a:ext cx="2548133" cy="461665"/>
+          </a:xfrm>
+          <a:prstGeom prst="rect">
+            <a:avLst/>
+          </a:prstGeom>
+          <a:noFill/>
+        </p:spPr>
+        <p:txBody>
+          <a:bodyPr wrap="none" rtlCol="0" anchor="ctr">
+            <a:spAutoFit/>
+          </a:bodyPr>
+          <a:lstStyle/>
+          <a:p>
+            <a:r>
+              <a:rPr lang="en-US" dirty="0"/>
+              <a:t>Jonathan Agustin</a:t>
+            </a:r>
+          </a:p>
+        </p:txBody>
+      </p:sp>
+      <p:sp>
+        <p:nvSpPr>
+          <p:cNvPr id="3" name="TextBox 2">
+            <a:extLst>
+              <a:ext uri="{FF2B5EF4-FFF2-40B4-BE49-F238E27FC236}">
+                <a16:creationId xmlns:a16="http://schemas.microsoft.com/office/drawing/2014/main" id="{F501E45A-DF55-5B93-C877-50B2C4B47180}"/>
+              </a:ext>
+            </a:extLst>
+          </p:cNvPr>
+          <p:cNvSpPr txBox="1"/>
+          <p:nvPr/>
+        </p:nvSpPr>
+        <p:spPr>
+          <a:xfrm>
+            <a:off x="4958027" y="4114800"/>
+            <a:ext cx="2840842" cy="461665"/>
+          </a:xfrm>
+          <a:prstGeom prst="rect">
+            <a:avLst/>
+          </a:prstGeom>
+          <a:noFill/>
+        </p:spPr>
+        <p:txBody>
+          <a:bodyPr wrap="none" rtlCol="0" anchor="ctr">
+            <a:spAutoFit/>
+          </a:bodyPr>
+          <a:lstStyle/>
+          <a:p>
+            <a:r>
+              <a:rPr lang="en-US" dirty="0"/>
+              <a:t>Fernando Calderon</a:t>
+            </a:r>
+          </a:p>
+        </p:txBody>
+      </p:sp>
+      <p:sp>
+        <p:nvSpPr>
+          <p:cNvPr id="4" name="TextBox 3">
+            <a:extLst>
+              <a:ext uri="{FF2B5EF4-FFF2-40B4-BE49-F238E27FC236}">
+                <a16:creationId xmlns:a16="http://schemas.microsoft.com/office/drawing/2014/main" id="{99028ACB-FE7B-0E6D-EF5A-0ECC023F0069}"/>
+              </a:ext>
+            </a:extLst>
+          </p:cNvPr>
+          <p:cNvSpPr txBox="1"/>
+          <p:nvPr/>
+        </p:nvSpPr>
+        <p:spPr>
+          <a:xfrm>
+            <a:off x="9003817" y="4114800"/>
+            <a:ext cx="1983235" cy="461665"/>
+          </a:xfrm>
+          <a:prstGeom prst="rect">
+            <a:avLst/>
+          </a:prstGeom>
+          <a:noFill/>
+        </p:spPr>
+        <p:txBody>
+          <a:bodyPr wrap="none" rtlCol="0" anchor="ctr">
+            <a:spAutoFit/>
+          </a:bodyPr>
+          <a:lstStyle/>
+          <a:p>
+            <a:r>
+              <a:rPr lang="en-US" dirty="0"/>
+              <a:t>Juliet Lawton</a:t>
             </a:r>
           </a:p>
         </p:txBody>
       </p:sp>
     </p:spTree>
+    <p:extLst>
+      <p:ext uri="{BB962C8B-B14F-4D97-AF65-F5344CB8AC3E}">
+        <p14:creationId xmlns:p14="http://schemas.microsoft.com/office/powerpoint/2010/main" val="1093170298"/>
+      </p:ext>
+    </p:extLst>
   </p:cSld>
   <p:clrMapOvr>
     <a:masterClrMapping/>
@@ -3799,17 +4837,12 @@
               <a:rPr lang="en-US" altLang="en-US" dirty="0">
                 <a:ea typeface="ＭＳ Ｐゴシック" charset="-128"/>
               </a:rPr>
-              <a:t>Related Work</a:t>
+              <a:t>Introduction</a:t>
             </a:r>
           </a:p>
         </p:txBody>
       </p:sp>
     </p:spTree>
-    <p:extLst>
-      <p:ext uri="{BB962C8B-B14F-4D97-AF65-F5344CB8AC3E}">
-        <p14:creationId xmlns:p14="http://schemas.microsoft.com/office/powerpoint/2010/main" val="4169348470"/>
-      </p:ext>
-    </p:extLst>
   </p:cSld>
   <p:clrMapOvr>
     <a:masterClrMapping/>
@@ -3853,7 +4886,7 @@
               <a:rPr lang="en-US" altLang="en-US" dirty="0">
                 <a:ea typeface="ＭＳ Ｐゴシック" charset="-128"/>
               </a:rPr>
-              <a:t>Problem Definition &amp; AI Techniques</a:t>
+              <a:t>Problem Statement</a:t>
             </a:r>
           </a:p>
         </p:txBody>
@@ -3907,7 +4940,7 @@
               <a:rPr lang="en-US" altLang="en-US" dirty="0">
                 <a:ea typeface="ＭＳ Ｐゴシック" charset="-128"/>
               </a:rPr>
-              <a:t>Dataset Description</a:t>
+              <a:t>Scope</a:t>
             </a:r>
           </a:p>
         </p:txBody>
@@ -3915,7 +4948,7 @@
     </p:spTree>
     <p:extLst>
       <p:ext uri="{BB962C8B-B14F-4D97-AF65-F5344CB8AC3E}">
-        <p14:creationId xmlns:p14="http://schemas.microsoft.com/office/powerpoint/2010/main" val="1623255054"/>
+        <p14:creationId xmlns:p14="http://schemas.microsoft.com/office/powerpoint/2010/main" val="3273571779"/>
       </p:ext>
     </p:extLst>
   </p:cSld>
@@ -3961,7 +4994,7 @@
               <a:rPr lang="en-US" altLang="en-US" dirty="0">
                 <a:ea typeface="ＭＳ Ｐゴシック" charset="-128"/>
               </a:rPr>
-              <a:t>Experimental Design</a:t>
+              <a:t>Algorithms</a:t>
             </a:r>
           </a:p>
         </p:txBody>
@@ -3969,7 +5002,7 @@
     </p:spTree>
     <p:extLst>
       <p:ext uri="{BB962C8B-B14F-4D97-AF65-F5344CB8AC3E}">
-        <p14:creationId xmlns:p14="http://schemas.microsoft.com/office/powerpoint/2010/main" val="1557484235"/>
+        <p14:creationId xmlns:p14="http://schemas.microsoft.com/office/powerpoint/2010/main" val="69069607"/>
       </p:ext>
     </p:extLst>
   </p:cSld>
@@ -4015,7 +5048,7 @@
               <a:rPr lang="en-US" altLang="en-US" dirty="0">
                 <a:ea typeface="ＭＳ Ｐゴシック" charset="-128"/>
               </a:rPr>
-              <a:t>Results &amp; Discussion</a:t>
+              <a:t>Datasets</a:t>
             </a:r>
           </a:p>
         </p:txBody>
@@ -4023,7 +5056,7 @@
     </p:spTree>
     <p:extLst>
       <p:ext uri="{BB962C8B-B14F-4D97-AF65-F5344CB8AC3E}">
-        <p14:creationId xmlns:p14="http://schemas.microsoft.com/office/powerpoint/2010/main" val="901105427"/>
+        <p14:creationId xmlns:p14="http://schemas.microsoft.com/office/powerpoint/2010/main" val="1623255054"/>
       </p:ext>
     </p:extLst>
   </p:cSld>
@@ -4069,7 +5102,7 @@
               <a:rPr lang="en-US" altLang="en-US" dirty="0">
                 <a:ea typeface="ＭＳ Ｐゴシック" charset="-128"/>
               </a:rPr>
-              <a:t>Conclusion &amp; Future Work</a:t>
+              <a:t>Experimental Design</a:t>
             </a:r>
           </a:p>
         </p:txBody>
@@ -4077,7 +5110,7 @@
     </p:spTree>
     <p:extLst>
       <p:ext uri="{BB962C8B-B14F-4D97-AF65-F5344CB8AC3E}">
-        <p14:creationId xmlns:p14="http://schemas.microsoft.com/office/powerpoint/2010/main" val="2875911112"/>
+        <p14:creationId xmlns:p14="http://schemas.microsoft.com/office/powerpoint/2010/main" val="1557484235"/>
       </p:ext>
     </p:extLst>
   </p:cSld>
@@ -4123,7 +5156,7 @@
               <a:rPr lang="en-US" altLang="en-US" dirty="0">
                 <a:ea typeface="ＭＳ Ｐゴシック" charset="-128"/>
               </a:rPr>
-              <a:t>Acknowledgements</a:t>
+              <a:t>First Stage: Assess</a:t>
             </a:r>
           </a:p>
         </p:txBody>
@@ -4131,7 +5164,7 @@
     </p:spTree>
     <p:extLst>
       <p:ext uri="{BB962C8B-B14F-4D97-AF65-F5344CB8AC3E}">
-        <p14:creationId xmlns:p14="http://schemas.microsoft.com/office/powerpoint/2010/main" val="1671929546"/>
+        <p14:creationId xmlns:p14="http://schemas.microsoft.com/office/powerpoint/2010/main" val="4054382697"/>
       </p:ext>
     </p:extLst>
   </p:cSld>

</xml_diff>

<commit_message>
new assets and pptx
</commit_message>
<xml_diff>
--- a/Final-Project-Team-2.pptx
+++ b/Final-Project-Team-2.pptx
@@ -5,28 +5,27 @@
     <p:sldMasterId id="2147483763" r:id="rId1"/>
   </p:sldMasterIdLst>
   <p:notesMasterIdLst>
-    <p:notesMasterId r:id="rId18"/>
+    <p:notesMasterId r:id="rId17"/>
   </p:notesMasterIdLst>
   <p:handoutMasterIdLst>
-    <p:handoutMasterId r:id="rId19"/>
+    <p:handoutMasterId r:id="rId18"/>
   </p:handoutMasterIdLst>
   <p:sldIdLst>
-    <p:sldId id="256" r:id="rId2"/>
-    <p:sldId id="273" r:id="rId3"/>
-    <p:sldId id="257" r:id="rId4"/>
-    <p:sldId id="260" r:id="rId5"/>
-    <p:sldId id="269" r:id="rId6"/>
-    <p:sldId id="266" r:id="rId7"/>
-    <p:sldId id="261" r:id="rId8"/>
-    <p:sldId id="262" r:id="rId9"/>
-    <p:sldId id="270" r:id="rId10"/>
-    <p:sldId id="271" r:id="rId11"/>
-    <p:sldId id="272" r:id="rId12"/>
-    <p:sldId id="263" r:id="rId13"/>
-    <p:sldId id="267" r:id="rId14"/>
-    <p:sldId id="268" r:id="rId15"/>
-    <p:sldId id="264" r:id="rId16"/>
-    <p:sldId id="265" r:id="rId17"/>
+    <p:sldId id="273" r:id="rId2"/>
+    <p:sldId id="257" r:id="rId3"/>
+    <p:sldId id="260" r:id="rId4"/>
+    <p:sldId id="269" r:id="rId5"/>
+    <p:sldId id="266" r:id="rId6"/>
+    <p:sldId id="261" r:id="rId7"/>
+    <p:sldId id="262" r:id="rId8"/>
+    <p:sldId id="270" r:id="rId9"/>
+    <p:sldId id="271" r:id="rId10"/>
+    <p:sldId id="272" r:id="rId11"/>
+    <p:sldId id="263" r:id="rId12"/>
+    <p:sldId id="267" r:id="rId13"/>
+    <p:sldId id="268" r:id="rId14"/>
+    <p:sldId id="264" r:id="rId15"/>
+    <p:sldId id="265" r:id="rId16"/>
   </p:sldIdLst>
   <p:sldSz cx="12192000" cy="6858000"/>
   <p:notesSz cx="6858000" cy="9144000"/>
@@ -177,7 +176,7 @@
 <file path=ppt/revisionInfo.xml><?xml version="1.0" encoding="utf-8"?>
 <p1510:revInfo xmlns:a="http://schemas.openxmlformats.org/drawingml/2006/main" xmlns:r="http://schemas.openxmlformats.org/officeDocument/2006/relationships" xmlns:p1510="http://schemas.microsoft.com/office/powerpoint/2015/10/main">
   <p1510:revLst>
-    <p1510:client id="{9DC81C8E-254C-4083-9BF4-030793D3F1B6}" v="22" dt="2023-07-15T02:48:51.470"/>
+    <p1510:client id="{9DC81C8E-254C-4083-9BF4-030793D3F1B6}" v="29" dt="2023-07-15T08:37:51.363"/>
   </p1510:revLst>
 </p1510:revInfo>
 </file>
@@ -275,7 +274,7 @@
             <a:fld id="{3CB42547-1216-8745-B61E-1644CC83EEDE}" type="datetimeFigureOut">
               <a:rPr lang="en-US" altLang="en-US"/>
               <a:pPr/>
-              <a:t>7/14/2023</a:t>
+              <a:t>7/15/2023</a:t>
             </a:fld>
             <a:endParaRPr lang="en-US" altLang="en-US"/>
           </a:p>
@@ -970,21 +969,18 @@
           <a:p>
             <a:r>
               <a:rPr lang="en-US" dirty="0"/>
-              <a:t>A </a:t>
-            </a:r>
-            <a:r>
-              <a:rPr lang="en-US"/>
-              <a:t>cool introductory videoclip </a:t>
+              <a:t>Let’s get started. Welcome to our project titled “</a:t>
+            </a:r>
+            <a:r>
+              <a:rPr lang="en-US" altLang="en-US" sz="1200" dirty="0">
+                <a:ea typeface="ＭＳ Ｐゴシック" charset="-128"/>
+              </a:rPr>
+              <a:t>Brand Sentiment Analysis of Twitter Posts.</a:t>
             </a:r>
             <a:r>
               <a:rPr lang="en-US" dirty="0"/>
-              <a:t>will be inserted here to WOW the audience and show that we </a:t>
-            </a:r>
-            <a:r>
-              <a:rPr lang="en-US"/>
-              <a:t>mean business.</a:t>
-            </a:r>
-            <a:endParaRPr lang="en-US" dirty="0"/>
+              <a:t>” </a:t>
+            </a:r>
           </a:p>
         </p:txBody>
       </p:sp>
@@ -1015,7 +1011,7 @@
     </p:spTree>
     <p:extLst>
       <p:ext uri="{BB962C8B-B14F-4D97-AF65-F5344CB8AC3E}">
-        <p14:creationId xmlns:p14="http://schemas.microsoft.com/office/powerpoint/2010/main" val="4054898556"/>
+        <p14:creationId xmlns:p14="http://schemas.microsoft.com/office/powerpoint/2010/main" val="850201174"/>
       </p:ext>
     </p:extLst>
   </p:cSld>
@@ -1103,7 +1099,7 @@
     </p:spTree>
     <p:extLst>
       <p:ext uri="{BB962C8B-B14F-4D97-AF65-F5344CB8AC3E}">
-        <p14:creationId xmlns:p14="http://schemas.microsoft.com/office/powerpoint/2010/main" val="2161610621"/>
+        <p14:creationId xmlns:p14="http://schemas.microsoft.com/office/powerpoint/2010/main" val="1812335125"/>
       </p:ext>
     </p:extLst>
   </p:cSld>
@@ -1159,7 +1155,7 @@
           <a:p>
             <a:r>
               <a:rPr lang="en-US" dirty="0"/>
-              <a:t>In the development stage, we handled invalid values and discarded non-textual content. We trained our models to identify a brand and align with the sentiment expressed in a tweet, and then tuned them to improve performance.</a:t>
+              <a:t>In the evaluation stage, we measured the models' ability to identify brands and predict sentiment in Twitter posts. We used standard classification metrics such as Accuracy, Precision, Recall, and F1 Score to evaluate the models.</a:t>
             </a:r>
           </a:p>
         </p:txBody>
@@ -1191,7 +1187,7 @@
     </p:spTree>
     <p:extLst>
       <p:ext uri="{BB962C8B-B14F-4D97-AF65-F5344CB8AC3E}">
-        <p14:creationId xmlns:p14="http://schemas.microsoft.com/office/powerpoint/2010/main" val="1812335125"/>
+        <p14:creationId xmlns:p14="http://schemas.microsoft.com/office/powerpoint/2010/main" val="3632726758"/>
       </p:ext>
     </p:extLst>
   </p:cSld>
@@ -1247,7 +1243,7 @@
           <a:p>
             <a:r>
               <a:rPr lang="en-US" dirty="0"/>
-              <a:t>In the evaluation stage, we measured the models' ability to identify brands and predict sentiment in Twitter posts. We used standard classification metrics such as Accuracy, Precision, Recall, and F1 Score to evaluate the models.</a:t>
+              <a:t>We present the results of our experiments, including any relevant figures or tables, discuss the implications of our results, and explain whether our results support our initial hypothesis. We present the results of our models. We achieved an accuracy rate over 50%, demonstrating the potential of machine learning in understanding public sentiment towards brands based on social media content.</a:t>
             </a:r>
           </a:p>
         </p:txBody>
@@ -1279,7 +1275,7 @@
     </p:spTree>
     <p:extLst>
       <p:ext uri="{BB962C8B-B14F-4D97-AF65-F5344CB8AC3E}">
-        <p14:creationId xmlns:p14="http://schemas.microsoft.com/office/powerpoint/2010/main" val="3632726758"/>
+        <p14:creationId xmlns:p14="http://schemas.microsoft.com/office/powerpoint/2010/main" val="4074490549"/>
       </p:ext>
     </p:extLst>
   </p:cSld>
@@ -1335,7 +1331,7 @@
           <a:p>
             <a:r>
               <a:rPr lang="en-US" dirty="0"/>
-              <a:t>We present the results of our experiments, including any relevant figures or tables, discuss the implications of our results, and explain whether our results support our initial hypothesis. We present the results of our models. We achieved an accuracy rate over 50%, demonstrating the potential of machine learning in understanding public sentiment towards brands based on social media content.</a:t>
+              <a:t>We faced challenges such as the 'aboutness' problem, which refers to the challenge of determining the subject of the sentiment expressed in a sentence. We also encountered issues with complex sentences and ambiguous subjects.</a:t>
             </a:r>
           </a:p>
         </p:txBody>
@@ -1367,7 +1363,7 @@
     </p:spTree>
     <p:extLst>
       <p:ext uri="{BB962C8B-B14F-4D97-AF65-F5344CB8AC3E}">
-        <p14:creationId xmlns:p14="http://schemas.microsoft.com/office/powerpoint/2010/main" val="4074490549"/>
+        <p14:creationId xmlns:p14="http://schemas.microsoft.com/office/powerpoint/2010/main" val="2371925110"/>
       </p:ext>
     </p:extLst>
   </p:cSld>
@@ -1423,7 +1419,7 @@
           <a:p>
             <a:r>
               <a:rPr lang="en-US" dirty="0"/>
-              <a:t>We faced challenges such as the 'aboutness' problem, which refers to the challenge of determining the subject of the sentiment expressed in a sentence. We also encountered issues with complex sentences and ambiguous subjects.</a:t>
+              <a:t>In the conclusion and future work section, we will summarize the main findings of our project, conclude the report by discussing the significance of our findings, and discuss potential future work, such as how our project could be extended or improved.</a:t>
             </a:r>
           </a:p>
         </p:txBody>
@@ -1455,7 +1451,7 @@
     </p:spTree>
     <p:extLst>
       <p:ext uri="{BB962C8B-B14F-4D97-AF65-F5344CB8AC3E}">
-        <p14:creationId xmlns:p14="http://schemas.microsoft.com/office/powerpoint/2010/main" val="2371925110"/>
+        <p14:creationId xmlns:p14="http://schemas.microsoft.com/office/powerpoint/2010/main" val="1196247736"/>
       </p:ext>
     </p:extLst>
   </p:cSld>
@@ -1509,9 +1505,90 @@
           <a:bodyPr/>
           <a:lstStyle/>
           <a:p>
+            <a:pPr marL="0" marR="0" lvl="0" indent="0" algn="l" defTabSz="914400" rtl="0" eaLnBrk="0" fontAlgn="base" latinLnBrk="0" hangingPunct="0">
+              <a:lnSpc>
+                <a:spcPct val="100000"/>
+              </a:lnSpc>
+              <a:spcBef>
+                <a:spcPct val="30000"/>
+              </a:spcBef>
+              <a:spcAft>
+                <a:spcPct val="0"/>
+              </a:spcAft>
+              <a:buClrTx/>
+              <a:buSzTx/>
+              <a:buFontTx/>
+              <a:buNone/>
+              <a:tabLst/>
+              <a:defRPr/>
+            </a:pPr>
             <a:r>
               <a:rPr lang="en-US" dirty="0"/>
-              <a:t>In the conclusion and future work section, we will summarize the main findings of our project, conclude the report by discussing the significance of our findings, and discuss potential future work, such as how our project could be extended or improved.</a:t>
+              <a:t>We would like to take a moment to express our deepest gratitude to those who have made this project possible. </a:t>
+            </a:r>
+            <a:r>
+              <a:rPr lang="en-US" b="0" dirty="0">
+                <a:solidFill>
+                  <a:srgbClr val="CE9178"/>
+                </a:solidFill>
+                <a:effectLst/>
+                <a:latin typeface="Consolas" panose="020B0609020204030204" pitchFamily="49" charset="0"/>
+              </a:rPr>
+              <a:t>We thank our advisor Dr. Van </a:t>
+            </a:r>
+            <a:r>
+              <a:rPr lang="en-US" b="0" dirty="0" err="1">
+                <a:solidFill>
+                  <a:srgbClr val="CE9178"/>
+                </a:solidFill>
+                <a:effectLst/>
+                <a:latin typeface="Consolas" panose="020B0609020204030204" pitchFamily="49" charset="0"/>
+              </a:rPr>
+              <a:t>Benschoten</a:t>
+            </a:r>
+            <a:r>
+              <a:rPr lang="en-US" b="0" dirty="0">
+                <a:solidFill>
+                  <a:srgbClr val="CE9178"/>
+                </a:solidFill>
+                <a:effectLst/>
+                <a:latin typeface="Consolas" panose="020B0609020204030204" pitchFamily="49" charset="0"/>
+              </a:rPr>
+              <a:t> for his invaluable guidance in this project. We also acknowledge Dr. </a:t>
+            </a:r>
+            <a:r>
+              <a:rPr lang="en-US" b="0" dirty="0" err="1">
+                <a:solidFill>
+                  <a:srgbClr val="CE9178"/>
+                </a:solidFill>
+                <a:effectLst/>
+                <a:latin typeface="Consolas" panose="020B0609020204030204" pitchFamily="49" charset="0"/>
+              </a:rPr>
+              <a:t>Tarshizi</a:t>
+            </a:r>
+            <a:r>
+              <a:rPr lang="en-US" b="0" dirty="0">
+                <a:solidFill>
+                  <a:srgbClr val="CE9178"/>
+                </a:solidFill>
+                <a:effectLst/>
+                <a:latin typeface="Consolas" panose="020B0609020204030204" pitchFamily="49" charset="0"/>
+              </a:rPr>
+              <a:t> for directing the Applied Artificial Intelligence program at the University of San Diego.</a:t>
+            </a:r>
+            <a:r>
+              <a:rPr lang="en-US" b="0" dirty="0">
+                <a:solidFill>
+                  <a:srgbClr val="D4D4D4"/>
+                </a:solidFill>
+                <a:effectLst/>
+                <a:latin typeface="Consolas" panose="020B0609020204030204" pitchFamily="49" charset="0"/>
+              </a:rPr>
+              <a:t> W</a:t>
+            </a:r>
+            <a:r>
+              <a:rPr lang="en-US" dirty="0"/>
+              <a:t>e are truly grateful for both of your support.</a:t>
             </a:r>
           </a:p>
         </p:txBody>
@@ -1535,94 +1612,6 @@
               <a:rPr lang="en-US" altLang="en-US" smtClean="0"/>
               <a:pPr/>
               <a:t>15</a:t>
-            </a:fld>
-            <a:endParaRPr lang="en-US" altLang="en-US"/>
-          </a:p>
-        </p:txBody>
-      </p:sp>
-    </p:spTree>
-    <p:extLst>
-      <p:ext uri="{BB962C8B-B14F-4D97-AF65-F5344CB8AC3E}">
-        <p14:creationId xmlns:p14="http://schemas.microsoft.com/office/powerpoint/2010/main" val="1196247736"/>
-      </p:ext>
-    </p:extLst>
-  </p:cSld>
-  <p:clrMapOvr>
-    <a:masterClrMapping/>
-  </p:clrMapOvr>
-</p:notes>
-</file>
-
-<file path=ppt/notesSlides/notesSlide16.xml><?xml version="1.0" encoding="utf-8"?>
-<p:notes xmlns:a="http://schemas.openxmlformats.org/drawingml/2006/main" xmlns:r="http://schemas.openxmlformats.org/officeDocument/2006/relationships" xmlns:p="http://schemas.openxmlformats.org/presentationml/2006/main">
-  <p:cSld>
-    <p:spTree>
-      <p:nvGrpSpPr>
-        <p:cNvPr id="1" name=""/>
-        <p:cNvGrpSpPr/>
-        <p:nvPr/>
-      </p:nvGrpSpPr>
-      <p:grpSpPr>
-        <a:xfrm>
-          <a:off x="0" y="0"/>
-          <a:ext cx="0" cy="0"/>
-          <a:chOff x="0" y="0"/>
-          <a:chExt cx="0" cy="0"/>
-        </a:xfrm>
-      </p:grpSpPr>
-      <p:sp>
-        <p:nvSpPr>
-          <p:cNvPr id="2" name="Slide Image Placeholder 1"/>
-          <p:cNvSpPr>
-            <a:spLocks noGrp="1" noRot="1" noChangeAspect="1"/>
-          </p:cNvSpPr>
-          <p:nvPr>
-            <p:ph type="sldImg"/>
-          </p:nvPr>
-        </p:nvSpPr>
-        <p:spPr/>
-      </p:sp>
-      <p:sp>
-        <p:nvSpPr>
-          <p:cNvPr id="3" name="Notes Placeholder 2"/>
-          <p:cNvSpPr>
-            <a:spLocks noGrp="1"/>
-          </p:cNvSpPr>
-          <p:nvPr>
-            <p:ph type="body" idx="1"/>
-          </p:nvPr>
-        </p:nvSpPr>
-        <p:spPr/>
-        <p:txBody>
-          <a:bodyPr/>
-          <a:lstStyle/>
-          <a:p>
-            <a:r>
-              <a:rPr lang="en-US" dirty="0"/>
-              <a:t>We would like to take a moment to express our deepest gratitude to those who have made this project possible. First and foremost, we would like to thank our professor, whose guidance and expertise have been invaluable throughout this process. Your patience and dedication have not gone unnoticed, and we are truly grateful for your support.</a:t>
-            </a:r>
-          </a:p>
-        </p:txBody>
-      </p:sp>
-      <p:sp>
-        <p:nvSpPr>
-          <p:cNvPr id="4" name="Slide Number Placeholder 3"/>
-          <p:cNvSpPr>
-            <a:spLocks noGrp="1"/>
-          </p:cNvSpPr>
-          <p:nvPr>
-            <p:ph type="sldNum" sz="quarter" idx="5"/>
-          </p:nvPr>
-        </p:nvSpPr>
-        <p:spPr/>
-        <p:txBody>
-          <a:bodyPr/>
-          <a:lstStyle/>
-          <a:p>
-            <a:fld id="{AA4D7F38-9E4B-194A-AA5A-81BF138D29E9}" type="slidenum">
-              <a:rPr lang="en-US" altLang="en-US" smtClean="0"/>
-              <a:pPr/>
-              <a:t>16</a:t>
             </a:fld>
             <a:endParaRPr lang="en-US" altLang="en-US"/>
           </a:p>
@@ -1687,17 +1676,7 @@
           <a:p>
             <a:r>
               <a:rPr lang="en-US" dirty="0"/>
-              <a:t>Let’s get started. Welcome to our project titled “</a:t>
-            </a:r>
-            <a:r>
-              <a:rPr lang="en-US" altLang="en-US" sz="1200" dirty="0">
-                <a:ea typeface="ＭＳ Ｐゴシック" charset="-128"/>
-              </a:rPr>
-              <a:t>Brand Sentiment Analysis of Twitter Posts</a:t>
-            </a:r>
-            <a:r>
-              <a:rPr lang="en-US" dirty="0"/>
-              <a:t>”. </a:t>
+              <a:t>Our team has worked diligently to develop a system that leverages AI to understand public sentiment towards brands based on Twitter posts.</a:t>
             </a:r>
           </a:p>
         </p:txBody>
@@ -1729,7 +1708,7 @@
     </p:spTree>
     <p:extLst>
       <p:ext uri="{BB962C8B-B14F-4D97-AF65-F5344CB8AC3E}">
-        <p14:creationId xmlns:p14="http://schemas.microsoft.com/office/powerpoint/2010/main" val="850201174"/>
+        <p14:creationId xmlns:p14="http://schemas.microsoft.com/office/powerpoint/2010/main" val="228650707"/>
       </p:ext>
     </p:extLst>
   </p:cSld>
@@ -1785,7 +1764,7 @@
           <a:p>
             <a:r>
               <a:rPr lang="en-US" dirty="0"/>
-              <a:t>Our team has worked diligently to develop a system that leverages AI to understand public sentiment towards brands based on social media content.</a:t>
+              <a:t>We build two models: a Brand Classifier that predicts whether a Twitter post expresses a brand, and a Brand Sentiment Analyzer that predicts the sentiment of a Twitter post towards a brand.</a:t>
             </a:r>
           </a:p>
         </p:txBody>
@@ -1817,7 +1796,7 @@
     </p:spTree>
     <p:extLst>
       <p:ext uri="{BB962C8B-B14F-4D97-AF65-F5344CB8AC3E}">
-        <p14:creationId xmlns:p14="http://schemas.microsoft.com/office/powerpoint/2010/main" val="228650707"/>
+        <p14:creationId xmlns:p14="http://schemas.microsoft.com/office/powerpoint/2010/main" val="1642067300"/>
       </p:ext>
     </p:extLst>
   </p:cSld>
@@ -1873,7 +1852,7 @@
           <a:p>
             <a:r>
               <a:rPr lang="en-US" dirty="0"/>
-              <a:t>We build two models: a Brand Classifier that predicts whether a Twitter post expresses a brand, and a Brand Sentiment Analyzer that predicts the sentiment of a Twitter post towards a brand.</a:t>
+              <a:t>They are trained on Twitter posts, so they cannot classify posts from other social media sites. They also process only text data, ignoring non-textual elements like images, videos, and audio clips.</a:t>
             </a:r>
           </a:p>
         </p:txBody>
@@ -1905,7 +1884,7 @@
     </p:spTree>
     <p:extLst>
       <p:ext uri="{BB962C8B-B14F-4D97-AF65-F5344CB8AC3E}">
-        <p14:creationId xmlns:p14="http://schemas.microsoft.com/office/powerpoint/2010/main" val="1642067300"/>
+        <p14:creationId xmlns:p14="http://schemas.microsoft.com/office/powerpoint/2010/main" val="3757772613"/>
       </p:ext>
     </p:extLst>
   </p:cSld>
@@ -1961,7 +1940,7 @@
           <a:p>
             <a:r>
               <a:rPr lang="en-US" dirty="0"/>
-              <a:t>They are trained on Twitter posts, so they cannot classify posts from other social media sites. They also process only text data, ignoring non-textual elements like images, videos, and audio clips.</a:t>
+              <a:t>We experimented with various machine learning algorithms like Naïve Bayes, Logistic Regression, Support Vector Machines, Recurrent Neural Networks, and Transformers.</a:t>
             </a:r>
           </a:p>
         </p:txBody>
@@ -1993,7 +1972,7 @@
     </p:spTree>
     <p:extLst>
       <p:ext uri="{BB962C8B-B14F-4D97-AF65-F5344CB8AC3E}">
-        <p14:creationId xmlns:p14="http://schemas.microsoft.com/office/powerpoint/2010/main" val="3757772613"/>
+        <p14:creationId xmlns:p14="http://schemas.microsoft.com/office/powerpoint/2010/main" val="1137822234"/>
       </p:ext>
     </p:extLst>
   </p:cSld>
@@ -2049,7 +2028,7 @@
           <a:p>
             <a:r>
               <a:rPr lang="en-US" dirty="0"/>
-              <a:t>We experimented with various machine learning algorithms like Naïve Bayes, Logistic Regression, Support Vector Machines, Recurrent Neural Networks, and Transformers.</a:t>
+              <a:t>We used the Sentiment140 dataset, which contains 1.6 million tweets, to train our models.</a:t>
             </a:r>
           </a:p>
         </p:txBody>
@@ -2081,7 +2060,7 @@
     </p:spTree>
     <p:extLst>
       <p:ext uri="{BB962C8B-B14F-4D97-AF65-F5344CB8AC3E}">
-        <p14:creationId xmlns:p14="http://schemas.microsoft.com/office/powerpoint/2010/main" val="1137822234"/>
+        <p14:creationId xmlns:p14="http://schemas.microsoft.com/office/powerpoint/2010/main" val="1805981893"/>
       </p:ext>
     </p:extLst>
   </p:cSld>
@@ -2137,7 +2116,7 @@
           <a:p>
             <a:r>
               <a:rPr lang="en-US" dirty="0"/>
-              <a:t>We used the Sentiment140 dataset, which contains 1.6 million tweets, to train our models.</a:t>
+              <a:t>Our methods were designed to ensure a thorough and systematic approach to the problem. It involved using at least two different types of AI and machine learning algorithms. We investigated of the analytics solution to the problem, which included aspects of experimental comparison. We also explored variable importance to understand which features were most important in making good predictions.</a:t>
             </a:r>
           </a:p>
         </p:txBody>
@@ -2169,7 +2148,7 @@
     </p:spTree>
     <p:extLst>
       <p:ext uri="{BB962C8B-B14F-4D97-AF65-F5344CB8AC3E}">
-        <p14:creationId xmlns:p14="http://schemas.microsoft.com/office/powerpoint/2010/main" val="1805981893"/>
+        <p14:creationId xmlns:p14="http://schemas.microsoft.com/office/powerpoint/2010/main" val="3333620174"/>
       </p:ext>
     </p:extLst>
   </p:cSld>
@@ -2225,7 +2204,7 @@
           <a:p>
             <a:r>
               <a:rPr lang="en-US" dirty="0"/>
-              <a:t>Our methods were designed to ensure a thorough and systematic approach to the problem. It involved using at least two different types of AI and machine learning algorithms. We conducted an investigation of the analytics solution to the problem, which included aspects of experimental comparison. We also explored variable importance to understand which features were most important in making good predictions.</a:t>
+              <a:t>In the assess stage, we analyzed the dataset and selected appropriate models based on the specific requirements of the sentiment analysis task, the characteristics of the available data, and the nature of the problem.</a:t>
             </a:r>
           </a:p>
         </p:txBody>
@@ -2257,7 +2236,7 @@
     </p:spTree>
     <p:extLst>
       <p:ext uri="{BB962C8B-B14F-4D97-AF65-F5344CB8AC3E}">
-        <p14:creationId xmlns:p14="http://schemas.microsoft.com/office/powerpoint/2010/main" val="3333620174"/>
+        <p14:creationId xmlns:p14="http://schemas.microsoft.com/office/powerpoint/2010/main" val="1875703993"/>
       </p:ext>
     </p:extLst>
   </p:cSld>
@@ -2313,7 +2292,7 @@
           <a:p>
             <a:r>
               <a:rPr lang="en-US" dirty="0"/>
-              <a:t>In the assess stage, we analyzed the dataset and selected appropriate models based on the specific requirements of the sentiment analysis task, the characteristics of the available data, and the nature of the problem.</a:t>
+              <a:t>In the development stage, we handled invalid values and discarded non-textual content. We trained our models to identify a brand and align with the sentiment expressed in a tweet, and then tuned them to improve performance.</a:t>
             </a:r>
           </a:p>
         </p:txBody>
@@ -2345,7 +2324,7 @@
     </p:spTree>
     <p:extLst>
       <p:ext uri="{BB962C8B-B14F-4D97-AF65-F5344CB8AC3E}">
-        <p14:creationId xmlns:p14="http://schemas.microsoft.com/office/powerpoint/2010/main" val="1875703993"/>
+        <p14:creationId xmlns:p14="http://schemas.microsoft.com/office/powerpoint/2010/main" val="2161610621"/>
       </p:ext>
     </p:extLst>
   </p:cSld>
@@ -2426,7 +2405,7 @@
             <a:fld id="{60E4B0F9-A7FB-5046-8EA1-145E13C1BB14}" type="datetimeFigureOut">
               <a:rPr lang="en-US" altLang="en-US"/>
               <a:pPr/>
-              <a:t>7/14/2023</a:t>
+              <a:t>7/15/2023</a:t>
             </a:fld>
             <a:endParaRPr lang="en-US" altLang="en-US"/>
           </a:p>
@@ -2618,7 +2597,7 @@
             <a:fld id="{9461B8EA-79DB-F845-97F0-24C5A509848C}" type="datetimeFigureOut">
               <a:rPr lang="en-US" altLang="en-US"/>
               <a:pPr/>
-              <a:t>7/14/2023</a:t>
+              <a:t>7/15/2023</a:t>
             </a:fld>
             <a:endParaRPr lang="en-US" altLang="en-US"/>
           </a:p>
@@ -3159,7 +3138,7 @@
             <a:fld id="{51040245-401E-DC4F-B046-F0C79A3107CA}" type="datetimeFigureOut">
               <a:rPr lang="en-US" altLang="en-US"/>
               <a:pPr/>
-              <a:t>7/14/2023</a:t>
+              <a:t>7/15/2023</a:t>
             </a:fld>
             <a:endParaRPr lang="en-US" altLang="en-US"/>
           </a:p>
@@ -3271,7 +3250,7 @@
             <a:fld id="{B8E3EDF6-D7E0-BF42-B0B6-A092B242026B}" type="datetimeFigureOut">
               <a:rPr lang="en-US" altLang="en-US"/>
               <a:pPr/>
-              <a:t>7/14/2023</a:t>
+              <a:t>7/15/2023</a:t>
             </a:fld>
             <a:endParaRPr lang="en-US" altLang="en-US"/>
           </a:p>
@@ -3666,7 +3645,7 @@
             <a:fld id="{482C3D94-7C5D-0846-984C-DFD8ACC0A135}" type="datetimeFigureOut">
               <a:rPr lang="en-US" altLang="en-US"/>
               <a:pPr/>
-              <a:t>7/14/2023</a:t>
+              <a:t>7/15/2023</a:t>
             </a:fld>
             <a:endParaRPr lang="en-US" altLang="en-US"/>
           </a:p>
@@ -4201,14 +4180,6 @@
 <file path=ppt/slides/slide1.xml><?xml version="1.0" encoding="utf-8"?>
 <p:sld xmlns:a="http://schemas.openxmlformats.org/drawingml/2006/main" xmlns:r="http://schemas.openxmlformats.org/officeDocument/2006/relationships" xmlns:p="http://schemas.openxmlformats.org/presentationml/2006/main">
   <p:cSld>
-    <p:bg>
-      <p:bgPr>
-        <a:solidFill>
-          <a:schemeClr val="bg1"/>
-        </a:solidFill>
-        <a:effectLst/>
-      </p:bgPr>
-    </p:bg>
     <p:spTree>
       <p:nvGrpSpPr>
         <p:cNvPr id="1" name=""/>
@@ -4225,33 +4196,144 @@
       </p:grpSpPr>
       <p:sp>
         <p:nvSpPr>
-          <p:cNvPr id="5" name="Title 4">
+          <p:cNvPr id="8193" name="Title 1"/>
+          <p:cNvSpPr>
+            <a:spLocks noGrp="1"/>
+          </p:cNvSpPr>
+          <p:nvPr>
+            <p:ph type="title"/>
+          </p:nvPr>
+        </p:nvSpPr>
+        <p:spPr>
+          <a:xfrm>
+            <a:off x="914400" y="2057400"/>
+            <a:ext cx="10363200" cy="2743200"/>
+          </a:xfrm>
+        </p:spPr>
+        <p:txBody>
+          <a:bodyPr/>
+          <a:lstStyle/>
+          <a:p>
+            <a:r>
+              <a:rPr lang="en-US" altLang="en-US" sz="3600" dirty="0">
+                <a:ea typeface="ＭＳ Ｐゴシック" charset="-128"/>
+              </a:rPr>
+              <a:t>Brand Sentiment Analysis of Twitter Posts</a:t>
+            </a:r>
+          </a:p>
+        </p:txBody>
+      </p:sp>
+      <p:sp>
+        <p:nvSpPr>
+          <p:cNvPr id="2" name="TextBox 1">
             <a:extLst>
               <a:ext uri="{FF2B5EF4-FFF2-40B4-BE49-F238E27FC236}">
-                <a16:creationId xmlns:a16="http://schemas.microsoft.com/office/drawing/2014/main" id="{E3720A7F-5BAF-4380-F170-E30B74F67C24}"/>
+                <a16:creationId xmlns:a16="http://schemas.microsoft.com/office/drawing/2014/main" id="{7D0BDA10-284A-7B41-8670-B6B5D19AF0F7}"/>
               </a:ext>
             </a:extLst>
           </p:cNvPr>
-          <p:cNvSpPr>
-            <a:spLocks noGrp="1"/>
-          </p:cNvSpPr>
-          <p:nvPr>
-            <p:ph type="title"/>
-          </p:nvPr>
-        </p:nvSpPr>
-        <p:spPr/>
-        <p:txBody>
-          <a:bodyPr/>
+          <p:cNvSpPr txBox="1"/>
+          <p:nvPr/>
+        </p:nvSpPr>
+        <p:spPr>
+          <a:xfrm>
+            <a:off x="1204948" y="4114800"/>
+            <a:ext cx="2548133" cy="461665"/>
+          </a:xfrm>
+          <a:prstGeom prst="rect">
+            <a:avLst/>
+          </a:prstGeom>
+          <a:noFill/>
+        </p:spPr>
+        <p:txBody>
+          <a:bodyPr wrap="none" rtlCol="0" anchor="ctr">
+            <a:spAutoFit/>
+          </a:bodyPr>
           <a:lstStyle/>
           <a:p>
             <a:r>
               <a:rPr lang="en-US" dirty="0"/>
-              <a:t>Intro Videoclip &amp; Segue to Presentation</a:t>
+              <a:t>Jonathan Agustin</a:t>
+            </a:r>
+          </a:p>
+        </p:txBody>
+      </p:sp>
+      <p:sp>
+        <p:nvSpPr>
+          <p:cNvPr id="3" name="TextBox 2">
+            <a:extLst>
+              <a:ext uri="{FF2B5EF4-FFF2-40B4-BE49-F238E27FC236}">
+                <a16:creationId xmlns:a16="http://schemas.microsoft.com/office/drawing/2014/main" id="{F501E45A-DF55-5B93-C877-50B2C4B47180}"/>
+              </a:ext>
+            </a:extLst>
+          </p:cNvPr>
+          <p:cNvSpPr txBox="1"/>
+          <p:nvPr/>
+        </p:nvSpPr>
+        <p:spPr>
+          <a:xfrm>
+            <a:off x="4958027" y="4114800"/>
+            <a:ext cx="2840842" cy="461665"/>
+          </a:xfrm>
+          <a:prstGeom prst="rect">
+            <a:avLst/>
+          </a:prstGeom>
+          <a:noFill/>
+        </p:spPr>
+        <p:txBody>
+          <a:bodyPr wrap="none" rtlCol="0" anchor="ctr">
+            <a:spAutoFit/>
+          </a:bodyPr>
+          <a:lstStyle/>
+          <a:p>
+            <a:r>
+              <a:rPr lang="en-US" dirty="0"/>
+              <a:t>Fernando Calderon</a:t>
+            </a:r>
+          </a:p>
+        </p:txBody>
+      </p:sp>
+      <p:sp>
+        <p:nvSpPr>
+          <p:cNvPr id="4" name="TextBox 3">
+            <a:extLst>
+              <a:ext uri="{FF2B5EF4-FFF2-40B4-BE49-F238E27FC236}">
+                <a16:creationId xmlns:a16="http://schemas.microsoft.com/office/drawing/2014/main" id="{99028ACB-FE7B-0E6D-EF5A-0ECC023F0069}"/>
+              </a:ext>
+            </a:extLst>
+          </p:cNvPr>
+          <p:cNvSpPr txBox="1"/>
+          <p:nvPr/>
+        </p:nvSpPr>
+        <p:spPr>
+          <a:xfrm>
+            <a:off x="9003817" y="4114800"/>
+            <a:ext cx="1983235" cy="461665"/>
+          </a:xfrm>
+          <a:prstGeom prst="rect">
+            <a:avLst/>
+          </a:prstGeom>
+          <a:noFill/>
+        </p:spPr>
+        <p:txBody>
+          <a:bodyPr wrap="none" rtlCol="0" anchor="ctr">
+            <a:spAutoFit/>
+          </a:bodyPr>
+          <a:lstStyle/>
+          <a:p>
+            <a:r>
+              <a:rPr lang="en-US" dirty="0"/>
+              <a:t>Juliet Lawton</a:t>
             </a:r>
           </a:p>
         </p:txBody>
       </p:sp>
     </p:spTree>
+    <p:extLst>
+      <p:ext uri="{BB962C8B-B14F-4D97-AF65-F5344CB8AC3E}">
+        <p14:creationId xmlns:p14="http://schemas.microsoft.com/office/powerpoint/2010/main" val="1093170298"/>
+      </p:ext>
+    </p:extLst>
   </p:cSld>
   <p:clrMapOvr>
     <a:masterClrMapping/>
@@ -4303,7 +4385,7 @@
     </p:spTree>
     <p:extLst>
       <p:ext uri="{BB962C8B-B14F-4D97-AF65-F5344CB8AC3E}">
-        <p14:creationId xmlns:p14="http://schemas.microsoft.com/office/powerpoint/2010/main" val="4127828933"/>
+        <p14:creationId xmlns:p14="http://schemas.microsoft.com/office/powerpoint/2010/main" val="2811755235"/>
       </p:ext>
     </p:extLst>
   </p:cSld>
@@ -4349,7 +4431,7 @@
               <a:rPr lang="en-US" altLang="en-US" dirty="0">
                 <a:ea typeface="ＭＳ Ｐゴシック" charset="-128"/>
               </a:rPr>
-              <a:t>Second Stage: Develop</a:t>
+              <a:t>Third Stage: Evaluate</a:t>
             </a:r>
           </a:p>
         </p:txBody>
@@ -4357,7 +4439,7 @@
     </p:spTree>
     <p:extLst>
       <p:ext uri="{BB962C8B-B14F-4D97-AF65-F5344CB8AC3E}">
-        <p14:creationId xmlns:p14="http://schemas.microsoft.com/office/powerpoint/2010/main" val="2811755235"/>
+        <p14:creationId xmlns:p14="http://schemas.microsoft.com/office/powerpoint/2010/main" val="901105427"/>
       </p:ext>
     </p:extLst>
   </p:cSld>
@@ -4403,7 +4485,7 @@
               <a:rPr lang="en-US" altLang="en-US" dirty="0">
                 <a:ea typeface="ＭＳ Ｐゴシック" charset="-128"/>
               </a:rPr>
-              <a:t>Third Stage: Evaluate</a:t>
+              <a:t>Results</a:t>
             </a:r>
           </a:p>
         </p:txBody>
@@ -4411,7 +4493,7 @@
     </p:spTree>
     <p:extLst>
       <p:ext uri="{BB962C8B-B14F-4D97-AF65-F5344CB8AC3E}">
-        <p14:creationId xmlns:p14="http://schemas.microsoft.com/office/powerpoint/2010/main" val="901105427"/>
+        <p14:creationId xmlns:p14="http://schemas.microsoft.com/office/powerpoint/2010/main" val="2681042120"/>
       </p:ext>
     </p:extLst>
   </p:cSld>
@@ -4457,7 +4539,7 @@
               <a:rPr lang="en-US" altLang="en-US" dirty="0">
                 <a:ea typeface="ＭＳ Ｐゴシック" charset="-128"/>
               </a:rPr>
-              <a:t>Results</a:t>
+              <a:t>Challenges</a:t>
             </a:r>
           </a:p>
         </p:txBody>
@@ -4465,7 +4547,7 @@
     </p:spTree>
     <p:extLst>
       <p:ext uri="{BB962C8B-B14F-4D97-AF65-F5344CB8AC3E}">
-        <p14:creationId xmlns:p14="http://schemas.microsoft.com/office/powerpoint/2010/main" val="2681042120"/>
+        <p14:creationId xmlns:p14="http://schemas.microsoft.com/office/powerpoint/2010/main" val="603158914"/>
       </p:ext>
     </p:extLst>
   </p:cSld>
@@ -4511,60 +4593,6 @@
               <a:rPr lang="en-US" altLang="en-US" dirty="0">
                 <a:ea typeface="ＭＳ Ｐゴシック" charset="-128"/>
               </a:rPr>
-              <a:t>Challenges</a:t>
-            </a:r>
-          </a:p>
-        </p:txBody>
-      </p:sp>
-    </p:spTree>
-    <p:extLst>
-      <p:ext uri="{BB962C8B-B14F-4D97-AF65-F5344CB8AC3E}">
-        <p14:creationId xmlns:p14="http://schemas.microsoft.com/office/powerpoint/2010/main" val="603158914"/>
-      </p:ext>
-    </p:extLst>
-  </p:cSld>
-  <p:clrMapOvr>
-    <a:masterClrMapping/>
-  </p:clrMapOvr>
-</p:sld>
-</file>
-
-<file path=ppt/slides/slide15.xml><?xml version="1.0" encoding="utf-8"?>
-<p:sld xmlns:a="http://schemas.openxmlformats.org/drawingml/2006/main" xmlns:r="http://schemas.openxmlformats.org/officeDocument/2006/relationships" xmlns:p="http://schemas.openxmlformats.org/presentationml/2006/main">
-  <p:cSld>
-    <p:spTree>
-      <p:nvGrpSpPr>
-        <p:cNvPr id="1" name=""/>
-        <p:cNvGrpSpPr/>
-        <p:nvPr/>
-      </p:nvGrpSpPr>
-      <p:grpSpPr>
-        <a:xfrm>
-          <a:off x="0" y="0"/>
-          <a:ext cx="0" cy="0"/>
-          <a:chOff x="0" y="0"/>
-          <a:chExt cx="0" cy="0"/>
-        </a:xfrm>
-      </p:grpSpPr>
-      <p:sp>
-        <p:nvSpPr>
-          <p:cNvPr id="9217" name="Title 1"/>
-          <p:cNvSpPr>
-            <a:spLocks noGrp="1"/>
-          </p:cNvSpPr>
-          <p:nvPr>
-            <p:ph type="title"/>
-          </p:nvPr>
-        </p:nvSpPr>
-        <p:spPr/>
-        <p:txBody>
-          <a:bodyPr/>
-          <a:lstStyle/>
-          <a:p>
-            <a:r>
-              <a:rPr lang="en-US" altLang="en-US" dirty="0">
-                <a:ea typeface="ＭＳ Ｐゴシック" charset="-128"/>
-              </a:rPr>
               <a:t>Conclusion &amp; Future Work</a:t>
             </a:r>
           </a:p>
@@ -4583,7 +4611,7 @@
 </p:sld>
 </file>
 
-<file path=ppt/slides/slide16.xml><?xml version="1.0" encoding="utf-8"?>
+<file path=ppt/slides/slide15.xml><?xml version="1.0" encoding="utf-8"?>
 <p:sld xmlns:a="http://schemas.openxmlformats.org/drawingml/2006/main" xmlns:r="http://schemas.openxmlformats.org/officeDocument/2006/relationships" xmlns:p="http://schemas.openxmlformats.org/presentationml/2006/main">
   <p:cSld>
     <p:spTree>
@@ -4656,7 +4684,7 @@
       </p:grpSpPr>
       <p:sp>
         <p:nvSpPr>
-          <p:cNvPr id="8193" name="Title 1"/>
+          <p:cNvPr id="9217" name="Title 1"/>
           <p:cNvSpPr>
             <a:spLocks noGrp="1"/>
           </p:cNvSpPr>
@@ -4664,136 +4692,21 @@
             <p:ph type="title"/>
           </p:nvPr>
         </p:nvSpPr>
-        <p:spPr>
-          <a:xfrm>
-            <a:off x="914400" y="2057400"/>
-            <a:ext cx="10363200" cy="2743200"/>
-          </a:xfrm>
-        </p:spPr>
+        <p:spPr/>
         <p:txBody>
           <a:bodyPr/>
           <a:lstStyle/>
           <a:p>
             <a:r>
-              <a:rPr lang="en-US" altLang="en-US" sz="3600" dirty="0">
+              <a:rPr lang="en-US" altLang="en-US" dirty="0">
                 <a:ea typeface="ＭＳ Ｐゴシック" charset="-128"/>
               </a:rPr>
-              <a:t>Brand Sentiment Analysis of Twitter Posts</a:t>
-            </a:r>
-          </a:p>
-        </p:txBody>
-      </p:sp>
-      <p:sp>
-        <p:nvSpPr>
-          <p:cNvPr id="2" name="TextBox 1">
-            <a:extLst>
-              <a:ext uri="{FF2B5EF4-FFF2-40B4-BE49-F238E27FC236}">
-                <a16:creationId xmlns:a16="http://schemas.microsoft.com/office/drawing/2014/main" id="{7D0BDA10-284A-7B41-8670-B6B5D19AF0F7}"/>
-              </a:ext>
-            </a:extLst>
-          </p:cNvPr>
-          <p:cNvSpPr txBox="1"/>
-          <p:nvPr/>
-        </p:nvSpPr>
-        <p:spPr>
-          <a:xfrm>
-            <a:off x="1204948" y="4114800"/>
-            <a:ext cx="2548133" cy="461665"/>
-          </a:xfrm>
-          <a:prstGeom prst="rect">
-            <a:avLst/>
-          </a:prstGeom>
-          <a:noFill/>
-        </p:spPr>
-        <p:txBody>
-          <a:bodyPr wrap="none" rtlCol="0" anchor="ctr">
-            <a:spAutoFit/>
-          </a:bodyPr>
-          <a:lstStyle/>
-          <a:p>
-            <a:r>
-              <a:rPr lang="en-US" dirty="0"/>
-              <a:t>Jonathan Agustin</a:t>
-            </a:r>
-          </a:p>
-        </p:txBody>
-      </p:sp>
-      <p:sp>
-        <p:nvSpPr>
-          <p:cNvPr id="3" name="TextBox 2">
-            <a:extLst>
-              <a:ext uri="{FF2B5EF4-FFF2-40B4-BE49-F238E27FC236}">
-                <a16:creationId xmlns:a16="http://schemas.microsoft.com/office/drawing/2014/main" id="{F501E45A-DF55-5B93-C877-50B2C4B47180}"/>
-              </a:ext>
-            </a:extLst>
-          </p:cNvPr>
-          <p:cNvSpPr txBox="1"/>
-          <p:nvPr/>
-        </p:nvSpPr>
-        <p:spPr>
-          <a:xfrm>
-            <a:off x="4958027" y="4114800"/>
-            <a:ext cx="2840842" cy="461665"/>
-          </a:xfrm>
-          <a:prstGeom prst="rect">
-            <a:avLst/>
-          </a:prstGeom>
-          <a:noFill/>
-        </p:spPr>
-        <p:txBody>
-          <a:bodyPr wrap="none" rtlCol="0" anchor="ctr">
-            <a:spAutoFit/>
-          </a:bodyPr>
-          <a:lstStyle/>
-          <a:p>
-            <a:r>
-              <a:rPr lang="en-US" dirty="0"/>
-              <a:t>Fernando Calderon</a:t>
-            </a:r>
-          </a:p>
-        </p:txBody>
-      </p:sp>
-      <p:sp>
-        <p:nvSpPr>
-          <p:cNvPr id="4" name="TextBox 3">
-            <a:extLst>
-              <a:ext uri="{FF2B5EF4-FFF2-40B4-BE49-F238E27FC236}">
-                <a16:creationId xmlns:a16="http://schemas.microsoft.com/office/drawing/2014/main" id="{99028ACB-FE7B-0E6D-EF5A-0ECC023F0069}"/>
-              </a:ext>
-            </a:extLst>
-          </p:cNvPr>
-          <p:cNvSpPr txBox="1"/>
-          <p:nvPr/>
-        </p:nvSpPr>
-        <p:spPr>
-          <a:xfrm>
-            <a:off x="9003817" y="4114800"/>
-            <a:ext cx="1983235" cy="461665"/>
-          </a:xfrm>
-          <a:prstGeom prst="rect">
-            <a:avLst/>
-          </a:prstGeom>
-          <a:noFill/>
-        </p:spPr>
-        <p:txBody>
-          <a:bodyPr wrap="none" rtlCol="0" anchor="ctr">
-            <a:spAutoFit/>
-          </a:bodyPr>
-          <a:lstStyle/>
-          <a:p>
-            <a:r>
-              <a:rPr lang="en-US" dirty="0"/>
-              <a:t>Juliet Lawton</a:t>
+              <a:t>Introduction</a:t>
             </a:r>
           </a:p>
         </p:txBody>
       </p:sp>
     </p:spTree>
-    <p:extLst>
-      <p:ext uri="{BB962C8B-B14F-4D97-AF65-F5344CB8AC3E}">
-        <p14:creationId xmlns:p14="http://schemas.microsoft.com/office/powerpoint/2010/main" val="1093170298"/>
-      </p:ext>
-    </p:extLst>
   </p:cSld>
   <p:clrMapOvr>
     <a:masterClrMapping/>
@@ -4837,12 +4750,17 @@
               <a:rPr lang="en-US" altLang="en-US" dirty="0">
                 <a:ea typeface="ＭＳ Ｐゴシック" charset="-128"/>
               </a:rPr>
-              <a:t>Introduction</a:t>
+              <a:t>Problem Statement</a:t>
             </a:r>
           </a:p>
         </p:txBody>
       </p:sp>
     </p:spTree>
+    <p:extLst>
+      <p:ext uri="{BB962C8B-B14F-4D97-AF65-F5344CB8AC3E}">
+        <p14:creationId xmlns:p14="http://schemas.microsoft.com/office/powerpoint/2010/main" val="1381240721"/>
+      </p:ext>
+    </p:extLst>
   </p:cSld>
   <p:clrMapOvr>
     <a:masterClrMapping/>
@@ -4886,7 +4804,7 @@
               <a:rPr lang="en-US" altLang="en-US" dirty="0">
                 <a:ea typeface="ＭＳ Ｐゴシック" charset="-128"/>
               </a:rPr>
-              <a:t>Problem Statement</a:t>
+              <a:t>Scope</a:t>
             </a:r>
           </a:p>
         </p:txBody>
@@ -4894,7 +4812,7 @@
     </p:spTree>
     <p:extLst>
       <p:ext uri="{BB962C8B-B14F-4D97-AF65-F5344CB8AC3E}">
-        <p14:creationId xmlns:p14="http://schemas.microsoft.com/office/powerpoint/2010/main" val="1381240721"/>
+        <p14:creationId xmlns:p14="http://schemas.microsoft.com/office/powerpoint/2010/main" val="3273571779"/>
       </p:ext>
     </p:extLst>
   </p:cSld>
@@ -4940,7 +4858,7 @@
               <a:rPr lang="en-US" altLang="en-US" dirty="0">
                 <a:ea typeface="ＭＳ Ｐゴシック" charset="-128"/>
               </a:rPr>
-              <a:t>Scope</a:t>
+              <a:t>Algorithms</a:t>
             </a:r>
           </a:p>
         </p:txBody>
@@ -4948,7 +4866,7 @@
     </p:spTree>
     <p:extLst>
       <p:ext uri="{BB962C8B-B14F-4D97-AF65-F5344CB8AC3E}">
-        <p14:creationId xmlns:p14="http://schemas.microsoft.com/office/powerpoint/2010/main" val="3273571779"/>
+        <p14:creationId xmlns:p14="http://schemas.microsoft.com/office/powerpoint/2010/main" val="69069607"/>
       </p:ext>
     </p:extLst>
   </p:cSld>
@@ -4994,7 +4912,7 @@
               <a:rPr lang="en-US" altLang="en-US" dirty="0">
                 <a:ea typeface="ＭＳ Ｐゴシック" charset="-128"/>
               </a:rPr>
-              <a:t>Algorithms</a:t>
+              <a:t>Datasets</a:t>
             </a:r>
           </a:p>
         </p:txBody>
@@ -5002,7 +4920,7 @@
     </p:spTree>
     <p:extLst>
       <p:ext uri="{BB962C8B-B14F-4D97-AF65-F5344CB8AC3E}">
-        <p14:creationId xmlns:p14="http://schemas.microsoft.com/office/powerpoint/2010/main" val="69069607"/>
+        <p14:creationId xmlns:p14="http://schemas.microsoft.com/office/powerpoint/2010/main" val="1623255054"/>
       </p:ext>
     </p:extLst>
   </p:cSld>
@@ -5048,7 +4966,7 @@
               <a:rPr lang="en-US" altLang="en-US" dirty="0">
                 <a:ea typeface="ＭＳ Ｐゴシック" charset="-128"/>
               </a:rPr>
-              <a:t>Datasets</a:t>
+              <a:t>Experimental Design</a:t>
             </a:r>
           </a:p>
         </p:txBody>
@@ -5056,7 +4974,7 @@
     </p:spTree>
     <p:extLst>
       <p:ext uri="{BB962C8B-B14F-4D97-AF65-F5344CB8AC3E}">
-        <p14:creationId xmlns:p14="http://schemas.microsoft.com/office/powerpoint/2010/main" val="1623255054"/>
+        <p14:creationId xmlns:p14="http://schemas.microsoft.com/office/powerpoint/2010/main" val="1557484235"/>
       </p:ext>
     </p:extLst>
   </p:cSld>
@@ -5102,7 +5020,7 @@
               <a:rPr lang="en-US" altLang="en-US" dirty="0">
                 <a:ea typeface="ＭＳ Ｐゴシック" charset="-128"/>
               </a:rPr>
-              <a:t>Experimental Design</a:t>
+              <a:t>First Stage: Assess</a:t>
             </a:r>
           </a:p>
         </p:txBody>
@@ -5110,7 +5028,7 @@
     </p:spTree>
     <p:extLst>
       <p:ext uri="{BB962C8B-B14F-4D97-AF65-F5344CB8AC3E}">
-        <p14:creationId xmlns:p14="http://schemas.microsoft.com/office/powerpoint/2010/main" val="1557484235"/>
+        <p14:creationId xmlns:p14="http://schemas.microsoft.com/office/powerpoint/2010/main" val="4054382697"/>
       </p:ext>
     </p:extLst>
   </p:cSld>
@@ -5156,7 +5074,7 @@
               <a:rPr lang="en-US" altLang="en-US" dirty="0">
                 <a:ea typeface="ＭＳ Ｐゴシック" charset="-128"/>
               </a:rPr>
-              <a:t>First Stage: Assess</a:t>
+              <a:t>Second Stage: Develop</a:t>
             </a:r>
           </a:p>
         </p:txBody>
@@ -5164,7 +5082,7 @@
     </p:spTree>
     <p:extLst>
       <p:ext uri="{BB962C8B-B14F-4D97-AF65-F5344CB8AC3E}">
-        <p14:creationId xmlns:p14="http://schemas.microsoft.com/office/powerpoint/2010/main" val="4054382697"/>
+        <p14:creationId xmlns:p14="http://schemas.microsoft.com/office/powerpoint/2010/main" val="4127828933"/>
       </p:ext>
     </p:extLst>
   </p:cSld>

</xml_diff>

<commit_message>
fix dimensions of intro
</commit_message>
<xml_diff>
--- a/Final-Project-Team-2.pptx
+++ b/Final-Project-Team-2.pptx
@@ -1,6 +1,6 @@
 
 <file path=ppt/presentation.xml><?xml version="1.0" encoding="utf-8"?>
-<p:presentation xmlns:a="http://schemas.openxmlformats.org/drawingml/2006/main" xmlns:r="http://schemas.openxmlformats.org/officeDocument/2006/relationships" xmlns:p="http://schemas.openxmlformats.org/presentationml/2006/main" removePersonalInfoOnSave="1" strictFirstAndLastChars="0" saveSubsetFonts="1" autoCompressPictures="0">
+<p:presentation xmlns:a="http://schemas.openxmlformats.org/drawingml/2006/main" xmlns:r="http://schemas.openxmlformats.org/officeDocument/2006/relationships" xmlns:p="http://schemas.openxmlformats.org/presentationml/2006/main" strictFirstAndLastChars="0" saveSubsetFonts="1" autoCompressPictures="0">
   <p:sldMasterIdLst>
     <p:sldMasterId id="2147483763" r:id="rId1"/>
   </p:sldMasterIdLst>
@@ -11,21 +11,21 @@
     <p:handoutMasterId r:id="rId18"/>
   </p:handoutMasterIdLst>
   <p:sldIdLst>
-    <p:sldId id="273" r:id="rId2"/>
+    <p:sldId id="256" r:id="rId2"/>
     <p:sldId id="257" r:id="rId3"/>
-    <p:sldId id="260" r:id="rId4"/>
-    <p:sldId id="269" r:id="rId5"/>
-    <p:sldId id="266" r:id="rId6"/>
-    <p:sldId id="261" r:id="rId7"/>
-    <p:sldId id="262" r:id="rId8"/>
-    <p:sldId id="270" r:id="rId9"/>
-    <p:sldId id="271" r:id="rId10"/>
-    <p:sldId id="272" r:id="rId11"/>
-    <p:sldId id="263" r:id="rId12"/>
-    <p:sldId id="267" r:id="rId13"/>
-    <p:sldId id="268" r:id="rId14"/>
-    <p:sldId id="264" r:id="rId15"/>
-    <p:sldId id="265" r:id="rId16"/>
+    <p:sldId id="259" r:id="rId4"/>
+    <p:sldId id="260" r:id="rId5"/>
+    <p:sldId id="261" r:id="rId6"/>
+    <p:sldId id="262" r:id="rId7"/>
+    <p:sldId id="264" r:id="rId8"/>
+    <p:sldId id="265" r:id="rId9"/>
+    <p:sldId id="267" r:id="rId10"/>
+    <p:sldId id="269" r:id="rId11"/>
+    <p:sldId id="270" r:id="rId12"/>
+    <p:sldId id="271" r:id="rId13"/>
+    <p:sldId id="273" r:id="rId14"/>
+    <p:sldId id="272" r:id="rId15"/>
+    <p:sldId id="274" r:id="rId16"/>
   </p:sldIdLst>
   <p:sldSz cx="12192000" cy="6858000"/>
   <p:notesSz cx="6858000" cy="9144000"/>
@@ -176,7 +176,7 @@
 <file path=ppt/revisionInfo.xml><?xml version="1.0" encoding="utf-8"?>
 <p1510:revInfo xmlns:a="http://schemas.openxmlformats.org/drawingml/2006/main" xmlns:r="http://schemas.openxmlformats.org/officeDocument/2006/relationships" xmlns:p1510="http://schemas.microsoft.com/office/powerpoint/2015/10/main">
   <p1510:revLst>
-    <p1510:client id="{9DC81C8E-254C-4083-9BF4-030793D3F1B6}" v="29" dt="2023-07-15T08:37:51.363"/>
+    <p1510:client id="{682874C9-A3CE-486A-81EA-107CC5A13A85}" v="19" dt="2023-07-15T09:58:45.085"/>
   </p1510:revLst>
 </p1510:revInfo>
 </file>
@@ -417,17 +417,17 @@
           </a:ln>
           <a:extLst>
             <a:ext uri="{FAA26D3D-D897-4be2-8F04-BA451C77F1D7}">
-              <ma14:placeholderFlag xmlns="" xmlns:ma14="http://schemas.microsoft.com/office/mac/drawingml/2011/main" val="1"/>
+              <ma14:placeholderFlag xmlns:ma14="http://schemas.microsoft.com/office/mac/drawingml/2011/main" xmlns="" val="1"/>
             </a:ext>
             <a:ext uri="{909E8E84-426E-40dd-AFC4-6F175D3DCCD1}">
-              <a14:hiddenFill xmlns:a14="http://schemas.microsoft.com/office/drawing/2010/main" xmlns="">
+              <a14:hiddenFill xmlns="" xmlns:a14="http://schemas.microsoft.com/office/drawing/2010/main">
                 <a:solidFill>
                   <a:schemeClr val="accent1"/>
                 </a:solidFill>
               </a14:hiddenFill>
             </a:ext>
             <a:ext uri="{91240B29-F687-4f45-9708-019B960494DF}">
-              <a14:hiddenLine xmlns:a14="http://schemas.microsoft.com/office/drawing/2010/main" xmlns="" w="9525">
+              <a14:hiddenLine xmlns="" xmlns:a14="http://schemas.microsoft.com/office/drawing/2010/main" w="9525">
                 <a:solidFill>
                   <a:schemeClr val="tx1"/>
                 </a:solidFill>
@@ -484,17 +484,17 @@
           </a:ln>
           <a:extLst>
             <a:ext uri="{FAA26D3D-D897-4be2-8F04-BA451C77F1D7}">
-              <ma14:placeholderFlag xmlns="" xmlns:ma14="http://schemas.microsoft.com/office/mac/drawingml/2011/main" val="1"/>
+              <ma14:placeholderFlag xmlns:ma14="http://schemas.microsoft.com/office/mac/drawingml/2011/main" xmlns="" val="1"/>
             </a:ext>
             <a:ext uri="{909E8E84-426E-40dd-AFC4-6F175D3DCCD1}">
-              <a14:hiddenFill xmlns:a14="http://schemas.microsoft.com/office/drawing/2010/main" xmlns="">
+              <a14:hiddenFill xmlns="" xmlns:a14="http://schemas.microsoft.com/office/drawing/2010/main">
                 <a:solidFill>
                   <a:schemeClr val="accent1"/>
                 </a:solidFill>
               </a14:hiddenFill>
             </a:ext>
             <a:ext uri="{91240B29-F687-4f45-9708-019B960494DF}">
-              <a14:hiddenLine xmlns:a14="http://schemas.microsoft.com/office/drawing/2010/main" xmlns="" w="9525">
+              <a14:hiddenLine xmlns="" xmlns:a14="http://schemas.microsoft.com/office/drawing/2010/main" w="9525">
                 <a:solidFill>
                   <a:schemeClr val="tx1"/>
                 </a:solidFill>
@@ -557,7 +557,7 @@
           <a:effectLst/>
           <a:extLst>
             <a:ext uri="{AF507438-7753-43e0-B8FC-AC1667EBCBE1}">
-              <a14:hiddenEffects xmlns:a14="http://schemas.microsoft.com/office/drawing/2010/main" xmlns="">
+              <a14:hiddenEffects xmlns="" xmlns:a14="http://schemas.microsoft.com/office/drawing/2010/main">
                 <a:effectLst>
                   <a:outerShdw blurRad="63500" dist="38099" dir="2700000" algn="ctr" rotWithShape="0">
                     <a:srgbClr val="000000">
@@ -568,7 +568,7 @@
               </a14:hiddenEffects>
             </a:ext>
             <a:ext uri="{53640926-AAD7-44d8-BBD7-CCE9431645EC}">
-              <a14:shadowObscured xmlns:a14="http://schemas.microsoft.com/office/drawing/2010/main" xmlns="" val="1"/>
+              <a14:shadowObscured xmlns="" xmlns:a14="http://schemas.microsoft.com/office/drawing/2010/main" val="1"/>
             </a:ext>
           </a:extLst>
         </p:spPr>
@@ -597,17 +597,17 @@
           </a:ln>
           <a:extLst>
             <a:ext uri="{FAA26D3D-D897-4be2-8F04-BA451C77F1D7}">
-              <ma14:placeholderFlag xmlns="" xmlns:ma14="http://schemas.microsoft.com/office/mac/drawingml/2011/main" val="1"/>
+              <ma14:placeholderFlag xmlns:ma14="http://schemas.microsoft.com/office/mac/drawingml/2011/main" xmlns="" val="1"/>
             </a:ext>
             <a:ext uri="{909E8E84-426E-40dd-AFC4-6F175D3DCCD1}">
-              <a14:hiddenFill xmlns:a14="http://schemas.microsoft.com/office/drawing/2010/main" xmlns="">
+              <a14:hiddenFill xmlns="" xmlns:a14="http://schemas.microsoft.com/office/drawing/2010/main">
                 <a:solidFill>
                   <a:schemeClr val="accent1"/>
                 </a:solidFill>
               </a14:hiddenFill>
             </a:ext>
             <a:ext uri="{91240B29-F687-4f45-9708-019B960494DF}">
-              <a14:hiddenLine xmlns:a14="http://schemas.microsoft.com/office/drawing/2010/main" xmlns="" w="9525">
+              <a14:hiddenLine xmlns="" xmlns:a14="http://schemas.microsoft.com/office/drawing/2010/main" w="9525">
                 <a:solidFill>
                   <a:schemeClr val="tx1"/>
                 </a:solidFill>
@@ -686,17 +686,17 @@
           </a:ln>
           <a:extLst>
             <a:ext uri="{FAA26D3D-D897-4be2-8F04-BA451C77F1D7}">
-              <ma14:placeholderFlag xmlns="" xmlns:ma14="http://schemas.microsoft.com/office/mac/drawingml/2011/main" val="1"/>
+              <ma14:placeholderFlag xmlns:ma14="http://schemas.microsoft.com/office/mac/drawingml/2011/main" xmlns="" val="1"/>
             </a:ext>
             <a:ext uri="{909E8E84-426E-40dd-AFC4-6F175D3DCCD1}">
-              <a14:hiddenFill xmlns:a14="http://schemas.microsoft.com/office/drawing/2010/main" xmlns="">
+              <a14:hiddenFill xmlns="" xmlns:a14="http://schemas.microsoft.com/office/drawing/2010/main">
                 <a:solidFill>
                   <a:schemeClr val="accent1"/>
                 </a:solidFill>
               </a14:hiddenFill>
             </a:ext>
             <a:ext uri="{91240B29-F687-4f45-9708-019B960494DF}">
-              <a14:hiddenLine xmlns:a14="http://schemas.microsoft.com/office/drawing/2010/main" xmlns="" w="9525">
+              <a14:hiddenLine xmlns="" xmlns:a14="http://schemas.microsoft.com/office/drawing/2010/main" w="9525">
                 <a:solidFill>
                   <a:schemeClr val="tx1"/>
                 </a:solidFill>
@@ -753,17 +753,17 @@
           </a:ln>
           <a:extLst>
             <a:ext uri="{FAA26D3D-D897-4be2-8F04-BA451C77F1D7}">
-              <ma14:placeholderFlag xmlns="" xmlns:ma14="http://schemas.microsoft.com/office/mac/drawingml/2011/main" val="1"/>
+              <ma14:placeholderFlag xmlns:ma14="http://schemas.microsoft.com/office/mac/drawingml/2011/main" xmlns="" val="1"/>
             </a:ext>
             <a:ext uri="{909E8E84-426E-40dd-AFC4-6F175D3DCCD1}">
-              <a14:hiddenFill xmlns:a14="http://schemas.microsoft.com/office/drawing/2010/main" xmlns="">
+              <a14:hiddenFill xmlns="" xmlns:a14="http://schemas.microsoft.com/office/drawing/2010/main">
                 <a:solidFill>
                   <a:schemeClr val="accent1"/>
                 </a:solidFill>
               </a14:hiddenFill>
             </a:ext>
             <a:ext uri="{91240B29-F687-4f45-9708-019B960494DF}">
-              <a14:hiddenLine xmlns:a14="http://schemas.microsoft.com/office/drawing/2010/main" xmlns="" w="9525">
+              <a14:hiddenLine xmlns="" xmlns:a14="http://schemas.microsoft.com/office/drawing/2010/main" w="9525">
                 <a:solidFill>
                   <a:schemeClr val="tx1"/>
                 </a:solidFill>
@@ -969,29 +969,13 @@
           <a:p>
             <a:r>
               <a:rPr lang="en-US" dirty="0"/>
-              <a:t>Let’s get started. Welcome to our </a:t>
-            </a:r>
-            <a:r>
-              <a:rPr lang="en-US"/>
-              <a:t>project titled, </a:t>
-            </a:r>
-            <a:r>
-              <a:rPr lang="en-US" altLang="en-US" sz="1200">
-                <a:ea typeface="ＭＳ Ｐゴシック" charset="-128"/>
-              </a:rPr>
-              <a:t>Brand </a:t>
+              <a:t>Let’s get started. Welcome to our project titled, </a:t>
             </a:r>
             <a:r>
               <a:rPr lang="en-US" altLang="en-US" sz="1200" dirty="0">
                 <a:ea typeface="ＭＳ Ｐゴシック" charset="-128"/>
               </a:rPr>
-              <a:t>Sentiment Analysis of Twitter </a:t>
-            </a:r>
-            <a:r>
-              <a:rPr lang="en-US" altLang="en-US" sz="1200">
-                <a:ea typeface="ＭＳ Ｐゴシック" charset="-128"/>
-              </a:rPr>
-              <a:t>Posts.</a:t>
+              <a:t>Brand Sentiment Analysis of Twitter Posts.</a:t>
             </a:r>
             <a:endParaRPr lang="en-US" dirty="0"/>
           </a:p>
@@ -1024,7 +1008,7 @@
     </p:spTree>
     <p:extLst>
       <p:ext uri="{BB962C8B-B14F-4D97-AF65-F5344CB8AC3E}">
-        <p14:creationId xmlns:p14="http://schemas.microsoft.com/office/powerpoint/2010/main" val="850201174"/>
+        <p14:creationId xmlns:p14="http://schemas.microsoft.com/office/powerpoint/2010/main" val="2840858107"/>
       </p:ext>
     </p:extLst>
   </p:cSld>
@@ -1080,7 +1064,7 @@
           <a:p>
             <a:r>
               <a:rPr lang="en-US" dirty="0"/>
-              <a:t>In the development stage, we handled invalid values and discarded non-textual content. We trained our models to identify a brand and align with the sentiment expressed in a tweet, and then tuned them to improve performance.</a:t>
+              <a:t>In the evaluation stage, we measured the models' ability to identify brands and predict sentiment in Twitter posts. We used standard classification metrics such as Accuracy, Precision, Recall, and F1 Score to evaluate the models.</a:t>
             </a:r>
           </a:p>
         </p:txBody>
@@ -1112,7 +1096,7 @@
     </p:spTree>
     <p:extLst>
       <p:ext uri="{BB962C8B-B14F-4D97-AF65-F5344CB8AC3E}">
-        <p14:creationId xmlns:p14="http://schemas.microsoft.com/office/powerpoint/2010/main" val="1812335125"/>
+        <p14:creationId xmlns:p14="http://schemas.microsoft.com/office/powerpoint/2010/main" val="3293987079"/>
       </p:ext>
     </p:extLst>
   </p:cSld>
@@ -1168,7 +1152,7 @@
           <a:p>
             <a:r>
               <a:rPr lang="en-US" dirty="0"/>
-              <a:t>In the evaluation stage, we measured the models' ability to identify brands and predict sentiment in Twitter posts. We used standard classification metrics such as Accuracy, Precision, Recall, and F1 Score to evaluate the models.</a:t>
+              <a:t>We present the results of our experiments, including any relevant figures or tables, discuss the implications of our results, and explain whether our results support our initial hypothesis. We present the results of our models. We achieved an accuracy rate over 50%, demonstrating the potential of machine learning in understanding public sentiment towards brands based on social media content.</a:t>
             </a:r>
           </a:p>
         </p:txBody>
@@ -1200,7 +1184,7 @@
     </p:spTree>
     <p:extLst>
       <p:ext uri="{BB962C8B-B14F-4D97-AF65-F5344CB8AC3E}">
-        <p14:creationId xmlns:p14="http://schemas.microsoft.com/office/powerpoint/2010/main" val="3632726758"/>
+        <p14:creationId xmlns:p14="http://schemas.microsoft.com/office/powerpoint/2010/main" val="2184831873"/>
       </p:ext>
     </p:extLst>
   </p:cSld>
@@ -1256,7 +1240,7 @@
           <a:p>
             <a:r>
               <a:rPr lang="en-US" dirty="0"/>
-              <a:t>We present the results of our experiments, including any relevant figures or tables, discuss the implications of our results, and explain whether our results support our initial hypothesis. We present the results of our models. We achieved an accuracy rate over 50%, demonstrating the potential of machine learning in understanding public sentiment towards brands based on social media content.</a:t>
+              <a:t>We faced challenges such as the 'aboutness' problem, which refers to the challenge of determining the subject of the sentiment expressed in a sentence. We also encountered issues with complex sentences and ambiguous subjects.</a:t>
             </a:r>
           </a:p>
         </p:txBody>
@@ -1288,7 +1272,7 @@
     </p:spTree>
     <p:extLst>
       <p:ext uri="{BB962C8B-B14F-4D97-AF65-F5344CB8AC3E}">
-        <p14:creationId xmlns:p14="http://schemas.microsoft.com/office/powerpoint/2010/main" val="4074490549"/>
+        <p14:creationId xmlns:p14="http://schemas.microsoft.com/office/powerpoint/2010/main" val="3478616541"/>
       </p:ext>
     </p:extLst>
   </p:cSld>
@@ -1342,9 +1326,26 @@
           <a:bodyPr/>
           <a:lstStyle/>
           <a:p>
+            <a:pPr marL="0" marR="0" lvl="0" indent="0" algn="l" defTabSz="914400" rtl="0" eaLnBrk="0" fontAlgn="base" latinLnBrk="0" hangingPunct="0">
+              <a:lnSpc>
+                <a:spcPct val="100000"/>
+              </a:lnSpc>
+              <a:spcBef>
+                <a:spcPct val="30000"/>
+              </a:spcBef>
+              <a:spcAft>
+                <a:spcPct val="0"/>
+              </a:spcAft>
+              <a:buClrTx/>
+              <a:buSzTx/>
+              <a:buFontTx/>
+              <a:buNone/>
+              <a:tabLst/>
+              <a:defRPr/>
+            </a:pPr>
             <a:r>
               <a:rPr lang="en-US" dirty="0"/>
-              <a:t>We faced challenges such as the 'aboutness' problem, which refers to the challenge of determining the subject of the sentiment expressed in a sentence. We also encountered issues with complex sentences and ambiguous subjects.</a:t>
+              <a:t>In the conclusion, we will summarize the main findings of our project, conclude the report by discussing the significance of our findings, and discuss potential future work, such as how our project could be extended or improved.</a:t>
             </a:r>
           </a:p>
         </p:txBody>
@@ -1376,7 +1377,7 @@
     </p:spTree>
     <p:extLst>
       <p:ext uri="{BB962C8B-B14F-4D97-AF65-F5344CB8AC3E}">
-        <p14:creationId xmlns:p14="http://schemas.microsoft.com/office/powerpoint/2010/main" val="2371925110"/>
+        <p14:creationId xmlns:p14="http://schemas.microsoft.com/office/powerpoint/2010/main" val="4099420831"/>
       </p:ext>
     </p:extLst>
   </p:cSld>
@@ -1430,10 +1431,36 @@
           <a:bodyPr/>
           <a:lstStyle/>
           <a:p>
+            <a:pPr marL="0" marR="0" lvl="0" indent="0" algn="l" defTabSz="914400" rtl="0" eaLnBrk="0" fontAlgn="base" latinLnBrk="0" hangingPunct="0">
+              <a:lnSpc>
+                <a:spcPct val="100000"/>
+              </a:lnSpc>
+              <a:spcBef>
+                <a:spcPct val="30000"/>
+              </a:spcBef>
+              <a:spcAft>
+                <a:spcPct val="0"/>
+              </a:spcAft>
+              <a:buClrTx/>
+              <a:buSzTx/>
+              <a:buFontTx/>
+              <a:buNone/>
+              <a:tabLst/>
+              <a:defRPr/>
+            </a:pPr>
             <a:r>
-              <a:rPr lang="en-US" dirty="0"/>
-              <a:t>In the conclusion and future work section, we will summarize the main findings of our project, conclude the report by discussing the significance of our findings, and discuss potential future work, such as how our project could be extended or improved.</a:t>
+              <a:rPr lang="en-US" b="0" dirty="0">
+                <a:solidFill>
+                  <a:srgbClr val="CCCCCC"/>
+                </a:solidFill>
+                <a:effectLst/>
+                <a:latin typeface="Consolas" panose="020B0609020204030204" pitchFamily="49" charset="0"/>
+              </a:rPr>
+              <a:t>Future work would generalize the model to work with other kinds of social media posts like Reddit, Facebook, or Instagram. Additionally, a future model can be multimodal and accept video, image, or audio input to provide a more comprehensive sentiment analysis of social media posts.</a:t>
             </a:r>
+          </a:p>
+          <a:p>
+            <a:endParaRPr lang="en-US" dirty="0"/>
           </a:p>
         </p:txBody>
       </p:sp>
@@ -1464,7 +1491,7 @@
     </p:spTree>
     <p:extLst>
       <p:ext uri="{BB962C8B-B14F-4D97-AF65-F5344CB8AC3E}">
-        <p14:creationId xmlns:p14="http://schemas.microsoft.com/office/powerpoint/2010/main" val="1196247736"/>
+        <p14:creationId xmlns:p14="http://schemas.microsoft.com/office/powerpoint/2010/main" val="2649913412"/>
       </p:ext>
     </p:extLst>
   </p:cSld>
@@ -1633,7 +1660,7 @@
     </p:spTree>
     <p:extLst>
       <p:ext uri="{BB962C8B-B14F-4D97-AF65-F5344CB8AC3E}">
-        <p14:creationId xmlns:p14="http://schemas.microsoft.com/office/powerpoint/2010/main" val="684833767"/>
+        <p14:creationId xmlns:p14="http://schemas.microsoft.com/office/powerpoint/2010/main" val="3727174744"/>
       </p:ext>
     </p:extLst>
   </p:cSld>
@@ -1721,7 +1748,7 @@
     </p:spTree>
     <p:extLst>
       <p:ext uri="{BB962C8B-B14F-4D97-AF65-F5344CB8AC3E}">
-        <p14:creationId xmlns:p14="http://schemas.microsoft.com/office/powerpoint/2010/main" val="228650707"/>
+        <p14:creationId xmlns:p14="http://schemas.microsoft.com/office/powerpoint/2010/main" val="663246818"/>
       </p:ext>
     </p:extLst>
   </p:cSld>
@@ -1775,10 +1802,30 @@
           <a:bodyPr/>
           <a:lstStyle/>
           <a:p>
+            <a:pPr marL="0" marR="0" lvl="0" indent="0" algn="l" defTabSz="914400" rtl="0" eaLnBrk="0" fontAlgn="base" latinLnBrk="0" hangingPunct="0">
+              <a:lnSpc>
+                <a:spcPct val="100000"/>
+              </a:lnSpc>
+              <a:spcBef>
+                <a:spcPct val="30000"/>
+              </a:spcBef>
+              <a:spcAft>
+                <a:spcPct val="0"/>
+              </a:spcAft>
+              <a:buClrTx/>
+              <a:buSzTx/>
+              <a:buFontTx/>
+              <a:buNone/>
+              <a:tabLst/>
+              <a:defRPr/>
+            </a:pPr>
             <a:r>
               <a:rPr lang="en-US" dirty="0"/>
-              <a:t>We build two models: a Brand Classifier that predicts whether a Twitter post expresses a brand, and a Brand Sentiment Analyzer that predicts the sentiment of a Twitter post towards a brand.</a:t>
+              <a:t>We build two models. The first model is a Brand Classifier that predicts whether a Twitter post expresses a brand. The second model is a Brand Sentiment Analyzer that predicts the sentiment of a Twitter post towards a brand.</a:t>
             </a:r>
+          </a:p>
+          <a:p>
+            <a:endParaRPr lang="en-US" dirty="0"/>
           </a:p>
         </p:txBody>
       </p:sp>
@@ -1809,7 +1856,7 @@
     </p:spTree>
     <p:extLst>
       <p:ext uri="{BB962C8B-B14F-4D97-AF65-F5344CB8AC3E}">
-        <p14:creationId xmlns:p14="http://schemas.microsoft.com/office/powerpoint/2010/main" val="1642067300"/>
+        <p14:creationId xmlns:p14="http://schemas.microsoft.com/office/powerpoint/2010/main" val="2156746090"/>
       </p:ext>
     </p:extLst>
   </p:cSld>
@@ -1865,7 +1912,7 @@
           <a:p>
             <a:r>
               <a:rPr lang="en-US" dirty="0"/>
-              <a:t>They are trained on Twitter posts, so they cannot classify posts from other social media sites. They also process only text data, ignoring non-textual elements like images, videos, and audio clips.</a:t>
+              <a:t>The models are trained on Twitter posts and will be scoped to only classify posts from Twitter and will not classify posts from other social media sites like Facebook, Instagram, or Reddit. The models will also process only textual data and will discard inputs with images, videos, or audio clips.</a:t>
             </a:r>
           </a:p>
         </p:txBody>
@@ -1897,7 +1944,7 @@
     </p:spTree>
     <p:extLst>
       <p:ext uri="{BB962C8B-B14F-4D97-AF65-F5344CB8AC3E}">
-        <p14:creationId xmlns:p14="http://schemas.microsoft.com/office/powerpoint/2010/main" val="3757772613"/>
+        <p14:creationId xmlns:p14="http://schemas.microsoft.com/office/powerpoint/2010/main" val="2088728054"/>
       </p:ext>
     </p:extLst>
   </p:cSld>
@@ -1985,7 +2032,7 @@
     </p:spTree>
     <p:extLst>
       <p:ext uri="{BB962C8B-B14F-4D97-AF65-F5344CB8AC3E}">
-        <p14:creationId xmlns:p14="http://schemas.microsoft.com/office/powerpoint/2010/main" val="1137822234"/>
+        <p14:creationId xmlns:p14="http://schemas.microsoft.com/office/powerpoint/2010/main" val="3596259610"/>
       </p:ext>
     </p:extLst>
   </p:cSld>
@@ -2073,7 +2120,7 @@
     </p:spTree>
     <p:extLst>
       <p:ext uri="{BB962C8B-B14F-4D97-AF65-F5344CB8AC3E}">
-        <p14:creationId xmlns:p14="http://schemas.microsoft.com/office/powerpoint/2010/main" val="1805981893"/>
+        <p14:creationId xmlns:p14="http://schemas.microsoft.com/office/powerpoint/2010/main" val="4029731157"/>
       </p:ext>
     </p:extLst>
   </p:cSld>
@@ -2161,7 +2208,7 @@
     </p:spTree>
     <p:extLst>
       <p:ext uri="{BB962C8B-B14F-4D97-AF65-F5344CB8AC3E}">
-        <p14:creationId xmlns:p14="http://schemas.microsoft.com/office/powerpoint/2010/main" val="3333620174"/>
+        <p14:creationId xmlns:p14="http://schemas.microsoft.com/office/powerpoint/2010/main" val="1177502873"/>
       </p:ext>
     </p:extLst>
   </p:cSld>
@@ -2249,7 +2296,7 @@
     </p:spTree>
     <p:extLst>
       <p:ext uri="{BB962C8B-B14F-4D97-AF65-F5344CB8AC3E}">
-        <p14:creationId xmlns:p14="http://schemas.microsoft.com/office/powerpoint/2010/main" val="1875703993"/>
+        <p14:creationId xmlns:p14="http://schemas.microsoft.com/office/powerpoint/2010/main" val="1097886910"/>
       </p:ext>
     </p:extLst>
   </p:cSld>
@@ -2337,7 +2384,7 @@
     </p:spTree>
     <p:extLst>
       <p:ext uri="{BB962C8B-B14F-4D97-AF65-F5344CB8AC3E}">
-        <p14:creationId xmlns:p14="http://schemas.microsoft.com/office/powerpoint/2010/main" val="2161610621"/>
+        <p14:creationId xmlns:p14="http://schemas.microsoft.com/office/powerpoint/2010/main" val="151308693"/>
       </p:ext>
     </p:extLst>
   </p:cSld>
@@ -3388,7 +3435,7 @@
           <a:effectLst/>
           <a:extLst>
             <a:ext uri="{AF507438-7753-43e0-B8FC-AC1667EBCBE1}">
-              <a14:hiddenEffects xmlns:a14="http://schemas.microsoft.com/office/drawing/2010/main" xmlns="">
+              <a14:hiddenEffects xmlns="" xmlns:a14="http://schemas.microsoft.com/office/drawing/2010/main">
                 <a:effectLst>
                   <a:outerShdw blurRad="63500" dist="38099" dir="2700000" algn="ctr" rotWithShape="0">
                     <a:schemeClr val="bg2">
@@ -3510,7 +3557,7 @@
               </a14:hiddenLine>
             </a:ext>
             <a:ext uri="{FAA26D3D-D897-4be2-8F04-BA451C77F1D7}">
-              <ma14:placeholderFlag xmlns="" xmlns:ma14="http://schemas.microsoft.com/office/mac/drawingml/2011/main" val="1"/>
+              <ma14:placeholderFlag xmlns:ma14="http://schemas.microsoft.com/office/mac/drawingml/2011/main" xmlns="" val="1"/>
             </a:ext>
           </a:extLst>
         </p:spPr>
@@ -3599,7 +3646,7 @@
               </a14:hiddenLine>
             </a:ext>
             <a:ext uri="{FAA26D3D-D897-4be2-8F04-BA451C77F1D7}">
-              <ma14:placeholderFlag xmlns="" xmlns:ma14="http://schemas.microsoft.com/office/mac/drawingml/2011/main" val="1"/>
+              <ma14:placeholderFlag xmlns:ma14="http://schemas.microsoft.com/office/mac/drawingml/2011/main" xmlns="" val="1"/>
             </a:ext>
           </a:extLst>
         </p:spPr>
@@ -4193,6 +4240,14 @@
 <file path=ppt/slides/slide1.xml><?xml version="1.0" encoding="utf-8"?>
 <p:sld xmlns:a="http://schemas.openxmlformats.org/drawingml/2006/main" xmlns:r="http://schemas.openxmlformats.org/officeDocument/2006/relationships" xmlns:p="http://schemas.openxmlformats.org/presentationml/2006/main">
   <p:cSld>
+    <p:bg>
+      <p:bgPr>
+        <a:solidFill>
+          <a:schemeClr val="bg1"/>
+        </a:solidFill>
+        <a:effectLst/>
+      </p:bgPr>
+    </p:bg>
     <p:spTree>
       <p:nvGrpSpPr>
         <p:cNvPr id="1" name=""/>
@@ -4217,22 +4272,20 @@
             <p:ph type="title"/>
           </p:nvPr>
         </p:nvSpPr>
-        <p:spPr>
-          <a:xfrm>
-            <a:off x="914400" y="2057400"/>
-            <a:ext cx="10363200" cy="2743200"/>
-          </a:xfrm>
-        </p:spPr>
+        <p:spPr/>
         <p:txBody>
           <a:bodyPr/>
           <a:lstStyle/>
           <a:p>
             <a:r>
-              <a:rPr lang="en-US" altLang="en-US" sz="3600" dirty="0">
+              <a:rPr lang="en-US" altLang="en-US" sz="4000" dirty="0">
                 <a:ea typeface="ＭＳ Ｐゴシック" charset="-128"/>
               </a:rPr>
               <a:t>Brand Sentiment Analysis of Twitter Posts</a:t>
             </a:r>
+            <a:endParaRPr lang="en-US" altLang="en-US" dirty="0">
+              <a:ea typeface="ＭＳ Ｐゴシック" charset="-128"/>
+            </a:endParaRPr>
           </a:p>
         </p:txBody>
       </p:sp>
@@ -4241,7 +4294,7 @@
           <p:cNvPr id="2" name="TextBox 1">
             <a:extLst>
               <a:ext uri="{FF2B5EF4-FFF2-40B4-BE49-F238E27FC236}">
-                <a16:creationId xmlns:a16="http://schemas.microsoft.com/office/drawing/2014/main" id="{7D0BDA10-284A-7B41-8670-B6B5D19AF0F7}"/>
+                <a16:creationId xmlns:a16="http://schemas.microsoft.com/office/drawing/2014/main" id="{8F53F5CB-6890-F0C6-8A18-15839502FF59}"/>
               </a:ext>
             </a:extLst>
           </p:cNvPr>
@@ -4250,7 +4303,7 @@
         </p:nvSpPr>
         <p:spPr>
           <a:xfrm>
-            <a:off x="1204948" y="4114800"/>
+            <a:off x="1204947" y="4114800"/>
             <a:ext cx="2548133" cy="461665"/>
           </a:xfrm>
           <a:prstGeom prst="rect">
@@ -4276,7 +4329,7 @@
           <p:cNvPr id="3" name="TextBox 2">
             <a:extLst>
               <a:ext uri="{FF2B5EF4-FFF2-40B4-BE49-F238E27FC236}">
-                <a16:creationId xmlns:a16="http://schemas.microsoft.com/office/drawing/2014/main" id="{F501E45A-DF55-5B93-C877-50B2C4B47180}"/>
+                <a16:creationId xmlns:a16="http://schemas.microsoft.com/office/drawing/2014/main" id="{FC08BBF4-C707-4FE6-BDD1-6A19C7F501D7}"/>
               </a:ext>
             </a:extLst>
           </p:cNvPr>
@@ -4311,7 +4364,7 @@
           <p:cNvPr id="4" name="TextBox 3">
             <a:extLst>
               <a:ext uri="{FF2B5EF4-FFF2-40B4-BE49-F238E27FC236}">
-                <a16:creationId xmlns:a16="http://schemas.microsoft.com/office/drawing/2014/main" id="{99028ACB-FE7B-0E6D-EF5A-0ECC023F0069}"/>
+                <a16:creationId xmlns:a16="http://schemas.microsoft.com/office/drawing/2014/main" id="{10ED2B7E-72DF-53B9-2368-5A94B2B73BDC}"/>
               </a:ext>
             </a:extLst>
           </p:cNvPr>
@@ -4320,7 +4373,7 @@
         </p:nvSpPr>
         <p:spPr>
           <a:xfrm>
-            <a:off x="9003817" y="4114800"/>
+            <a:off x="9003816" y="4114800"/>
             <a:ext cx="1983235" cy="461665"/>
           </a:xfrm>
           <a:prstGeom prst="rect">
@@ -4342,11 +4395,6 @@
         </p:txBody>
       </p:sp>
     </p:spTree>
-    <p:extLst>
-      <p:ext uri="{BB962C8B-B14F-4D97-AF65-F5344CB8AC3E}">
-        <p14:creationId xmlns:p14="http://schemas.microsoft.com/office/powerpoint/2010/main" val="1093170298"/>
-      </p:ext>
-    </p:extLst>
   </p:cSld>
   <p:clrMapOvr>
     <a:masterClrMapping/>
@@ -4390,15 +4438,46 @@
               <a:rPr lang="en-US" altLang="en-US" dirty="0">
                 <a:ea typeface="ＭＳ Ｐゴシック" charset="-128"/>
               </a:rPr>
-              <a:t>Second Stage: Develop</a:t>
+              <a:t>Third Stage: Evaluate</a:t>
             </a:r>
+          </a:p>
+        </p:txBody>
+      </p:sp>
+      <p:sp>
+        <p:nvSpPr>
+          <p:cNvPr id="3" name="Text Placeholder 2"/>
+          <p:cNvSpPr>
+            <a:spLocks noGrp="1"/>
+          </p:cNvSpPr>
+          <p:nvPr>
+            <p:ph type="body" sz="quarter" idx="10"/>
+          </p:nvPr>
+        </p:nvSpPr>
+        <p:spPr>
+          <a:xfrm>
+            <a:off x="2100266" y="1947863"/>
+            <a:ext cx="7881937" cy="3776662"/>
+          </a:xfrm>
+        </p:spPr>
+        <p:txBody>
+          <a:bodyPr rtlCol="0">
+            <a:noAutofit/>
+          </a:bodyPr>
+          <a:lstStyle/>
+          <a:p>
+            <a:pPr marL="91440" indent="-91440">
+              <a:buFont typeface="Lucida Grande"/>
+              <a:buChar char=" "/>
+              <a:defRPr/>
+            </a:pPr>
+            <a:endParaRPr lang="en-US" dirty="0"/>
           </a:p>
         </p:txBody>
       </p:sp>
     </p:spTree>
     <p:extLst>
       <p:ext uri="{BB962C8B-B14F-4D97-AF65-F5344CB8AC3E}">
-        <p14:creationId xmlns:p14="http://schemas.microsoft.com/office/powerpoint/2010/main" val="2811755235"/>
+        <p14:creationId xmlns:p14="http://schemas.microsoft.com/office/powerpoint/2010/main" val="943618049"/>
       </p:ext>
     </p:extLst>
   </p:cSld>
@@ -4444,15 +4523,46 @@
               <a:rPr lang="en-US" altLang="en-US" dirty="0">
                 <a:ea typeface="ＭＳ Ｐゴシック" charset="-128"/>
               </a:rPr>
-              <a:t>Third Stage: Evaluate</a:t>
+              <a:t>Results</a:t>
             </a:r>
+          </a:p>
+        </p:txBody>
+      </p:sp>
+      <p:sp>
+        <p:nvSpPr>
+          <p:cNvPr id="3" name="Text Placeholder 2"/>
+          <p:cNvSpPr>
+            <a:spLocks noGrp="1"/>
+          </p:cNvSpPr>
+          <p:nvPr>
+            <p:ph type="body" sz="quarter" idx="10"/>
+          </p:nvPr>
+        </p:nvSpPr>
+        <p:spPr>
+          <a:xfrm>
+            <a:off x="2100266" y="1947863"/>
+            <a:ext cx="7881937" cy="3776662"/>
+          </a:xfrm>
+        </p:spPr>
+        <p:txBody>
+          <a:bodyPr rtlCol="0">
+            <a:noAutofit/>
+          </a:bodyPr>
+          <a:lstStyle/>
+          <a:p>
+            <a:pPr marL="91440" indent="-91440">
+              <a:buFont typeface="Lucida Grande"/>
+              <a:buChar char=" "/>
+              <a:defRPr/>
+            </a:pPr>
+            <a:endParaRPr lang="en-US" dirty="0"/>
           </a:p>
         </p:txBody>
       </p:sp>
     </p:spTree>
     <p:extLst>
       <p:ext uri="{BB962C8B-B14F-4D97-AF65-F5344CB8AC3E}">
-        <p14:creationId xmlns:p14="http://schemas.microsoft.com/office/powerpoint/2010/main" val="901105427"/>
+        <p14:creationId xmlns:p14="http://schemas.microsoft.com/office/powerpoint/2010/main" val="3156255279"/>
       </p:ext>
     </p:extLst>
   </p:cSld>
@@ -4498,15 +4608,46 @@
               <a:rPr lang="en-US" altLang="en-US" dirty="0">
                 <a:ea typeface="ＭＳ Ｐゴシック" charset="-128"/>
               </a:rPr>
-              <a:t>Results</a:t>
+              <a:t>Challenges</a:t>
             </a:r>
+          </a:p>
+        </p:txBody>
+      </p:sp>
+      <p:sp>
+        <p:nvSpPr>
+          <p:cNvPr id="3" name="Text Placeholder 2"/>
+          <p:cNvSpPr>
+            <a:spLocks noGrp="1"/>
+          </p:cNvSpPr>
+          <p:nvPr>
+            <p:ph type="body" sz="quarter" idx="10"/>
+          </p:nvPr>
+        </p:nvSpPr>
+        <p:spPr>
+          <a:xfrm>
+            <a:off x="2100266" y="1947863"/>
+            <a:ext cx="7881937" cy="3776662"/>
+          </a:xfrm>
+        </p:spPr>
+        <p:txBody>
+          <a:bodyPr rtlCol="0">
+            <a:noAutofit/>
+          </a:bodyPr>
+          <a:lstStyle/>
+          <a:p>
+            <a:pPr marL="91440" indent="-91440">
+              <a:buFont typeface="Lucida Grande"/>
+              <a:buChar char=" "/>
+              <a:defRPr/>
+            </a:pPr>
+            <a:endParaRPr lang="en-US" dirty="0"/>
           </a:p>
         </p:txBody>
       </p:sp>
     </p:spTree>
     <p:extLst>
       <p:ext uri="{BB962C8B-B14F-4D97-AF65-F5344CB8AC3E}">
-        <p14:creationId xmlns:p14="http://schemas.microsoft.com/office/powerpoint/2010/main" val="2681042120"/>
+        <p14:creationId xmlns:p14="http://schemas.microsoft.com/office/powerpoint/2010/main" val="1103107023"/>
       </p:ext>
     </p:extLst>
   </p:cSld>
@@ -4552,15 +4693,46 @@
               <a:rPr lang="en-US" altLang="en-US" dirty="0">
                 <a:ea typeface="ＭＳ Ｐゴシック" charset="-128"/>
               </a:rPr>
-              <a:t>Challenges</a:t>
+              <a:t>Conclusion</a:t>
             </a:r>
+          </a:p>
+        </p:txBody>
+      </p:sp>
+      <p:sp>
+        <p:nvSpPr>
+          <p:cNvPr id="3" name="Text Placeholder 2"/>
+          <p:cNvSpPr>
+            <a:spLocks noGrp="1"/>
+          </p:cNvSpPr>
+          <p:nvPr>
+            <p:ph type="body" sz="quarter" idx="10"/>
+          </p:nvPr>
+        </p:nvSpPr>
+        <p:spPr>
+          <a:xfrm>
+            <a:off x="2100266" y="1947863"/>
+            <a:ext cx="7881937" cy="3776662"/>
+          </a:xfrm>
+        </p:spPr>
+        <p:txBody>
+          <a:bodyPr rtlCol="0">
+            <a:noAutofit/>
+          </a:bodyPr>
+          <a:lstStyle/>
+          <a:p>
+            <a:pPr marL="91440" indent="-91440">
+              <a:buFont typeface="Lucida Grande"/>
+              <a:buChar char=" "/>
+              <a:defRPr/>
+            </a:pPr>
+            <a:endParaRPr lang="en-US" dirty="0"/>
           </a:p>
         </p:txBody>
       </p:sp>
     </p:spTree>
     <p:extLst>
       <p:ext uri="{BB962C8B-B14F-4D97-AF65-F5344CB8AC3E}">
-        <p14:creationId xmlns:p14="http://schemas.microsoft.com/office/powerpoint/2010/main" val="603158914"/>
+        <p14:creationId xmlns:p14="http://schemas.microsoft.com/office/powerpoint/2010/main" val="3390827187"/>
       </p:ext>
     </p:extLst>
   </p:cSld>
@@ -4606,15 +4778,46 @@
               <a:rPr lang="en-US" altLang="en-US" dirty="0">
                 <a:ea typeface="ＭＳ Ｐゴシック" charset="-128"/>
               </a:rPr>
-              <a:t>Conclusion &amp; Future Work</a:t>
+              <a:t>Future Work</a:t>
             </a:r>
+          </a:p>
+        </p:txBody>
+      </p:sp>
+      <p:sp>
+        <p:nvSpPr>
+          <p:cNvPr id="3" name="Text Placeholder 2"/>
+          <p:cNvSpPr>
+            <a:spLocks noGrp="1"/>
+          </p:cNvSpPr>
+          <p:nvPr>
+            <p:ph type="body" sz="quarter" idx="10"/>
+          </p:nvPr>
+        </p:nvSpPr>
+        <p:spPr>
+          <a:xfrm>
+            <a:off x="2100266" y="1947863"/>
+            <a:ext cx="7881937" cy="3776662"/>
+          </a:xfrm>
+        </p:spPr>
+        <p:txBody>
+          <a:bodyPr rtlCol="0">
+            <a:noAutofit/>
+          </a:bodyPr>
+          <a:lstStyle/>
+          <a:p>
+            <a:pPr marL="91440" indent="-91440">
+              <a:buFont typeface="Lucida Grande"/>
+              <a:buChar char=" "/>
+              <a:defRPr/>
+            </a:pPr>
+            <a:endParaRPr lang="en-US" dirty="0"/>
           </a:p>
         </p:txBody>
       </p:sp>
     </p:spTree>
     <p:extLst>
       <p:ext uri="{BB962C8B-B14F-4D97-AF65-F5344CB8AC3E}">
-        <p14:creationId xmlns:p14="http://schemas.microsoft.com/office/powerpoint/2010/main" val="2875911112"/>
+        <p14:creationId xmlns:p14="http://schemas.microsoft.com/office/powerpoint/2010/main" val="1339825775"/>
       </p:ext>
     </p:extLst>
   </p:cSld>
@@ -4665,10 +4868,41 @@
           </a:p>
         </p:txBody>
       </p:sp>
+      <p:sp>
+        <p:nvSpPr>
+          <p:cNvPr id="3" name="Text Placeholder 2"/>
+          <p:cNvSpPr>
+            <a:spLocks noGrp="1"/>
+          </p:cNvSpPr>
+          <p:nvPr>
+            <p:ph type="body" sz="quarter" idx="10"/>
+          </p:nvPr>
+        </p:nvSpPr>
+        <p:spPr>
+          <a:xfrm>
+            <a:off x="2100266" y="1947863"/>
+            <a:ext cx="7881937" cy="3776662"/>
+          </a:xfrm>
+        </p:spPr>
+        <p:txBody>
+          <a:bodyPr rtlCol="0">
+            <a:noAutofit/>
+          </a:bodyPr>
+          <a:lstStyle/>
+          <a:p>
+            <a:pPr marL="91440" indent="-91440">
+              <a:buFont typeface="Lucida Grande"/>
+              <a:buChar char=" "/>
+              <a:defRPr/>
+            </a:pPr>
+            <a:endParaRPr lang="en-US" dirty="0"/>
+          </a:p>
+        </p:txBody>
+      </p:sp>
     </p:spTree>
     <p:extLst>
       <p:ext uri="{BB962C8B-B14F-4D97-AF65-F5344CB8AC3E}">
-        <p14:creationId xmlns:p14="http://schemas.microsoft.com/office/powerpoint/2010/main" val="1671929546"/>
+        <p14:creationId xmlns:p14="http://schemas.microsoft.com/office/powerpoint/2010/main" val="3147092962"/>
       </p:ext>
     </p:extLst>
   </p:cSld>
@@ -4719,6 +4953,37 @@
           </a:p>
         </p:txBody>
       </p:sp>
+      <p:sp>
+        <p:nvSpPr>
+          <p:cNvPr id="3" name="Text Placeholder 2"/>
+          <p:cNvSpPr>
+            <a:spLocks noGrp="1"/>
+          </p:cNvSpPr>
+          <p:nvPr>
+            <p:ph type="body" sz="quarter" idx="10"/>
+          </p:nvPr>
+        </p:nvSpPr>
+        <p:spPr>
+          <a:xfrm>
+            <a:off x="2100266" y="1947863"/>
+            <a:ext cx="7881937" cy="3776662"/>
+          </a:xfrm>
+        </p:spPr>
+        <p:txBody>
+          <a:bodyPr rtlCol="0">
+            <a:noAutofit/>
+          </a:bodyPr>
+          <a:lstStyle/>
+          <a:p>
+            <a:pPr marL="91440" indent="-91440">
+              <a:buFont typeface="Lucida Grande"/>
+              <a:buChar char=" "/>
+              <a:defRPr/>
+            </a:pPr>
+            <a:endParaRPr lang="en-US" dirty="0"/>
+          </a:p>
+        </p:txBody>
+      </p:sp>
     </p:spTree>
   </p:cSld>
   <p:clrMapOvr>
@@ -4768,10 +5033,41 @@
           </a:p>
         </p:txBody>
       </p:sp>
+      <p:sp>
+        <p:nvSpPr>
+          <p:cNvPr id="3" name="Text Placeholder 2"/>
+          <p:cNvSpPr>
+            <a:spLocks noGrp="1"/>
+          </p:cNvSpPr>
+          <p:nvPr>
+            <p:ph type="body" sz="quarter" idx="10"/>
+          </p:nvPr>
+        </p:nvSpPr>
+        <p:spPr>
+          <a:xfrm>
+            <a:off x="2100266" y="1947863"/>
+            <a:ext cx="7881937" cy="3776662"/>
+          </a:xfrm>
+        </p:spPr>
+        <p:txBody>
+          <a:bodyPr rtlCol="0">
+            <a:noAutofit/>
+          </a:bodyPr>
+          <a:lstStyle/>
+          <a:p>
+            <a:pPr marL="91440" indent="-91440">
+              <a:buFont typeface="Lucida Grande"/>
+              <a:buChar char=" "/>
+              <a:defRPr/>
+            </a:pPr>
+            <a:endParaRPr lang="en-US" dirty="0"/>
+          </a:p>
+        </p:txBody>
+      </p:sp>
     </p:spTree>
     <p:extLst>
       <p:ext uri="{BB962C8B-B14F-4D97-AF65-F5344CB8AC3E}">
-        <p14:creationId xmlns:p14="http://schemas.microsoft.com/office/powerpoint/2010/main" val="1381240721"/>
+        <p14:creationId xmlns:p14="http://schemas.microsoft.com/office/powerpoint/2010/main" val="226194277"/>
       </p:ext>
     </p:extLst>
   </p:cSld>
@@ -4822,10 +5118,41 @@
           </a:p>
         </p:txBody>
       </p:sp>
+      <p:sp>
+        <p:nvSpPr>
+          <p:cNvPr id="3" name="Text Placeholder 2"/>
+          <p:cNvSpPr>
+            <a:spLocks noGrp="1"/>
+          </p:cNvSpPr>
+          <p:nvPr>
+            <p:ph type="body" sz="quarter" idx="10"/>
+          </p:nvPr>
+        </p:nvSpPr>
+        <p:spPr>
+          <a:xfrm>
+            <a:off x="2100266" y="1947863"/>
+            <a:ext cx="7881937" cy="3776662"/>
+          </a:xfrm>
+        </p:spPr>
+        <p:txBody>
+          <a:bodyPr rtlCol="0">
+            <a:noAutofit/>
+          </a:bodyPr>
+          <a:lstStyle/>
+          <a:p>
+            <a:pPr marL="91440" indent="-91440">
+              <a:buFont typeface="Lucida Grande"/>
+              <a:buChar char=" "/>
+              <a:defRPr/>
+            </a:pPr>
+            <a:endParaRPr lang="en-US" dirty="0"/>
+          </a:p>
+        </p:txBody>
+      </p:sp>
     </p:spTree>
     <p:extLst>
       <p:ext uri="{BB962C8B-B14F-4D97-AF65-F5344CB8AC3E}">
-        <p14:creationId xmlns:p14="http://schemas.microsoft.com/office/powerpoint/2010/main" val="3273571779"/>
+        <p14:creationId xmlns:p14="http://schemas.microsoft.com/office/powerpoint/2010/main" val="1429123797"/>
       </p:ext>
     </p:extLst>
   </p:cSld>
@@ -4876,10 +5203,41 @@
           </a:p>
         </p:txBody>
       </p:sp>
+      <p:sp>
+        <p:nvSpPr>
+          <p:cNvPr id="3" name="Text Placeholder 2"/>
+          <p:cNvSpPr>
+            <a:spLocks noGrp="1"/>
+          </p:cNvSpPr>
+          <p:nvPr>
+            <p:ph type="body" sz="quarter" idx="10"/>
+          </p:nvPr>
+        </p:nvSpPr>
+        <p:spPr>
+          <a:xfrm>
+            <a:off x="2100266" y="1947863"/>
+            <a:ext cx="7881937" cy="3776662"/>
+          </a:xfrm>
+        </p:spPr>
+        <p:txBody>
+          <a:bodyPr rtlCol="0">
+            <a:noAutofit/>
+          </a:bodyPr>
+          <a:lstStyle/>
+          <a:p>
+            <a:pPr marL="91440" indent="-91440">
+              <a:buFont typeface="Lucida Grande"/>
+              <a:buChar char=" "/>
+              <a:defRPr/>
+            </a:pPr>
+            <a:endParaRPr lang="en-US" dirty="0"/>
+          </a:p>
+        </p:txBody>
+      </p:sp>
     </p:spTree>
     <p:extLst>
       <p:ext uri="{BB962C8B-B14F-4D97-AF65-F5344CB8AC3E}">
-        <p14:creationId xmlns:p14="http://schemas.microsoft.com/office/powerpoint/2010/main" val="69069607"/>
+        <p14:creationId xmlns:p14="http://schemas.microsoft.com/office/powerpoint/2010/main" val="3863883462"/>
       </p:ext>
     </p:extLst>
   </p:cSld>
@@ -4930,10 +5288,41 @@
           </a:p>
         </p:txBody>
       </p:sp>
+      <p:sp>
+        <p:nvSpPr>
+          <p:cNvPr id="3" name="Text Placeholder 2"/>
+          <p:cNvSpPr>
+            <a:spLocks noGrp="1"/>
+          </p:cNvSpPr>
+          <p:nvPr>
+            <p:ph type="body" sz="quarter" idx="10"/>
+          </p:nvPr>
+        </p:nvSpPr>
+        <p:spPr>
+          <a:xfrm>
+            <a:off x="2100266" y="1947863"/>
+            <a:ext cx="7881937" cy="3776662"/>
+          </a:xfrm>
+        </p:spPr>
+        <p:txBody>
+          <a:bodyPr rtlCol="0">
+            <a:noAutofit/>
+          </a:bodyPr>
+          <a:lstStyle/>
+          <a:p>
+            <a:pPr marL="91440" indent="-91440">
+              <a:buFont typeface="Lucida Grande"/>
+              <a:buChar char=" "/>
+              <a:defRPr/>
+            </a:pPr>
+            <a:endParaRPr lang="en-US" dirty="0"/>
+          </a:p>
+        </p:txBody>
+      </p:sp>
     </p:spTree>
     <p:extLst>
       <p:ext uri="{BB962C8B-B14F-4D97-AF65-F5344CB8AC3E}">
-        <p14:creationId xmlns:p14="http://schemas.microsoft.com/office/powerpoint/2010/main" val="1623255054"/>
+        <p14:creationId xmlns:p14="http://schemas.microsoft.com/office/powerpoint/2010/main" val="3978041919"/>
       </p:ext>
     </p:extLst>
   </p:cSld>
@@ -4984,10 +5373,41 @@
           </a:p>
         </p:txBody>
       </p:sp>
+      <p:sp>
+        <p:nvSpPr>
+          <p:cNvPr id="3" name="Text Placeholder 2"/>
+          <p:cNvSpPr>
+            <a:spLocks noGrp="1"/>
+          </p:cNvSpPr>
+          <p:nvPr>
+            <p:ph type="body" sz="quarter" idx="10"/>
+          </p:nvPr>
+        </p:nvSpPr>
+        <p:spPr>
+          <a:xfrm>
+            <a:off x="2100266" y="1947863"/>
+            <a:ext cx="7881937" cy="3776662"/>
+          </a:xfrm>
+        </p:spPr>
+        <p:txBody>
+          <a:bodyPr rtlCol="0">
+            <a:noAutofit/>
+          </a:bodyPr>
+          <a:lstStyle/>
+          <a:p>
+            <a:pPr marL="91440" indent="-91440">
+              <a:buFont typeface="Lucida Grande"/>
+              <a:buChar char=" "/>
+              <a:defRPr/>
+            </a:pPr>
+            <a:endParaRPr lang="en-US" dirty="0"/>
+          </a:p>
+        </p:txBody>
+      </p:sp>
     </p:spTree>
     <p:extLst>
       <p:ext uri="{BB962C8B-B14F-4D97-AF65-F5344CB8AC3E}">
-        <p14:creationId xmlns:p14="http://schemas.microsoft.com/office/powerpoint/2010/main" val="1557484235"/>
+        <p14:creationId xmlns:p14="http://schemas.microsoft.com/office/powerpoint/2010/main" val="3171744020"/>
       </p:ext>
     </p:extLst>
   </p:cSld>
@@ -5038,10 +5458,41 @@
           </a:p>
         </p:txBody>
       </p:sp>
+      <p:sp>
+        <p:nvSpPr>
+          <p:cNvPr id="3" name="Text Placeholder 2"/>
+          <p:cNvSpPr>
+            <a:spLocks noGrp="1"/>
+          </p:cNvSpPr>
+          <p:nvPr>
+            <p:ph type="body" sz="quarter" idx="10"/>
+          </p:nvPr>
+        </p:nvSpPr>
+        <p:spPr>
+          <a:xfrm>
+            <a:off x="2100266" y="1947863"/>
+            <a:ext cx="7881937" cy="3776662"/>
+          </a:xfrm>
+        </p:spPr>
+        <p:txBody>
+          <a:bodyPr rtlCol="0">
+            <a:noAutofit/>
+          </a:bodyPr>
+          <a:lstStyle/>
+          <a:p>
+            <a:pPr marL="91440" indent="-91440">
+              <a:buFont typeface="Lucida Grande"/>
+              <a:buChar char=" "/>
+              <a:defRPr/>
+            </a:pPr>
+            <a:endParaRPr lang="en-US" dirty="0"/>
+          </a:p>
+        </p:txBody>
+      </p:sp>
     </p:spTree>
     <p:extLst>
       <p:ext uri="{BB962C8B-B14F-4D97-AF65-F5344CB8AC3E}">
-        <p14:creationId xmlns:p14="http://schemas.microsoft.com/office/powerpoint/2010/main" val="4054382697"/>
+        <p14:creationId xmlns:p14="http://schemas.microsoft.com/office/powerpoint/2010/main" val="3011073026"/>
       </p:ext>
     </p:extLst>
   </p:cSld>
@@ -5092,10 +5543,41 @@
           </a:p>
         </p:txBody>
       </p:sp>
+      <p:sp>
+        <p:nvSpPr>
+          <p:cNvPr id="3" name="Text Placeholder 2"/>
+          <p:cNvSpPr>
+            <a:spLocks noGrp="1"/>
+          </p:cNvSpPr>
+          <p:nvPr>
+            <p:ph type="body" sz="quarter" idx="10"/>
+          </p:nvPr>
+        </p:nvSpPr>
+        <p:spPr>
+          <a:xfrm>
+            <a:off x="2100266" y="1947863"/>
+            <a:ext cx="7881937" cy="3776662"/>
+          </a:xfrm>
+        </p:spPr>
+        <p:txBody>
+          <a:bodyPr rtlCol="0">
+            <a:noAutofit/>
+          </a:bodyPr>
+          <a:lstStyle/>
+          <a:p>
+            <a:pPr marL="91440" indent="-91440">
+              <a:buFont typeface="Lucida Grande"/>
+              <a:buChar char=" "/>
+              <a:defRPr/>
+            </a:pPr>
+            <a:endParaRPr lang="en-US" dirty="0"/>
+          </a:p>
+        </p:txBody>
+      </p:sp>
     </p:spTree>
     <p:extLst>
       <p:ext uri="{BB962C8B-B14F-4D97-AF65-F5344CB8AC3E}">
-        <p14:creationId xmlns:p14="http://schemas.microsoft.com/office/powerpoint/2010/main" val="4127828933"/>
+        <p14:creationId xmlns:p14="http://schemas.microsoft.com/office/powerpoint/2010/main" val="1243893798"/>
       </p:ext>
     </p:extLst>
   </p:cSld>
@@ -5409,7 +5891,7 @@
         <a:effectLst/>
         <a:extLst>
           <a:ext uri="{AF507438-7753-43e0-B8FC-AC1667EBCBE1}">
-            <a14:hiddenEffects xmlns:a14="http://schemas.microsoft.com/office/drawing/2010/main" xmlns="">
+            <a14:hiddenEffects xmlns="" xmlns:a14="http://schemas.microsoft.com/office/drawing/2010/main">
               <a:effectLst>
                 <a:outerShdw blurRad="63500" dist="38099" dir="2700000" algn="ctr" rotWithShape="0">
                   <a:schemeClr val="bg2">
@@ -5486,7 +5968,7 @@
         <a:effectLst/>
         <a:extLst>
           <a:ext uri="{AF507438-7753-43e0-B8FC-AC1667EBCBE1}">
-            <a14:hiddenEffects xmlns:a14="http://schemas.microsoft.com/office/drawing/2010/main" xmlns="">
+            <a14:hiddenEffects xmlns="" xmlns:a14="http://schemas.microsoft.com/office/drawing/2010/main">
               <a:effectLst>
                 <a:outerShdw blurRad="63500" dist="38099" dir="2700000" algn="ctr" rotWithShape="0">
                   <a:schemeClr val="bg2">

</xml_diff>

<commit_message>
add voiceover filler for slides w/o voiceover
</commit_message>
<xml_diff>
--- a/Final-Project-Team-2.pptx
+++ b/Final-Project-Team-2.pptx
@@ -192,7 +192,7 @@
   <pc:docChgLst>
     <pc:chgData name="John D" userId="1cefe769efc9e99e" providerId="LiveId" clId="{9C813817-CFC9-4E2E-BF18-A1BFFBFD1F31}"/>
     <pc:docChg chg="undo custSel modSld">
-      <pc:chgData name="John D" userId="1cefe769efc9e99e" providerId="LiveId" clId="{9C813817-CFC9-4E2E-BF18-A1BFFBFD1F31}" dt="2023-08-08T08:40:42.377" v="34" actId="6549"/>
+      <pc:chgData name="John D" userId="1cefe769efc9e99e" providerId="LiveId" clId="{9C813817-CFC9-4E2E-BF18-A1BFFBFD1F31}" dt="2023-08-11T04:53:41.111" v="68"/>
       <pc:docMkLst>
         <pc:docMk/>
       </pc:docMkLst>
@@ -224,6 +224,42 @@
           <pc:sldMk cId="3978041919" sldId="262"/>
         </pc:sldMkLst>
       </pc:sldChg>
+      <pc:sldChg chg="modNotesTx">
+        <pc:chgData name="John D" userId="1cefe769efc9e99e" providerId="LiveId" clId="{9C813817-CFC9-4E2E-BF18-A1BFFBFD1F31}" dt="2023-08-11T04:53:41.111" v="68"/>
+        <pc:sldMkLst>
+          <pc:docMk/>
+          <pc:sldMk cId="250569513" sldId="276"/>
+        </pc:sldMkLst>
+      </pc:sldChg>
+      <pc:sldChg chg="modSp mod modNotesTx">
+        <pc:chgData name="John D" userId="1cefe769efc9e99e" providerId="LiveId" clId="{9C813817-CFC9-4E2E-BF18-A1BFFBFD1F31}" dt="2023-08-11T04:53:26.824" v="62"/>
+        <pc:sldMkLst>
+          <pc:docMk/>
+          <pc:sldMk cId="1503236287" sldId="277"/>
+        </pc:sldMkLst>
+        <pc:spChg chg="mod">
+          <ac:chgData name="John D" userId="1cefe769efc9e99e" providerId="LiveId" clId="{9C813817-CFC9-4E2E-BF18-A1BFFBFD1F31}" dt="2023-08-11T04:53:25.936" v="61" actId="21"/>
+          <ac:spMkLst>
+            <pc:docMk/>
+            <pc:sldMk cId="1503236287" sldId="277"/>
+            <ac:spMk id="2" creationId="{B0E3F178-D34D-1063-7361-8BDB75584E51}"/>
+          </ac:spMkLst>
+        </pc:spChg>
+      </pc:sldChg>
+      <pc:sldChg chg="modNotesTx">
+        <pc:chgData name="John D" userId="1cefe769efc9e99e" providerId="LiveId" clId="{9C813817-CFC9-4E2E-BF18-A1BFFBFD1F31}" dt="2023-08-11T04:53:35.919" v="67" actId="20577"/>
+        <pc:sldMkLst>
+          <pc:docMk/>
+          <pc:sldMk cId="2300759122" sldId="278"/>
+        </pc:sldMkLst>
+      </pc:sldChg>
+      <pc:sldChg chg="modNotesTx">
+        <pc:chgData name="John D" userId="1cefe769efc9e99e" providerId="LiveId" clId="{9C813817-CFC9-4E2E-BF18-A1BFFBFD1F31}" dt="2023-08-11T04:53:21.065" v="59" actId="20577"/>
+        <pc:sldMkLst>
+          <pc:docMk/>
+          <pc:sldMk cId="4167620600" sldId="279"/>
+        </pc:sldMkLst>
+      </pc:sldChg>
     </pc:docChg>
   </pc:docChgLst>
 </pc:chgInfo>
@@ -322,7 +358,7 @@
             <a:fld id="{3CB42547-1216-8745-B61E-1644CC83EEDE}" type="datetimeFigureOut">
               <a:rPr lang="en-US" altLang="en-US"/>
               <a:pPr/>
-              <a:t>8/10/2023</a:t>
+              <a:t>8/11/2023</a:t>
             </a:fld>
             <a:endParaRPr lang="en-US" altLang="en-US"/>
           </a:p>
@@ -465,17 +501,17 @@
           </a:ln>
           <a:extLst>
             <a:ext uri="{FAA26D3D-D897-4be2-8F04-BA451C77F1D7}">
-              <ma14:placeholderFlag xmlns="" xmlns:ma14="http://schemas.microsoft.com/office/mac/drawingml/2011/main" val="1"/>
+              <ma14:placeholderFlag xmlns:ma14="http://schemas.microsoft.com/office/mac/drawingml/2011/main" xmlns="" val="1"/>
             </a:ext>
             <a:ext uri="{909E8E84-426E-40dd-AFC4-6F175D3DCCD1}">
-              <a14:hiddenFill xmlns:a14="http://schemas.microsoft.com/office/drawing/2010/main" xmlns="">
+              <a14:hiddenFill xmlns="" xmlns:a14="http://schemas.microsoft.com/office/drawing/2010/main">
                 <a:solidFill>
                   <a:schemeClr val="accent1"/>
                 </a:solidFill>
               </a14:hiddenFill>
             </a:ext>
             <a:ext uri="{91240B29-F687-4f45-9708-019B960494DF}">
-              <a14:hiddenLine xmlns:a14="http://schemas.microsoft.com/office/drawing/2010/main" xmlns="" w="9525">
+              <a14:hiddenLine xmlns="" xmlns:a14="http://schemas.microsoft.com/office/drawing/2010/main" w="9525">
                 <a:solidFill>
                   <a:schemeClr val="tx1"/>
                 </a:solidFill>
@@ -532,17 +568,17 @@
           </a:ln>
           <a:extLst>
             <a:ext uri="{FAA26D3D-D897-4be2-8F04-BA451C77F1D7}">
-              <ma14:placeholderFlag xmlns="" xmlns:ma14="http://schemas.microsoft.com/office/mac/drawingml/2011/main" val="1"/>
+              <ma14:placeholderFlag xmlns:ma14="http://schemas.microsoft.com/office/mac/drawingml/2011/main" xmlns="" val="1"/>
             </a:ext>
             <a:ext uri="{909E8E84-426E-40dd-AFC4-6F175D3DCCD1}">
-              <a14:hiddenFill xmlns:a14="http://schemas.microsoft.com/office/drawing/2010/main" xmlns="">
+              <a14:hiddenFill xmlns="" xmlns:a14="http://schemas.microsoft.com/office/drawing/2010/main">
                 <a:solidFill>
                   <a:schemeClr val="accent1"/>
                 </a:solidFill>
               </a14:hiddenFill>
             </a:ext>
             <a:ext uri="{91240B29-F687-4f45-9708-019B960494DF}">
-              <a14:hiddenLine xmlns:a14="http://schemas.microsoft.com/office/drawing/2010/main" xmlns="" w="9525">
+              <a14:hiddenLine xmlns="" xmlns:a14="http://schemas.microsoft.com/office/drawing/2010/main" w="9525">
                 <a:solidFill>
                   <a:schemeClr val="tx1"/>
                 </a:solidFill>
@@ -605,7 +641,7 @@
           <a:effectLst/>
           <a:extLst>
             <a:ext uri="{AF507438-7753-43e0-B8FC-AC1667EBCBE1}">
-              <a14:hiddenEffects xmlns:a14="http://schemas.microsoft.com/office/drawing/2010/main" xmlns="">
+              <a14:hiddenEffects xmlns="" xmlns:a14="http://schemas.microsoft.com/office/drawing/2010/main">
                 <a:effectLst>
                   <a:outerShdw blurRad="63500" dist="38099" dir="2700000" algn="ctr" rotWithShape="0">
                     <a:srgbClr val="000000">
@@ -616,7 +652,7 @@
               </a14:hiddenEffects>
             </a:ext>
             <a:ext uri="{53640926-AAD7-44d8-BBD7-CCE9431645EC}">
-              <a14:shadowObscured xmlns:a14="http://schemas.microsoft.com/office/drawing/2010/main" xmlns="" val="1"/>
+              <a14:shadowObscured xmlns="" xmlns:a14="http://schemas.microsoft.com/office/drawing/2010/main" val="1"/>
             </a:ext>
           </a:extLst>
         </p:spPr>
@@ -645,17 +681,17 @@
           </a:ln>
           <a:extLst>
             <a:ext uri="{FAA26D3D-D897-4be2-8F04-BA451C77F1D7}">
-              <ma14:placeholderFlag xmlns="" xmlns:ma14="http://schemas.microsoft.com/office/mac/drawingml/2011/main" val="1"/>
+              <ma14:placeholderFlag xmlns:ma14="http://schemas.microsoft.com/office/mac/drawingml/2011/main" xmlns="" val="1"/>
             </a:ext>
             <a:ext uri="{909E8E84-426E-40dd-AFC4-6F175D3DCCD1}">
-              <a14:hiddenFill xmlns:a14="http://schemas.microsoft.com/office/drawing/2010/main" xmlns="">
+              <a14:hiddenFill xmlns="" xmlns:a14="http://schemas.microsoft.com/office/drawing/2010/main">
                 <a:solidFill>
                   <a:schemeClr val="accent1"/>
                 </a:solidFill>
               </a14:hiddenFill>
             </a:ext>
             <a:ext uri="{91240B29-F687-4f45-9708-019B960494DF}">
-              <a14:hiddenLine xmlns:a14="http://schemas.microsoft.com/office/drawing/2010/main" xmlns="" w="9525">
+              <a14:hiddenLine xmlns="" xmlns:a14="http://schemas.microsoft.com/office/drawing/2010/main" w="9525">
                 <a:solidFill>
                   <a:schemeClr val="tx1"/>
                 </a:solidFill>
@@ -734,17 +770,17 @@
           </a:ln>
           <a:extLst>
             <a:ext uri="{FAA26D3D-D897-4be2-8F04-BA451C77F1D7}">
-              <ma14:placeholderFlag xmlns="" xmlns:ma14="http://schemas.microsoft.com/office/mac/drawingml/2011/main" val="1"/>
+              <ma14:placeholderFlag xmlns:ma14="http://schemas.microsoft.com/office/mac/drawingml/2011/main" xmlns="" val="1"/>
             </a:ext>
             <a:ext uri="{909E8E84-426E-40dd-AFC4-6F175D3DCCD1}">
-              <a14:hiddenFill xmlns:a14="http://schemas.microsoft.com/office/drawing/2010/main" xmlns="">
+              <a14:hiddenFill xmlns="" xmlns:a14="http://schemas.microsoft.com/office/drawing/2010/main">
                 <a:solidFill>
                   <a:schemeClr val="accent1"/>
                 </a:solidFill>
               </a14:hiddenFill>
             </a:ext>
             <a:ext uri="{91240B29-F687-4f45-9708-019B960494DF}">
-              <a14:hiddenLine xmlns:a14="http://schemas.microsoft.com/office/drawing/2010/main" xmlns="" w="9525">
+              <a14:hiddenLine xmlns="" xmlns:a14="http://schemas.microsoft.com/office/drawing/2010/main" w="9525">
                 <a:solidFill>
                   <a:schemeClr val="tx1"/>
                 </a:solidFill>
@@ -801,17 +837,17 @@
           </a:ln>
           <a:extLst>
             <a:ext uri="{FAA26D3D-D897-4be2-8F04-BA451C77F1D7}">
-              <ma14:placeholderFlag xmlns="" xmlns:ma14="http://schemas.microsoft.com/office/mac/drawingml/2011/main" val="1"/>
+              <ma14:placeholderFlag xmlns:ma14="http://schemas.microsoft.com/office/mac/drawingml/2011/main" xmlns="" val="1"/>
             </a:ext>
             <a:ext uri="{909E8E84-426E-40dd-AFC4-6F175D3DCCD1}">
-              <a14:hiddenFill xmlns:a14="http://schemas.microsoft.com/office/drawing/2010/main" xmlns="">
+              <a14:hiddenFill xmlns="" xmlns:a14="http://schemas.microsoft.com/office/drawing/2010/main">
                 <a:solidFill>
                   <a:schemeClr val="accent1"/>
                 </a:solidFill>
               </a14:hiddenFill>
             </a:ext>
             <a:ext uri="{91240B29-F687-4f45-9708-019B960494DF}">
-              <a14:hiddenLine xmlns:a14="http://schemas.microsoft.com/office/drawing/2010/main" xmlns="" w="9525">
+              <a14:hiddenLine xmlns="" xmlns:a14="http://schemas.microsoft.com/office/drawing/2010/main" w="9525">
                 <a:solidFill>
                   <a:schemeClr val="tx1"/>
                 </a:solidFill>
@@ -1112,7 +1148,7 @@
           <a:p>
             <a:r>
               <a:rPr lang="en-US" dirty="0"/>
-              <a:t>We experimented with various machine learning algorithms like Naïve Bayes, Logistic Regression, Support Vector Machines, Recurrent Neural Networks, and Transformers.</a:t>
+              <a:t>Feature Engineering TBD</a:t>
             </a:r>
           </a:p>
         </p:txBody>
@@ -1135,7 +1171,7 @@
             <a:fld id="{AA4D7F38-9E4B-194A-AA5A-81BF138D29E9}" type="slidenum">
               <a:rPr lang="en-US" altLang="en-US" smtClean="0"/>
               <a:pPr/>
-              <a:t>14</a:t>
+              <a:t>10</a:t>
             </a:fld>
             <a:endParaRPr lang="en-US" altLang="en-US"/>
           </a:p>
@@ -1144,7 +1180,7 @@
     </p:spTree>
     <p:extLst>
       <p:ext uri="{BB962C8B-B14F-4D97-AF65-F5344CB8AC3E}">
-        <p14:creationId xmlns:p14="http://schemas.microsoft.com/office/powerpoint/2010/main" val="974401036"/>
+        <p14:creationId xmlns:p14="http://schemas.microsoft.com/office/powerpoint/2010/main" val="4181000801"/>
       </p:ext>
     </p:extLst>
   </p:cSld>
@@ -1200,7 +1236,7 @@
           <a:p>
             <a:r>
               <a:rPr lang="en-US" dirty="0"/>
-              <a:t>In the evaluation stage, we measured the models' ability to identify brands and predict sentiment in Twitter posts. We used standard classification metrics such as Accuracy, Precision, Recall, and F1 Score to evaluate the models.</a:t>
+              <a:t>In the development stage, we handled invalid values and discarded non-textual content. We trained our models to identify a brand and align with the sentiment expressed in a tweet, and then tuned them to improve performance.</a:t>
             </a:r>
           </a:p>
         </p:txBody>
@@ -1223,7 +1259,7 @@
             <a:fld id="{AA4D7F38-9E4B-194A-AA5A-81BF138D29E9}" type="slidenum">
               <a:rPr lang="en-US" altLang="en-US" smtClean="0"/>
               <a:pPr/>
-              <a:t>15</a:t>
+              <a:t>11</a:t>
             </a:fld>
             <a:endParaRPr lang="en-US" altLang="en-US"/>
           </a:p>
@@ -1232,7 +1268,7 @@
     </p:spTree>
     <p:extLst>
       <p:ext uri="{BB962C8B-B14F-4D97-AF65-F5344CB8AC3E}">
-        <p14:creationId xmlns:p14="http://schemas.microsoft.com/office/powerpoint/2010/main" val="3293987079"/>
+        <p14:creationId xmlns:p14="http://schemas.microsoft.com/office/powerpoint/2010/main" val="151308693"/>
       </p:ext>
     </p:extLst>
   </p:cSld>
@@ -1288,7 +1324,7 @@
           <a:p>
             <a:r>
               <a:rPr lang="en-US" dirty="0"/>
-              <a:t>We experimented with various machine learning algorithms like Naïve Bayes, Logistic Regression, Support Vector Machines, Recurrent Neural Networks, and Transformers.</a:t>
+              <a:t>Generating Synthetic Data</a:t>
             </a:r>
           </a:p>
         </p:txBody>
@@ -1311,7 +1347,7 @@
             <a:fld id="{AA4D7F38-9E4B-194A-AA5A-81BF138D29E9}" type="slidenum">
               <a:rPr lang="en-US" altLang="en-US" smtClean="0"/>
               <a:pPr/>
-              <a:t>16</a:t>
+              <a:t>12</a:t>
             </a:fld>
             <a:endParaRPr lang="en-US" altLang="en-US"/>
           </a:p>
@@ -1320,7 +1356,7 @@
     </p:spTree>
     <p:extLst>
       <p:ext uri="{BB962C8B-B14F-4D97-AF65-F5344CB8AC3E}">
-        <p14:creationId xmlns:p14="http://schemas.microsoft.com/office/powerpoint/2010/main" val="567488541"/>
+        <p14:creationId xmlns:p14="http://schemas.microsoft.com/office/powerpoint/2010/main" val="3028261521"/>
       </p:ext>
     </p:extLst>
   </p:cSld>
@@ -1376,7 +1412,7 @@
           <a:p>
             <a:r>
               <a:rPr lang="en-US" dirty="0"/>
-              <a:t>We present the results of our experiments, including any relevant figures or tables, discuss the implications of our results, and explain whether our results support our initial hypothesis. We present the results of our models. We achieved an accuracy rate over 50%, demonstrating the potential of machine learning in understanding public sentiment towards brands based on social media content.</a:t>
+              <a:t>We experimented with various machine learning algorithms like Naïve Bayes, Logistic Regression, Support Vector Machines, Recurrent Neural Networks, and Transformers.</a:t>
             </a:r>
           </a:p>
         </p:txBody>
@@ -1399,7 +1435,7 @@
             <a:fld id="{AA4D7F38-9E4B-194A-AA5A-81BF138D29E9}" type="slidenum">
               <a:rPr lang="en-US" altLang="en-US" smtClean="0"/>
               <a:pPr/>
-              <a:t>17</a:t>
+              <a:t>13</a:t>
             </a:fld>
             <a:endParaRPr lang="en-US" altLang="en-US"/>
           </a:p>
@@ -1408,7 +1444,7 @@
     </p:spTree>
     <p:extLst>
       <p:ext uri="{BB962C8B-B14F-4D97-AF65-F5344CB8AC3E}">
-        <p14:creationId xmlns:p14="http://schemas.microsoft.com/office/powerpoint/2010/main" val="2184831873"/>
+        <p14:creationId xmlns:p14="http://schemas.microsoft.com/office/powerpoint/2010/main" val="3596259610"/>
       </p:ext>
     </p:extLst>
   </p:cSld>
@@ -1464,7 +1500,7 @@
           <a:p>
             <a:r>
               <a:rPr lang="en-US" dirty="0"/>
-              <a:t>We faced challenges such as the 'aboutness' problem, which refers to the challenge of determining the subject of the sentiment expressed in a sentence. We also encountered issues with complex sentences and ambiguous subjects.</a:t>
+              <a:t>We experimented with various machine learning algorithms like Naïve Bayes, Logistic Regression, Support Vector Machines, Recurrent Neural Networks, and Transformers.</a:t>
             </a:r>
           </a:p>
         </p:txBody>
@@ -1487,7 +1523,7 @@
             <a:fld id="{AA4D7F38-9E4B-194A-AA5A-81BF138D29E9}" type="slidenum">
               <a:rPr lang="en-US" altLang="en-US" smtClean="0"/>
               <a:pPr/>
-              <a:t>18</a:t>
+              <a:t>14</a:t>
             </a:fld>
             <a:endParaRPr lang="en-US" altLang="en-US"/>
           </a:p>
@@ -1496,7 +1532,7 @@
     </p:spTree>
     <p:extLst>
       <p:ext uri="{BB962C8B-B14F-4D97-AF65-F5344CB8AC3E}">
-        <p14:creationId xmlns:p14="http://schemas.microsoft.com/office/powerpoint/2010/main" val="3478616541"/>
+        <p14:creationId xmlns:p14="http://schemas.microsoft.com/office/powerpoint/2010/main" val="974401036"/>
       </p:ext>
     </p:extLst>
   </p:cSld>
@@ -1550,26 +1586,9 @@
           <a:bodyPr/>
           <a:lstStyle/>
           <a:p>
-            <a:pPr marL="0" marR="0" lvl="0" indent="0" algn="l" defTabSz="914400" rtl="0" eaLnBrk="0" fontAlgn="base" latinLnBrk="0" hangingPunct="0">
-              <a:lnSpc>
-                <a:spcPct val="100000"/>
-              </a:lnSpc>
-              <a:spcBef>
-                <a:spcPct val="30000"/>
-              </a:spcBef>
-              <a:spcAft>
-                <a:spcPct val="0"/>
-              </a:spcAft>
-              <a:buClrTx/>
-              <a:buSzTx/>
-              <a:buFontTx/>
-              <a:buNone/>
-              <a:tabLst/>
-              <a:defRPr/>
-            </a:pPr>
             <a:r>
               <a:rPr lang="en-US" dirty="0"/>
-              <a:t>In the conclusion, we will summarize the main findings of our project, conclude the report by discussing the significance of our findings, and discuss potential future work, such as how our project could be extended or improved.</a:t>
+              <a:t>In the evaluation stage, we measured the models' ability to identify brands and predict sentiment in Twitter posts. We used standard classification metrics such as Accuracy, Precision, Recall, and F1 Score to evaluate the models.</a:t>
             </a:r>
           </a:p>
         </p:txBody>
@@ -1592,7 +1611,7 @@
             <a:fld id="{AA4D7F38-9E4B-194A-AA5A-81BF138D29E9}" type="slidenum">
               <a:rPr lang="en-US" altLang="en-US" smtClean="0"/>
               <a:pPr/>
-              <a:t>19</a:t>
+              <a:t>15</a:t>
             </a:fld>
             <a:endParaRPr lang="en-US" altLang="en-US"/>
           </a:p>
@@ -1601,7 +1620,7 @@
     </p:spTree>
     <p:extLst>
       <p:ext uri="{BB962C8B-B14F-4D97-AF65-F5344CB8AC3E}">
-        <p14:creationId xmlns:p14="http://schemas.microsoft.com/office/powerpoint/2010/main" val="4099420831"/>
+        <p14:creationId xmlns:p14="http://schemas.microsoft.com/office/powerpoint/2010/main" val="3293987079"/>
       </p:ext>
     </p:extLst>
   </p:cSld>
@@ -1655,36 +1674,10 @@
           <a:bodyPr/>
           <a:lstStyle/>
           <a:p>
-            <a:pPr marL="0" marR="0" lvl="0" indent="0" algn="l" defTabSz="914400" rtl="0" eaLnBrk="0" fontAlgn="base" latinLnBrk="0" hangingPunct="0">
-              <a:lnSpc>
-                <a:spcPct val="100000"/>
-              </a:lnSpc>
-              <a:spcBef>
-                <a:spcPct val="30000"/>
-              </a:spcBef>
-              <a:spcAft>
-                <a:spcPct val="0"/>
-              </a:spcAft>
-              <a:buClrTx/>
-              <a:buSzTx/>
-              <a:buFontTx/>
-              <a:buNone/>
-              <a:tabLst/>
-              <a:defRPr/>
-            </a:pPr>
-            <a:r>
-              <a:rPr lang="en-US" b="0" dirty="0">
-                <a:solidFill>
-                  <a:srgbClr val="CCCCCC"/>
-                </a:solidFill>
-                <a:effectLst/>
-                <a:latin typeface="Consolas" panose="020B0609020204030204" pitchFamily="49" charset="0"/>
-              </a:rPr>
-              <a:t>Future work would generalize the model to work with other kinds of social media posts like Reddit, Facebook, or Instagram. Additionally, a future model can be multimodal and accept video, image, or audio input to provide a more comprehensive sentiment analysis of social media posts.</a:t>
-            </a:r>
-          </a:p>
-          <a:p>
-            <a:endParaRPr lang="en-US" dirty="0"/>
+            <a:r>
+              <a:rPr lang="en-US" dirty="0"/>
+              <a:t>We experimented with various machine learning algorithms like Naïve Bayes, Logistic Regression, Support Vector Machines, Recurrent Neural Networks, and Transformers.</a:t>
+            </a:r>
           </a:p>
         </p:txBody>
       </p:sp>
@@ -1706,7 +1699,7 @@
             <a:fld id="{AA4D7F38-9E4B-194A-AA5A-81BF138D29E9}" type="slidenum">
               <a:rPr lang="en-US" altLang="en-US" smtClean="0"/>
               <a:pPr/>
-              <a:t>20</a:t>
+              <a:t>16</a:t>
             </a:fld>
             <a:endParaRPr lang="en-US" altLang="en-US"/>
           </a:p>
@@ -1715,7 +1708,7 @@
     </p:spTree>
     <p:extLst>
       <p:ext uri="{BB962C8B-B14F-4D97-AF65-F5344CB8AC3E}">
-        <p14:creationId xmlns:p14="http://schemas.microsoft.com/office/powerpoint/2010/main" val="2649913412"/>
+        <p14:creationId xmlns:p14="http://schemas.microsoft.com/office/powerpoint/2010/main" val="567488541"/>
       </p:ext>
     </p:extLst>
   </p:cSld>
@@ -1769,6 +1762,182 @@
           <a:bodyPr/>
           <a:lstStyle/>
           <a:p>
+            <a:r>
+              <a:rPr lang="en-US" dirty="0"/>
+              <a:t>We present the results of our experiments, including any relevant figures or tables, discuss the implications of our results, and explain whether our results support our initial hypothesis. We present the results of our models. We achieved an accuracy rate over 50%, demonstrating the potential of machine learning in understanding public sentiment towards brands based on social media content.</a:t>
+            </a:r>
+          </a:p>
+        </p:txBody>
+      </p:sp>
+      <p:sp>
+        <p:nvSpPr>
+          <p:cNvPr id="4" name="Slide Number Placeholder 3"/>
+          <p:cNvSpPr>
+            <a:spLocks noGrp="1"/>
+          </p:cNvSpPr>
+          <p:nvPr>
+            <p:ph type="sldNum" sz="quarter" idx="5"/>
+          </p:nvPr>
+        </p:nvSpPr>
+        <p:spPr/>
+        <p:txBody>
+          <a:bodyPr/>
+          <a:lstStyle/>
+          <a:p>
+            <a:fld id="{AA4D7F38-9E4B-194A-AA5A-81BF138D29E9}" type="slidenum">
+              <a:rPr lang="en-US" altLang="en-US" smtClean="0"/>
+              <a:pPr/>
+              <a:t>17</a:t>
+            </a:fld>
+            <a:endParaRPr lang="en-US" altLang="en-US"/>
+          </a:p>
+        </p:txBody>
+      </p:sp>
+    </p:spTree>
+    <p:extLst>
+      <p:ext uri="{BB962C8B-B14F-4D97-AF65-F5344CB8AC3E}">
+        <p14:creationId xmlns:p14="http://schemas.microsoft.com/office/powerpoint/2010/main" val="2184831873"/>
+      </p:ext>
+    </p:extLst>
+  </p:cSld>
+  <p:clrMapOvr>
+    <a:masterClrMapping/>
+  </p:clrMapOvr>
+</p:notes>
+</file>
+
+<file path=ppt/notesSlides/notesSlide18.xml><?xml version="1.0" encoding="utf-8"?>
+<p:notes xmlns:a="http://schemas.openxmlformats.org/drawingml/2006/main" xmlns:r="http://schemas.openxmlformats.org/officeDocument/2006/relationships" xmlns:p="http://schemas.openxmlformats.org/presentationml/2006/main">
+  <p:cSld>
+    <p:spTree>
+      <p:nvGrpSpPr>
+        <p:cNvPr id="1" name=""/>
+        <p:cNvGrpSpPr/>
+        <p:nvPr/>
+      </p:nvGrpSpPr>
+      <p:grpSpPr>
+        <a:xfrm>
+          <a:off x="0" y="0"/>
+          <a:ext cx="0" cy="0"/>
+          <a:chOff x="0" y="0"/>
+          <a:chExt cx="0" cy="0"/>
+        </a:xfrm>
+      </p:grpSpPr>
+      <p:sp>
+        <p:nvSpPr>
+          <p:cNvPr id="2" name="Slide Image Placeholder 1"/>
+          <p:cNvSpPr>
+            <a:spLocks noGrp="1" noRot="1" noChangeAspect="1"/>
+          </p:cNvSpPr>
+          <p:nvPr>
+            <p:ph type="sldImg"/>
+          </p:nvPr>
+        </p:nvSpPr>
+        <p:spPr/>
+      </p:sp>
+      <p:sp>
+        <p:nvSpPr>
+          <p:cNvPr id="3" name="Notes Placeholder 2"/>
+          <p:cNvSpPr>
+            <a:spLocks noGrp="1"/>
+          </p:cNvSpPr>
+          <p:nvPr>
+            <p:ph type="body" idx="1"/>
+          </p:nvPr>
+        </p:nvSpPr>
+        <p:spPr/>
+        <p:txBody>
+          <a:bodyPr/>
+          <a:lstStyle/>
+          <a:p>
+            <a:r>
+              <a:rPr lang="en-US" dirty="0"/>
+              <a:t>We faced challenges such as the 'aboutness' problem, which refers to the challenge of determining the subject of the sentiment expressed in a sentence. We also encountered issues with complex sentences and ambiguous subjects.</a:t>
+            </a:r>
+          </a:p>
+        </p:txBody>
+      </p:sp>
+      <p:sp>
+        <p:nvSpPr>
+          <p:cNvPr id="4" name="Slide Number Placeholder 3"/>
+          <p:cNvSpPr>
+            <a:spLocks noGrp="1"/>
+          </p:cNvSpPr>
+          <p:nvPr>
+            <p:ph type="sldNum" sz="quarter" idx="5"/>
+          </p:nvPr>
+        </p:nvSpPr>
+        <p:spPr/>
+        <p:txBody>
+          <a:bodyPr/>
+          <a:lstStyle/>
+          <a:p>
+            <a:fld id="{AA4D7F38-9E4B-194A-AA5A-81BF138D29E9}" type="slidenum">
+              <a:rPr lang="en-US" altLang="en-US" smtClean="0"/>
+              <a:pPr/>
+              <a:t>18</a:t>
+            </a:fld>
+            <a:endParaRPr lang="en-US" altLang="en-US"/>
+          </a:p>
+        </p:txBody>
+      </p:sp>
+    </p:spTree>
+    <p:extLst>
+      <p:ext uri="{BB962C8B-B14F-4D97-AF65-F5344CB8AC3E}">
+        <p14:creationId xmlns:p14="http://schemas.microsoft.com/office/powerpoint/2010/main" val="3478616541"/>
+      </p:ext>
+    </p:extLst>
+  </p:cSld>
+  <p:clrMapOvr>
+    <a:masterClrMapping/>
+  </p:clrMapOvr>
+</p:notes>
+</file>
+
+<file path=ppt/notesSlides/notesSlide19.xml><?xml version="1.0" encoding="utf-8"?>
+<p:notes xmlns:a="http://schemas.openxmlformats.org/drawingml/2006/main" xmlns:r="http://schemas.openxmlformats.org/officeDocument/2006/relationships" xmlns:p="http://schemas.openxmlformats.org/presentationml/2006/main">
+  <p:cSld>
+    <p:spTree>
+      <p:nvGrpSpPr>
+        <p:cNvPr id="1" name=""/>
+        <p:cNvGrpSpPr/>
+        <p:nvPr/>
+      </p:nvGrpSpPr>
+      <p:grpSpPr>
+        <a:xfrm>
+          <a:off x="0" y="0"/>
+          <a:ext cx="0" cy="0"/>
+          <a:chOff x="0" y="0"/>
+          <a:chExt cx="0" cy="0"/>
+        </a:xfrm>
+      </p:grpSpPr>
+      <p:sp>
+        <p:nvSpPr>
+          <p:cNvPr id="2" name="Slide Image Placeholder 1"/>
+          <p:cNvSpPr>
+            <a:spLocks noGrp="1" noRot="1" noChangeAspect="1"/>
+          </p:cNvSpPr>
+          <p:nvPr>
+            <p:ph type="sldImg"/>
+          </p:nvPr>
+        </p:nvSpPr>
+        <p:spPr/>
+      </p:sp>
+      <p:sp>
+        <p:nvSpPr>
+          <p:cNvPr id="3" name="Notes Placeholder 2"/>
+          <p:cNvSpPr>
+            <a:spLocks noGrp="1"/>
+          </p:cNvSpPr>
+          <p:nvPr>
+            <p:ph type="body" idx="1"/>
+          </p:nvPr>
+        </p:nvSpPr>
+        <p:spPr/>
+        <p:txBody>
+          <a:bodyPr/>
+          <a:lstStyle/>
+          <a:p>
             <a:pPr marL="0" marR="0" lvl="0" indent="0" algn="l" defTabSz="914400" rtl="0" eaLnBrk="0" fontAlgn="base" latinLnBrk="0" hangingPunct="0">
               <a:lnSpc>
                 <a:spcPct val="100000"/>
@@ -1788,71 +1957,7 @@
             </a:pPr>
             <a:r>
               <a:rPr lang="en-US" dirty="0"/>
-              <a:t>We would like to take a moment to express our deepest gratitude to those who have made this project possible. </a:t>
-            </a:r>
-            <a:r>
-              <a:rPr lang="en-US" b="0" dirty="0">
-                <a:solidFill>
-                  <a:srgbClr val="CE9178"/>
-                </a:solidFill>
-                <a:effectLst/>
-                <a:latin typeface="Consolas" panose="020B0609020204030204" pitchFamily="49" charset="0"/>
-              </a:rPr>
-              <a:t>We thank our advisor Dr. Van </a:t>
-            </a:r>
-            <a:r>
-              <a:rPr lang="en-US" b="0" dirty="0" err="1">
-                <a:solidFill>
-                  <a:srgbClr val="CE9178"/>
-                </a:solidFill>
-                <a:effectLst/>
-                <a:latin typeface="Consolas" panose="020B0609020204030204" pitchFamily="49" charset="0"/>
-              </a:rPr>
-              <a:t>Benschoten</a:t>
-            </a:r>
-            <a:r>
-              <a:rPr lang="en-US" b="0" dirty="0">
-                <a:solidFill>
-                  <a:srgbClr val="CE9178"/>
-                </a:solidFill>
-                <a:effectLst/>
-                <a:latin typeface="Consolas" panose="020B0609020204030204" pitchFamily="49" charset="0"/>
-              </a:rPr>
-              <a:t> for his invaluable guidance in this project. We also acknowledge Dr. </a:t>
-            </a:r>
-            <a:r>
-              <a:rPr lang="en-US" b="0" dirty="0" err="1">
-                <a:solidFill>
-                  <a:srgbClr val="CE9178"/>
-                </a:solidFill>
-                <a:effectLst/>
-                <a:latin typeface="Consolas" panose="020B0609020204030204" pitchFamily="49" charset="0"/>
-              </a:rPr>
-              <a:t>Tarshizi</a:t>
-            </a:r>
-            <a:r>
-              <a:rPr lang="en-US" b="0" dirty="0">
-                <a:solidFill>
-                  <a:srgbClr val="CE9178"/>
-                </a:solidFill>
-                <a:effectLst/>
-                <a:latin typeface="Consolas" panose="020B0609020204030204" pitchFamily="49" charset="0"/>
-              </a:rPr>
-              <a:t> for directing the Applied Artificial Intelligence program at the University of San Diego.</a:t>
-            </a:r>
-            <a:r>
-              <a:rPr lang="en-US" b="0" dirty="0">
-                <a:solidFill>
-                  <a:srgbClr val="D4D4D4"/>
-                </a:solidFill>
-                <a:effectLst/>
-                <a:latin typeface="Consolas" panose="020B0609020204030204" pitchFamily="49" charset="0"/>
-              </a:rPr>
-              <a:t> W</a:t>
-            </a:r>
-            <a:r>
-              <a:rPr lang="en-US" dirty="0"/>
-              <a:t>e are truly grateful for both of your support.</a:t>
+              <a:t>In the conclusion, we will summarize the main findings of our project, conclude the report by discussing the significance of our findings, and discuss potential future work, such as how our project could be extended or improved.</a:t>
             </a:r>
           </a:p>
         </p:txBody>
@@ -1875,7 +1980,7 @@
             <a:fld id="{AA4D7F38-9E4B-194A-AA5A-81BF138D29E9}" type="slidenum">
               <a:rPr lang="en-US" altLang="en-US" smtClean="0"/>
               <a:pPr/>
-              <a:t>21</a:t>
+              <a:t>19</a:t>
             </a:fld>
             <a:endParaRPr lang="en-US" altLang="en-US"/>
           </a:p>
@@ -1884,7 +1989,7 @@
     </p:spTree>
     <p:extLst>
       <p:ext uri="{BB962C8B-B14F-4D97-AF65-F5344CB8AC3E}">
-        <p14:creationId xmlns:p14="http://schemas.microsoft.com/office/powerpoint/2010/main" val="3727174744"/>
+        <p14:creationId xmlns:p14="http://schemas.microsoft.com/office/powerpoint/2010/main" val="4099420831"/>
       </p:ext>
     </p:extLst>
   </p:cSld>
@@ -1939,7 +2044,7 @@
           <a:lstStyle/>
           <a:p>
             <a:r>
-              <a:rPr lang="en-US" b="0" i="0">
+              <a:rPr lang="en-US" b="0" i="0" dirty="0">
                 <a:solidFill>
                   <a:srgbClr val="1C1917"/>
                 </a:solidFill>
@@ -1980,6 +2085,289 @@
     <p:extLst>
       <p:ext uri="{BB962C8B-B14F-4D97-AF65-F5344CB8AC3E}">
         <p14:creationId xmlns:p14="http://schemas.microsoft.com/office/powerpoint/2010/main" val="663246818"/>
+      </p:ext>
+    </p:extLst>
+  </p:cSld>
+  <p:clrMapOvr>
+    <a:masterClrMapping/>
+  </p:clrMapOvr>
+</p:notes>
+</file>
+
+<file path=ppt/notesSlides/notesSlide20.xml><?xml version="1.0" encoding="utf-8"?>
+<p:notes xmlns:a="http://schemas.openxmlformats.org/drawingml/2006/main" xmlns:r="http://schemas.openxmlformats.org/officeDocument/2006/relationships" xmlns:p="http://schemas.openxmlformats.org/presentationml/2006/main">
+  <p:cSld>
+    <p:spTree>
+      <p:nvGrpSpPr>
+        <p:cNvPr id="1" name=""/>
+        <p:cNvGrpSpPr/>
+        <p:nvPr/>
+      </p:nvGrpSpPr>
+      <p:grpSpPr>
+        <a:xfrm>
+          <a:off x="0" y="0"/>
+          <a:ext cx="0" cy="0"/>
+          <a:chOff x="0" y="0"/>
+          <a:chExt cx="0" cy="0"/>
+        </a:xfrm>
+      </p:grpSpPr>
+      <p:sp>
+        <p:nvSpPr>
+          <p:cNvPr id="2" name="Slide Image Placeholder 1"/>
+          <p:cNvSpPr>
+            <a:spLocks noGrp="1" noRot="1" noChangeAspect="1"/>
+          </p:cNvSpPr>
+          <p:nvPr>
+            <p:ph type="sldImg"/>
+          </p:nvPr>
+        </p:nvSpPr>
+        <p:spPr/>
+      </p:sp>
+      <p:sp>
+        <p:nvSpPr>
+          <p:cNvPr id="3" name="Notes Placeholder 2"/>
+          <p:cNvSpPr>
+            <a:spLocks noGrp="1"/>
+          </p:cNvSpPr>
+          <p:nvPr>
+            <p:ph type="body" idx="1"/>
+          </p:nvPr>
+        </p:nvSpPr>
+        <p:spPr/>
+        <p:txBody>
+          <a:bodyPr/>
+          <a:lstStyle/>
+          <a:p>
+            <a:pPr marL="0" marR="0" lvl="0" indent="0" algn="l" defTabSz="914400" rtl="0" eaLnBrk="0" fontAlgn="base" latinLnBrk="0" hangingPunct="0">
+              <a:lnSpc>
+                <a:spcPct val="100000"/>
+              </a:lnSpc>
+              <a:spcBef>
+                <a:spcPct val="30000"/>
+              </a:spcBef>
+              <a:spcAft>
+                <a:spcPct val="0"/>
+              </a:spcAft>
+              <a:buClrTx/>
+              <a:buSzTx/>
+              <a:buFontTx/>
+              <a:buNone/>
+              <a:tabLst/>
+              <a:defRPr/>
+            </a:pPr>
+            <a:r>
+              <a:rPr lang="en-US" b="0" dirty="0">
+                <a:solidFill>
+                  <a:srgbClr val="CCCCCC"/>
+                </a:solidFill>
+                <a:effectLst/>
+                <a:latin typeface="Consolas" panose="020B0609020204030204" pitchFamily="49" charset="0"/>
+              </a:rPr>
+              <a:t>Future work would generalize the model to work with other kinds of social media posts like Reddit, Facebook, or Instagram. Additionally, a future model can be multimodal and accept video, image, or audio input to provide a more comprehensive sentiment analysis of social media posts.</a:t>
+            </a:r>
+          </a:p>
+          <a:p>
+            <a:endParaRPr lang="en-US" dirty="0"/>
+          </a:p>
+        </p:txBody>
+      </p:sp>
+      <p:sp>
+        <p:nvSpPr>
+          <p:cNvPr id="4" name="Slide Number Placeholder 3"/>
+          <p:cNvSpPr>
+            <a:spLocks noGrp="1"/>
+          </p:cNvSpPr>
+          <p:nvPr>
+            <p:ph type="sldNum" sz="quarter" idx="5"/>
+          </p:nvPr>
+        </p:nvSpPr>
+        <p:spPr/>
+        <p:txBody>
+          <a:bodyPr/>
+          <a:lstStyle/>
+          <a:p>
+            <a:fld id="{AA4D7F38-9E4B-194A-AA5A-81BF138D29E9}" type="slidenum">
+              <a:rPr lang="en-US" altLang="en-US" smtClean="0"/>
+              <a:pPr/>
+              <a:t>20</a:t>
+            </a:fld>
+            <a:endParaRPr lang="en-US" altLang="en-US"/>
+          </a:p>
+        </p:txBody>
+      </p:sp>
+    </p:spTree>
+    <p:extLst>
+      <p:ext uri="{BB962C8B-B14F-4D97-AF65-F5344CB8AC3E}">
+        <p14:creationId xmlns:p14="http://schemas.microsoft.com/office/powerpoint/2010/main" val="2649913412"/>
+      </p:ext>
+    </p:extLst>
+  </p:cSld>
+  <p:clrMapOvr>
+    <a:masterClrMapping/>
+  </p:clrMapOvr>
+</p:notes>
+</file>
+
+<file path=ppt/notesSlides/notesSlide21.xml><?xml version="1.0" encoding="utf-8"?>
+<p:notes xmlns:a="http://schemas.openxmlformats.org/drawingml/2006/main" xmlns:r="http://schemas.openxmlformats.org/officeDocument/2006/relationships" xmlns:p="http://schemas.openxmlformats.org/presentationml/2006/main">
+  <p:cSld>
+    <p:spTree>
+      <p:nvGrpSpPr>
+        <p:cNvPr id="1" name=""/>
+        <p:cNvGrpSpPr/>
+        <p:nvPr/>
+      </p:nvGrpSpPr>
+      <p:grpSpPr>
+        <a:xfrm>
+          <a:off x="0" y="0"/>
+          <a:ext cx="0" cy="0"/>
+          <a:chOff x="0" y="0"/>
+          <a:chExt cx="0" cy="0"/>
+        </a:xfrm>
+      </p:grpSpPr>
+      <p:sp>
+        <p:nvSpPr>
+          <p:cNvPr id="2" name="Slide Image Placeholder 1"/>
+          <p:cNvSpPr>
+            <a:spLocks noGrp="1" noRot="1" noChangeAspect="1"/>
+          </p:cNvSpPr>
+          <p:nvPr>
+            <p:ph type="sldImg"/>
+          </p:nvPr>
+        </p:nvSpPr>
+        <p:spPr/>
+      </p:sp>
+      <p:sp>
+        <p:nvSpPr>
+          <p:cNvPr id="3" name="Notes Placeholder 2"/>
+          <p:cNvSpPr>
+            <a:spLocks noGrp="1"/>
+          </p:cNvSpPr>
+          <p:nvPr>
+            <p:ph type="body" idx="1"/>
+          </p:nvPr>
+        </p:nvSpPr>
+        <p:spPr/>
+        <p:txBody>
+          <a:bodyPr/>
+          <a:lstStyle/>
+          <a:p>
+            <a:pPr marL="0" marR="0" lvl="0" indent="0" algn="l" defTabSz="914400" rtl="0" eaLnBrk="0" fontAlgn="base" latinLnBrk="0" hangingPunct="0">
+              <a:lnSpc>
+                <a:spcPct val="100000"/>
+              </a:lnSpc>
+              <a:spcBef>
+                <a:spcPct val="30000"/>
+              </a:spcBef>
+              <a:spcAft>
+                <a:spcPct val="0"/>
+              </a:spcAft>
+              <a:buClrTx/>
+              <a:buSzTx/>
+              <a:buFontTx/>
+              <a:buNone/>
+              <a:tabLst/>
+              <a:defRPr/>
+            </a:pPr>
+            <a:r>
+              <a:rPr lang="en-US" dirty="0"/>
+              <a:t>We would like to take a moment to express our deepest gratitude to those who have made this project possible. </a:t>
+            </a:r>
+            <a:r>
+              <a:rPr lang="en-US" b="0" dirty="0">
+                <a:solidFill>
+                  <a:srgbClr val="CE9178"/>
+                </a:solidFill>
+                <a:effectLst/>
+                <a:latin typeface="Consolas" panose="020B0609020204030204" pitchFamily="49" charset="0"/>
+              </a:rPr>
+              <a:t>We thank our advisor Dr. Van </a:t>
+            </a:r>
+            <a:r>
+              <a:rPr lang="en-US" b="0" dirty="0" err="1">
+                <a:solidFill>
+                  <a:srgbClr val="CE9178"/>
+                </a:solidFill>
+                <a:effectLst/>
+                <a:latin typeface="Consolas" panose="020B0609020204030204" pitchFamily="49" charset="0"/>
+              </a:rPr>
+              <a:t>Benschoten</a:t>
+            </a:r>
+            <a:r>
+              <a:rPr lang="en-US" b="0" dirty="0">
+                <a:solidFill>
+                  <a:srgbClr val="CE9178"/>
+                </a:solidFill>
+                <a:effectLst/>
+                <a:latin typeface="Consolas" panose="020B0609020204030204" pitchFamily="49" charset="0"/>
+              </a:rPr>
+              <a:t> for his invaluable guidance in this project. We also acknowledge Dr. </a:t>
+            </a:r>
+            <a:r>
+              <a:rPr lang="en-US" b="0" dirty="0" err="1">
+                <a:solidFill>
+                  <a:srgbClr val="CE9178"/>
+                </a:solidFill>
+                <a:effectLst/>
+                <a:latin typeface="Consolas" panose="020B0609020204030204" pitchFamily="49" charset="0"/>
+              </a:rPr>
+              <a:t>Tarshizi</a:t>
+            </a:r>
+            <a:r>
+              <a:rPr lang="en-US" b="0" dirty="0">
+                <a:solidFill>
+                  <a:srgbClr val="CE9178"/>
+                </a:solidFill>
+                <a:effectLst/>
+                <a:latin typeface="Consolas" panose="020B0609020204030204" pitchFamily="49" charset="0"/>
+              </a:rPr>
+              <a:t> for directing the Applied Artificial Intelligence program at the University of San Diego.</a:t>
+            </a:r>
+            <a:r>
+              <a:rPr lang="en-US" b="0" dirty="0">
+                <a:solidFill>
+                  <a:srgbClr val="D4D4D4"/>
+                </a:solidFill>
+                <a:effectLst/>
+                <a:latin typeface="Consolas" panose="020B0609020204030204" pitchFamily="49" charset="0"/>
+              </a:rPr>
+              <a:t> W</a:t>
+            </a:r>
+            <a:r>
+              <a:rPr lang="en-US" dirty="0"/>
+              <a:t>e are truly grateful for both of your support.</a:t>
+            </a:r>
+          </a:p>
+        </p:txBody>
+      </p:sp>
+      <p:sp>
+        <p:nvSpPr>
+          <p:cNvPr id="4" name="Slide Number Placeholder 3"/>
+          <p:cNvSpPr>
+            <a:spLocks noGrp="1"/>
+          </p:cNvSpPr>
+          <p:nvPr>
+            <p:ph type="sldNum" sz="quarter" idx="5"/>
+          </p:nvPr>
+        </p:nvSpPr>
+        <p:spPr/>
+        <p:txBody>
+          <a:bodyPr/>
+          <a:lstStyle/>
+          <a:p>
+            <a:fld id="{AA4D7F38-9E4B-194A-AA5A-81BF138D29E9}" type="slidenum">
+              <a:rPr lang="en-US" altLang="en-US" smtClean="0"/>
+              <a:pPr/>
+              <a:t>21</a:t>
+            </a:fld>
+            <a:endParaRPr lang="en-US" altLang="en-US"/>
+          </a:p>
+        </p:txBody>
+      </p:sp>
+    </p:spTree>
+    <p:extLst>
+      <p:ext uri="{BB962C8B-B14F-4D97-AF65-F5344CB8AC3E}">
+        <p14:creationId xmlns:p14="http://schemas.microsoft.com/office/powerpoint/2010/main" val="3727174744"/>
       </p:ext>
     </p:extLst>
   </p:cSld>
@@ -2616,7 +3004,7 @@
           <a:p>
             <a:r>
               <a:rPr lang="en-US" dirty="0"/>
-              <a:t>In the development stage, we handled invalid values and discarded non-textual content. We trained our models to identify a brand and align with the sentiment expressed in a tweet, and then tuned them to improve performance.</a:t>
+              <a:t>Exploratory Data Analysis</a:t>
             </a:r>
           </a:p>
         </p:txBody>
@@ -2639,7 +3027,7 @@
             <a:fld id="{AA4D7F38-9E4B-194A-AA5A-81BF138D29E9}" type="slidenum">
               <a:rPr lang="en-US" altLang="en-US" smtClean="0"/>
               <a:pPr/>
-              <a:t>11</a:t>
+              <a:t>8</a:t>
             </a:fld>
             <a:endParaRPr lang="en-US" altLang="en-US"/>
           </a:p>
@@ -2648,7 +3036,7 @@
     </p:spTree>
     <p:extLst>
       <p:ext uri="{BB962C8B-B14F-4D97-AF65-F5344CB8AC3E}">
-        <p14:creationId xmlns:p14="http://schemas.microsoft.com/office/powerpoint/2010/main" val="151308693"/>
+        <p14:creationId xmlns:p14="http://schemas.microsoft.com/office/powerpoint/2010/main" val="10346999"/>
       </p:ext>
     </p:extLst>
   </p:cSld>
@@ -2704,7 +3092,7 @@
           <a:p>
             <a:r>
               <a:rPr lang="en-US" dirty="0"/>
-              <a:t>We experimented with various machine learning algorithms like Naïve Bayes, Logistic Regression, Support Vector Machines, Recurrent Neural Networks, and Transformers.</a:t>
+              <a:t>Preprocessing - NLP</a:t>
             </a:r>
           </a:p>
         </p:txBody>
@@ -2727,7 +3115,7 @@
             <a:fld id="{AA4D7F38-9E4B-194A-AA5A-81BF138D29E9}" type="slidenum">
               <a:rPr lang="en-US" altLang="en-US" smtClean="0"/>
               <a:pPr/>
-              <a:t>13</a:t>
+              <a:t>9</a:t>
             </a:fld>
             <a:endParaRPr lang="en-US" altLang="en-US"/>
           </a:p>
@@ -2736,7 +3124,7 @@
     </p:spTree>
     <p:extLst>
       <p:ext uri="{BB962C8B-B14F-4D97-AF65-F5344CB8AC3E}">
-        <p14:creationId xmlns:p14="http://schemas.microsoft.com/office/powerpoint/2010/main" val="3596259610"/>
+        <p14:creationId xmlns:p14="http://schemas.microsoft.com/office/powerpoint/2010/main" val="3478454173"/>
       </p:ext>
     </p:extLst>
   </p:cSld>
@@ -2817,7 +3205,7 @@
             <a:fld id="{60E4B0F9-A7FB-5046-8EA1-145E13C1BB14}" type="datetimeFigureOut">
               <a:rPr lang="en-US" altLang="en-US"/>
               <a:pPr/>
-              <a:t>8/10/2023</a:t>
+              <a:t>8/11/2023</a:t>
             </a:fld>
             <a:endParaRPr lang="en-US" altLang="en-US"/>
           </a:p>
@@ -3009,7 +3397,7 @@
             <a:fld id="{9461B8EA-79DB-F845-97F0-24C5A509848C}" type="datetimeFigureOut">
               <a:rPr lang="en-US" altLang="en-US"/>
               <a:pPr/>
-              <a:t>8/10/2023</a:t>
+              <a:t>8/11/2023</a:t>
             </a:fld>
             <a:endParaRPr lang="en-US" altLang="en-US"/>
           </a:p>
@@ -3550,7 +3938,7 @@
             <a:fld id="{51040245-401E-DC4F-B046-F0C79A3107CA}" type="datetimeFigureOut">
               <a:rPr lang="en-US" altLang="en-US"/>
               <a:pPr/>
-              <a:t>8/10/2023</a:t>
+              <a:t>8/11/2023</a:t>
             </a:fld>
             <a:endParaRPr lang="en-US" altLang="en-US"/>
           </a:p>
@@ -3662,7 +4050,7 @@
             <a:fld id="{B8E3EDF6-D7E0-BF42-B0B6-A092B242026B}" type="datetimeFigureOut">
               <a:rPr lang="en-US" altLang="en-US"/>
               <a:pPr/>
-              <a:t>8/10/2023</a:t>
+              <a:t>8/11/2023</a:t>
             </a:fld>
             <a:endParaRPr lang="en-US" altLang="en-US"/>
           </a:p>
@@ -3787,7 +4175,7 @@
           <a:effectLst/>
           <a:extLst>
             <a:ext uri="{AF507438-7753-43e0-B8FC-AC1667EBCBE1}">
-              <a14:hiddenEffects xmlns:a14="http://schemas.microsoft.com/office/drawing/2010/main" xmlns="">
+              <a14:hiddenEffects xmlns="" xmlns:a14="http://schemas.microsoft.com/office/drawing/2010/main">
                 <a:effectLst>
                   <a:outerShdw blurRad="63500" dist="38099" dir="2700000" algn="ctr" rotWithShape="0">
                     <a:schemeClr val="bg2">
@@ -3909,7 +4297,7 @@
               </a14:hiddenLine>
             </a:ext>
             <a:ext uri="{FAA26D3D-D897-4be2-8F04-BA451C77F1D7}">
-              <ma14:placeholderFlag xmlns="" xmlns:ma14="http://schemas.microsoft.com/office/mac/drawingml/2011/main" val="1"/>
+              <ma14:placeholderFlag xmlns:ma14="http://schemas.microsoft.com/office/mac/drawingml/2011/main" xmlns="" val="1"/>
             </a:ext>
           </a:extLst>
         </p:spPr>
@@ -3998,7 +4386,7 @@
               </a14:hiddenLine>
             </a:ext>
             <a:ext uri="{FAA26D3D-D897-4be2-8F04-BA451C77F1D7}">
-              <ma14:placeholderFlag xmlns="" xmlns:ma14="http://schemas.microsoft.com/office/mac/drawingml/2011/main" val="1"/>
+              <ma14:placeholderFlag xmlns:ma14="http://schemas.microsoft.com/office/mac/drawingml/2011/main" xmlns="" val="1"/>
             </a:ext>
           </a:extLst>
         </p:spPr>
@@ -4057,7 +4445,7 @@
             <a:fld id="{482C3D94-7C5D-0846-984C-DFD8ACC0A135}" type="datetimeFigureOut">
               <a:rPr lang="en-US" altLang="en-US"/>
               <a:pPr/>
-              <a:t>8/10/2023</a:t>
+              <a:t>8/11/2023</a:t>
             </a:fld>
             <a:endParaRPr lang="en-US" altLang="en-US"/>
           </a:p>
@@ -7018,7 +7406,7 @@
         <a:effectLst/>
         <a:extLst>
           <a:ext uri="{AF507438-7753-43e0-B8FC-AC1667EBCBE1}">
-            <a14:hiddenEffects xmlns:a14="http://schemas.microsoft.com/office/drawing/2010/main" xmlns="">
+            <a14:hiddenEffects xmlns="" xmlns:a14="http://schemas.microsoft.com/office/drawing/2010/main">
               <a:effectLst>
                 <a:outerShdw blurRad="63500" dist="38099" dir="2700000" algn="ctr" rotWithShape="0">
                   <a:schemeClr val="bg2">
@@ -7095,7 +7483,7 @@
         <a:effectLst/>
         <a:extLst>
           <a:ext uri="{AF507438-7753-43e0-B8FC-AC1667EBCBE1}">
-            <a14:hiddenEffects xmlns:a14="http://schemas.microsoft.com/office/drawing/2010/main" xmlns="">
+            <a14:hiddenEffects xmlns="" xmlns:a14="http://schemas.microsoft.com/office/drawing/2010/main">
               <a:effectLst>
                 <a:outerShdw blurRad="63500" dist="38099" dir="2700000" algn="ctr" rotWithShape="0">
                   <a:schemeClr val="bg2">

</xml_diff>

<commit_message>
getting duration of current working PPTX
</commit_message>
<xml_diff>
--- a/Final-Project-Team-2.pptx
+++ b/Final-Project-Team-2.pptx
@@ -5,17 +5,17 @@
     <p:sldMasterId id="2147483648" r:id="rId1"/>
   </p:sldMasterIdLst>
   <p:notesMasterIdLst>
-    <p:notesMasterId r:id="rId29"/>
+    <p:notesMasterId r:id="rId28"/>
   </p:notesMasterIdLst>
   <p:sldIdLst>
     <p:sldId id="256" r:id="rId2"/>
     <p:sldId id="257" r:id="rId3"/>
     <p:sldId id="283" r:id="rId4"/>
-    <p:sldId id="284" r:id="rId5"/>
-    <p:sldId id="285" r:id="rId6"/>
-    <p:sldId id="286" r:id="rId7"/>
-    <p:sldId id="258" r:id="rId8"/>
-    <p:sldId id="259" r:id="rId9"/>
+    <p:sldId id="259" r:id="rId5"/>
+    <p:sldId id="284" r:id="rId6"/>
+    <p:sldId id="258" r:id="rId7"/>
+    <p:sldId id="285" r:id="rId8"/>
+    <p:sldId id="286" r:id="rId9"/>
     <p:sldId id="260" r:id="rId10"/>
     <p:sldId id="261" r:id="rId11"/>
     <p:sldId id="278" r:id="rId12"/>
@@ -31,10 +31,9 @@
     <p:sldId id="271" r:id="rId22"/>
     <p:sldId id="272" r:id="rId23"/>
     <p:sldId id="273" r:id="rId24"/>
-    <p:sldId id="274" r:id="rId25"/>
-    <p:sldId id="275" r:id="rId26"/>
-    <p:sldId id="281" r:id="rId27"/>
-    <p:sldId id="276" r:id="rId28"/>
+    <p:sldId id="275" r:id="rId25"/>
+    <p:sldId id="274" r:id="rId26"/>
+    <p:sldId id="276" r:id="rId27"/>
   </p:sldIdLst>
   <p:sldSz cx="12192000" cy="6858000"/>
   <p:notesSz cx="6858000" cy="9144000"/>
@@ -283,19 +282,69 @@
       </p15:sldGuideLst>
     </p:ext>
     <p:ext uri="GoogleSlidesCustomDataVersion2">
-      <go:slidesCustomData xmlns="" xmlns:mc="http://schemas.openxmlformats.org/markup-compatibility/2006" xmlns:mv="urn:schemas-microsoft-com:mac:vml" xmlns:c="http://schemas.openxmlformats.org/drawingml/2006/chart" xmlns:dgm="http://schemas.openxmlformats.org/drawingml/2006/diagram" xmlns:o="urn:schemas-microsoft-com:office:office" xmlns:v="urn:schemas-microsoft-com:vml" xmlns:pvml="urn:schemas-microsoft-com:office:powerpoint" xmlns:com="http://schemas.openxmlformats.org/drawingml/2006/compatibility" xmlns:p14="http://schemas.microsoft.com/office/powerpoint/2010/main" xmlns:p15="http://schemas.microsoft.com/office/powerpoint/2012/main" xmlns:ahyp="http://schemas.microsoft.com/office/drawing/2018/hyperlinkcolor" xmlns:go="http://customooxmlschemas.google.com/" r:id="rId30" roundtripDataSignature="AMtx7mg21pheX7b66ozkCnuoWWKRsIE9AA=="/>
+      <go:slidesCustomData xmlns:go="http://customooxmlschemas.google.com/" xmlns:ahyp="http://schemas.microsoft.com/office/drawing/2018/hyperlinkcolor" xmlns:p15="http://schemas.microsoft.com/office/powerpoint/2012/main" xmlns:p14="http://schemas.microsoft.com/office/powerpoint/2010/main" xmlns:com="http://schemas.openxmlformats.org/drawingml/2006/compatibility" xmlns:pvml="urn:schemas-microsoft-com:office:powerpoint" xmlns:v="urn:schemas-microsoft-com:vml" xmlns:o="urn:schemas-microsoft-com:office:office" xmlns:dgm="http://schemas.openxmlformats.org/drawingml/2006/diagram" xmlns:c="http://schemas.openxmlformats.org/drawingml/2006/chart" xmlns:mv="urn:schemas-microsoft-com:mac:vml" xmlns:mc="http://schemas.openxmlformats.org/markup-compatibility/2006" xmlns="" r:id="rId30" roundtripDataSignature="AMtx7mg21pheX7b66ozkCnuoWWKRsIE9AA=="/>
     </p:ext>
   </p:extLst>
 </p:presentation>
 </file>
 
-<file path=ppt/revisionInfo.xml><?xml version="1.0" encoding="utf-8"?>
-<p1510:revInfo xmlns:a="http://schemas.openxmlformats.org/drawingml/2006/main" xmlns:r="http://schemas.openxmlformats.org/officeDocument/2006/relationships" xmlns:p1510="http://schemas.microsoft.com/office/powerpoint/2015/10/main">
-  <p1510:revLst>
-    <p1510:client id="{31B385D4-704F-4CDE-9965-F835540463D3}" v="3" dt="2023-08-14T01:53:14.022"/>
-    <p1510:client id="{74859441-2C1F-467C-9E9C-356303501E14}" v="889" dt="2023-08-14T05:32:31.124"/>
-  </p1510:revLst>
-</p1510:revInfo>
+<file path=ppt/changesInfos/changesInfo1.xml><?xml version="1.0" encoding="utf-8"?>
+<pc:chgInfo xmlns:a="http://schemas.openxmlformats.org/drawingml/2006/main" xmlns:r="http://schemas.openxmlformats.org/officeDocument/2006/relationships" xmlns:ac="http://schemas.microsoft.com/office/drawing/2013/main/command" xmlns:pc="http://schemas.microsoft.com/office/powerpoint/2013/main/command">
+  <pc:docChgLst>
+    <pc:chgData name="John D" userId="1cefe769efc9e99e" providerId="LiveId" clId="{93D8348B-0139-4A67-9220-DB379244354A}"/>
+    <pc:docChg chg="undo custSel modSld">
+      <pc:chgData name="John D" userId="1cefe769efc9e99e" providerId="LiveId" clId="{93D8348B-0139-4A67-9220-DB379244354A}" dt="2023-08-14T07:32:40.235" v="24" actId="5793"/>
+      <pc:docMkLst>
+        <pc:docMk/>
+      </pc:docMkLst>
+      <pc:sldChg chg="modSp mod">
+        <pc:chgData name="John D" userId="1cefe769efc9e99e" providerId="LiveId" clId="{93D8348B-0139-4A67-9220-DB379244354A}" dt="2023-08-14T07:32:25.647" v="19" actId="5793"/>
+        <pc:sldMkLst>
+          <pc:docMk/>
+          <pc:sldMk cId="0" sldId="258"/>
+        </pc:sldMkLst>
+        <pc:spChg chg="mod">
+          <ac:chgData name="John D" userId="1cefe769efc9e99e" providerId="LiveId" clId="{93D8348B-0139-4A67-9220-DB379244354A}" dt="2023-08-14T07:32:25.647" v="19" actId="5793"/>
+          <ac:spMkLst>
+            <pc:docMk/>
+            <pc:sldMk cId="0" sldId="258"/>
+            <ac:spMk id="63" creationId="{00000000-0000-0000-0000-000000000000}"/>
+          </ac:spMkLst>
+        </pc:spChg>
+      </pc:sldChg>
+      <pc:sldChg chg="modSp mod">
+        <pc:chgData name="John D" userId="1cefe769efc9e99e" providerId="LiveId" clId="{93D8348B-0139-4A67-9220-DB379244354A}" dt="2023-08-14T07:32:16.826" v="16" actId="122"/>
+        <pc:sldMkLst>
+          <pc:docMk/>
+          <pc:sldMk cId="1726448529" sldId="284"/>
+        </pc:sldMkLst>
+        <pc:spChg chg="mod">
+          <ac:chgData name="John D" userId="1cefe769efc9e99e" providerId="LiveId" clId="{93D8348B-0139-4A67-9220-DB379244354A}" dt="2023-08-14T07:32:16.826" v="16" actId="122"/>
+          <ac:spMkLst>
+            <pc:docMk/>
+            <pc:sldMk cId="1726448529" sldId="284"/>
+            <ac:spMk id="3" creationId="{5A541EC2-4F39-92E6-17F1-D59164595624}"/>
+          </ac:spMkLst>
+        </pc:spChg>
+      </pc:sldChg>
+      <pc:sldChg chg="modSp mod">
+        <pc:chgData name="John D" userId="1cefe769efc9e99e" providerId="LiveId" clId="{93D8348B-0139-4A67-9220-DB379244354A}" dt="2023-08-14T07:32:40.235" v="24" actId="5793"/>
+        <pc:sldMkLst>
+          <pc:docMk/>
+          <pc:sldMk cId="1254571953" sldId="285"/>
+        </pc:sldMkLst>
+        <pc:spChg chg="mod">
+          <ac:chgData name="John D" userId="1cefe769efc9e99e" providerId="LiveId" clId="{93D8348B-0139-4A67-9220-DB379244354A}" dt="2023-08-14T07:32:40.235" v="24" actId="5793"/>
+          <ac:spMkLst>
+            <pc:docMk/>
+            <pc:sldMk cId="1254571953" sldId="285"/>
+            <ac:spMk id="3" creationId="{5A541EC2-4F39-92E6-17F1-D59164595624}"/>
+          </ac:spMkLst>
+        </pc:spChg>
+      </pc:sldChg>
+    </pc:docChg>
+  </pc:docChgLst>
+</pc:chgInfo>
 </file>
 
 <file path=ppt/notesMasters/notesMaster1.xml><?xml version="1.0" encoding="utf-8"?>
@@ -1598,14 +1647,14 @@
               <a:buNone/>
             </a:pPr>
             <a:r>
-              <a:rPr lang="en-US"/>
+              <a:rPr lang="en-US" dirty="0"/>
               <a:t>Let’s get started. Welcome to our project titled, </a:t>
             </a:r>
             <a:r>
-              <a:rPr lang="en-US" sz="1200"/>
+              <a:rPr lang="en-US" sz="1200" dirty="0"/>
               <a:t>Brand Sentiment Analysis of Twitter Posts.</a:t>
             </a:r>
-            <a:endParaRPr/>
+            <a:endParaRPr dirty="0"/>
           </a:p>
         </p:txBody>
       </p:sp>
@@ -1875,15 +1924,22 @@
           <a:bodyPr/>
           <a:lstStyle/>
           <a:p>
-            <a:pPr>
-              <a:spcBef>
-                <a:spcPts val="0"/>
-              </a:spcBef>
-            </a:pPr>
             <a:r>
               <a:rPr lang="en-US"/>
               <a:t>In the assess stage, we analyzed the dataset and selected appropriate models based on the specific requirements of the sentiment analysis task, the characteristics of the available data, and the nature of the problem.</a:t>
             </a:r>
+            <a:r>
+              <a:rPr lang="en-US" dirty="0"/>
+              <a:t> The assessment stage of the project involves dataset analysis, model selection, and preliminary testing. This phase sets the foundation for subsequent stages by determining the most suitable models for sentiment analysis and brand identification. The project starts with an in-depth analysis of the Sentiment140 dataset. This dataset contains labeled tweets with sentiment polarity. The sentiment labels are remapped to binary values (0 for negative and 1 for positive) to simplify interpretation and analysis.</a:t>
+            </a:r>
+          </a:p>
+          <a:p>
+            <a:pPr>
+              <a:spcBef>
+                <a:spcPts val="0"/>
+              </a:spcBef>
+            </a:pPr>
+            <a:endParaRPr lang="en-US"/>
           </a:p>
           <a:p>
             <a:endParaRPr lang="en-US">
@@ -3351,7 +3407,15 @@
             </a:pPr>
             <a:r>
               <a:rPr lang="en-US"/>
-              <a:t>In today's contemporary business landscape, companies increasingly use social media to monitor their brands. This digital revolution has opened up a wealth of data, providing businesses with unprecedented access to consumer behavior, preferences, and trends. By harnessing the power of social media, businesses can gain a deeper understanding of their market performance and make data-driven decisions. Machine Learning, or ML, has emerged as a powerful tool in this process. ML models are capable of analyzing and interpreting vast amounts of social media data, transforming it into actionable insights. These insights can help businesses to predict future customer behavior, improve targeted marketing strategies, and enhance customer engagement and loyalty.</a:t>
+              <a:t>In today's contemporary business landscape, companies increasingly use social media to monitor their brands. This digital revolution has opened up a wealth of data, providing businesses with unprecedented access to consumer behavior, preferences, and trends. By harnessing the power of social media, businesses can gain a deeper understanding of their market performance and make data-driven decisions. Machine Learning, or ML, has emerged as a powerful tool in this process. ML models are capable of analyzing and interpreting vast amounts of social media data,</a:t>
+            </a:r>
+            <a:r>
+              <a:rPr lang="en-US" dirty="0"/>
+              <a:t> </a:t>
+            </a:r>
+            <a:r>
+              <a:rPr lang="en-US"/>
+              <a:t>transforming it into actionable insights.</a:t>
             </a:r>
           </a:p>
         </p:txBody>
@@ -3966,29 +4030,86 @@
               </a:spcBef>
             </a:pPr>
             <a:r>
+              <a:rPr lang="en-US" dirty="0"/>
+              <a:t>Like any project, ours also </a:t>
+            </a:r>
+            <a:r>
               <a:rPr lang="en-US"/>
-              <a:t>We faced challenges such as the "aboutness" problem, which refers to the challenge of determining the subject of the sentiment expressed in a sentence. </a:t>
-            </a:r>
-          </a:p>
-          <a:p>
-            <a:pPr marL="0" indent="0">
-              <a:spcBef>
-                <a:spcPts val="0"/>
-              </a:spcBef>
-            </a:pPr>
-            <a:endParaRPr lang="en-US"/>
-          </a:p>
-          <a:p>
-            <a:pPr marL="0" indent="0">
-              <a:spcBef>
-                <a:spcPts val="0"/>
-              </a:spcBef>
-            </a:pPr>
+              <a:t>faced </a:t>
+            </a:r>
+            <a:r>
+              <a:rPr lang="en-US" dirty="0"/>
+              <a:t>several </a:t>
+            </a:r>
             <a:r>
               <a:rPr lang="en-US"/>
-              <a:t>We also encountered issues with complex sentences and ambiguous subjects.</a:t>
-            </a:r>
-            <a:endParaRPr/>
+              <a:t>challenges </a:t>
+            </a:r>
+            <a:r>
+              <a:rPr lang="en-US" dirty="0"/>
+              <a:t>and limitations. The ambiguity in language posed a significant challenge, </a:t>
+            </a:r>
+            <a:r>
+              <a:rPr lang="en-US"/>
+              <a:t>as the </a:t>
+            </a:r>
+            <a:r>
+              <a:rPr lang="en-US" dirty="0"/>
+              <a:t>same words can have different meanings in different contexts. For instance, the word 'Apple' could refer to the fruit or the tech company, depending on the context. This leads to what we call the 'Aboutness' </a:t>
+            </a:r>
+            <a:r>
+              <a:rPr lang="en-US"/>
+              <a:t>problem, </a:t>
+            </a:r>
+            <a:r>
+              <a:rPr lang="en-US" dirty="0"/>
+              <a:t>where it becomes difficult to determine whether a tweet </a:t>
+            </a:r>
+            <a:r>
+              <a:rPr lang="en-US"/>
+              <a:t>refers to the </a:t>
+            </a:r>
+            <a:r>
+              <a:rPr lang="en-US" dirty="0"/>
+              <a:t>fruit or </a:t>
+            </a:r>
+            <a:r>
+              <a:rPr lang="en-US"/>
+              <a:t>the </a:t>
+            </a:r>
+            <a:r>
+              <a:rPr lang="en-US" dirty="0"/>
+              <a:t>tech company. Insufficient data on certain brands made it difficult to gather meaningful insights or make accurate predictions. The large size </a:t>
+            </a:r>
+            <a:r>
+              <a:rPr lang="en-US"/>
+              <a:t>of the </a:t>
+            </a:r>
+            <a:r>
+              <a:rPr lang="en-US" dirty="0"/>
+              <a:t>dataset posed a challenge </a:t>
+            </a:r>
+            <a:r>
+              <a:rPr lang="en-US"/>
+              <a:t>in </a:t>
+            </a:r>
+            <a:r>
+              <a:rPr lang="en-US" dirty="0"/>
+              <a:t>terms of computational resources and processing time. Despite these challenges, we were able to develop </a:t>
+            </a:r>
+            <a:r>
+              <a:rPr lang="en-US"/>
+              <a:t>a </a:t>
+            </a:r>
+            <a:r>
+              <a:rPr lang="en-US" dirty="0"/>
+              <a:t>robust brand sentiment analyzer that can provide valuable insights to businesses</a:t>
+            </a:r>
+            <a:r>
+              <a:rPr lang="en-US"/>
+              <a:t>.</a:t>
+            </a:r>
+            <a:endParaRPr lang="en-US" dirty="0"/>
           </a:p>
         </p:txBody>
       </p:sp>
@@ -4051,7 +4172,7 @@
   <p:cSld>
     <p:spTree>
       <p:nvGrpSpPr>
-        <p:cNvPr id="1" name="Shape 169"/>
+        <p:cNvPr id="1" name="Shape 176"/>
         <p:cNvGrpSpPr/>
         <p:nvPr/>
       </p:nvGrpSpPr>
@@ -4065,7 +4186,7 @@
       </p:grpSpPr>
       <p:sp>
         <p:nvSpPr>
-          <p:cNvPr id="170" name="Google Shape;170;p19:notes"/>
+          <p:cNvPr id="177" name="Google Shape;177;p20:notes"/>
           <p:cNvSpPr>
             <a:spLocks noGrp="1" noRot="1" noChangeAspect="1"/>
           </p:cNvSpPr>
@@ -4116,7 +4237,7 @@
       </p:sp>
       <p:sp>
         <p:nvSpPr>
-          <p:cNvPr id="171" name="Google Shape;171;p19:notes"/>
+          <p:cNvPr id="178" name="Google Shape;178;p20:notes"/>
           <p:cNvSpPr txBox="1">
             <a:spLocks noGrp="1"/>
           </p:cNvSpPr>
@@ -4143,34 +4264,21 @@
           </a:bodyPr>
           <a:lstStyle/>
           <a:p>
-            <a:pPr marL="0" marR="0" lvl="0" indent="0" algn="l" rtl="0">
-              <a:lnSpc>
-                <a:spcPct val="100000"/>
-              </a:lnSpc>
-              <a:spcBef>
-                <a:spcPts val="0"/>
-              </a:spcBef>
-              <a:spcAft>
-                <a:spcPts val="0"/>
-              </a:spcAft>
-              <a:buClr>
-                <a:schemeClr val="dk1"/>
-              </a:buClr>
-              <a:buSzPts val="1200"/>
-              <a:buFont typeface="Arial"/>
-              <a:buNone/>
-            </a:pPr>
-            <a:r>
-              <a:rPr lang="en-US"/>
-              <a:t>In the conclusion, we will summarize the main findings of our project, conclude the report by discussing the significance of our findings, and discuss potential future work, such as how our project could be extended or improved.</a:t>
-            </a:r>
-            <a:endParaRPr/>
+            <a:pPr marL="0" indent="0"/>
+            <a:r>
+              <a:rPr lang="en-US" dirty="0"/>
+              <a:t>Looking ahead, there are several areas for future work. These include fine-tuning of model parameters to improve performance, testing the model on larger and more diverse datasets to gain additional insights, developing a multimodal model that can accept not only textual input but also video, image, or audio input, and exploring the impact of data duplication on model performance. We explored Large Language Models (or LLMs) but decided against using them in our final Brand Sentiment Analyzer because they were difficult to integrate. If given more time, we would integrate BERT and GPT2 to the Brand Sentiment Analyzer. These future directions will help us to further refine our brand sentiment analyzer and make it even more effective and accurate.</a:t>
+            </a:r>
+          </a:p>
+          <a:p>
+            <a:pPr marL="0" indent="0"/>
+            <a:endParaRPr lang="en-US"/>
           </a:p>
         </p:txBody>
       </p:sp>
       <p:sp>
         <p:nvSpPr>
-          <p:cNvPr id="172" name="Google Shape;172;p19:notes"/>
+          <p:cNvPr id="179" name="Google Shape;179;p20:notes"/>
           <p:cNvSpPr txBox="1">
             <a:spLocks noGrp="1"/>
           </p:cNvSpPr>
@@ -4227,7 +4335,7 @@
   <p:cSld>
     <p:spTree>
       <p:nvGrpSpPr>
-        <p:cNvPr id="1" name="Shape 176"/>
+        <p:cNvPr id="1" name="Shape 169"/>
         <p:cNvGrpSpPr/>
         <p:nvPr/>
       </p:nvGrpSpPr>
@@ -4241,7 +4349,7 @@
       </p:grpSpPr>
       <p:sp>
         <p:nvSpPr>
-          <p:cNvPr id="177" name="Google Shape;177;p20:notes"/>
+          <p:cNvPr id="170" name="Google Shape;170;p19:notes"/>
           <p:cNvSpPr>
             <a:spLocks noGrp="1" noRot="1" noChangeAspect="1"/>
           </p:cNvSpPr>
@@ -4292,7 +4400,7 @@
       </p:sp>
       <p:sp>
         <p:nvSpPr>
-          <p:cNvPr id="178" name="Google Shape;178;p20:notes"/>
+          <p:cNvPr id="171" name="Google Shape;171;p19:notes"/>
           <p:cNvSpPr txBox="1">
             <a:spLocks noGrp="1"/>
           </p:cNvSpPr>
@@ -4321,20 +4429,108 @@
           <a:p>
             <a:pPr marL="0" indent="0"/>
             <a:r>
-              <a:rPr lang="en-US">
-                <a:solidFill>
-                  <a:srgbClr val="000000"/>
-                </a:solidFill>
-              </a:rPr>
-              <a:t>Future work would generalize the model to work with other kinds of social media posts like Reddit, Facebook, or Instagram. Additionally, a future model can be multimodal and accept video, image, or audio input to provide a more comprehensive sentiment analysis of social media posts.</a:t>
-            </a:r>
-            <a:endParaRPr lang="en-US"/>
+              <a:rPr lang="en-US" dirty="0"/>
+              <a:t>To summarize</a:t>
+            </a:r>
+            <a:r>
+              <a:rPr lang="en-US"/>
+              <a:t>, we </a:t>
+            </a:r>
+            <a:r>
+              <a:rPr lang="en-US" dirty="0"/>
+              <a:t>developed a robust brand sentiment analyzer that can accurately classify sentiment in Twitter posts. We have leveraged </a:t>
+            </a:r>
+            <a:r>
+              <a:rPr lang="en-US"/>
+              <a:t>the </a:t>
+            </a:r>
+            <a:r>
+              <a:rPr lang="en-US" dirty="0"/>
+              <a:t>power </a:t>
+            </a:r>
+            <a:r>
+              <a:rPr lang="en-US"/>
+              <a:t>of </a:t>
+            </a:r>
+            <a:r>
+              <a:rPr lang="en-US" dirty="0"/>
+              <a:t>AI to provide businesses with real-time insights into their brand image. Despite facing several challenges and limitations</a:t>
+            </a:r>
+            <a:r>
+              <a:rPr lang="en-US"/>
+              <a:t>, </a:t>
+            </a:r>
+            <a:r>
+              <a:rPr lang="en-US" dirty="0"/>
+              <a:t>such as </a:t>
+            </a:r>
+            <a:r>
+              <a:rPr lang="en-US"/>
+              <a:t>the </a:t>
+            </a:r>
+            <a:r>
+              <a:rPr lang="en-US" dirty="0"/>
+              <a:t>ambiguity in language and </a:t>
+            </a:r>
+            <a:r>
+              <a:rPr lang="en-US"/>
+              <a:t>the </a:t>
+            </a:r>
+            <a:r>
+              <a:rPr lang="en-US" dirty="0"/>
+              <a:t>'Aboutness' problem</a:t>
+            </a:r>
+            <a:r>
+              <a:rPr lang="en-US"/>
+              <a:t>, </a:t>
+            </a:r>
+            <a:r>
+              <a:rPr lang="en-US" dirty="0"/>
+              <a:t>we have been able to overcome them </a:t>
+            </a:r>
+            <a:r>
+              <a:rPr lang="en-US"/>
+              <a:t>and </a:t>
+            </a:r>
+            <a:r>
+              <a:rPr lang="en-US" dirty="0"/>
+              <a:t>deliver a valuable tool for businesses. Looking ahead, we have identified several areas for </a:t>
+            </a:r>
+            <a:r>
+              <a:rPr lang="en-US"/>
+              <a:t>future work</a:t>
+            </a:r>
+            <a:r>
+              <a:rPr lang="en-US" dirty="0"/>
+              <a:t> that will help us to further refine and improve our brand sentiment analyzer. However, it's important to note that the choice of classification approach should be made considering a holistic view of metrics, aligning with the project's objectives. Depending on the specific needs of the task, different approaches might be preferred. It's essential to evaluate models based on the metrics that align with the project's goals. Thank you for your attention</a:t>
+            </a:r>
+            <a:r>
+              <a:rPr lang="en-US"/>
+              <a:t>, </a:t>
+            </a:r>
+            <a:r>
+              <a:rPr lang="en-US" dirty="0"/>
+              <a:t>and we look forward to continuing </a:t>
+            </a:r>
+            <a:r>
+              <a:rPr lang="en-US"/>
+              <a:t>our </a:t>
+            </a:r>
+            <a:r>
+              <a:rPr lang="en-US" dirty="0"/>
+              <a:t>work in this exciting field</a:t>
+            </a:r>
+            <a:r>
+              <a:rPr lang="en-US"/>
+              <a:t>.</a:t>
+            </a:r>
+            <a:endParaRPr lang="en-US" dirty="0"/>
           </a:p>
         </p:txBody>
       </p:sp>
       <p:sp>
         <p:nvSpPr>
-          <p:cNvPr id="179" name="Google Shape;179;p20:notes"/>
+          <p:cNvPr id="172" name="Google Shape;172;p19:notes"/>
           <p:cNvSpPr txBox="1">
             <a:spLocks noGrp="1"/>
           </p:cNvSpPr>
@@ -4387,118 +4583,6 @@
 </file>
 
 <file path=ppt/notesSlides/notesSlide26.xml><?xml version="1.0" encoding="utf-8"?>
-<p:notes xmlns:a="http://schemas.openxmlformats.org/drawingml/2006/main" xmlns:r="http://schemas.openxmlformats.org/officeDocument/2006/relationships" xmlns:p="http://schemas.openxmlformats.org/presentationml/2006/main">
-  <p:cSld>
-    <p:spTree>
-      <p:nvGrpSpPr>
-        <p:cNvPr id="1" name=""/>
-        <p:cNvGrpSpPr/>
-        <p:nvPr/>
-      </p:nvGrpSpPr>
-      <p:grpSpPr>
-        <a:xfrm>
-          <a:off x="0" y="0"/>
-          <a:ext cx="0" cy="0"/>
-          <a:chOff x="0" y="0"/>
-          <a:chExt cx="0" cy="0"/>
-        </a:xfrm>
-      </p:grpSpPr>
-      <p:sp>
-        <p:nvSpPr>
-          <p:cNvPr id="2" name="Slide Image Placeholder 1"/>
-          <p:cNvSpPr>
-            <a:spLocks noGrp="1" noRot="1" noChangeAspect="1"/>
-          </p:cNvSpPr>
-          <p:nvPr>
-            <p:ph type="sldImg"/>
-          </p:nvPr>
-        </p:nvSpPr>
-        <p:spPr/>
-      </p:sp>
-      <p:sp>
-        <p:nvSpPr>
-          <p:cNvPr id="3" name="Notes Placeholder 2"/>
-          <p:cNvSpPr>
-            <a:spLocks noGrp="1"/>
-          </p:cNvSpPr>
-          <p:nvPr>
-            <p:ph type="body" idx="1"/>
-          </p:nvPr>
-        </p:nvSpPr>
-        <p:spPr/>
-        <p:txBody>
-          <a:bodyPr/>
-          <a:lstStyle/>
-          <a:p>
-            <a:r>
-              <a:rPr lang="en-US"/>
-              <a:t>We explored Large Language Models (or LLMs) but decided against using them in our final Brand Sentiment Analyzer because they were difficult to integrate. If given more time, we would integrate BERT and GPT2 to the Brand Sentiment Analyzer.</a:t>
-            </a:r>
-          </a:p>
-        </p:txBody>
-      </p:sp>
-      <p:sp>
-        <p:nvSpPr>
-          <p:cNvPr id="4" name="Slide Number Placeholder 3"/>
-          <p:cNvSpPr>
-            <a:spLocks noGrp="1"/>
-          </p:cNvSpPr>
-          <p:nvPr>
-            <p:ph type="sldNum" idx="12"/>
-          </p:nvPr>
-        </p:nvSpPr>
-        <p:spPr/>
-        <p:txBody>
-          <a:bodyPr/>
-          <a:lstStyle/>
-          <a:p>
-            <a:pPr marL="0" marR="0" lvl="0" indent="0" algn="r" rtl="0">
-              <a:spcBef>
-                <a:spcPts val="0"/>
-              </a:spcBef>
-              <a:spcAft>
-                <a:spcPts val="0"/>
-              </a:spcAft>
-              <a:buNone/>
-            </a:pPr>
-            <a:fld id="{00000000-1234-1234-1234-123412341234}" type="slidenum">
-              <a:rPr lang="en-US" sz="1200" b="0" i="0" u="none" strike="noStrike" cap="none">
-                <a:solidFill>
-                  <a:schemeClr val="dk1"/>
-                </a:solidFill>
-                <a:latin typeface="Arial"/>
-                <a:ea typeface="Arial"/>
-                <a:cs typeface="Arial"/>
-                <a:sym typeface="Arial"/>
-              </a:rPr>
-              <a:t>26</a:t>
-            </a:fld>
-            <a:endParaRPr lang="en-US" sz="1200" b="0" i="0" u="none" strike="noStrike" cap="none">
-              <a:solidFill>
-                <a:schemeClr val="dk1"/>
-              </a:solidFill>
-              <a:latin typeface="Arial"/>
-              <a:ea typeface="Arial"/>
-              <a:cs typeface="Arial"/>
-              <a:sym typeface="Arial"/>
-            </a:endParaRPr>
-          </a:p>
-        </p:txBody>
-      </p:sp>
-    </p:spTree>
-    <p:extLst>
-      <p:ext uri="{BB962C8B-B14F-4D97-AF65-F5344CB8AC3E}">
-        <p14:creationId xmlns:p14="http://schemas.microsoft.com/office/powerpoint/2010/main" val="2594840881"/>
-      </p:ext>
-    </p:extLst>
-  </p:cSld>
-  <p:clrMapOvr>
-    <a:masterClrMapping/>
-  </p:clrMapOvr>
-</p:notes>
-</file>
-
-<file path=ppt/notesSlides/notesSlide27.xml><?xml version="1.0" encoding="utf-8"?>
 <p:notes xmlns:a="http://schemas.openxmlformats.org/drawingml/2006/main" xmlns:r="http://schemas.openxmlformats.org/officeDocument/2006/relationships" xmlns:p="http://schemas.openxmlformats.org/presentationml/2006/main" showMasterSp="0" showMasterPhAnim="0">
   <p:cSld>
     <p:spTree>
@@ -4655,7 +4739,7 @@
             </a:pPr>
             <a:fld id="{00000000-1234-1234-1234-123412341234}" type="slidenum">
               <a:rPr lang="en-US"/>
-              <a:t>27</a:t>
+              <a:t>26</a:t>
             </a:fld>
             <a:endParaRPr/>
           </a:p>
@@ -4782,11 +4866,11 @@
 </file>
 
 <file path=ppt/notesSlides/notesSlide4.xml><?xml version="1.0" encoding="utf-8"?>
-<p:notes xmlns:a="http://schemas.openxmlformats.org/drawingml/2006/main" xmlns:r="http://schemas.openxmlformats.org/officeDocument/2006/relationships" xmlns:p="http://schemas.openxmlformats.org/presentationml/2006/main">
+<p:notes xmlns:a="http://schemas.openxmlformats.org/drawingml/2006/main" xmlns:r="http://schemas.openxmlformats.org/officeDocument/2006/relationships" xmlns:p="http://schemas.openxmlformats.org/presentationml/2006/main" showMasterSp="0" showMasterPhAnim="0">
   <p:cSld>
     <p:spTree>
       <p:nvGrpSpPr>
-        <p:cNvPr id="1" name=""/>
+        <p:cNvPr id="1" name="Shape 64"/>
         <p:cNvGrpSpPr/>
         <p:nvPr/>
       </p:nvGrpSpPr>
@@ -4800,403 +4884,7 @@
       </p:grpSpPr>
       <p:sp>
         <p:nvSpPr>
-          <p:cNvPr id="2" name="Slide Image Placeholder 1"/>
-          <p:cNvSpPr>
-            <a:spLocks noGrp="1" noRot="1" noChangeAspect="1"/>
-          </p:cNvSpPr>
-          <p:nvPr>
-            <p:ph type="sldImg"/>
-          </p:nvPr>
-        </p:nvSpPr>
-        <p:spPr/>
-      </p:sp>
-      <p:sp>
-        <p:nvSpPr>
-          <p:cNvPr id="3" name="Notes Placeholder 2"/>
-          <p:cNvSpPr>
-            <a:spLocks noGrp="1"/>
-          </p:cNvSpPr>
-          <p:nvPr>
-            <p:ph type="body" idx="1"/>
-          </p:nvPr>
-        </p:nvSpPr>
-        <p:spPr/>
-        <p:txBody>
-          <a:bodyPr/>
-          <a:lstStyle/>
-          <a:p>
-            <a:pPr marL="0" indent="0">
-              <a:spcBef>
-                <a:spcPts val="0"/>
-              </a:spcBef>
-            </a:pPr>
-            <a:r>
-              <a:rPr lang="en-US"/>
-              <a:t>In this project, we leverage Natural Language Processing, Classification, and Sentiment Analysis techniques to understand public sentiment towards brands. Our goal is to empower businesses with timely insights for maintaining a positive brand image.</a:t>
-            </a:r>
-          </a:p>
-        </p:txBody>
-      </p:sp>
-      <p:sp>
-        <p:nvSpPr>
-          <p:cNvPr id="4" name="Slide Number Placeholder 3"/>
-          <p:cNvSpPr>
-            <a:spLocks noGrp="1"/>
-          </p:cNvSpPr>
-          <p:nvPr>
-            <p:ph type="sldNum" idx="12"/>
-          </p:nvPr>
-        </p:nvSpPr>
-        <p:spPr/>
-        <p:txBody>
-          <a:bodyPr/>
-          <a:lstStyle/>
-          <a:p>
-            <a:pPr marL="0" marR="0" lvl="0" indent="0" algn="r" rtl="0">
-              <a:spcBef>
-                <a:spcPts val="0"/>
-              </a:spcBef>
-              <a:spcAft>
-                <a:spcPts val="0"/>
-              </a:spcAft>
-              <a:buNone/>
-            </a:pPr>
-            <a:fld id="{00000000-1234-1234-1234-123412341234}" type="slidenum">
-              <a:rPr lang="en-US" sz="1200" b="0" i="0" u="none" strike="noStrike" cap="none">
-                <a:solidFill>
-                  <a:schemeClr val="dk1"/>
-                </a:solidFill>
-                <a:latin typeface="Arial"/>
-                <a:ea typeface="Arial"/>
-                <a:cs typeface="Arial"/>
-                <a:sym typeface="Arial"/>
-              </a:rPr>
-              <a:t>4</a:t>
-            </a:fld>
-            <a:endParaRPr lang="en-US" sz="1200" b="0" i="0" u="none" strike="noStrike" cap="none">
-              <a:solidFill>
-                <a:schemeClr val="dk1"/>
-              </a:solidFill>
-              <a:latin typeface="Arial"/>
-              <a:ea typeface="Arial"/>
-              <a:cs typeface="Arial"/>
-              <a:sym typeface="Arial"/>
-            </a:endParaRPr>
-          </a:p>
-        </p:txBody>
-      </p:sp>
-    </p:spTree>
-    <p:extLst>
-      <p:ext uri="{BB962C8B-B14F-4D97-AF65-F5344CB8AC3E}">
-        <p14:creationId xmlns:p14="http://schemas.microsoft.com/office/powerpoint/2010/main" val="2012730978"/>
-      </p:ext>
-    </p:extLst>
-  </p:cSld>
-  <p:clrMapOvr>
-    <a:masterClrMapping/>
-  </p:clrMapOvr>
-</p:notes>
-</file>
-
-<file path=ppt/notesSlides/notesSlide5.xml><?xml version="1.0" encoding="utf-8"?>
-<p:notes xmlns:a="http://schemas.openxmlformats.org/drawingml/2006/main" xmlns:r="http://schemas.openxmlformats.org/officeDocument/2006/relationships" xmlns:p="http://schemas.openxmlformats.org/presentationml/2006/main">
-  <p:cSld>
-    <p:spTree>
-      <p:nvGrpSpPr>
-        <p:cNvPr id="1" name=""/>
-        <p:cNvGrpSpPr/>
-        <p:nvPr/>
-      </p:nvGrpSpPr>
-      <p:grpSpPr>
-        <a:xfrm>
-          <a:off x="0" y="0"/>
-          <a:ext cx="0" cy="0"/>
-          <a:chOff x="0" y="0"/>
-          <a:chExt cx="0" cy="0"/>
-        </a:xfrm>
-      </p:grpSpPr>
-      <p:sp>
-        <p:nvSpPr>
-          <p:cNvPr id="2" name="Slide Image Placeholder 1"/>
-          <p:cNvSpPr>
-            <a:spLocks noGrp="1" noRot="1" noChangeAspect="1"/>
-          </p:cNvSpPr>
-          <p:nvPr>
-            <p:ph type="sldImg"/>
-          </p:nvPr>
-        </p:nvSpPr>
-        <p:spPr/>
-      </p:sp>
-      <p:sp>
-        <p:nvSpPr>
-          <p:cNvPr id="3" name="Notes Placeholder 2"/>
-          <p:cNvSpPr>
-            <a:spLocks noGrp="1"/>
-          </p:cNvSpPr>
-          <p:nvPr>
-            <p:ph type="body" idx="1"/>
-          </p:nvPr>
-        </p:nvSpPr>
-        <p:spPr/>
-        <p:txBody>
-          <a:bodyPr/>
-          <a:lstStyle/>
-          <a:p>
-            <a:pPr marL="0" indent="0">
-              <a:spcBef>
-                <a:spcPts val="0"/>
-              </a:spcBef>
-            </a:pPr>
-            <a:r>
-              <a:rPr lang="en-US"/>
-              <a:t>To achieve this, we perform brand sentiment analysis on Twitter posts. Brand sentiment analysis involves identifying brand mentions in text and determining the sentiment towards those brands. The purpose of this project is to create Machine Learning models to classify sentiment in textual tweets.</a:t>
-            </a:r>
-          </a:p>
-        </p:txBody>
-      </p:sp>
-      <p:sp>
-        <p:nvSpPr>
-          <p:cNvPr id="4" name="Slide Number Placeholder 3"/>
-          <p:cNvSpPr>
-            <a:spLocks noGrp="1"/>
-          </p:cNvSpPr>
-          <p:nvPr>
-            <p:ph type="sldNum" idx="12"/>
-          </p:nvPr>
-        </p:nvSpPr>
-        <p:spPr/>
-        <p:txBody>
-          <a:bodyPr/>
-          <a:lstStyle/>
-          <a:p>
-            <a:pPr marL="0" marR="0" lvl="0" indent="0" algn="r" rtl="0">
-              <a:spcBef>
-                <a:spcPts val="0"/>
-              </a:spcBef>
-              <a:spcAft>
-                <a:spcPts val="0"/>
-              </a:spcAft>
-              <a:buNone/>
-            </a:pPr>
-            <a:fld id="{00000000-1234-1234-1234-123412341234}" type="slidenum">
-              <a:rPr lang="en-US" sz="1200" b="0" i="0" u="none" strike="noStrike" cap="none">
-                <a:solidFill>
-                  <a:schemeClr val="dk1"/>
-                </a:solidFill>
-                <a:latin typeface="Arial"/>
-                <a:ea typeface="Arial"/>
-                <a:cs typeface="Arial"/>
-                <a:sym typeface="Arial"/>
-              </a:rPr>
-              <a:t>5</a:t>
-            </a:fld>
-            <a:endParaRPr lang="en-US" sz="1200" b="0" i="0" u="none" strike="noStrike" cap="none">
-              <a:solidFill>
-                <a:schemeClr val="dk1"/>
-              </a:solidFill>
-              <a:latin typeface="Arial"/>
-              <a:ea typeface="Arial"/>
-              <a:cs typeface="Arial"/>
-              <a:sym typeface="Arial"/>
-            </a:endParaRPr>
-          </a:p>
-        </p:txBody>
-      </p:sp>
-    </p:spTree>
-    <p:extLst>
-      <p:ext uri="{BB962C8B-B14F-4D97-AF65-F5344CB8AC3E}">
-        <p14:creationId xmlns:p14="http://schemas.microsoft.com/office/powerpoint/2010/main" val="3757994113"/>
-      </p:ext>
-    </p:extLst>
-  </p:cSld>
-  <p:clrMapOvr>
-    <a:masterClrMapping/>
-  </p:clrMapOvr>
-</p:notes>
-</file>
-
-<file path=ppt/notesSlides/notesSlide6.xml><?xml version="1.0" encoding="utf-8"?>
-<p:notes xmlns:a="http://schemas.openxmlformats.org/drawingml/2006/main" xmlns:r="http://schemas.openxmlformats.org/officeDocument/2006/relationships" xmlns:p="http://schemas.openxmlformats.org/presentationml/2006/main">
-  <p:cSld>
-    <p:spTree>
-      <p:nvGrpSpPr>
-        <p:cNvPr id="1" name=""/>
-        <p:cNvGrpSpPr/>
-        <p:nvPr/>
-      </p:nvGrpSpPr>
-      <p:grpSpPr>
-        <a:xfrm>
-          <a:off x="0" y="0"/>
-          <a:ext cx="0" cy="0"/>
-          <a:chOff x="0" y="0"/>
-          <a:chExt cx="0" cy="0"/>
-        </a:xfrm>
-      </p:grpSpPr>
-      <p:sp>
-        <p:nvSpPr>
-          <p:cNvPr id="2" name="Slide Image Placeholder 1"/>
-          <p:cNvSpPr>
-            <a:spLocks noGrp="1" noRot="1" noChangeAspect="1"/>
-          </p:cNvSpPr>
-          <p:nvPr>
-            <p:ph type="sldImg"/>
-          </p:nvPr>
-        </p:nvSpPr>
-        <p:spPr/>
-      </p:sp>
-      <p:sp>
-        <p:nvSpPr>
-          <p:cNvPr id="3" name="Notes Placeholder 2"/>
-          <p:cNvSpPr>
-            <a:spLocks noGrp="1"/>
-          </p:cNvSpPr>
-          <p:nvPr>
-            <p:ph type="body" idx="1"/>
-          </p:nvPr>
-        </p:nvSpPr>
-        <p:spPr/>
-        <p:txBody>
-          <a:bodyPr/>
-          <a:lstStyle/>
-          <a:p>
-            <a:pPr marL="90170" indent="-58420">
-              <a:lnSpc>
-                <a:spcPct val="160000"/>
-              </a:lnSpc>
-              <a:spcBef>
-                <a:spcPts val="600"/>
-              </a:spcBef>
-            </a:pPr>
-            <a:r>
-              <a:rPr lang="en-US"/>
-              <a:t>The primary ML algorithms considered for sentiment analysis include Naïve Bayes, Logistic Regression, </a:t>
-            </a:r>
-          </a:p>
-          <a:p>
-            <a:pPr marL="90170" indent="-58420">
-              <a:lnSpc>
-                <a:spcPct val="160000"/>
-              </a:lnSpc>
-              <a:spcBef>
-                <a:spcPts val="600"/>
-              </a:spcBef>
-            </a:pPr>
-            <a:r>
-              <a:rPr lang="en-US"/>
-              <a:t>Support Vector Machines, Recurrent Neural Networks, and Transformers (e.g., BERT). Each algorithm </a:t>
-            </a:r>
-          </a:p>
-          <a:p>
-            <a:pPr marL="90170" indent="-58420">
-              <a:lnSpc>
-                <a:spcPct val="160000"/>
-              </a:lnSpc>
-              <a:spcBef>
-                <a:spcPts val="600"/>
-              </a:spcBef>
-            </a:pPr>
-            <a:r>
-              <a:rPr lang="en-US"/>
-              <a:t>offers distinct advantages and trade-offs, influencing the overall performance of the sentiment analysis </a:t>
-            </a:r>
-          </a:p>
-          <a:p>
-            <a:pPr marL="90170" indent="-58420">
-              <a:lnSpc>
-                <a:spcPct val="160000"/>
-              </a:lnSpc>
-              <a:spcBef>
-                <a:spcPts val="600"/>
-              </a:spcBef>
-            </a:pPr>
-            <a:r>
-              <a:rPr lang="en-US"/>
-              <a:t>system.</a:t>
-            </a:r>
-          </a:p>
-        </p:txBody>
-      </p:sp>
-      <p:sp>
-        <p:nvSpPr>
-          <p:cNvPr id="4" name="Slide Number Placeholder 3"/>
-          <p:cNvSpPr>
-            <a:spLocks noGrp="1"/>
-          </p:cNvSpPr>
-          <p:nvPr>
-            <p:ph type="sldNum" idx="12"/>
-          </p:nvPr>
-        </p:nvSpPr>
-        <p:spPr/>
-        <p:txBody>
-          <a:bodyPr/>
-          <a:lstStyle/>
-          <a:p>
-            <a:pPr marL="0" marR="0" lvl="0" indent="0" algn="r" rtl="0">
-              <a:spcBef>
-                <a:spcPts val="0"/>
-              </a:spcBef>
-              <a:spcAft>
-                <a:spcPts val="0"/>
-              </a:spcAft>
-              <a:buNone/>
-            </a:pPr>
-            <a:fld id="{00000000-1234-1234-1234-123412341234}" type="slidenum">
-              <a:rPr lang="en-US" sz="1200" b="0" i="0" u="none" strike="noStrike" cap="none">
-                <a:solidFill>
-                  <a:schemeClr val="dk1"/>
-                </a:solidFill>
-                <a:latin typeface="Arial"/>
-                <a:ea typeface="Arial"/>
-                <a:cs typeface="Arial"/>
-                <a:sym typeface="Arial"/>
-              </a:rPr>
-              <a:t>6</a:t>
-            </a:fld>
-            <a:endParaRPr lang="en-US" sz="1200" b="0" i="0" u="none" strike="noStrike" cap="none">
-              <a:solidFill>
-                <a:schemeClr val="dk1"/>
-              </a:solidFill>
-              <a:latin typeface="Arial"/>
-              <a:ea typeface="Arial"/>
-              <a:cs typeface="Arial"/>
-              <a:sym typeface="Arial"/>
-            </a:endParaRPr>
-          </a:p>
-        </p:txBody>
-      </p:sp>
-    </p:spTree>
-    <p:extLst>
-      <p:ext uri="{BB962C8B-B14F-4D97-AF65-F5344CB8AC3E}">
-        <p14:creationId xmlns:p14="http://schemas.microsoft.com/office/powerpoint/2010/main" val="1439647282"/>
-      </p:ext>
-    </p:extLst>
-  </p:cSld>
-  <p:clrMapOvr>
-    <a:masterClrMapping/>
-  </p:clrMapOvr>
-</p:notes>
-</file>
-
-<file path=ppt/notesSlides/notesSlide7.xml><?xml version="1.0" encoding="utf-8"?>
-<p:notes xmlns:a="http://schemas.openxmlformats.org/drawingml/2006/main" xmlns:r="http://schemas.openxmlformats.org/officeDocument/2006/relationships" xmlns:p="http://schemas.openxmlformats.org/presentationml/2006/main" showMasterSp="0" showMasterPhAnim="0">
-  <p:cSld>
-    <p:spTree>
-      <p:nvGrpSpPr>
-        <p:cNvPr id="1" name="Shape 57"/>
-        <p:cNvGrpSpPr/>
-        <p:nvPr/>
-      </p:nvGrpSpPr>
-      <p:grpSpPr>
-        <a:xfrm>
-          <a:off x="0" y="0"/>
-          <a:ext cx="0" cy="0"/>
-          <a:chOff x="0" y="0"/>
-          <a:chExt cx="0" cy="0"/>
-        </a:xfrm>
-      </p:grpSpPr>
-      <p:sp>
-        <p:nvSpPr>
-          <p:cNvPr id="58" name="Google Shape;58;p3:notes"/>
+          <p:cNvPr id="65" name="Google Shape;65;p4:notes"/>
           <p:cNvSpPr>
             <a:spLocks noGrp="1" noRot="1" noChangeAspect="1"/>
           </p:cNvSpPr>
@@ -5247,7 +4935,7 @@
       </p:sp>
       <p:sp>
         <p:nvSpPr>
-          <p:cNvPr id="59" name="Google Shape;59;p3:notes"/>
+          <p:cNvPr id="66" name="Google Shape;66;p4:notes"/>
           <p:cNvSpPr txBox="1">
             <a:spLocks noGrp="1"/>
           </p:cNvSpPr>
@@ -5274,42 +4962,88 @@
           </a:bodyPr>
           <a:lstStyle/>
           <a:p>
-            <a:pPr marL="0" marR="0" lvl="0" indent="0" algn="l" rtl="0">
-              <a:lnSpc>
-                <a:spcPct val="100000"/>
-              </a:lnSpc>
-              <a:spcBef>
-                <a:spcPts val="0"/>
-              </a:spcBef>
-              <a:spcAft>
-                <a:spcPts val="0"/>
-              </a:spcAft>
-              <a:buClr>
-                <a:srgbClr val="1C1917"/>
-              </a:buClr>
-              <a:buSzPts val="1200"/>
-              <a:buFont typeface="Arial"/>
-              <a:buNone/>
+            <a:pPr marL="0" indent="0">
+              <a:spcBef>
+                <a:spcPts val="0"/>
+              </a:spcBef>
             </a:pPr>
             <a:r>
-              <a:rPr lang="en-US" b="0" i="0">
-                <a:solidFill>
-                  <a:srgbClr val="1C1917"/>
-                </a:solidFill>
-                <a:latin typeface="Arial"/>
-                <a:ea typeface="Arial"/>
-                <a:cs typeface="Arial"/>
+              <a:rPr lang="en-US" dirty="0"/>
+              <a:t>The scope of our </a:t>
+            </a:r>
+            <a:r>
+              <a:rPr lang="en-US" b="0" i="0" dirty="0">
                 <a:sym typeface="Arial"/>
               </a:rPr>
-              <a:t>The problem we aim to solve is detecting if a given tweet mentions a brand, and if so, classifying the sentiment of the tweet towards that brand as positive, negative or neutral. We break this down into two models - a Brand Classifier and a Sentiment Classifier.</a:t>
-            </a:r>
-            <a:endParaRPr/>
+              <a:t>project </a:t>
+            </a:r>
+            <a:r>
+              <a:rPr lang="en-US" dirty="0"/>
+              <a:t>is </a:t>
+            </a:r>
+            <a:r>
+              <a:rPr lang="en-US" b="0" i="0" dirty="0">
+                <a:sym typeface="Arial"/>
+              </a:rPr>
+              <a:t>specifically </a:t>
+            </a:r>
+            <a:r>
+              <a:rPr lang="en-US" dirty="0"/>
+              <a:t>focused </a:t>
+            </a:r>
+            <a:r>
+              <a:rPr lang="en-US" b="0" i="0" dirty="0">
+                <a:sym typeface="Arial"/>
+              </a:rPr>
+              <a:t>on Twitter</a:t>
+            </a:r>
+            <a:r>
+              <a:rPr lang="en-US" dirty="0"/>
+              <a:t>, one of the most popular social media platforms. We aim to analyze tweets</a:t>
+            </a:r>
+            <a:r>
+              <a:rPr lang="en-US" b="0" i="0" dirty="0">
+                <a:sym typeface="Arial"/>
+              </a:rPr>
+              <a:t> for brand mentions and </a:t>
+            </a:r>
+            <a:r>
+              <a:rPr lang="en-US" dirty="0"/>
+              <a:t>the sentiment </a:t>
+            </a:r>
+            <a:r>
+              <a:rPr lang="en-US" b="0" i="0" dirty="0">
+                <a:sym typeface="Arial"/>
+              </a:rPr>
+              <a:t>associated </a:t>
+            </a:r>
+            <a:r>
+              <a:rPr lang="en-US" dirty="0"/>
+              <a:t>with these mentions. This involves identifying tweets that mention specific brands and then classifying the </a:t>
+            </a:r>
+            <a:r>
+              <a:rPr lang="en-US" b="0" i="0" dirty="0">
+                <a:sym typeface="Arial"/>
+              </a:rPr>
+              <a:t>sentiment</a:t>
+            </a:r>
+            <a:r>
+              <a:rPr lang="en-US" dirty="0"/>
+              <a:t> of these tweets as positive or negative</a:t>
+            </a:r>
+            <a:r>
+              <a:rPr lang="en-US" b="0" i="0" dirty="0">
+                <a:sym typeface="Arial"/>
+              </a:rPr>
+              <a:t>.</a:t>
+            </a:r>
+            <a:endParaRPr lang="en-US" dirty="0"/>
           </a:p>
         </p:txBody>
       </p:sp>
       <p:sp>
         <p:nvSpPr>
-          <p:cNvPr id="60" name="Google Shape;60;p3:notes"/>
+          <p:cNvPr id="67" name="Google Shape;67;p4:notes"/>
           <p:cNvSpPr txBox="1">
             <a:spLocks noGrp="1"/>
           </p:cNvSpPr>
@@ -5347,7 +5081,7 @@
             </a:pPr>
             <a:fld id="{00000000-1234-1234-1234-123412341234}" type="slidenum">
               <a:rPr lang="en-US"/>
-              <a:t>7</a:t>
+              <a:t>4</a:t>
             </a:fld>
             <a:endParaRPr/>
           </a:p>
@@ -5361,12 +5095,12 @@
 </p:notes>
 </file>
 
-<file path=ppt/notesSlides/notesSlide8.xml><?xml version="1.0" encoding="utf-8"?>
-<p:notes xmlns:a="http://schemas.openxmlformats.org/drawingml/2006/main" xmlns:r="http://schemas.openxmlformats.org/officeDocument/2006/relationships" xmlns:p="http://schemas.openxmlformats.org/presentationml/2006/main" showMasterSp="0" showMasterPhAnim="0">
+<file path=ppt/notesSlides/notesSlide5.xml><?xml version="1.0" encoding="utf-8"?>
+<p:notes xmlns:a="http://schemas.openxmlformats.org/drawingml/2006/main" xmlns:r="http://schemas.openxmlformats.org/officeDocument/2006/relationships" xmlns:p="http://schemas.openxmlformats.org/presentationml/2006/main">
   <p:cSld>
     <p:spTree>
       <p:nvGrpSpPr>
-        <p:cNvPr id="1" name="Shape 64"/>
+        <p:cNvPr id="1" name=""/>
         <p:cNvGrpSpPr/>
         <p:nvPr/>
       </p:nvGrpSpPr>
@@ -5380,7 +5114,124 @@
       </p:grpSpPr>
       <p:sp>
         <p:nvSpPr>
-          <p:cNvPr id="65" name="Google Shape;65;p4:notes"/>
+          <p:cNvPr id="2" name="Slide Image Placeholder 1"/>
+          <p:cNvSpPr>
+            <a:spLocks noGrp="1" noRot="1" noChangeAspect="1"/>
+          </p:cNvSpPr>
+          <p:nvPr>
+            <p:ph type="sldImg"/>
+          </p:nvPr>
+        </p:nvSpPr>
+        <p:spPr/>
+      </p:sp>
+      <p:sp>
+        <p:nvSpPr>
+          <p:cNvPr id="3" name="Notes Placeholder 2"/>
+          <p:cNvSpPr>
+            <a:spLocks noGrp="1"/>
+          </p:cNvSpPr>
+          <p:nvPr>
+            <p:ph type="body" idx="1"/>
+          </p:nvPr>
+        </p:nvSpPr>
+        <p:spPr/>
+        <p:txBody>
+          <a:bodyPr/>
+          <a:lstStyle/>
+          <a:p>
+            <a:pPr marL="0" indent="0">
+              <a:spcBef>
+                <a:spcPts val="0"/>
+              </a:spcBef>
+            </a:pPr>
+            <a:r>
+              <a:rPr lang="en-US" dirty="0"/>
+              <a:t>Now, let's delve into the specifics of our project. Our goal is to use Machine Learning to classify sentiment in textual tweets using the Sentiment140 dataset. We aim to explore algorithms like Naïve Bayes and Logistic Regression to understand public sentiment toward brands. The ultimate goal is to empower businesses with timely insights for maintaining a positive brand image. We will be covering various key course topics, including Natural Language Processing, Supervised Machine Learning, Classification, Regression, Bayesian Networks, and Deep Learning. These concepts are essential to developing a robust sentiment analysis system capable of accurate sentiment classification.</a:t>
+            </a:r>
+          </a:p>
+        </p:txBody>
+      </p:sp>
+      <p:sp>
+        <p:nvSpPr>
+          <p:cNvPr id="4" name="Slide Number Placeholder 3"/>
+          <p:cNvSpPr>
+            <a:spLocks noGrp="1"/>
+          </p:cNvSpPr>
+          <p:nvPr>
+            <p:ph type="sldNum" idx="12"/>
+          </p:nvPr>
+        </p:nvSpPr>
+        <p:spPr/>
+        <p:txBody>
+          <a:bodyPr/>
+          <a:lstStyle/>
+          <a:p>
+            <a:pPr marL="0" marR="0" lvl="0" indent="0" algn="r" rtl="0">
+              <a:spcBef>
+                <a:spcPts val="0"/>
+              </a:spcBef>
+              <a:spcAft>
+                <a:spcPts val="0"/>
+              </a:spcAft>
+              <a:buNone/>
+            </a:pPr>
+            <a:fld id="{00000000-1234-1234-1234-123412341234}" type="slidenum">
+              <a:rPr lang="en-US" sz="1200" b="0" i="0" u="none" strike="noStrike" cap="none">
+                <a:solidFill>
+                  <a:schemeClr val="dk1"/>
+                </a:solidFill>
+                <a:latin typeface="Arial"/>
+                <a:ea typeface="Arial"/>
+                <a:cs typeface="Arial"/>
+                <a:sym typeface="Arial"/>
+              </a:rPr>
+              <a:t>5</a:t>
+            </a:fld>
+            <a:endParaRPr lang="en-US" sz="1200" b="0" i="0" u="none" strike="noStrike" cap="none">
+              <a:solidFill>
+                <a:schemeClr val="dk1"/>
+              </a:solidFill>
+              <a:latin typeface="Arial"/>
+              <a:ea typeface="Arial"/>
+              <a:cs typeface="Arial"/>
+              <a:sym typeface="Arial"/>
+            </a:endParaRPr>
+          </a:p>
+        </p:txBody>
+      </p:sp>
+    </p:spTree>
+    <p:extLst>
+      <p:ext uri="{BB962C8B-B14F-4D97-AF65-F5344CB8AC3E}">
+        <p14:creationId xmlns:p14="http://schemas.microsoft.com/office/powerpoint/2010/main" val="2012730978"/>
+      </p:ext>
+    </p:extLst>
+  </p:cSld>
+  <p:clrMapOvr>
+    <a:masterClrMapping/>
+  </p:clrMapOvr>
+</p:notes>
+</file>
+
+<file path=ppt/notesSlides/notesSlide6.xml><?xml version="1.0" encoding="utf-8"?>
+<p:notes xmlns:a="http://schemas.openxmlformats.org/drawingml/2006/main" xmlns:r="http://schemas.openxmlformats.org/officeDocument/2006/relationships" xmlns:p="http://schemas.openxmlformats.org/presentationml/2006/main" showMasterSp="0" showMasterPhAnim="0">
+  <p:cSld>
+    <p:spTree>
+      <p:nvGrpSpPr>
+        <p:cNvPr id="1" name="Shape 57"/>
+        <p:cNvGrpSpPr/>
+        <p:nvPr/>
+      </p:nvGrpSpPr>
+      <p:grpSpPr>
+        <a:xfrm>
+          <a:off x="0" y="0"/>
+          <a:ext cx="0" cy="0"/>
+          <a:chOff x="0" y="0"/>
+          <a:chExt cx="0" cy="0"/>
+        </a:xfrm>
+      </p:grpSpPr>
+      <p:sp>
+        <p:nvSpPr>
+          <p:cNvPr id="58" name="Google Shape;58;p3:notes"/>
           <p:cNvSpPr>
             <a:spLocks noGrp="1" noRot="1" noChangeAspect="1"/>
           </p:cNvSpPr>
@@ -5431,7 +5282,7 @@
       </p:sp>
       <p:sp>
         <p:nvSpPr>
-          <p:cNvPr id="66" name="Google Shape;66;p4:notes"/>
+          <p:cNvPr id="59" name="Google Shape;59;p3:notes"/>
           <p:cNvSpPr txBox="1">
             <a:spLocks noGrp="1"/>
           </p:cNvSpPr>
@@ -5458,34 +5309,148 @@
           </a:bodyPr>
           <a:lstStyle/>
           <a:p>
-            <a:pPr marL="0" lvl="0" indent="0" algn="l" rtl="0">
-              <a:spcBef>
-                <a:spcPts val="0"/>
-              </a:spcBef>
-              <a:spcAft>
-                <a:spcPts val="0"/>
-              </a:spcAft>
-              <a:buNone/>
+            <a:pPr marL="0" indent="0">
+              <a:spcBef>
+                <a:spcPts val="0"/>
+              </a:spcBef>
             </a:pPr>
             <a:r>
-              <a:rPr lang="en-US" b="0" i="0">
-                <a:solidFill>
-                  <a:srgbClr val="1C1917"/>
-                </a:solidFill>
-                <a:latin typeface="Arial"/>
-                <a:ea typeface="Arial"/>
-                <a:cs typeface="Arial"/>
+              <a:rPr lang="en-US" dirty="0"/>
+              <a:t>Our project revolves around three main questions. First, how can </a:t>
+            </a:r>
+            <a:r>
+              <a:rPr lang="en-US" b="0" i="0" dirty="0">
                 <a:sym typeface="Arial"/>
               </a:rPr>
-              <a:t>Our project focuses specifically on analyzing tweets from Twitter for brand mentions and associated sentiment.</a:t>
-            </a:r>
-            <a:endParaRPr/>
+              <a:t>we </a:t>
+            </a:r>
+            <a:r>
+              <a:rPr lang="en-US" dirty="0"/>
+              <a:t>accurately classify brand sentiment in Twitter posts? This involves developing </a:t>
+            </a:r>
+            <a:r>
+              <a:rPr lang="en-US" b="0" i="0" dirty="0">
+                <a:sym typeface="Arial"/>
+              </a:rPr>
+              <a:t>a </a:t>
+            </a:r>
+            <a:r>
+              <a:rPr lang="en-US" dirty="0"/>
+              <a:t>model that can understand </a:t>
+            </a:r>
+            <a:r>
+              <a:rPr lang="en-US" b="0" i="0" dirty="0">
+                <a:sym typeface="Arial"/>
+              </a:rPr>
+              <a:t>and </a:t>
+            </a:r>
+            <a:r>
+              <a:rPr lang="en-US" dirty="0"/>
+              <a:t>interpret </a:t>
+            </a:r>
+            <a:r>
+              <a:rPr lang="en-US" b="0" i="0" dirty="0">
+                <a:sym typeface="Arial"/>
+              </a:rPr>
+              <a:t>the </a:t>
+            </a:r>
+            <a:r>
+              <a:rPr lang="en-US" dirty="0"/>
+              <a:t>nuances </a:t>
+            </a:r>
+            <a:r>
+              <a:rPr lang="en-US" b="0" i="0" dirty="0">
+                <a:sym typeface="Arial"/>
+              </a:rPr>
+              <a:t>of </a:t>
+            </a:r>
+            <a:r>
+              <a:rPr lang="en-US" dirty="0"/>
+              <a:t>human language, distinguishing between </a:t>
+            </a:r>
+            <a:r>
+              <a:rPr lang="en-US" b="0" i="0" dirty="0">
+                <a:sym typeface="Arial"/>
+              </a:rPr>
+              <a:t>positive, negative</a:t>
+            </a:r>
+            <a:r>
+              <a:rPr lang="en-US" dirty="0"/>
+              <a:t>, and</a:t>
+            </a:r>
+            <a:r>
+              <a:rPr lang="en-US" b="0" i="0" dirty="0">
+                <a:sym typeface="Arial"/>
+              </a:rPr>
+              <a:t> neutral</a:t>
+            </a:r>
+            <a:r>
+              <a:rPr lang="en-US" dirty="0"/>
+              <a:t> sentiments</a:t>
+            </a:r>
+            <a:r>
+              <a:rPr lang="en-US" b="0" i="0" dirty="0">
+                <a:sym typeface="Arial"/>
+              </a:rPr>
+              <a:t>. </a:t>
+            </a:r>
+            <a:r>
+              <a:rPr lang="en-US" dirty="0"/>
+              <a:t>Second, how can we leverage AI to provide businesses with real-time insights </a:t>
+            </a:r>
+            <a:r>
+              <a:rPr lang="en-US" b="0" i="0" dirty="0">
+                <a:sym typeface="Arial"/>
+              </a:rPr>
+              <a:t>into </a:t>
+            </a:r>
+            <a:r>
+              <a:rPr lang="en-US" dirty="0"/>
+              <a:t>their brand image? This requires </a:t>
+            </a:r>
+            <a:r>
+              <a:rPr lang="en-US" b="0" i="0" dirty="0">
+                <a:sym typeface="Arial"/>
+              </a:rPr>
+              <a:t>a </a:t>
+            </a:r>
+            <a:r>
+              <a:rPr lang="en-US" dirty="0"/>
+              <a:t>system that can analyze and interpret vast amounts of social media data quickly and accurately. And third, how can we use Machine Learning to predict future customer sentiment </a:t>
+            </a:r>
+            <a:r>
+              <a:rPr lang="en-US" b="0" i="0" dirty="0">
+                <a:sym typeface="Arial"/>
+              </a:rPr>
+              <a:t>and </a:t>
+            </a:r>
+            <a:r>
+              <a:rPr lang="en-US" dirty="0"/>
+              <a:t>behavior? This involves creating </a:t>
+            </a:r>
+            <a:r>
+              <a:rPr lang="en-US" b="0" i="0" dirty="0">
+                <a:sym typeface="Arial"/>
+              </a:rPr>
+              <a:t>a </a:t>
+            </a:r>
+            <a:r>
+              <a:rPr lang="en-US" dirty="0"/>
+              <a:t>predictive model that can analyze past behavior and trends to forecast future customer sentiment and actions. These questions form the basis of our project and guide our research and development efforts</a:t>
+            </a:r>
+            <a:r>
+              <a:rPr lang="en-US" b="0" i="0" dirty="0">
+                <a:sym typeface="Arial"/>
+              </a:rPr>
+              <a:t>.</a:t>
+            </a:r>
+            <a:endParaRPr lang="en-US" dirty="0"/>
           </a:p>
         </p:txBody>
       </p:sp>
       <p:sp>
         <p:nvSpPr>
-          <p:cNvPr id="67" name="Google Shape;67;p4:notes"/>
+          <p:cNvPr id="60" name="Google Shape;60;p3:notes"/>
           <p:cNvSpPr txBox="1">
             <a:spLocks noGrp="1"/>
           </p:cNvSpPr>
@@ -5523,13 +5488,350 @@
             </a:pPr>
             <a:fld id="{00000000-1234-1234-1234-123412341234}" type="slidenum">
               <a:rPr lang="en-US"/>
+              <a:t>6</a:t>
+            </a:fld>
+            <a:endParaRPr/>
+          </a:p>
+        </p:txBody>
+      </p:sp>
+    </p:spTree>
+  </p:cSld>
+  <p:clrMapOvr>
+    <a:masterClrMapping/>
+  </p:clrMapOvr>
+</p:notes>
+</file>
+
+<file path=ppt/notesSlides/notesSlide7.xml><?xml version="1.0" encoding="utf-8"?>
+<p:notes xmlns:a="http://schemas.openxmlformats.org/drawingml/2006/main" xmlns:r="http://schemas.openxmlformats.org/officeDocument/2006/relationships" xmlns:p="http://schemas.openxmlformats.org/presentationml/2006/main">
+  <p:cSld>
+    <p:spTree>
+      <p:nvGrpSpPr>
+        <p:cNvPr id="1" name=""/>
+        <p:cNvGrpSpPr/>
+        <p:nvPr/>
+      </p:nvGrpSpPr>
+      <p:grpSpPr>
+        <a:xfrm>
+          <a:off x="0" y="0"/>
+          <a:ext cx="0" cy="0"/>
+          <a:chOff x="0" y="0"/>
+          <a:chExt cx="0" cy="0"/>
+        </a:xfrm>
+      </p:grpSpPr>
+      <p:sp>
+        <p:nvSpPr>
+          <p:cNvPr id="2" name="Slide Image Placeholder 1"/>
+          <p:cNvSpPr>
+            <a:spLocks noGrp="1" noRot="1" noChangeAspect="1"/>
+          </p:cNvSpPr>
+          <p:nvPr>
+            <p:ph type="sldImg"/>
+          </p:nvPr>
+        </p:nvSpPr>
+        <p:spPr/>
+      </p:sp>
+      <p:sp>
+        <p:nvSpPr>
+          <p:cNvPr id="3" name="Notes Placeholder 2"/>
+          <p:cNvSpPr>
+            <a:spLocks noGrp="1"/>
+          </p:cNvSpPr>
+          <p:nvPr>
+            <p:ph type="body" idx="1"/>
+          </p:nvPr>
+        </p:nvSpPr>
+        <p:spPr/>
+        <p:txBody>
+          <a:bodyPr/>
+          <a:lstStyle/>
+          <a:p>
+            <a:pPr marL="0" indent="0">
+              <a:spcBef>
+                <a:spcPts val="0"/>
+              </a:spcBef>
+            </a:pPr>
+            <a:r>
+              <a:rPr lang="en-US" dirty="0"/>
+              <a:t>So, how do we create a brand sentiment analyzer? Our process involves several steps. First, we explore the Sentiment140 dataset to understand the information represented and discover any limitations. Next, we use OpenAI’s GPT-4 to generate synthetic entries to provide more support for each brand class. Then, we preprocess the data to clean and prepare it for model development. We test different models for brand classification, including Multinomial Naive Bayes, Linear Support Vector Classifier, and Logistic Regression. We also test different models for sentiment classification, all using the Logistic Regression algorithm but with different vectorization methods. We evaluate each model using metrics such as accuracy, precision, recall, and F1 score. Finally, we combine the highest performing brand and sentiment classifiers to create a Brand Sentiment Analyzer.</a:t>
+            </a:r>
+          </a:p>
+        </p:txBody>
+      </p:sp>
+      <p:sp>
+        <p:nvSpPr>
+          <p:cNvPr id="4" name="Slide Number Placeholder 3"/>
+          <p:cNvSpPr>
+            <a:spLocks noGrp="1"/>
+          </p:cNvSpPr>
+          <p:nvPr>
+            <p:ph type="sldNum" idx="12"/>
+          </p:nvPr>
+        </p:nvSpPr>
+        <p:spPr/>
+        <p:txBody>
+          <a:bodyPr/>
+          <a:lstStyle/>
+          <a:p>
+            <a:pPr marL="0" marR="0" lvl="0" indent="0" algn="r" rtl="0">
+              <a:spcBef>
+                <a:spcPts val="0"/>
+              </a:spcBef>
+              <a:spcAft>
+                <a:spcPts val="0"/>
+              </a:spcAft>
+              <a:buNone/>
+            </a:pPr>
+            <a:fld id="{00000000-1234-1234-1234-123412341234}" type="slidenum">
+              <a:rPr lang="en-US" sz="1200" b="0" i="0" u="none" strike="noStrike" cap="none">
+                <a:solidFill>
+                  <a:schemeClr val="dk1"/>
+                </a:solidFill>
+                <a:latin typeface="Arial"/>
+                <a:ea typeface="Arial"/>
+                <a:cs typeface="Arial"/>
+                <a:sym typeface="Arial"/>
+              </a:rPr>
+              <a:t>7</a:t>
+            </a:fld>
+            <a:endParaRPr lang="en-US" sz="1200" b="0" i="0" u="none" strike="noStrike" cap="none">
+              <a:solidFill>
+                <a:schemeClr val="dk1"/>
+              </a:solidFill>
+              <a:latin typeface="Arial"/>
+              <a:ea typeface="Arial"/>
+              <a:cs typeface="Arial"/>
+              <a:sym typeface="Arial"/>
+            </a:endParaRPr>
+          </a:p>
+        </p:txBody>
+      </p:sp>
+    </p:spTree>
+    <p:extLst>
+      <p:ext uri="{BB962C8B-B14F-4D97-AF65-F5344CB8AC3E}">
+        <p14:creationId xmlns:p14="http://schemas.microsoft.com/office/powerpoint/2010/main" val="3757994113"/>
+      </p:ext>
+    </p:extLst>
+  </p:cSld>
+  <p:clrMapOvr>
+    <a:masterClrMapping/>
+  </p:clrMapOvr>
+</p:notes>
+</file>
+
+<file path=ppt/notesSlides/notesSlide8.xml><?xml version="1.0" encoding="utf-8"?>
+<p:notes xmlns:a="http://schemas.openxmlformats.org/drawingml/2006/main" xmlns:r="http://schemas.openxmlformats.org/officeDocument/2006/relationships" xmlns:p="http://schemas.openxmlformats.org/presentationml/2006/main">
+  <p:cSld>
+    <p:spTree>
+      <p:nvGrpSpPr>
+        <p:cNvPr id="1" name=""/>
+        <p:cNvGrpSpPr/>
+        <p:nvPr/>
+      </p:nvGrpSpPr>
+      <p:grpSpPr>
+        <a:xfrm>
+          <a:off x="0" y="0"/>
+          <a:ext cx="0" cy="0"/>
+          <a:chOff x="0" y="0"/>
+          <a:chExt cx="0" cy="0"/>
+        </a:xfrm>
+      </p:grpSpPr>
+      <p:sp>
+        <p:nvSpPr>
+          <p:cNvPr id="2" name="Slide Image Placeholder 1"/>
+          <p:cNvSpPr>
+            <a:spLocks noGrp="1" noRot="1" noChangeAspect="1"/>
+          </p:cNvSpPr>
+          <p:nvPr>
+            <p:ph type="sldImg"/>
+          </p:nvPr>
+        </p:nvSpPr>
+        <p:spPr/>
+      </p:sp>
+      <p:sp>
+        <p:nvSpPr>
+          <p:cNvPr id="3" name="Notes Placeholder 2"/>
+          <p:cNvSpPr>
+            <a:spLocks noGrp="1"/>
+          </p:cNvSpPr>
+          <p:nvPr>
+            <p:ph type="body" idx="1"/>
+          </p:nvPr>
+        </p:nvSpPr>
+        <p:spPr/>
+        <p:txBody>
+          <a:bodyPr/>
+          <a:lstStyle/>
+          <a:p>
+            <a:pPr marL="90170" indent="-58420">
+              <a:lnSpc>
+                <a:spcPct val="160000"/>
+              </a:lnSpc>
+              <a:spcBef>
+                <a:spcPts val="600"/>
+              </a:spcBef>
+            </a:pPr>
+            <a:r>
+              <a:rPr lang="en-US" dirty="0"/>
+              <a:t>In our project, we </a:t>
+            </a:r>
+            <a:r>
+              <a:rPr lang="en-US"/>
+              <a:t>considered </a:t>
+            </a:r>
+            <a:r>
+              <a:rPr lang="en-US" dirty="0"/>
+              <a:t>several machine learning algorithms. These </a:t>
+            </a:r>
+            <a:r>
+              <a:rPr lang="en-US"/>
+              <a:t>include Naïve Bayes, </a:t>
+            </a:r>
+            <a:r>
+              <a:rPr lang="en-US" dirty="0"/>
+              <a:t>which is a simple yet powerful algorithm based on Bayes' theorem. We also considered </a:t>
+            </a:r>
+            <a:r>
+              <a:rPr lang="en-US"/>
+              <a:t>Logistic</a:t>
+            </a:r>
+            <a:r>
+              <a:rPr lang="en-US" dirty="0"/>
+              <a:t> </a:t>
+            </a:r>
+            <a:r>
+              <a:rPr lang="en-US"/>
+              <a:t>Regression,</a:t>
+            </a:r>
+            <a:r>
+              <a:rPr lang="en-US" dirty="0"/>
+              <a:t> a popular algorithm for binary classification problems. </a:t>
+            </a:r>
+            <a:r>
+              <a:rPr lang="en-US"/>
+              <a:t>Support Vector Machines, </a:t>
+            </a:r>
+            <a:r>
+              <a:rPr lang="en-US" dirty="0"/>
+              <a:t>or SVMs, were another option. These are powerful algorithms that can handle both linear and non-linear data. We also considered </a:t>
+            </a:r>
+            <a:r>
+              <a:rPr lang="en-US"/>
+              <a:t>Recurrent Neural Networks, </a:t>
+            </a:r>
+            <a:r>
+              <a:rPr lang="en-US" dirty="0"/>
+              <a:t>or RNNs, which are a type of neural network that are particularly good at processing sequential data. Finally, we looked at </a:t>
+            </a:r>
+            <a:r>
+              <a:rPr lang="en-US"/>
+              <a:t>Transformers</a:t>
+            </a:r>
+            <a:r>
+              <a:rPr lang="en-US" dirty="0"/>
+              <a:t>, such as BERT, which are state-of-the-art models for natural language processing tasks</a:t>
+            </a:r>
+            <a:r>
+              <a:rPr lang="en-US"/>
+              <a:t>. Each </a:t>
+            </a:r>
+            <a:r>
+              <a:rPr lang="en-US" dirty="0"/>
+              <a:t>of these algorithms has its own strengths </a:t>
+            </a:r>
+            <a:r>
+              <a:rPr lang="en-US"/>
+              <a:t>and </a:t>
+            </a:r>
+            <a:r>
+              <a:rPr lang="en-US" dirty="0"/>
+              <a:t>weaknesses</a:t>
+            </a:r>
+            <a:r>
+              <a:rPr lang="en-US"/>
+              <a:t>, </a:t>
+            </a:r>
+            <a:r>
+              <a:rPr lang="en-US" dirty="0"/>
+              <a:t>and the choice of algorithm depends on </a:t>
+            </a:r>
+            <a:r>
+              <a:rPr lang="en-US"/>
+              <a:t>the </a:t>
+            </a:r>
+            <a:r>
+              <a:rPr lang="en-US" dirty="0"/>
+              <a:t>specific requirements </a:t>
+            </a:r>
+            <a:r>
+              <a:rPr lang="en-US"/>
+              <a:t>of the </a:t>
+            </a:r>
+            <a:r>
+              <a:rPr lang="en-US" dirty="0"/>
+              <a:t>task at hand</a:t>
+            </a:r>
+            <a:r>
+              <a:rPr lang="en-US"/>
+              <a:t>.</a:t>
+            </a:r>
+          </a:p>
+        </p:txBody>
+      </p:sp>
+      <p:sp>
+        <p:nvSpPr>
+          <p:cNvPr id="4" name="Slide Number Placeholder 3"/>
+          <p:cNvSpPr>
+            <a:spLocks noGrp="1"/>
+          </p:cNvSpPr>
+          <p:nvPr>
+            <p:ph type="sldNum" idx="12"/>
+          </p:nvPr>
+        </p:nvSpPr>
+        <p:spPr/>
+        <p:txBody>
+          <a:bodyPr/>
+          <a:lstStyle/>
+          <a:p>
+            <a:pPr marL="0" marR="0" lvl="0" indent="0" algn="r" rtl="0">
+              <a:spcBef>
+                <a:spcPts val="0"/>
+              </a:spcBef>
+              <a:spcAft>
+                <a:spcPts val="0"/>
+              </a:spcAft>
+              <a:buNone/>
+            </a:pPr>
+            <a:fld id="{00000000-1234-1234-1234-123412341234}" type="slidenum">
+              <a:rPr lang="en-US" sz="1200" b="0" i="0" u="none" strike="noStrike" cap="none">
+                <a:solidFill>
+                  <a:schemeClr val="dk1"/>
+                </a:solidFill>
+                <a:latin typeface="Arial"/>
+                <a:ea typeface="Arial"/>
+                <a:cs typeface="Arial"/>
+                <a:sym typeface="Arial"/>
+              </a:rPr>
               <a:t>8</a:t>
             </a:fld>
-            <a:endParaRPr/>
+            <a:endParaRPr lang="en-US" sz="1200" b="0" i="0" u="none" strike="noStrike" cap="none">
+              <a:solidFill>
+                <a:schemeClr val="dk1"/>
+              </a:solidFill>
+              <a:latin typeface="Arial"/>
+              <a:ea typeface="Arial"/>
+              <a:cs typeface="Arial"/>
+              <a:sym typeface="Arial"/>
+            </a:endParaRPr>
           </a:p>
         </p:txBody>
       </p:sp>
     </p:spTree>
+    <p:extLst>
+      <p:ext uri="{BB962C8B-B14F-4D97-AF65-F5344CB8AC3E}">
+        <p14:creationId xmlns:p14="http://schemas.microsoft.com/office/powerpoint/2010/main" val="1439647282"/>
+      </p:ext>
+    </p:extLst>
   </p:cSld>
   <p:clrMapOvr>
     <a:masterClrMapping/>
@@ -5634,14 +5936,10 @@
           </a:bodyPr>
           <a:lstStyle/>
           <a:p>
-            <a:pPr marL="0" lvl="0" indent="0" algn="l" rtl="0">
-              <a:spcBef>
-                <a:spcPts val="0"/>
-              </a:spcBef>
-              <a:spcAft>
-                <a:spcPts val="0"/>
-              </a:spcAft>
-              <a:buNone/>
+            <a:pPr marL="0" indent="0">
+              <a:spcBef>
+                <a:spcPts val="0"/>
+              </a:spcBef>
             </a:pPr>
             <a:r>
               <a:rPr lang="en-US" b="0" i="0">
@@ -5653,40 +5951,20 @@
                 <a:cs typeface="Arial"/>
                 <a:sym typeface="Arial"/>
               </a:rPr>
-              <a:t>In the field of sentiment analysis, two key datasets are the Sentiment140 dataset and the SurgeAI Brand Sentiment dataset.</a:t>
-            </a:r>
-            <a:endParaRPr/>
-          </a:p>
-          <a:p>
-            <a:pPr marL="0" lvl="0" indent="0" algn="l" rtl="0">
-              <a:spcBef>
-                <a:spcPts val="360"/>
-              </a:spcBef>
-              <a:spcAft>
-                <a:spcPts val="0"/>
-              </a:spcAft>
-              <a:buNone/>
-            </a:pPr>
-            <a:endParaRPr b="0" i="0">
-              <a:solidFill>
-                <a:srgbClr val="1C1917"/>
-              </a:solidFill>
-              <a:latin typeface="Arial"/>
-              <a:ea typeface="Arial"/>
-              <a:cs typeface="Arial"/>
-              <a:sym typeface="Arial"/>
-            </a:endParaRPr>
-          </a:p>
-          <a:p>
-            <a:pPr marL="0" lvl="0" indent="0" algn="l" rtl="0">
-              <a:spcBef>
-                <a:spcPts val="360"/>
-              </a:spcBef>
-              <a:spcAft>
-                <a:spcPts val="0"/>
-              </a:spcAft>
-              <a:buNone/>
-            </a:pPr>
+              <a:t>In the field of sentiment analysis, two key datasets are the Sentiment140 dataset and the </a:t>
+            </a:r>
+            <a:r>
+              <a:rPr lang="en-US" b="0" i="0" dirty="0" err="1">
+                <a:solidFill>
+                  <a:srgbClr val="1C1917"/>
+                </a:solidFill>
+                <a:latin typeface="Arial"/>
+                <a:ea typeface="Arial"/>
+                <a:cs typeface="Arial"/>
+                <a:sym typeface="Arial"/>
+              </a:rPr>
+              <a:t>SurgeAI</a:t>
+            </a:r>
             <a:r>
               <a:rPr lang="en-US" b="0" i="0">
                 <a:solidFill>
@@ -5697,40 +5975,16 @@
                 <a:cs typeface="Arial"/>
                 <a:sym typeface="Arial"/>
               </a:rPr>
-              <a:t>The Sentiment140 dataset, developed by Stanford researchers, is a comprehensive collection of 1.6 million tweets. Each tweet is annotated with a sentiment polarity - 0 indicating negative sentiment and 4 indicating positive sentiment. This large and diverse dataset is particularly useful for training robust machine learning models for sentiment analysis.</a:t>
-            </a:r>
-            <a:endParaRPr/>
-          </a:p>
-          <a:p>
-            <a:pPr marL="0" lvl="0" indent="0" algn="l" rtl="0">
-              <a:spcBef>
-                <a:spcPts val="360"/>
-              </a:spcBef>
-              <a:spcAft>
-                <a:spcPts val="0"/>
-              </a:spcAft>
-              <a:buNone/>
-            </a:pPr>
-            <a:endParaRPr b="0" i="0">
-              <a:solidFill>
-                <a:srgbClr val="1C1917"/>
-              </a:solidFill>
-              <a:latin typeface="Arial"/>
-              <a:ea typeface="Arial"/>
-              <a:cs typeface="Arial"/>
-              <a:sym typeface="Arial"/>
-            </a:endParaRPr>
-          </a:p>
-          <a:p>
-            <a:pPr marL="0" lvl="0" indent="0" algn="l" rtl="0">
-              <a:spcBef>
-                <a:spcPts val="360"/>
-              </a:spcBef>
-              <a:spcAft>
-                <a:spcPts val="0"/>
-              </a:spcAft>
-              <a:buNone/>
-            </a:pPr>
+              <a:t> Brand Sentiment dataset.</a:t>
+            </a:r>
+            <a:r>
+              <a:rPr lang="en-US" dirty="0">
+                <a:solidFill>
+                  <a:srgbClr val="1C1917"/>
+                </a:solidFill>
+              </a:rPr>
+              <a:t> </a:t>
+            </a:r>
             <a:r>
               <a:rPr lang="en-US" b="0" i="0">
                 <a:solidFill>
@@ -5741,40 +5995,16 @@
                 <a:cs typeface="Arial"/>
                 <a:sym typeface="Arial"/>
               </a:rPr>
-              <a:t>On the other hand, the SurgeAI Brand Sentiment dataset is a curated collection of over 600 tweets that provide insights into public opinions about global brands like Nike, Tesla, and Chick-fil-A. Each tweet in this dataset is labeled with sentiment scores, making it a valuable resource for tasks such as brand monitoring, sentiment analysis, and understanding consumer trends.</a:t>
-            </a:r>
-            <a:endParaRPr/>
-          </a:p>
-          <a:p>
-            <a:pPr marL="0" lvl="0" indent="0" algn="l" rtl="0">
-              <a:spcBef>
-                <a:spcPts val="360"/>
-              </a:spcBef>
-              <a:spcAft>
-                <a:spcPts val="0"/>
-              </a:spcAft>
-              <a:buNone/>
-            </a:pPr>
-            <a:endParaRPr b="0" i="0">
-              <a:solidFill>
-                <a:srgbClr val="1C1917"/>
-              </a:solidFill>
-              <a:latin typeface="Arial"/>
-              <a:ea typeface="Arial"/>
-              <a:cs typeface="Arial"/>
-              <a:sym typeface="Arial"/>
-            </a:endParaRPr>
-          </a:p>
-          <a:p>
-            <a:pPr marL="0" lvl="0" indent="0" algn="l" rtl="0">
-              <a:spcBef>
-                <a:spcPts val="360"/>
-              </a:spcBef>
-              <a:spcAft>
-                <a:spcPts val="0"/>
-              </a:spcAft>
-              <a:buNone/>
-            </a:pPr>
+              <a:t>The Sentiment140 dataset, developed by Stanford researchers, is a comprehensive collection of 1.6 million tweets. Each tweet is annotated with a sentiment polarity - 0 indicating negative sentiment and 4 indicating positive sentiment. This large and diverse dataset is particularly useful for training robust machine learning models for sentiment analysis.</a:t>
+            </a:r>
+            <a:r>
+              <a:rPr lang="en-US" dirty="0">
+                <a:solidFill>
+                  <a:srgbClr val="1C1917"/>
+                </a:solidFill>
+              </a:rPr>
+              <a:t> </a:t>
+            </a:r>
             <a:r>
               <a:rPr lang="en-US" b="0" i="0">
                 <a:solidFill>
@@ -5785,9 +6015,53 @@
                 <a:cs typeface="Arial"/>
                 <a:sym typeface="Arial"/>
               </a:rPr>
+              <a:t>On the other hand, the </a:t>
+            </a:r>
+            <a:r>
+              <a:rPr lang="en-US" b="0" i="0" dirty="0" err="1">
+                <a:solidFill>
+                  <a:srgbClr val="1C1917"/>
+                </a:solidFill>
+                <a:latin typeface="Arial"/>
+                <a:ea typeface="Arial"/>
+                <a:cs typeface="Arial"/>
+                <a:sym typeface="Arial"/>
+              </a:rPr>
+              <a:t>SurgeAI</a:t>
+            </a:r>
+            <a:r>
+              <a:rPr lang="en-US" b="0" i="0">
+                <a:solidFill>
+                  <a:srgbClr val="1C1917"/>
+                </a:solidFill>
+                <a:latin typeface="Arial"/>
+                <a:ea typeface="Arial"/>
+                <a:cs typeface="Arial"/>
+                <a:sym typeface="Arial"/>
+              </a:rPr>
+              <a:t> Brand Sentiment dataset is a curated collection of over 600 tweets that provide insights into public opinions about global brands like Nike, Tesla, and Chick-fil-A. Each tweet in this dataset is labeled with sentiment scores, making it a valuable resource for tasks such as brand monitoring, sentiment analysis, and understanding consumer trends.</a:t>
+            </a:r>
+            <a:r>
+              <a:rPr lang="en-US" dirty="0">
+                <a:solidFill>
+                  <a:srgbClr val="1C1917"/>
+                </a:solidFill>
+              </a:rPr>
+              <a:t> </a:t>
+            </a:r>
+            <a:r>
+              <a:rPr lang="en-US" b="0" i="0">
+                <a:solidFill>
+                  <a:srgbClr val="1C1917"/>
+                </a:solidFill>
+                <a:latin typeface="Arial"/>
+                <a:ea typeface="Arial"/>
+                <a:cs typeface="Arial"/>
+                <a:sym typeface="Arial"/>
+              </a:rPr>
               <a:t>Both these datasets offer unique opportunities for data scientists and researchers. They provide a wealth of information to train models that can accurately gauge public sentiment based on tweet content, each with their own unique focus and application.</a:t>
             </a:r>
-            <a:endParaRPr/>
+            <a:endParaRPr lang="en-US" dirty="0"/>
           </a:p>
         </p:txBody>
       </p:sp>
@@ -13090,8 +13364,8 @@
         </p:nvSpPr>
         <p:spPr>
           <a:xfrm>
-            <a:off x="914400" y="685800"/>
-            <a:ext cx="10363200" cy="1143000"/>
+            <a:off x="0" y="6928"/>
+            <a:ext cx="12192000" cy="1821872"/>
           </a:xfrm>
           <a:prstGeom prst="rect">
             <a:avLst/>
@@ -13107,23 +13381,19 @@
           </a:bodyPr>
           <a:lstStyle/>
           <a:p>
-            <a:pPr marL="0" lvl="0" indent="0" algn="l" rtl="0">
+            <a:pPr algn="ctr">
               <a:lnSpc>
                 <a:spcPct val="104999"/>
               </a:lnSpc>
-              <a:spcBef>
-                <a:spcPts val="0"/>
-              </a:spcBef>
-              <a:spcAft>
-                <a:spcPts val="0"/>
-              </a:spcAft>
-              <a:buNone/>
             </a:pPr>
             <a:r>
               <a:rPr lang="en-US"/>
               <a:t>Challenges</a:t>
             </a:r>
-            <a:endParaRPr/>
+            <a:r>
+              <a:rPr lang="en-US" dirty="0"/>
+              <a:t> &amp; Limitations</a:t>
+            </a:r>
           </a:p>
         </p:txBody>
       </p:sp>
@@ -13139,8 +13409,8 @@
         </p:nvSpPr>
         <p:spPr>
           <a:xfrm>
-            <a:off x="2100266" y="1947863"/>
-            <a:ext cx="7881937" cy="3776662"/>
+            <a:off x="8230" y="1947863"/>
+            <a:ext cx="12190700" cy="3776662"/>
           </a:xfrm>
           <a:prstGeom prst="rect">
             <a:avLst/>
@@ -13156,60 +13426,72 @@
           </a:bodyPr>
           <a:lstStyle/>
           <a:p>
-            <a:pPr marL="514350" lvl="0" indent="-514350" algn="l" rtl="0">
+            <a:pPr marL="0" indent="0" algn="ctr">
               <a:lnSpc>
-                <a:spcPct val="114285"/>
+                <a:spcPct val="114284"/>
               </a:lnSpc>
-              <a:spcBef>
-                <a:spcPts val="0"/>
-              </a:spcBef>
-              <a:spcAft>
-                <a:spcPts val="0"/>
-              </a:spcAft>
-              <a:buSzPts val="700"/>
-              <a:buAutoNum type="arabicPeriod"/>
+              <a:buNone/>
             </a:pPr>
             <a:r>
+              <a:rPr lang="en-US" dirty="0"/>
+              <a:t>Ambiguity in language</a:t>
+            </a:r>
+            <a:br>
+              <a:rPr lang="en-US" dirty="0"/>
+            </a:br>
+            <a:endParaRPr lang="en-US" dirty="0"/>
+          </a:p>
+          <a:p>
+            <a:pPr marL="0" indent="0" algn="ctr">
+              <a:lnSpc>
+                <a:spcPct val="114284"/>
+              </a:lnSpc>
+              <a:buNone/>
+            </a:pPr>
+            <a:r>
+              <a:rPr lang="en-US" dirty="0"/>
+              <a:t>Insufficient data on certain </a:t>
+            </a:r>
+            <a:r>
               <a:rPr lang="en-US"/>
-              <a:t>Not enough tweets mentioning brands</a:t>
-            </a:r>
-          </a:p>
-          <a:p>
-            <a:pPr marL="514350" lvl="0" indent="-514350" algn="l" rtl="0">
+              <a:t>brands</a:t>
+            </a:r>
+            <a:br>
+              <a:rPr lang="en-US" dirty="0"/>
+            </a:br>
+            <a:endParaRPr lang="en-US" dirty="0"/>
+          </a:p>
+          <a:p>
+            <a:pPr marL="0" indent="0" algn="ctr">
               <a:lnSpc>
-                <a:spcPct val="114285"/>
+                <a:spcPct val="114284"/>
               </a:lnSpc>
-              <a:spcBef>
-                <a:spcPts val="600"/>
-              </a:spcBef>
-              <a:spcAft>
-                <a:spcPts val="0"/>
-              </a:spcAft>
-              <a:buSzPts val="700"/>
-              <a:buAutoNum type="arabicPeriod"/>
+              <a:buNone/>
             </a:pPr>
             <a:r>
               <a:rPr lang="en-US"/>
-              <a:t>Aboutness problem</a:t>
-            </a:r>
-            <a:endParaRPr/>
-          </a:p>
-          <a:p>
-            <a:pPr marL="514350" indent="-514350">
+              <a:t>Large </a:t>
+            </a:r>
+            <a:r>
+              <a:rPr lang="en-US" dirty="0"/>
+              <a:t>dataset size</a:t>
+            </a:r>
+            <a:br>
+              <a:rPr lang="en-US" dirty="0"/>
+            </a:br>
+            <a:endParaRPr lang="en-US" dirty="0"/>
+          </a:p>
+          <a:p>
+            <a:pPr marL="0" indent="0" algn="ctr">
               <a:lnSpc>
-                <a:spcPct val="114285"/>
+                <a:spcPct val="114284"/>
               </a:lnSpc>
-              <a:spcBef>
-                <a:spcPts val="600"/>
-              </a:spcBef>
-              <a:buSzPts val="700"/>
-              <a:buAutoNum type="arabicPeriod"/>
+              <a:buNone/>
             </a:pPr>
             <a:r>
-              <a:rPr lang="en-US"/>
-              <a:t>Large Size of Sentiment140 Dataset</a:t>
-            </a:r>
-            <a:endParaRPr/>
+              <a:rPr lang="en-US" dirty="0"/>
+              <a:t>Computational resources and processing time</a:t>
+            </a:r>
           </a:p>
         </p:txBody>
       </p:sp>
@@ -13222,6 +13504,209 @@
 </file>
 
 <file path=ppt/slides/slide24.xml><?xml version="1.0" encoding="utf-8"?>
+<p:sld xmlns:a="http://schemas.openxmlformats.org/drawingml/2006/main" xmlns:r="http://schemas.openxmlformats.org/officeDocument/2006/relationships" xmlns:p="http://schemas.openxmlformats.org/presentationml/2006/main">
+  <p:cSld>
+    <p:spTree>
+      <p:nvGrpSpPr>
+        <p:cNvPr id="1" name="Shape 180"/>
+        <p:cNvGrpSpPr/>
+        <p:nvPr/>
+      </p:nvGrpSpPr>
+      <p:grpSpPr>
+        <a:xfrm>
+          <a:off x="0" y="0"/>
+          <a:ext cx="0" cy="0"/>
+          <a:chOff x="0" y="0"/>
+          <a:chExt cx="0" cy="0"/>
+        </a:xfrm>
+      </p:grpSpPr>
+      <p:sp>
+        <p:nvSpPr>
+          <p:cNvPr id="181" name="Google Shape;181;p20"/>
+          <p:cNvSpPr txBox="1">
+            <a:spLocks noGrp="1"/>
+          </p:cNvSpPr>
+          <p:nvPr>
+            <p:ph type="title"/>
+          </p:nvPr>
+        </p:nvSpPr>
+        <p:spPr>
+          <a:xfrm>
+            <a:off x="0" y="6927"/>
+            <a:ext cx="12192000" cy="1932709"/>
+          </a:xfrm>
+          <a:prstGeom prst="rect">
+            <a:avLst/>
+          </a:prstGeom>
+          <a:noFill/>
+          <a:ln>
+            <a:noFill/>
+          </a:ln>
+        </p:spPr>
+        <p:txBody>
+          <a:bodyPr spcFirstLastPara="1" wrap="square" lIns="0" tIns="0" rIns="0" bIns="0" anchor="ctr" anchorCtr="0">
+            <a:noAutofit/>
+          </a:bodyPr>
+          <a:lstStyle/>
+          <a:p>
+            <a:pPr marL="0" lvl="0" indent="0" algn="ctr" rtl="0">
+              <a:lnSpc>
+                <a:spcPct val="104999"/>
+              </a:lnSpc>
+              <a:spcBef>
+                <a:spcPts val="0"/>
+              </a:spcBef>
+              <a:spcAft>
+                <a:spcPts val="0"/>
+              </a:spcAft>
+              <a:buNone/>
+            </a:pPr>
+            <a:r>
+              <a:rPr lang="en-US"/>
+              <a:t>Future Work</a:t>
+            </a:r>
+          </a:p>
+        </p:txBody>
+      </p:sp>
+      <p:sp>
+        <p:nvSpPr>
+          <p:cNvPr id="182" name="Google Shape;182;p20"/>
+          <p:cNvSpPr txBox="1">
+            <a:spLocks noGrp="1"/>
+          </p:cNvSpPr>
+          <p:nvPr>
+            <p:ph type="body" idx="1"/>
+          </p:nvPr>
+        </p:nvSpPr>
+        <p:spPr>
+          <a:xfrm>
+            <a:off x="0" y="1947875"/>
+            <a:ext cx="12198926" cy="3776700"/>
+          </a:xfrm>
+          <a:prstGeom prst="rect">
+            <a:avLst/>
+          </a:prstGeom>
+          <a:noFill/>
+          <a:ln>
+            <a:noFill/>
+          </a:ln>
+        </p:spPr>
+        <p:txBody>
+          <a:bodyPr spcFirstLastPara="1" wrap="square" lIns="0" tIns="0" rIns="0" bIns="0" anchor="t" anchorCtr="0">
+            <a:noAutofit/>
+          </a:bodyPr>
+          <a:lstStyle/>
+          <a:p>
+            <a:pPr marL="101600" indent="0" algn="ctr">
+              <a:lnSpc>
+                <a:spcPct val="114999"/>
+              </a:lnSpc>
+              <a:spcBef>
+                <a:spcPts val="1200"/>
+              </a:spcBef>
+              <a:buSzPts val="2000"/>
+              <a:buNone/>
+            </a:pPr>
+            <a:r>
+              <a:rPr lang="en-US" dirty="0"/>
+              <a:t>Fine-tune model parameters</a:t>
+            </a:r>
+            <a:endParaRPr lang="en-US" sz="3600" dirty="0"/>
+          </a:p>
+          <a:p>
+            <a:pPr marL="101600" indent="0" algn="ctr">
+              <a:lnSpc>
+                <a:spcPct val="114999"/>
+              </a:lnSpc>
+              <a:spcBef>
+                <a:spcPts val="1200"/>
+              </a:spcBef>
+              <a:buSzPts val="2000"/>
+              <a:buNone/>
+            </a:pPr>
+            <a:r>
+              <a:rPr lang="en-US" dirty="0"/>
+              <a:t>Test on larger and more diverse datasets</a:t>
+            </a:r>
+            <a:endParaRPr lang="en-US" sz="3600" dirty="0"/>
+          </a:p>
+          <a:p>
+            <a:pPr marL="101600" indent="0" algn="ctr">
+              <a:lnSpc>
+                <a:spcPct val="114999"/>
+              </a:lnSpc>
+              <a:spcBef>
+                <a:spcPts val="1200"/>
+              </a:spcBef>
+              <a:buSzPts val="2000"/>
+              <a:buNone/>
+            </a:pPr>
+            <a:r>
+              <a:rPr lang="en-US" dirty="0"/>
+              <a:t>Develop a multimodal model</a:t>
+            </a:r>
+            <a:endParaRPr lang="en-US" sz="3600" dirty="0"/>
+          </a:p>
+          <a:p>
+            <a:pPr marL="101600" indent="0" algn="ctr">
+              <a:lnSpc>
+                <a:spcPct val="114999"/>
+              </a:lnSpc>
+              <a:spcBef>
+                <a:spcPts val="1200"/>
+              </a:spcBef>
+              <a:buSzPts val="2000"/>
+              <a:buNone/>
+            </a:pPr>
+            <a:r>
+              <a:rPr lang="en-US" dirty="0"/>
+              <a:t>Explore the impact of data duplication on model performance</a:t>
+            </a:r>
+            <a:endParaRPr lang="en-US" sz="3600" dirty="0"/>
+          </a:p>
+          <a:p>
+            <a:pPr marL="101600" indent="0" algn="ctr">
+              <a:lnSpc>
+                <a:spcPct val="114999"/>
+              </a:lnSpc>
+              <a:spcBef>
+                <a:spcPts val="1200"/>
+              </a:spcBef>
+              <a:buSzPts val="2000"/>
+              <a:buNone/>
+            </a:pPr>
+            <a:r>
+              <a:rPr lang="en-US" dirty="0"/>
+              <a:t>Use Large Language Models (LLMs)</a:t>
+            </a:r>
+          </a:p>
+          <a:p>
+            <a:pPr marL="930275" lvl="0" indent="0" algn="l" rtl="0">
+              <a:lnSpc>
+                <a:spcPct val="114285"/>
+              </a:lnSpc>
+              <a:spcBef>
+                <a:spcPts val="0"/>
+              </a:spcBef>
+              <a:spcAft>
+                <a:spcPts val="0"/>
+              </a:spcAft>
+              <a:buSzPts val="450"/>
+              <a:buNone/>
+            </a:pPr>
+            <a:endParaRPr lang="en-US"/>
+          </a:p>
+        </p:txBody>
+      </p:sp>
+    </p:spTree>
+  </p:cSld>
+  <p:clrMapOvr>
+    <a:masterClrMapping/>
+  </p:clrMapOvr>
+</p:sld>
+</file>
+
+<file path=ppt/slides/slide25.xml><?xml version="1.0" encoding="utf-8"?>
 <p:sld xmlns:a="http://schemas.openxmlformats.org/drawingml/2006/main" xmlns:r="http://schemas.openxmlformats.org/officeDocument/2006/relationships" xmlns:p="http://schemas.openxmlformats.org/presentationml/2006/main">
   <p:cSld>
     <p:spTree>
@@ -13267,23 +13752,16 @@
           </a:bodyPr>
           <a:lstStyle/>
           <a:p>
-            <a:pPr marL="0" lvl="0" indent="0" algn="l" rtl="0">
+            <a:pPr>
               <a:lnSpc>
                 <a:spcPct val="104999"/>
               </a:lnSpc>
-              <a:spcBef>
-                <a:spcPts val="0"/>
-              </a:spcBef>
-              <a:spcAft>
-                <a:spcPts val="0"/>
-              </a:spcAft>
-              <a:buNone/>
             </a:pPr>
             <a:r>
               <a:rPr lang="en-US"/>
               <a:t>Conclusion</a:t>
             </a:r>
-            <a:endParaRPr/>
+            <a:endParaRPr lang="en-US" dirty="0"/>
           </a:p>
         </p:txBody>
       </p:sp>
@@ -13316,281 +13794,99 @@
           </a:bodyPr>
           <a:lstStyle/>
           <a:p>
-            <a:pPr marL="457200" lvl="0" indent="-349250" algn="l" rtl="0">
+            <a:pPr marL="565150" indent="-457200">
               <a:lnSpc>
                 <a:spcPct val="115000"/>
               </a:lnSpc>
               <a:spcBef>
                 <a:spcPts val="1200"/>
               </a:spcBef>
-              <a:spcAft>
-                <a:spcPts val="0"/>
-              </a:spcAft>
               <a:buClr>
                 <a:schemeClr val="dk1"/>
               </a:buClr>
               <a:buSzPts val="1900"/>
-              <a:buFont typeface="Arial"/>
-              <a:buChar char="●"/>
+              <a:buAutoNum type="arabicPeriod"/>
             </a:pPr>
             <a:r>
-              <a:rPr lang="en-US" sz="1900"/>
-              <a:t>Depending on the specific needs of the task, different approaches might be preferred.</a:t>
-            </a:r>
-            <a:endParaRPr sz="1900"/>
-          </a:p>
-          <a:p>
-            <a:pPr marL="457200" lvl="0" indent="0" algn="l" rtl="0">
+              <a:rPr lang="en-US" dirty="0"/>
+              <a:t>Developed a robust brand sentiment analyzer</a:t>
+            </a:r>
+          </a:p>
+          <a:p>
+            <a:pPr marL="565150" indent="-457200">
               <a:lnSpc>
-                <a:spcPct val="115000"/>
+                <a:spcPct val="114999"/>
               </a:lnSpc>
               <a:spcBef>
                 <a:spcPts val="1200"/>
               </a:spcBef>
-              <a:spcAft>
-                <a:spcPts val="0"/>
-              </a:spcAft>
-              <a:buNone/>
-            </a:pPr>
-            <a:endParaRPr sz="1900"/>
-          </a:p>
-          <a:p>
-            <a:pPr marL="457200" lvl="0" indent="-349250" algn="l" rtl="0">
-              <a:lnSpc>
-                <a:spcPct val="115000"/>
-              </a:lnSpc>
-              <a:spcBef>
-                <a:spcPts val="1200"/>
-              </a:spcBef>
-              <a:spcAft>
-                <a:spcPts val="0"/>
-              </a:spcAft>
               <a:buClr>
                 <a:schemeClr val="dk1"/>
               </a:buClr>
               <a:buSzPts val="1900"/>
-              <a:buFont typeface="Arial"/>
-              <a:buChar char="●"/>
+              <a:buAutoNum type="arabicPeriod"/>
             </a:pPr>
             <a:r>
-              <a:rPr lang="en-US" sz="1900"/>
-              <a:t>It's essential to evaluate models based on the metrics that align with the project's goals.</a:t>
-            </a:r>
-            <a:endParaRPr sz="1900"/>
-          </a:p>
-          <a:p>
-            <a:pPr marL="457200" lvl="0" indent="0" algn="l" rtl="0">
+              <a:rPr lang="en-US" dirty="0"/>
+              <a:t>Leveraged AI to provide businesses with real-time insights</a:t>
+            </a:r>
+          </a:p>
+          <a:p>
+            <a:pPr marL="565150" indent="-457200">
               <a:lnSpc>
-                <a:spcPct val="115000"/>
+                <a:spcPct val="114999"/>
               </a:lnSpc>
               <a:spcBef>
                 <a:spcPts val="1200"/>
               </a:spcBef>
-              <a:spcAft>
-                <a:spcPts val="0"/>
-              </a:spcAft>
-              <a:buNone/>
-            </a:pPr>
-            <a:endParaRPr sz="1900"/>
-          </a:p>
-          <a:p>
-            <a:pPr marL="457200" lvl="0" indent="-349250" algn="l" rtl="0">
-              <a:lnSpc>
-                <a:spcPct val="115000"/>
-              </a:lnSpc>
-              <a:spcBef>
-                <a:spcPts val="1200"/>
-              </a:spcBef>
-              <a:spcAft>
-                <a:spcPts val="0"/>
-              </a:spcAft>
               <a:buClr>
                 <a:schemeClr val="dk1"/>
               </a:buClr>
               <a:buSzPts val="1900"/>
-              <a:buFont typeface="Arial"/>
-              <a:buChar char="●"/>
+              <a:buAutoNum type="arabicPeriod"/>
             </a:pPr>
             <a:r>
-              <a:rPr lang="en-US" sz="1900"/>
-              <a:t>The choice of classification approach should be made considering a holistic view of metrics, aligning with the project's objectives.</a:t>
-            </a:r>
-            <a:endParaRPr sz="1900"/>
-          </a:p>
-        </p:txBody>
-      </p:sp>
-    </p:spTree>
-  </p:cSld>
-  <p:clrMapOvr>
-    <a:masterClrMapping/>
-  </p:clrMapOvr>
-</p:sld>
-</file>
-
-<file path=ppt/slides/slide25.xml><?xml version="1.0" encoding="utf-8"?>
-<p:sld xmlns:a="http://schemas.openxmlformats.org/drawingml/2006/main" xmlns:r="http://schemas.openxmlformats.org/officeDocument/2006/relationships" xmlns:p="http://schemas.openxmlformats.org/presentationml/2006/main">
-  <p:cSld>
-    <p:spTree>
-      <p:nvGrpSpPr>
-        <p:cNvPr id="1" name="Shape 180"/>
-        <p:cNvGrpSpPr/>
-        <p:nvPr/>
-      </p:nvGrpSpPr>
-      <p:grpSpPr>
-        <a:xfrm>
-          <a:off x="0" y="0"/>
-          <a:ext cx="0" cy="0"/>
-          <a:chOff x="0" y="0"/>
-          <a:chExt cx="0" cy="0"/>
-        </a:xfrm>
-      </p:grpSpPr>
-      <p:sp>
-        <p:nvSpPr>
-          <p:cNvPr id="181" name="Google Shape;181;p20"/>
-          <p:cNvSpPr txBox="1">
-            <a:spLocks noGrp="1"/>
-          </p:cNvSpPr>
-          <p:nvPr>
-            <p:ph type="title"/>
-          </p:nvPr>
-        </p:nvSpPr>
-        <p:spPr>
-          <a:xfrm>
-            <a:off x="914400" y="685800"/>
-            <a:ext cx="10363200" cy="1143000"/>
-          </a:xfrm>
-          <a:prstGeom prst="rect">
-            <a:avLst/>
-          </a:prstGeom>
-          <a:noFill/>
-          <a:ln>
-            <a:noFill/>
-          </a:ln>
-        </p:spPr>
-        <p:txBody>
-          <a:bodyPr spcFirstLastPara="1" wrap="square" lIns="0" tIns="0" rIns="0" bIns="0" anchor="ctr" anchorCtr="0">
-            <a:noAutofit/>
-          </a:bodyPr>
-          <a:lstStyle/>
-          <a:p>
-            <a:pPr marL="0" lvl="0" indent="0" algn="l" rtl="0">
+              <a:rPr lang="en-US" dirty="0"/>
+              <a:t>Overcame challenges and limitations</a:t>
+            </a:r>
+          </a:p>
+          <a:p>
+            <a:pPr marL="565150" indent="-457200">
               <a:lnSpc>
-                <a:spcPct val="104999"/>
+                <a:spcPct val="114999"/>
               </a:lnSpc>
               <a:spcBef>
-                <a:spcPts val="0"/>
-              </a:spcBef>
-              <a:spcAft>
-                <a:spcPts val="0"/>
-              </a:spcAft>
-              <a:buNone/>
+                <a:spcPts val="1200"/>
+              </a:spcBef>
+              <a:buClr>
+                <a:schemeClr val="dk1"/>
+              </a:buClr>
+              <a:buSzPts val="1900"/>
+              <a:buAutoNum type="arabicPeriod"/>
             </a:pPr>
             <a:r>
-              <a:rPr lang="en-US"/>
-              <a:t>Future Work</a:t>
-            </a:r>
-            <a:endParaRPr/>
-          </a:p>
-        </p:txBody>
-      </p:sp>
-      <p:sp>
-        <p:nvSpPr>
-          <p:cNvPr id="182" name="Google Shape;182;p20"/>
-          <p:cNvSpPr txBox="1">
-            <a:spLocks noGrp="1"/>
-          </p:cNvSpPr>
-          <p:nvPr>
-            <p:ph type="body" idx="1"/>
-          </p:nvPr>
-        </p:nvSpPr>
-        <p:spPr>
-          <a:xfrm>
-            <a:off x="914400" y="1947875"/>
-            <a:ext cx="9067800" cy="3776700"/>
-          </a:xfrm>
-          <a:prstGeom prst="rect">
-            <a:avLst/>
-          </a:prstGeom>
-          <a:noFill/>
-          <a:ln>
-            <a:noFill/>
-          </a:ln>
-        </p:spPr>
-        <p:txBody>
-          <a:bodyPr spcFirstLastPara="1" wrap="square" lIns="0" tIns="0" rIns="0" bIns="0" anchor="t" anchorCtr="0">
-            <a:noAutofit/>
-          </a:bodyPr>
-          <a:lstStyle/>
-          <a:p>
-            <a:pPr marL="457200" lvl="0" indent="-355600" algn="l" rtl="0">
+              <a:rPr lang="en-US" dirty="0"/>
+              <a:t>Identified areas for future work</a:t>
+            </a:r>
+          </a:p>
+          <a:p>
+            <a:pPr marL="565150" indent="-457200">
               <a:lnSpc>
-                <a:spcPct val="115000"/>
+                <a:spcPct val="114999"/>
               </a:lnSpc>
               <a:spcBef>
                 <a:spcPts val="1200"/>
               </a:spcBef>
-              <a:spcAft>
-                <a:spcPts val="0"/>
-              </a:spcAft>
-              <a:buSzPts val="2000"/>
-              <a:buChar char="●"/>
+              <a:buClr>
+                <a:schemeClr val="dk1"/>
+              </a:buClr>
+              <a:buSzPts val="1900"/>
+              <a:buAutoNum type="arabicPeriod"/>
             </a:pPr>
             <a:r>
-              <a:rPr lang="en-US" sz="2000"/>
-              <a:t>Further exploration could involve fine-tuning model parameters to potentially improve performance.</a:t>
-            </a:r>
-            <a:endParaRPr sz="2000"/>
-          </a:p>
-          <a:p>
-            <a:pPr marL="457200" lvl="0" indent="0" algn="l" rtl="0">
-              <a:lnSpc>
-                <a:spcPct val="115000"/>
-              </a:lnSpc>
-              <a:spcBef>
-                <a:spcPts val="1200"/>
-              </a:spcBef>
-              <a:spcAft>
-                <a:spcPts val="0"/>
-              </a:spcAft>
-              <a:buNone/>
-            </a:pPr>
-            <a:endParaRPr sz="2000"/>
-          </a:p>
-          <a:p>
-            <a:pPr marL="457200" lvl="0" indent="-355600" algn="l" rtl="0">
-              <a:lnSpc>
-                <a:spcPct val="115000"/>
-              </a:lnSpc>
-              <a:spcBef>
-                <a:spcPts val="1200"/>
-              </a:spcBef>
-              <a:spcAft>
-                <a:spcPts val="0"/>
-              </a:spcAft>
-              <a:buSzPts val="2000"/>
-              <a:buChar char="●"/>
-            </a:pPr>
-            <a:r>
-              <a:rPr lang="en-US" sz="2000"/>
-              <a:t>Testing on larger and more diverse datasets could provide additional insights into the models' generalizability.</a:t>
-            </a:r>
-            <a:endParaRPr sz="2000"/>
-          </a:p>
-          <a:p>
-            <a:pPr marL="1005839" lvl="0" indent="-75564" algn="l" rtl="0">
-              <a:lnSpc>
-                <a:spcPct val="114285"/>
-              </a:lnSpc>
-              <a:spcBef>
-                <a:spcPts val="0"/>
-              </a:spcBef>
-              <a:spcAft>
-                <a:spcPts val="0"/>
-              </a:spcAft>
-              <a:buSzPts val="450"/>
-              <a:buChar char=" "/>
-            </a:pPr>
-            <a:endParaRPr/>
+              <a:rPr lang="en-US" dirty="0"/>
+              <a:t>Importance of aligning model evaluation with project goals</a:t>
+            </a:r>
           </a:p>
         </p:txBody>
       </p:sp>
@@ -13603,106 +13899,6 @@
 </file>
 
 <file path=ppt/slides/slide26.xml><?xml version="1.0" encoding="utf-8"?>
-<p:sld xmlns:a="http://schemas.openxmlformats.org/drawingml/2006/main" xmlns:r="http://schemas.openxmlformats.org/officeDocument/2006/relationships" xmlns:p="http://schemas.openxmlformats.org/presentationml/2006/main">
-  <p:cSld>
-    <p:spTree>
-      <p:nvGrpSpPr>
-        <p:cNvPr id="1" name=""/>
-        <p:cNvGrpSpPr/>
-        <p:nvPr/>
-      </p:nvGrpSpPr>
-      <p:grpSpPr>
-        <a:xfrm>
-          <a:off x="0" y="0"/>
-          <a:ext cx="0" cy="0"/>
-          <a:chOff x="0" y="0"/>
-          <a:chExt cx="0" cy="0"/>
-        </a:xfrm>
-      </p:grpSpPr>
-      <p:sp>
-        <p:nvSpPr>
-          <p:cNvPr id="2" name="Title 1">
-            <a:extLst>
-              <a:ext uri="{FF2B5EF4-FFF2-40B4-BE49-F238E27FC236}">
-                <a16:creationId xmlns:a16="http://schemas.microsoft.com/office/drawing/2014/main" id="{5C966DC2-0A39-45F2-735D-79C32BD37931}"/>
-              </a:ext>
-            </a:extLst>
-          </p:cNvPr>
-          <p:cNvSpPr>
-            <a:spLocks noGrp="1"/>
-          </p:cNvSpPr>
-          <p:nvPr>
-            <p:ph type="title"/>
-          </p:nvPr>
-        </p:nvSpPr>
-        <p:spPr/>
-        <p:txBody>
-          <a:bodyPr/>
-          <a:lstStyle/>
-          <a:p>
-            <a:r>
-              <a:rPr lang="en-US"/>
-              <a:t>Large Language Models</a:t>
-            </a:r>
-          </a:p>
-        </p:txBody>
-      </p:sp>
-      <p:sp>
-        <p:nvSpPr>
-          <p:cNvPr id="3" name="Text Placeholder 2">
-            <a:extLst>
-              <a:ext uri="{FF2B5EF4-FFF2-40B4-BE49-F238E27FC236}">
-                <a16:creationId xmlns:a16="http://schemas.microsoft.com/office/drawing/2014/main" id="{805EDF67-4873-2D92-5907-AB878506E0E4}"/>
-              </a:ext>
-            </a:extLst>
-          </p:cNvPr>
-          <p:cNvSpPr>
-            <a:spLocks noGrp="1"/>
-          </p:cNvSpPr>
-          <p:nvPr>
-            <p:ph type="body" idx="1"/>
-          </p:nvPr>
-        </p:nvSpPr>
-        <p:spPr/>
-        <p:txBody>
-          <a:bodyPr/>
-          <a:lstStyle/>
-          <a:p>
-            <a:pPr lvl="1">
-              <a:buFont typeface="Arial"/>
-              <a:buChar char="•"/>
-            </a:pPr>
-            <a:r>
-              <a:rPr lang="en-US"/>
-              <a:t>BERT</a:t>
-            </a:r>
-          </a:p>
-          <a:p>
-            <a:pPr lvl="1">
-              <a:buFont typeface="Arial"/>
-              <a:buChar char="•"/>
-            </a:pPr>
-            <a:r>
-              <a:rPr lang="en-US"/>
-              <a:t>GPT2</a:t>
-            </a:r>
-          </a:p>
-        </p:txBody>
-      </p:sp>
-    </p:spTree>
-    <p:extLst>
-      <p:ext uri="{BB962C8B-B14F-4D97-AF65-F5344CB8AC3E}">
-        <p14:creationId xmlns:p14="http://schemas.microsoft.com/office/powerpoint/2010/main" val="4048882109"/>
-      </p:ext>
-    </p:extLst>
-  </p:cSld>
-  <p:clrMapOvr>
-    <a:masterClrMapping/>
-  </p:clrMapOvr>
-</p:sld>
-</file>
-
-<file path=ppt/slides/slide27.xml><?xml version="1.0" encoding="utf-8"?>
 <p:sld xmlns:a="http://schemas.openxmlformats.org/drawingml/2006/main" xmlns:r="http://schemas.openxmlformats.org/officeDocument/2006/relationships" xmlns:p="http://schemas.openxmlformats.org/presentationml/2006/main">
   <p:cSld>
     <p:spTree>
@@ -13860,15 +14056,22 @@
             <p:ph type="title"/>
           </p:nvPr>
         </p:nvSpPr>
-        <p:spPr/>
+        <p:spPr>
+          <a:xfrm>
+            <a:off x="-2059" y="-4119"/>
+            <a:ext cx="12196118" cy="1420091"/>
+          </a:xfrm>
+        </p:spPr>
         <p:txBody>
           <a:bodyPr/>
           <a:lstStyle/>
           <a:p>
+            <a:pPr algn="ctr"/>
             <a:r>
               <a:rPr lang="en-US"/>
               <a:t>Why Use AI in Business?</a:t>
             </a:r>
+            <a:endParaRPr lang="en-US" dirty="0"/>
           </a:p>
         </p:txBody>
       </p:sp>
@@ -13888,12 +14091,17 @@
             <p:ph type="body" idx="1"/>
           </p:nvPr>
         </p:nvSpPr>
-        <p:spPr/>
+        <p:spPr>
+          <a:xfrm>
+            <a:off x="-7758" y="1545890"/>
+            <a:ext cx="12185903" cy="4455344"/>
+          </a:xfrm>
+        </p:spPr>
         <p:txBody>
           <a:bodyPr/>
           <a:lstStyle/>
           <a:p>
-            <a:pPr marL="657225" indent="-457200"/>
+            <a:pPr marL="657225" indent="-457200" algn="ctr"/>
             <a:r>
               <a:rPr lang="en-US" sz="2400">
                 <a:solidFill>
@@ -13902,10 +14110,10 @@
               </a:rPr>
               <a:t>Understand customer sentiment towards brand</a:t>
             </a:r>
-            <a:endParaRPr lang="en-US" sz="2400"/>
-          </a:p>
-          <a:p>
-            <a:pPr marL="657225" indent="-457200"/>
+            <a:endParaRPr lang="en-US" sz="2400" dirty="0"/>
+          </a:p>
+          <a:p>
+            <a:pPr marL="657225" indent="-457200" algn="ctr"/>
             <a:r>
               <a:rPr lang="en-US" sz="2400">
                 <a:solidFill>
@@ -13914,9 +14122,14 @@
               </a:rPr>
               <a:t>Identify emerging trends and preferences</a:t>
             </a:r>
-          </a:p>
-          <a:p>
-            <a:pPr marL="657225" indent="-457200"/>
+            <a:endParaRPr lang="en-US" sz="2400" dirty="0">
+              <a:solidFill>
+                <a:srgbClr val="002060"/>
+              </a:solidFill>
+            </a:endParaRPr>
+          </a:p>
+          <a:p>
+            <a:pPr marL="657225" indent="-457200" algn="ctr"/>
             <a:r>
               <a:rPr lang="en-US" sz="2400">
                 <a:solidFill>
@@ -13925,9 +14138,14 @@
               </a:rPr>
               <a:t>Predict future customer behavior</a:t>
             </a:r>
-          </a:p>
-          <a:p>
-            <a:pPr marL="657225" indent="-457200"/>
+            <a:endParaRPr lang="en-US" sz="2400" dirty="0">
+              <a:solidFill>
+                <a:srgbClr val="002060"/>
+              </a:solidFill>
+            </a:endParaRPr>
+          </a:p>
+          <a:p>
+            <a:pPr marL="657225" indent="-457200" algn="ctr"/>
             <a:r>
               <a:rPr lang="en-US" sz="2400">
                 <a:solidFill>
@@ -13936,9 +14154,14 @@
               </a:rPr>
               <a:t>Improve targeted marketing strategies</a:t>
             </a:r>
-          </a:p>
-          <a:p>
-            <a:pPr marL="657225" indent="-457200"/>
+            <a:endParaRPr lang="en-US" sz="2400" dirty="0">
+              <a:solidFill>
+                <a:srgbClr val="002060"/>
+              </a:solidFill>
+            </a:endParaRPr>
+          </a:p>
+          <a:p>
+            <a:pPr marL="657225" indent="-457200" algn="ctr"/>
             <a:r>
               <a:rPr lang="en-US" sz="2400">
                 <a:solidFill>
@@ -13947,6 +14170,11 @@
               </a:rPr>
               <a:t>Enhance customer engagement and loyalty</a:t>
             </a:r>
+            <a:endParaRPr lang="en-US" sz="2400" dirty="0">
+              <a:solidFill>
+                <a:srgbClr val="002060"/>
+              </a:solidFill>
+            </a:endParaRPr>
           </a:p>
         </p:txBody>
       </p:sp>
@@ -13968,7 +14196,7 @@
   <p:cSld>
     <p:spTree>
       <p:nvGrpSpPr>
-        <p:cNvPr id="1" name=""/>
+        <p:cNvPr id="1" name="Shape 68"/>
         <p:cNvGrpSpPr/>
         <p:nvPr/>
       </p:nvGrpSpPr>
@@ -13982,42 +14210,54 @@
       </p:grpSpPr>
       <p:sp>
         <p:nvSpPr>
-          <p:cNvPr id="2" name="Title 1">
-            <a:extLst>
-              <a:ext uri="{FF2B5EF4-FFF2-40B4-BE49-F238E27FC236}">
-                <a16:creationId xmlns:a16="http://schemas.microsoft.com/office/drawing/2014/main" id="{9A8299AB-00CF-4E50-E1B2-22267B7FC055}"/>
-              </a:ext>
-            </a:extLst>
-          </p:cNvPr>
-          <p:cNvSpPr>
+          <p:cNvPr id="69" name="Google Shape;69;p4"/>
+          <p:cNvSpPr txBox="1">
             <a:spLocks noGrp="1"/>
           </p:cNvSpPr>
           <p:nvPr>
             <p:ph type="title"/>
           </p:nvPr>
         </p:nvSpPr>
-        <p:spPr/>
+        <p:spPr>
+          <a:xfrm>
+            <a:off x="0" y="6927"/>
+            <a:ext cx="12192000" cy="1932709"/>
+          </a:xfrm>
+          <a:prstGeom prst="rect">
+            <a:avLst/>
+          </a:prstGeom>
+          <a:noFill/>
+          <a:ln>
+            <a:noFill/>
+          </a:ln>
+        </p:spPr>
         <p:txBody>
-          <a:bodyPr/>
+          <a:bodyPr spcFirstLastPara="1" wrap="square" lIns="0" tIns="0" rIns="0" bIns="0" anchor="ctr" anchorCtr="0">
+            <a:noAutofit/>
+          </a:bodyPr>
           <a:lstStyle/>
           <a:p>
+            <a:pPr algn="ctr">
+              <a:lnSpc>
+                <a:spcPct val="104999"/>
+              </a:lnSpc>
+            </a:pPr>
+            <a:r>
+              <a:rPr lang="en-US" dirty="0"/>
+              <a:t>Topic &amp; </a:t>
+            </a:r>
             <a:r>
               <a:rPr lang="en-US"/>
-              <a:t>Project Overview &amp; Goals</a:t>
-            </a:r>
+              <a:t>Scope</a:t>
+            </a:r>
+            <a:endParaRPr lang="en-US" dirty="0"/>
           </a:p>
         </p:txBody>
       </p:sp>
       <p:sp>
         <p:nvSpPr>
-          <p:cNvPr id="3" name="Text Placeholder 2">
-            <a:extLst>
-              <a:ext uri="{FF2B5EF4-FFF2-40B4-BE49-F238E27FC236}">
-                <a16:creationId xmlns:a16="http://schemas.microsoft.com/office/drawing/2014/main" id="{5A541EC2-4F39-92E6-17F1-D59164595624}"/>
-              </a:ext>
-            </a:extLst>
-          </p:cNvPr>
-          <p:cNvSpPr>
+          <p:cNvPr id="70" name="Google Shape;70;p4"/>
+          <p:cNvSpPr txBox="1">
             <a:spLocks noGrp="1"/>
           </p:cNvSpPr>
           <p:nvPr>
@@ -14026,63 +14266,44 @@
         </p:nvSpPr>
         <p:spPr>
           <a:xfrm>
-            <a:off x="906642" y="1975381"/>
-            <a:ext cx="10357103" cy="3776472"/>
+            <a:off x="0" y="2682153"/>
+            <a:ext cx="12185075" cy="3042372"/>
           </a:xfrm>
+          <a:prstGeom prst="rect">
+            <a:avLst/>
+          </a:prstGeom>
+          <a:noFill/>
+          <a:ln>
+            <a:noFill/>
+          </a:ln>
         </p:spPr>
         <p:txBody>
-          <a:bodyPr/>
+          <a:bodyPr spcFirstLastPara="1" wrap="square" lIns="0" tIns="0" rIns="0" bIns="0" anchor="t" anchorCtr="0">
+            <a:noAutofit/>
+          </a:bodyPr>
           <a:lstStyle/>
           <a:p>
-            <a:pPr marL="200025" indent="0">
-              <a:buNone/>
+            <a:pPr marL="91440" indent="-91440" algn="ctr">
+              <a:lnSpc>
+                <a:spcPct val="160000"/>
+              </a:lnSpc>
+              <a:buSzPts val="500"/>
             </a:pPr>
             <a:r>
-              <a:rPr lang="en-US" sz="2400">
-                <a:solidFill>
-                  <a:srgbClr val="002060"/>
-                </a:solidFill>
-              </a:rPr>
-              <a:t>Leverage NLP, Classification, and Sentiment Analysis techniques </a:t>
-            </a:r>
-            <a:endParaRPr lang="en-US"/>
-          </a:p>
-          <a:p>
-            <a:pPr marL="200025" indent="0">
-              <a:buNone/>
-            </a:pPr>
-            <a:r>
-              <a:rPr lang="en-US" sz="2400">
-                <a:solidFill>
-                  <a:srgbClr val="002060"/>
-                </a:solidFill>
-              </a:rPr>
-              <a:t>Understand public sentiment towards brands </a:t>
-            </a:r>
-            <a:endParaRPr lang="en-US"/>
-          </a:p>
-          <a:p>
-            <a:pPr marL="200025" indent="0">
-              <a:buNone/>
-            </a:pPr>
-            <a:r>
-              <a:rPr lang="en-US" sz="2400">
-                <a:solidFill>
-                  <a:srgbClr val="002060"/>
-                </a:solidFill>
-              </a:rPr>
-              <a:t>Empower businesses with insights for maintaining a positive brand image</a:t>
-            </a:r>
-            <a:endParaRPr lang="en-US"/>
+              <a:rPr lang="en-US" sz="3600" dirty="0"/>
+              <a:t>Analyze tweets from Twitter </a:t>
+            </a:r>
+            <a:br>
+              <a:rPr lang="en-US" sz="3600" dirty="0"/>
+            </a:br>
+            <a:r>
+              <a:rPr lang="en-US" sz="3600" dirty="0"/>
+              <a:t>for brand mentions and associated sentiment. </a:t>
+            </a:r>
           </a:p>
         </p:txBody>
       </p:sp>
     </p:spTree>
-    <p:extLst>
-      <p:ext uri="{BB962C8B-B14F-4D97-AF65-F5344CB8AC3E}">
-        <p14:creationId xmlns:p14="http://schemas.microsoft.com/office/powerpoint/2010/main" val="1726448529"/>
-      </p:ext>
-    </p:extLst>
   </p:cSld>
   <p:clrMapOvr>
     <a:masterClrMapping/>
@@ -14109,34 +14330,6 @@
       </p:grpSpPr>
       <p:sp>
         <p:nvSpPr>
-          <p:cNvPr id="2" name="Title 1">
-            <a:extLst>
-              <a:ext uri="{FF2B5EF4-FFF2-40B4-BE49-F238E27FC236}">
-                <a16:creationId xmlns:a16="http://schemas.microsoft.com/office/drawing/2014/main" id="{9A8299AB-00CF-4E50-E1B2-22267B7FC055}"/>
-              </a:ext>
-            </a:extLst>
-          </p:cNvPr>
-          <p:cNvSpPr>
-            <a:spLocks noGrp="1"/>
-          </p:cNvSpPr>
-          <p:nvPr>
-            <p:ph type="title"/>
-          </p:nvPr>
-        </p:nvSpPr>
-        <p:spPr/>
-        <p:txBody>
-          <a:bodyPr/>
-          <a:lstStyle/>
-          <a:p>
-            <a:r>
-              <a:rPr lang="en-US"/>
-              <a:t>Brand Sentiment Analysis</a:t>
-            </a:r>
-          </a:p>
-        </p:txBody>
-      </p:sp>
-      <p:sp>
-        <p:nvSpPr>
           <p:cNvPr id="3" name="Text Placeholder 2">
             <a:extLst>
               <a:ext uri="{FF2B5EF4-FFF2-40B4-BE49-F238E27FC236}">
@@ -14161,32 +14354,115 @@
           <a:bodyPr/>
           <a:lstStyle/>
           <a:p>
-            <a:r>
-              <a:rPr lang="en-US" sz="2400"/>
-              <a:t>Perform brand sentiment analysis on Twitter posts</a:t>
-            </a:r>
-            <a:endParaRPr lang="en-US"/>
-          </a:p>
-          <a:p>
-            <a:r>
-              <a:rPr lang="en-US" sz="2400"/>
-              <a:t>Identify brand mentions in text</a:t>
-            </a:r>
-            <a:endParaRPr lang="en-US"/>
-          </a:p>
-          <a:p>
-            <a:r>
-              <a:rPr lang="en-US" sz="2400"/>
-              <a:t>Determine sentiment towards those brands</a:t>
-            </a:r>
-            <a:endParaRPr lang="en-US"/>
+            <a:pPr marL="200025" indent="0" algn="ctr">
+              <a:buNone/>
+            </a:pPr>
+            <a:r>
+              <a:rPr lang="en-US" sz="2000" dirty="0">
+                <a:solidFill>
+                  <a:srgbClr val="002060"/>
+                </a:solidFill>
+              </a:rPr>
+              <a:t>Analyze sentiment in Twitter posts using the Sentiment140 dataset</a:t>
+            </a:r>
+            <a:endParaRPr lang="en-US" sz="2000" dirty="0"/>
+          </a:p>
+          <a:p>
+            <a:pPr marL="200025" indent="0" algn="ctr">
+              <a:buNone/>
+            </a:pPr>
+            <a:r>
+              <a:rPr lang="en-US" sz="2000" dirty="0">
+                <a:solidFill>
+                  <a:srgbClr val="002060"/>
+                </a:solidFill>
+              </a:rPr>
+              <a:t>Use ML algorithms like Naïve Bayes and Logistic Regression </a:t>
+            </a:r>
+            <a:endParaRPr lang="en-US" sz="2000" dirty="0"/>
+          </a:p>
+          <a:p>
+            <a:pPr marL="200025" indent="0" algn="ctr">
+              <a:buNone/>
+            </a:pPr>
+            <a:r>
+              <a:rPr lang="en-US" sz="2000" dirty="0">
+                <a:solidFill>
+                  <a:srgbClr val="002060"/>
+                </a:solidFill>
+              </a:rPr>
+              <a:t>Understand public sentiment towards brands</a:t>
+            </a:r>
+            <a:endParaRPr lang="en-US" sz="2000" dirty="0"/>
+          </a:p>
+          <a:p>
+            <a:pPr marL="200025" indent="0" algn="ctr">
+              <a:buNone/>
+            </a:pPr>
+            <a:r>
+              <a:rPr lang="en-US" sz="2000" dirty="0">
+                <a:solidFill>
+                  <a:srgbClr val="002060"/>
+                </a:solidFill>
+              </a:rPr>
+              <a:t>Empower businesses with insights for maintaining a positive brand image</a:t>
+            </a:r>
+            <a:endParaRPr lang="en-US" sz="2000" dirty="0"/>
+          </a:p>
+          <a:p>
+            <a:pPr marL="200025" indent="0" algn="ctr">
+              <a:buNone/>
+            </a:pPr>
+            <a:r>
+              <a:rPr lang="en-US" sz="2000" dirty="0">
+                <a:solidFill>
+                  <a:srgbClr val="002060"/>
+                </a:solidFill>
+              </a:rPr>
+              <a:t>Explore key course topics</a:t>
+            </a:r>
+            <a:endParaRPr lang="en-US" sz="2000" dirty="0"/>
+          </a:p>
+        </p:txBody>
+      </p:sp>
+      <p:sp>
+        <p:nvSpPr>
+          <p:cNvPr id="7" name="Title 1">
+            <a:extLst>
+              <a:ext uri="{FF2B5EF4-FFF2-40B4-BE49-F238E27FC236}">
+                <a16:creationId xmlns:a16="http://schemas.microsoft.com/office/drawing/2014/main" id="{9A2ED280-0E85-3926-F350-5468A93D75F5}"/>
+              </a:ext>
+            </a:extLst>
+          </p:cNvPr>
+          <p:cNvSpPr>
+            <a:spLocks noGrp="1"/>
+          </p:cNvSpPr>
+          <p:nvPr>
+            <p:ph type="title"/>
+          </p:nvPr>
+        </p:nvSpPr>
+        <p:spPr>
+          <a:xfrm>
+            <a:off x="-2059" y="-4119"/>
+            <a:ext cx="12196118" cy="1711036"/>
+          </a:xfrm>
+        </p:spPr>
+        <p:txBody>
+          <a:bodyPr/>
+          <a:lstStyle/>
+          <a:p>
+            <a:pPr algn="ctr"/>
+            <a:r>
+              <a:rPr lang="en-US" dirty="0"/>
+              <a:t>Project Overview &amp; Goals</a:t>
+            </a:r>
           </a:p>
         </p:txBody>
       </p:sp>
     </p:spTree>
     <p:extLst>
       <p:ext uri="{BB962C8B-B14F-4D97-AF65-F5344CB8AC3E}">
-        <p14:creationId xmlns:p14="http://schemas.microsoft.com/office/powerpoint/2010/main" val="1254571953"/>
+        <p14:creationId xmlns:p14="http://schemas.microsoft.com/office/powerpoint/2010/main" val="1726448529"/>
       </p:ext>
     </p:extLst>
   </p:cSld>
@@ -14197,6 +14473,134 @@
 </file>
 
 <file path=ppt/slides/slide6.xml><?xml version="1.0" encoding="utf-8"?>
+<p:sld xmlns:a="http://schemas.openxmlformats.org/drawingml/2006/main" xmlns:r="http://schemas.openxmlformats.org/officeDocument/2006/relationships" xmlns:p="http://schemas.openxmlformats.org/presentationml/2006/main">
+  <p:cSld>
+    <p:spTree>
+      <p:nvGrpSpPr>
+        <p:cNvPr id="1" name="Shape 61"/>
+        <p:cNvGrpSpPr/>
+        <p:nvPr/>
+      </p:nvGrpSpPr>
+      <p:grpSpPr>
+        <a:xfrm>
+          <a:off x="0" y="0"/>
+          <a:ext cx="0" cy="0"/>
+          <a:chOff x="0" y="0"/>
+          <a:chExt cx="0" cy="0"/>
+        </a:xfrm>
+      </p:grpSpPr>
+      <p:sp>
+        <p:nvSpPr>
+          <p:cNvPr id="63" name="Google Shape;63;p3"/>
+          <p:cNvSpPr txBox="1">
+            <a:spLocks noGrp="1"/>
+          </p:cNvSpPr>
+          <p:nvPr>
+            <p:ph type="body" idx="1"/>
+          </p:nvPr>
+        </p:nvSpPr>
+        <p:spPr>
+          <a:xfrm>
+            <a:off x="914400" y="1537854"/>
+            <a:ext cx="10363200" cy="3776700"/>
+          </a:xfrm>
+          <a:prstGeom prst="rect">
+            <a:avLst/>
+          </a:prstGeom>
+          <a:noFill/>
+          <a:ln>
+            <a:noFill/>
+          </a:ln>
+        </p:spPr>
+        <p:txBody>
+          <a:bodyPr spcFirstLastPara="1" wrap="square" lIns="0" tIns="0" rIns="0" bIns="0" anchor="t" anchorCtr="0">
+            <a:noAutofit/>
+          </a:bodyPr>
+          <a:lstStyle/>
+          <a:p>
+            <a:pPr marL="0" indent="0">
+              <a:lnSpc>
+                <a:spcPct val="160000"/>
+              </a:lnSpc>
+              <a:buSzPts val="500"/>
+              <a:buNone/>
+            </a:pPr>
+            <a:r>
+              <a:rPr lang="en-US" dirty="0"/>
+              <a:t>How can we accurately classify brand sentiment in Twitter posts?</a:t>
+            </a:r>
+          </a:p>
+          <a:p>
+            <a:pPr marL="0" indent="0">
+              <a:lnSpc>
+                <a:spcPct val="160000"/>
+              </a:lnSpc>
+              <a:buSzPts val="500"/>
+              <a:buNone/>
+            </a:pPr>
+            <a:r>
+              <a:rPr lang="en-US" dirty="0"/>
+              <a:t>How can we leverage AI to provide businesses with real-time insights into their brand image?</a:t>
+            </a:r>
+          </a:p>
+          <a:p>
+            <a:pPr marL="0" indent="0">
+              <a:lnSpc>
+                <a:spcPct val="160000"/>
+              </a:lnSpc>
+              <a:buSzPts val="500"/>
+              <a:buNone/>
+            </a:pPr>
+            <a:r>
+              <a:rPr lang="en-US" dirty="0"/>
+              <a:t>How can we use Machine Learning to predict future customer sentiment and behavior?</a:t>
+            </a:r>
+          </a:p>
+        </p:txBody>
+      </p:sp>
+      <p:sp>
+        <p:nvSpPr>
+          <p:cNvPr id="5" name="Title 1">
+            <a:extLst>
+              <a:ext uri="{FF2B5EF4-FFF2-40B4-BE49-F238E27FC236}">
+                <a16:creationId xmlns:a16="http://schemas.microsoft.com/office/drawing/2014/main" id="{9CD88636-71AF-01E2-BC99-3FAC9E6A854F}"/>
+              </a:ext>
+            </a:extLst>
+          </p:cNvPr>
+          <p:cNvSpPr>
+            <a:spLocks noGrp="1"/>
+          </p:cNvSpPr>
+          <p:nvPr>
+            <p:ph type="title"/>
+          </p:nvPr>
+        </p:nvSpPr>
+        <p:spPr>
+          <a:xfrm>
+            <a:off x="-2059" y="-4119"/>
+            <a:ext cx="12196118" cy="893618"/>
+          </a:xfrm>
+        </p:spPr>
+        <p:txBody>
+          <a:bodyPr/>
+          <a:lstStyle/>
+          <a:p>
+            <a:pPr algn="ctr"/>
+            <a:r>
+              <a:rPr lang="en-US" dirty="0"/>
+              <a:t>Questions</a:t>
+            </a:r>
+          </a:p>
+        </p:txBody>
+      </p:sp>
+    </p:spTree>
+  </p:cSld>
+  <p:clrMapOvr>
+    <a:masterClrMapping/>
+  </p:clrMapOvr>
+</p:sld>
+</file>
+
+<file path=ppt/slides/slide7.xml><?xml version="1.0" encoding="utf-8"?>
 <p:sld xmlns:a="http://schemas.openxmlformats.org/drawingml/2006/main" xmlns:r="http://schemas.openxmlformats.org/officeDocument/2006/relationships" xmlns:p="http://schemas.openxmlformats.org/presentationml/2006/main">
   <p:cSld>
     <p:spTree>
@@ -14215,6 +14619,142 @@
       </p:grpSpPr>
       <p:sp>
         <p:nvSpPr>
+          <p:cNvPr id="3" name="Text Placeholder 2">
+            <a:extLst>
+              <a:ext uri="{FF2B5EF4-FFF2-40B4-BE49-F238E27FC236}">
+                <a16:creationId xmlns:a16="http://schemas.microsoft.com/office/drawing/2014/main" id="{5A541EC2-4F39-92E6-17F1-D59164595624}"/>
+              </a:ext>
+            </a:extLst>
+          </p:cNvPr>
+          <p:cNvSpPr>
+            <a:spLocks noGrp="1"/>
+          </p:cNvSpPr>
+          <p:nvPr>
+            <p:ph type="body" idx="1"/>
+          </p:nvPr>
+        </p:nvSpPr>
+        <p:spPr>
+          <a:xfrm>
+            <a:off x="906642" y="1975381"/>
+            <a:ext cx="10357103" cy="3776472"/>
+          </a:xfrm>
+        </p:spPr>
+        <p:txBody>
+          <a:bodyPr/>
+          <a:lstStyle/>
+          <a:p>
+            <a:pPr marL="200025" indent="0">
+              <a:buNone/>
+            </a:pPr>
+            <a:r>
+              <a:rPr lang="en-US" sz="2400" dirty="0"/>
+              <a:t>Explore Sentiment140 dataset</a:t>
+            </a:r>
+          </a:p>
+          <a:p>
+            <a:pPr marL="200025" indent="0">
+              <a:buNone/>
+            </a:pPr>
+            <a:r>
+              <a:rPr lang="en-US" sz="2400" dirty="0"/>
+              <a:t>Use GPT-4 to generate additional data</a:t>
+            </a:r>
+          </a:p>
+          <a:p>
+            <a:pPr marL="200025" indent="0">
+              <a:buNone/>
+            </a:pPr>
+            <a:r>
+              <a:rPr lang="en-US" sz="2400" dirty="0"/>
+              <a:t>Preprocess the data</a:t>
+            </a:r>
+          </a:p>
+          <a:p>
+            <a:pPr marL="200025" indent="0">
+              <a:buNone/>
+            </a:pPr>
+            <a:r>
+              <a:rPr lang="en-US" sz="2400" dirty="0"/>
+              <a:t>Train and test different models</a:t>
+            </a:r>
+          </a:p>
+          <a:p>
+            <a:pPr marL="200025" indent="0">
+              <a:buNone/>
+            </a:pPr>
+            <a:r>
+              <a:rPr lang="en-US" sz="2400" dirty="0"/>
+              <a:t>Select highest performer</a:t>
+            </a:r>
+          </a:p>
+        </p:txBody>
+      </p:sp>
+      <p:sp>
+        <p:nvSpPr>
+          <p:cNvPr id="7" name="Title 1">
+            <a:extLst>
+              <a:ext uri="{FF2B5EF4-FFF2-40B4-BE49-F238E27FC236}">
+                <a16:creationId xmlns:a16="http://schemas.microsoft.com/office/drawing/2014/main" id="{80A46B42-BD37-9CEE-588E-C639DB9EBCFE}"/>
+              </a:ext>
+            </a:extLst>
+          </p:cNvPr>
+          <p:cNvSpPr>
+            <a:spLocks noGrp="1"/>
+          </p:cNvSpPr>
+          <p:nvPr>
+            <p:ph type="title"/>
+          </p:nvPr>
+        </p:nvSpPr>
+        <p:spPr>
+          <a:xfrm>
+            <a:off x="-2059" y="-4119"/>
+            <a:ext cx="12196118" cy="1711036"/>
+          </a:xfrm>
+        </p:spPr>
+        <p:txBody>
+          <a:bodyPr/>
+          <a:lstStyle/>
+          <a:p>
+            <a:pPr algn="ctr"/>
+            <a:r>
+              <a:rPr lang="en-US" dirty="0"/>
+              <a:t>How Do We Create A Brand Sentiment Analyzer?</a:t>
+            </a:r>
+          </a:p>
+        </p:txBody>
+      </p:sp>
+    </p:spTree>
+    <p:extLst>
+      <p:ext uri="{BB962C8B-B14F-4D97-AF65-F5344CB8AC3E}">
+        <p14:creationId xmlns:p14="http://schemas.microsoft.com/office/powerpoint/2010/main" val="1254571953"/>
+      </p:ext>
+    </p:extLst>
+  </p:cSld>
+  <p:clrMapOvr>
+    <a:masterClrMapping/>
+  </p:clrMapOvr>
+</p:sld>
+</file>
+
+<file path=ppt/slides/slide8.xml><?xml version="1.0" encoding="utf-8"?>
+<p:sld xmlns:a="http://schemas.openxmlformats.org/drawingml/2006/main" xmlns:r="http://schemas.openxmlformats.org/officeDocument/2006/relationships" xmlns:p="http://schemas.openxmlformats.org/presentationml/2006/main">
+  <p:cSld>
+    <p:spTree>
+      <p:nvGrpSpPr>
+        <p:cNvPr id="1" name=""/>
+        <p:cNvGrpSpPr/>
+        <p:nvPr/>
+      </p:nvGrpSpPr>
+      <p:grpSpPr>
+        <a:xfrm>
+          <a:off x="0" y="0"/>
+          <a:ext cx="0" cy="0"/>
+          <a:chOff x="0" y="0"/>
+          <a:chExt cx="0" cy="0"/>
+        </a:xfrm>
+      </p:grpSpPr>
+      <p:sp>
+        <p:nvSpPr>
           <p:cNvPr id="2" name="Title 1">
             <a:extLst>
               <a:ext uri="{FF2B5EF4-FFF2-40B4-BE49-F238E27FC236}">
@@ -14320,304 +14860,6 @@
         <p14:creationId xmlns:p14="http://schemas.microsoft.com/office/powerpoint/2010/main" val="4034068343"/>
       </p:ext>
     </p:extLst>
-  </p:cSld>
-  <p:clrMapOvr>
-    <a:masterClrMapping/>
-  </p:clrMapOvr>
-</p:sld>
-</file>
-
-<file path=ppt/slides/slide7.xml><?xml version="1.0" encoding="utf-8"?>
-<p:sld xmlns:a="http://schemas.openxmlformats.org/drawingml/2006/main" xmlns:r="http://schemas.openxmlformats.org/officeDocument/2006/relationships" xmlns:p="http://schemas.openxmlformats.org/presentationml/2006/main">
-  <p:cSld>
-    <p:spTree>
-      <p:nvGrpSpPr>
-        <p:cNvPr id="1" name="Shape 61"/>
-        <p:cNvGrpSpPr/>
-        <p:nvPr/>
-      </p:nvGrpSpPr>
-      <p:grpSpPr>
-        <a:xfrm>
-          <a:off x="0" y="0"/>
-          <a:ext cx="0" cy="0"/>
-          <a:chOff x="0" y="0"/>
-          <a:chExt cx="0" cy="0"/>
-        </a:xfrm>
-      </p:grpSpPr>
-      <p:sp>
-        <p:nvSpPr>
-          <p:cNvPr id="62" name="Google Shape;62;p3"/>
-          <p:cNvSpPr txBox="1">
-            <a:spLocks noGrp="1"/>
-          </p:cNvSpPr>
-          <p:nvPr>
-            <p:ph type="title"/>
-          </p:nvPr>
-        </p:nvSpPr>
-        <p:spPr>
-          <a:xfrm>
-            <a:off x="914400" y="685800"/>
-            <a:ext cx="10363200" cy="1143000"/>
-          </a:xfrm>
-          <a:prstGeom prst="rect">
-            <a:avLst/>
-          </a:prstGeom>
-          <a:noFill/>
-          <a:ln>
-            <a:noFill/>
-          </a:ln>
-        </p:spPr>
-        <p:txBody>
-          <a:bodyPr spcFirstLastPara="1" wrap="square" lIns="0" tIns="0" rIns="0" bIns="0" anchor="ctr" anchorCtr="0">
-            <a:noAutofit/>
-          </a:bodyPr>
-          <a:lstStyle/>
-          <a:p>
-            <a:pPr marL="0" lvl="0" indent="0" algn="l" rtl="0">
-              <a:lnSpc>
-                <a:spcPct val="104999"/>
-              </a:lnSpc>
-              <a:spcBef>
-                <a:spcPts val="0"/>
-              </a:spcBef>
-              <a:spcAft>
-                <a:spcPts val="0"/>
-              </a:spcAft>
-              <a:buNone/>
-            </a:pPr>
-            <a:r>
-              <a:rPr lang="en-US"/>
-              <a:t>Problem Statement</a:t>
-            </a:r>
-            <a:endParaRPr/>
-          </a:p>
-        </p:txBody>
-      </p:sp>
-      <p:sp>
-        <p:nvSpPr>
-          <p:cNvPr id="63" name="Google Shape;63;p3"/>
-          <p:cNvSpPr txBox="1">
-            <a:spLocks noGrp="1"/>
-          </p:cNvSpPr>
-          <p:nvPr>
-            <p:ph type="body" idx="1"/>
-          </p:nvPr>
-        </p:nvSpPr>
-        <p:spPr>
-          <a:xfrm>
-            <a:off x="914400" y="1828800"/>
-            <a:ext cx="10363200" cy="3776700"/>
-          </a:xfrm>
-          <a:prstGeom prst="rect">
-            <a:avLst/>
-          </a:prstGeom>
-          <a:noFill/>
-          <a:ln>
-            <a:noFill/>
-          </a:ln>
-        </p:spPr>
-        <p:txBody>
-          <a:bodyPr spcFirstLastPara="1" wrap="square" lIns="0" tIns="0" rIns="0" bIns="0" anchor="t" anchorCtr="0">
-            <a:noAutofit/>
-          </a:bodyPr>
-          <a:lstStyle/>
-          <a:p>
-            <a:pPr marL="91440" indent="-91440">
-              <a:lnSpc>
-                <a:spcPct val="160000"/>
-              </a:lnSpc>
-              <a:buSzPts val="500"/>
-            </a:pPr>
-            <a:r>
-              <a:rPr lang="en-US" sz="2000"/>
-              <a:t>For a given tweet, we want to detect in there is a brand mentioned and the sentiment towards that brand. There are two parts to this problem:</a:t>
-            </a:r>
-            <a:endParaRPr lang="en-US"/>
-          </a:p>
-          <a:p>
-            <a:pPr marL="571500" lvl="1" indent="-457200">
-              <a:lnSpc>
-                <a:spcPct val="160000"/>
-              </a:lnSpc>
-              <a:buSzPts val="2000"/>
-              <a:buAutoNum type="arabicPeriod"/>
-            </a:pPr>
-            <a:r>
-              <a:rPr lang="en-US" sz="2000"/>
-              <a:t>Brand Classification – classifies a brand, if one is mentioned</a:t>
-            </a:r>
-            <a:endParaRPr/>
-          </a:p>
-          <a:p>
-            <a:pPr marL="571500" lvl="1" indent="-457200">
-              <a:lnSpc>
-                <a:spcPct val="160000"/>
-              </a:lnSpc>
-              <a:buSzPts val="2000"/>
-              <a:buAutoNum type="arabicPeriod"/>
-            </a:pPr>
-            <a:r>
-              <a:rPr lang="en-US" sz="2000"/>
-              <a:t>Sentiment Classification – classifies the sentiment of a tweet</a:t>
-            </a:r>
-            <a:endParaRPr/>
-          </a:p>
-          <a:p>
-            <a:pPr marL="90170" lvl="0" indent="-58420" algn="l" rtl="0">
-              <a:lnSpc>
-                <a:spcPct val="160000"/>
-              </a:lnSpc>
-              <a:spcBef>
-                <a:spcPts val="600"/>
-              </a:spcBef>
-              <a:spcAft>
-                <a:spcPts val="0"/>
-              </a:spcAft>
-              <a:buSzPts val="500"/>
-              <a:buNone/>
-            </a:pPr>
-            <a:endParaRPr sz="2000"/>
-          </a:p>
-          <a:p>
-            <a:pPr marL="90170" lvl="0" indent="-90170" algn="ctr" rtl="0">
-              <a:lnSpc>
-                <a:spcPct val="160000"/>
-              </a:lnSpc>
-              <a:spcBef>
-                <a:spcPts val="600"/>
-              </a:spcBef>
-              <a:spcAft>
-                <a:spcPts val="0"/>
-              </a:spcAft>
-              <a:buSzPts val="500"/>
-              <a:buChar char=" "/>
-            </a:pPr>
-            <a:r>
-              <a:rPr lang="en-US" sz="2000"/>
-              <a:t>Putting these together we get a Brand Sentiment Analyzer</a:t>
-            </a:r>
-            <a:endParaRPr/>
-          </a:p>
-        </p:txBody>
-      </p:sp>
-    </p:spTree>
-  </p:cSld>
-  <p:clrMapOvr>
-    <a:masterClrMapping/>
-  </p:clrMapOvr>
-</p:sld>
-</file>
-
-<file path=ppt/slides/slide8.xml><?xml version="1.0" encoding="utf-8"?>
-<p:sld xmlns:a="http://schemas.openxmlformats.org/drawingml/2006/main" xmlns:r="http://schemas.openxmlformats.org/officeDocument/2006/relationships" xmlns:p="http://schemas.openxmlformats.org/presentationml/2006/main">
-  <p:cSld>
-    <p:spTree>
-      <p:nvGrpSpPr>
-        <p:cNvPr id="1" name="Shape 68"/>
-        <p:cNvGrpSpPr/>
-        <p:nvPr/>
-      </p:nvGrpSpPr>
-      <p:grpSpPr>
-        <a:xfrm>
-          <a:off x="0" y="0"/>
-          <a:ext cx="0" cy="0"/>
-          <a:chOff x="0" y="0"/>
-          <a:chExt cx="0" cy="0"/>
-        </a:xfrm>
-      </p:grpSpPr>
-      <p:sp>
-        <p:nvSpPr>
-          <p:cNvPr id="69" name="Google Shape;69;p4"/>
-          <p:cNvSpPr txBox="1">
-            <a:spLocks noGrp="1"/>
-          </p:cNvSpPr>
-          <p:nvPr>
-            <p:ph type="title"/>
-          </p:nvPr>
-        </p:nvSpPr>
-        <p:spPr>
-          <a:xfrm>
-            <a:off x="914400" y="685800"/>
-            <a:ext cx="10363200" cy="1143000"/>
-          </a:xfrm>
-          <a:prstGeom prst="rect">
-            <a:avLst/>
-          </a:prstGeom>
-          <a:noFill/>
-          <a:ln>
-            <a:noFill/>
-          </a:ln>
-        </p:spPr>
-        <p:txBody>
-          <a:bodyPr spcFirstLastPara="1" wrap="square" lIns="0" tIns="0" rIns="0" bIns="0" anchor="ctr" anchorCtr="0">
-            <a:noAutofit/>
-          </a:bodyPr>
-          <a:lstStyle/>
-          <a:p>
-            <a:pPr marL="0" lvl="0" indent="0" algn="l" rtl="0">
-              <a:lnSpc>
-                <a:spcPct val="104999"/>
-              </a:lnSpc>
-              <a:spcBef>
-                <a:spcPts val="0"/>
-              </a:spcBef>
-              <a:spcAft>
-                <a:spcPts val="0"/>
-              </a:spcAft>
-              <a:buNone/>
-            </a:pPr>
-            <a:r>
-              <a:rPr lang="en-US"/>
-              <a:t>Scope</a:t>
-            </a:r>
-            <a:endParaRPr/>
-          </a:p>
-        </p:txBody>
-      </p:sp>
-      <p:sp>
-        <p:nvSpPr>
-          <p:cNvPr id="70" name="Google Shape;70;p4"/>
-          <p:cNvSpPr txBox="1">
-            <a:spLocks noGrp="1"/>
-          </p:cNvSpPr>
-          <p:nvPr>
-            <p:ph type="body" idx="1"/>
-          </p:nvPr>
-        </p:nvSpPr>
-        <p:spPr>
-          <a:xfrm>
-            <a:off x="1371600" y="1947863"/>
-            <a:ext cx="8610603" cy="3776662"/>
-          </a:xfrm>
-          <a:prstGeom prst="rect">
-            <a:avLst/>
-          </a:prstGeom>
-          <a:noFill/>
-          <a:ln>
-            <a:noFill/>
-          </a:ln>
-        </p:spPr>
-        <p:txBody>
-          <a:bodyPr spcFirstLastPara="1" wrap="square" lIns="0" tIns="0" rIns="0" bIns="0" anchor="t" anchorCtr="0">
-            <a:noAutofit/>
-          </a:bodyPr>
-          <a:lstStyle/>
-          <a:p>
-            <a:pPr marL="91440" indent="-91440">
-              <a:lnSpc>
-                <a:spcPct val="160000"/>
-              </a:lnSpc>
-              <a:buSzPts val="500"/>
-            </a:pPr>
-            <a:r>
-              <a:rPr lang="en-US" sz="2000"/>
-              <a:t>Our project focuses specifically on analyzing tweets from Twitter for brand mentions and associated sentiment. </a:t>
-            </a:r>
-            <a:endParaRPr lang="en-US"/>
-          </a:p>
-        </p:txBody>
-      </p:sp>
-    </p:spTree>
   </p:cSld>
   <p:clrMapOvr>
     <a:masterClrMapping/>
@@ -14654,8 +14896,8 @@
         </p:nvSpPr>
         <p:spPr>
           <a:xfrm>
-            <a:off x="914400" y="685800"/>
-            <a:ext cx="10363200" cy="1143000"/>
+            <a:off x="13855" y="464127"/>
+            <a:ext cx="12178145" cy="1143000"/>
           </a:xfrm>
           <a:prstGeom prst="rect">
             <a:avLst/>
@@ -14671,7 +14913,7 @@
           </a:bodyPr>
           <a:lstStyle/>
           <a:p>
-            <a:pPr marL="0" lvl="0" indent="0" algn="l" rtl="0">
+            <a:pPr marL="0" lvl="0" indent="0" algn="ctr" rtl="0">
               <a:lnSpc>
                 <a:spcPct val="104999"/>
               </a:lnSpc>
@@ -14684,10 +14926,9 @@
               <a:buNone/>
             </a:pPr>
             <a:r>
-              <a:rPr lang="en-US"/>
+              <a:rPr lang="en-US" sz="6000" dirty="0"/>
               <a:t>Datasets</a:t>
             </a:r>
-            <a:endParaRPr/>
           </a:p>
         </p:txBody>
       </p:sp>
@@ -14703,8 +14944,8 @@
         </p:nvSpPr>
         <p:spPr>
           <a:xfrm>
-            <a:off x="1600200" y="1828800"/>
-            <a:ext cx="7881937" cy="3776662"/>
+            <a:off x="20782" y="2244436"/>
+            <a:ext cx="12190700" cy="2349644"/>
           </a:xfrm>
           <a:prstGeom prst="rect">
             <a:avLst/>
@@ -14720,7 +14961,7 @@
           </a:bodyPr>
           <a:lstStyle/>
           <a:p>
-            <a:pPr marL="340995" lvl="1" indent="-226695">
+            <a:pPr marL="114300" lvl="1" indent="0" algn="ctr">
               <a:lnSpc>
                 <a:spcPct val="160000"/>
               </a:lnSpc>
@@ -14728,25 +14969,25 @@
                 <a:spcPts val="0"/>
               </a:spcBef>
               <a:buSzPts val="2000"/>
+              <a:buNone/>
             </a:pPr>
             <a:r>
-              <a:rPr lang="en-US" sz="2000"/>
+              <a:rPr lang="en-US" sz="4400" dirty="0"/>
               <a:t>Sentiment140</a:t>
             </a:r>
-            <a:endParaRPr lang="en-US"/>
-          </a:p>
-          <a:p>
-            <a:pPr marL="340995" lvl="1" indent="-226695">
+          </a:p>
+          <a:p>
+            <a:pPr marL="114300" lvl="1" indent="0" algn="ctr">
               <a:lnSpc>
                 <a:spcPct val="160000"/>
               </a:lnSpc>
               <a:buSzPts val="2000"/>
+              <a:buNone/>
             </a:pPr>
             <a:r>
-              <a:rPr lang="en-US" sz="2000"/>
+              <a:rPr lang="en-US" sz="4400" dirty="0"/>
               <a:t>Surge AI</a:t>
             </a:r>
-            <a:endParaRPr lang="en-US"/>
           </a:p>
         </p:txBody>
       </p:sp>

</xml_diff>